<commit_message>
Deepinder feedback on Signup/login/logout webservices
</commit_message>
<xml_diff>
--- a/ws/WS Design Docs/API_Listing.pptx
+++ b/ws/WS Design Docs/API_Listing.pptx
@@ -5,39 +5,40 @@
     <p:sldMasterId id="2147483648" r:id="rId1"/>
   </p:sldMasterIdLst>
   <p:notesMasterIdLst>
-    <p:notesMasterId r:id="rId32"/>
+    <p:notesMasterId r:id="rId33"/>
   </p:notesMasterIdLst>
   <p:sldIdLst>
     <p:sldId id="256" r:id="rId2"/>
-    <p:sldId id="257" r:id="rId3"/>
-    <p:sldId id="258" r:id="rId4"/>
-    <p:sldId id="262" r:id="rId5"/>
-    <p:sldId id="264" r:id="rId6"/>
-    <p:sldId id="265" r:id="rId7"/>
-    <p:sldId id="268" r:id="rId8"/>
-    <p:sldId id="266" r:id="rId9"/>
-    <p:sldId id="269" r:id="rId10"/>
-    <p:sldId id="271" r:id="rId11"/>
-    <p:sldId id="270" r:id="rId12"/>
-    <p:sldId id="273" r:id="rId13"/>
-    <p:sldId id="275" r:id="rId14"/>
-    <p:sldId id="277" r:id="rId15"/>
-    <p:sldId id="274" r:id="rId16"/>
-    <p:sldId id="278" r:id="rId17"/>
-    <p:sldId id="280" r:id="rId18"/>
-    <p:sldId id="281" r:id="rId19"/>
-    <p:sldId id="282" r:id="rId20"/>
-    <p:sldId id="283" r:id="rId21"/>
-    <p:sldId id="287" r:id="rId22"/>
-    <p:sldId id="284" r:id="rId23"/>
-    <p:sldId id="288" r:id="rId24"/>
-    <p:sldId id="285" r:id="rId25"/>
-    <p:sldId id="289" r:id="rId26"/>
-    <p:sldId id="286" r:id="rId27"/>
-    <p:sldId id="290" r:id="rId28"/>
-    <p:sldId id="292" r:id="rId29"/>
-    <p:sldId id="293" r:id="rId30"/>
-    <p:sldId id="295" r:id="rId31"/>
+    <p:sldId id="296" r:id="rId3"/>
+    <p:sldId id="257" r:id="rId4"/>
+    <p:sldId id="258" r:id="rId5"/>
+    <p:sldId id="262" r:id="rId6"/>
+    <p:sldId id="264" r:id="rId7"/>
+    <p:sldId id="265" r:id="rId8"/>
+    <p:sldId id="268" r:id="rId9"/>
+    <p:sldId id="266" r:id="rId10"/>
+    <p:sldId id="269" r:id="rId11"/>
+    <p:sldId id="271" r:id="rId12"/>
+    <p:sldId id="270" r:id="rId13"/>
+    <p:sldId id="273" r:id="rId14"/>
+    <p:sldId id="275" r:id="rId15"/>
+    <p:sldId id="277" r:id="rId16"/>
+    <p:sldId id="274" r:id="rId17"/>
+    <p:sldId id="278" r:id="rId18"/>
+    <p:sldId id="280" r:id="rId19"/>
+    <p:sldId id="281" r:id="rId20"/>
+    <p:sldId id="282" r:id="rId21"/>
+    <p:sldId id="283" r:id="rId22"/>
+    <p:sldId id="287" r:id="rId23"/>
+    <p:sldId id="284" r:id="rId24"/>
+    <p:sldId id="288" r:id="rId25"/>
+    <p:sldId id="285" r:id="rId26"/>
+    <p:sldId id="289" r:id="rId27"/>
+    <p:sldId id="286" r:id="rId28"/>
+    <p:sldId id="290" r:id="rId29"/>
+    <p:sldId id="292" r:id="rId30"/>
+    <p:sldId id="293" r:id="rId31"/>
+    <p:sldId id="295" r:id="rId32"/>
   </p:sldIdLst>
   <p:sldSz cx="9144000" cy="6858000" type="screen4x3"/>
   <p:notesSz cx="6858000" cy="9144000"/>
@@ -554,7 +555,7 @@
           <a:p>
             <a:fld id="{EBCCC8FC-91A4-41CA-AEE8-7E0ED8E40045}" type="slidenum">
               <a:rPr lang="en-US" smtClean="0"/>
-              <a:t>21</a:t>
+              <a:t>22</a:t>
             </a:fld>
             <a:endParaRPr lang="en-US"/>
           </a:p>
@@ -3633,12 +3634,14 @@
         </p:nvSpPr>
         <p:spPr/>
         <p:txBody>
-          <a:bodyPr/>
+          <a:bodyPr>
+            <a:normAutofit/>
+          </a:bodyPr>
           <a:lstStyle/>
           <a:p>
             <a:r>
               <a:rPr lang="en-US" dirty="0" err="1" smtClean="0"/>
-              <a:t>showOptionsSocialNetworks</a:t>
+              <a:t>submitOptionsSocialNetworks</a:t>
             </a:r>
             <a:endParaRPr lang="en-US" dirty="0"/>
           </a:p>
@@ -3656,7 +3659,9 @@
         </p:nvSpPr>
         <p:spPr/>
         <p:txBody>
-          <a:bodyPr/>
+          <a:bodyPr>
+            <a:normAutofit fontScale="92500" lnSpcReduction="10000"/>
+          </a:bodyPr>
           <a:lstStyle/>
           <a:p>
             <a:r>
@@ -3664,8 +3669,8 @@
               <a:t>API: </a:t>
             </a:r>
             <a:r>
-              <a:rPr lang="en-US" dirty="0" err="1"/>
-              <a:t>showOptionsSocialNetworks</a:t>
+              <a:rPr lang="en-US" dirty="0" err="1" smtClean="0"/>
+              <a:t>submitOptionsSocialNetworks</a:t>
             </a:r>
             <a:endParaRPr lang="en-US" dirty="0"/>
           </a:p>
@@ -3676,7 +3681,7 @@
             </a:r>
             <a:r>
               <a:rPr lang="en-US" dirty="0" smtClean="0"/>
-              <a:t>by: when users access Profile -&gt; Settings -&gt; Social Networks -&gt; Connections</a:t>
+              <a:t>by: when users make changes in User Profile -&gt; Social Networks -&gt; Connections</a:t>
             </a:r>
             <a:endParaRPr lang="en-US" dirty="0"/>
           </a:p>
@@ -3689,33 +3694,34 @@
               <a:rPr lang="en-US" dirty="0" err="1" smtClean="0"/>
               <a:t>user_id</a:t>
             </a:r>
-            <a:endParaRPr lang="en-US" dirty="0"/>
-          </a:p>
-          <a:p>
-            <a:r>
-              <a:rPr lang="en-US" dirty="0" smtClean="0"/>
-              <a:t>Output: </a:t>
-            </a:r>
-            <a:r>
-              <a:rPr lang="en-US" dirty="0"/>
-              <a:t>connection status to social networks (</a:t>
-            </a:r>
-            <a:r>
-              <a:rPr lang="en-US" dirty="0" err="1"/>
+            <a:r>
+              <a:rPr lang="en-US" dirty="0" smtClean="0"/>
+              <a:t>, connection status to social networks (</a:t>
+            </a:r>
+            <a:r>
+              <a:rPr lang="en-US" dirty="0" err="1" smtClean="0"/>
               <a:t>facebook</a:t>
             </a:r>
             <a:r>
-              <a:rPr lang="en-US" dirty="0"/>
+              <a:rPr lang="en-US" dirty="0" smtClean="0"/>
               <a:t>, twitter, foursquare, </a:t>
             </a:r>
             <a:r>
-              <a:rPr lang="en-US" dirty="0" err="1"/>
+              <a:rPr lang="en-US" dirty="0" err="1" smtClean="0"/>
               <a:t>tumblr</a:t>
             </a:r>
             <a:r>
-              <a:rPr lang="en-US" dirty="0"/>
+              <a:rPr lang="en-US" dirty="0" smtClean="0"/>
               <a:t>)</a:t>
             </a:r>
+            <a:endParaRPr lang="en-US" dirty="0"/>
+          </a:p>
+          <a:p>
+            <a:r>
+              <a:rPr lang="en-US" dirty="0" smtClean="0"/>
+              <a:t>Output: success or not</a:t>
+            </a:r>
+            <a:endParaRPr lang="en-US" dirty="0"/>
           </a:p>
           <a:p>
             <a:r>
@@ -3724,7 +3730,25 @@
             </a:r>
             <a:r>
               <a:rPr lang="en-US" dirty="0" smtClean="0"/>
-              <a:t>changes: no changes</a:t>
+              <a:t>changes:</a:t>
+            </a:r>
+          </a:p>
+          <a:p>
+            <a:pPr lvl="1"/>
+            <a:r>
+              <a:rPr lang="en-US" dirty="0" err="1" smtClean="0"/>
+              <a:t>user_usnc</a:t>
+            </a:r>
+            <a:endParaRPr lang="en-US" dirty="0" smtClean="0"/>
+          </a:p>
+          <a:p>
+            <a:r>
+              <a:rPr lang="en-US" dirty="0" smtClean="0"/>
+              <a:t>Notes: Ignore the column </a:t>
+            </a:r>
+            <a:r>
+              <a:rPr lang="en-US" dirty="0" err="1" smtClean="0"/>
+              <a:t>usnc_order</a:t>
             </a:r>
             <a:endParaRPr lang="en-US" dirty="0"/>
           </a:p>
@@ -3733,7 +3757,7 @@
     </p:spTree>
     <p:extLst>
       <p:ext uri="{BB962C8B-B14F-4D97-AF65-F5344CB8AC3E}">
-        <p14:creationId xmlns:p14="http://schemas.microsoft.com/office/powerpoint/2010/main" val="1792597315"/>
+        <p14:creationId xmlns:p14="http://schemas.microsoft.com/office/powerpoint/2010/main" val="1512642130"/>
       </p:ext>
     </p:extLst>
   </p:cSld>
@@ -3777,7 +3801,7 @@
           <a:p>
             <a:r>
               <a:rPr lang="en-US" dirty="0" err="1" smtClean="0"/>
-              <a:t>submitOptionsAutoPublish</a:t>
+              <a:t>showOptionsSocialNetworks</a:t>
             </a:r>
             <a:endParaRPr lang="en-US" dirty="0"/>
           </a:p>
@@ -3795,9 +3819,7 @@
         </p:nvSpPr>
         <p:spPr/>
         <p:txBody>
-          <a:bodyPr>
-            <a:normAutofit fontScale="92500"/>
-          </a:bodyPr>
+          <a:bodyPr/>
           <a:lstStyle/>
           <a:p>
             <a:r>
@@ -3806,7 +3828,7 @@
             </a:r>
             <a:r>
               <a:rPr lang="en-US" dirty="0" err="1"/>
-              <a:t>submitOptionsAutoPublish</a:t>
+              <a:t>showOptionsSocialNetworks</a:t>
             </a:r>
             <a:endParaRPr lang="en-US" dirty="0"/>
           </a:p>
@@ -3817,15 +3839,7 @@
             </a:r>
             <a:r>
               <a:rPr lang="en-US" dirty="0" smtClean="0"/>
-              <a:t>by: when users make changes in </a:t>
-            </a:r>
-            <a:r>
-              <a:rPr lang="en-US" dirty="0"/>
-              <a:t>Profile -&gt; Settings -&gt; Social Networks -&gt; </a:t>
-            </a:r>
-            <a:r>
-              <a:rPr lang="en-US" dirty="0" smtClean="0"/>
-              <a:t>Auto Publishing</a:t>
+              <a:t>by: when users access Profile -&gt; Settings -&gt; Social Networks -&gt; Connections</a:t>
             </a:r>
             <a:endParaRPr lang="en-US" dirty="0"/>
           </a:p>
@@ -3838,26 +3852,33 @@
               <a:rPr lang="en-US" dirty="0" err="1" smtClean="0"/>
               <a:t>user_id</a:t>
             </a:r>
-            <a:r>
-              <a:rPr lang="en-US" dirty="0" smtClean="0"/>
-              <a:t>, </a:t>
-            </a:r>
-            <a:r>
-              <a:rPr lang="en-US" dirty="0" err="1" smtClean="0"/>
-              <a:t>auto_publishing</a:t>
-            </a:r>
-            <a:r>
-              <a:rPr lang="en-US" dirty="0" smtClean="0"/>
-              <a:t> status</a:t>
-            </a:r>
-            <a:endParaRPr lang="en-US" dirty="0"/>
-          </a:p>
-          <a:p>
-            <a:r>
-              <a:rPr lang="en-US" dirty="0" smtClean="0"/>
-              <a:t>Output: success or not</a:t>
-            </a:r>
-            <a:endParaRPr lang="en-US" dirty="0"/>
+            <a:endParaRPr lang="en-US" dirty="0"/>
+          </a:p>
+          <a:p>
+            <a:r>
+              <a:rPr lang="en-US" dirty="0" smtClean="0"/>
+              <a:t>Output: </a:t>
+            </a:r>
+            <a:r>
+              <a:rPr lang="en-US" dirty="0"/>
+              <a:t>connection status to social networks (</a:t>
+            </a:r>
+            <a:r>
+              <a:rPr lang="en-US" dirty="0" err="1"/>
+              <a:t>facebook</a:t>
+            </a:r>
+            <a:r>
+              <a:rPr lang="en-US" dirty="0"/>
+              <a:t>, twitter, foursquare, </a:t>
+            </a:r>
+            <a:r>
+              <a:rPr lang="en-US" dirty="0" err="1"/>
+              <a:t>tumblr</a:t>
+            </a:r>
+            <a:r>
+              <a:rPr lang="en-US" dirty="0"/>
+              <a:t>)</a:t>
+            </a:r>
           </a:p>
           <a:p>
             <a:r>
@@ -3866,25 +3887,7 @@
             </a:r>
             <a:r>
               <a:rPr lang="en-US" dirty="0" smtClean="0"/>
-              <a:t>changes</a:t>
-            </a:r>
-          </a:p>
-          <a:p>
-            <a:pPr lvl="1"/>
-            <a:r>
-              <a:rPr lang="en-US" dirty="0" err="1"/>
-              <a:t>usg_usnc_ap</a:t>
-            </a:r>
-            <a:endParaRPr lang="en-US" dirty="0" smtClean="0"/>
-          </a:p>
-          <a:p>
-            <a:r>
-              <a:rPr lang="en-US" dirty="0" smtClean="0"/>
-              <a:t>Notes: ignore the column </a:t>
-            </a:r>
-            <a:r>
-              <a:rPr lang="en-US" dirty="0" err="1" smtClean="0"/>
-              <a:t>ap_order</a:t>
+              <a:t>changes: no changes</a:t>
             </a:r>
             <a:endParaRPr lang="en-US" dirty="0"/>
           </a:p>
@@ -3893,7 +3896,7 @@
     </p:spTree>
     <p:extLst>
       <p:ext uri="{BB962C8B-B14F-4D97-AF65-F5344CB8AC3E}">
-        <p14:creationId xmlns:p14="http://schemas.microsoft.com/office/powerpoint/2010/main" val="2349672672"/>
+        <p14:creationId xmlns:p14="http://schemas.microsoft.com/office/powerpoint/2010/main" val="1792597315"/>
       </p:ext>
     </p:extLst>
   </p:cSld>
@@ -3937,7 +3940,7 @@
           <a:p>
             <a:r>
               <a:rPr lang="en-US" dirty="0" err="1" smtClean="0"/>
-              <a:t>showOptionsAutoPublish</a:t>
+              <a:t>submitOptionsAutoPublish</a:t>
             </a:r>
             <a:endParaRPr lang="en-US" dirty="0"/>
           </a:p>
@@ -3955,7 +3958,9 @@
         </p:nvSpPr>
         <p:spPr/>
         <p:txBody>
-          <a:bodyPr/>
+          <a:bodyPr>
+            <a:normAutofit fontScale="92500"/>
+          </a:bodyPr>
           <a:lstStyle/>
           <a:p>
             <a:r>
@@ -3964,7 +3969,7 @@
             </a:r>
             <a:r>
               <a:rPr lang="en-US" dirty="0" err="1"/>
-              <a:t>showOptionsAutoPublish</a:t>
+              <a:t>submitOptionsAutoPublish</a:t>
             </a:r>
             <a:endParaRPr lang="en-US" dirty="0"/>
           </a:p>
@@ -3975,15 +3980,15 @@
             </a:r>
             <a:r>
               <a:rPr lang="en-US" dirty="0" smtClean="0"/>
-              <a:t>by: when users access </a:t>
+              <a:t>by: when users make changes in </a:t>
             </a:r>
             <a:r>
               <a:rPr lang="en-US" dirty="0"/>
-              <a:t>Profile -&gt; Settings -&gt; Social </a:t>
-            </a:r>
-            <a:r>
-              <a:rPr lang="en-US" dirty="0" smtClean="0"/>
-              <a:t>Networks </a:t>
+              <a:t>Profile -&gt; Settings -&gt; Social Networks -&gt; </a:t>
+            </a:r>
+            <a:r>
+              <a:rPr lang="en-US" dirty="0" smtClean="0"/>
+              <a:t>Auto Publishing</a:t>
             </a:r>
             <a:endParaRPr lang="en-US" dirty="0"/>
           </a:p>
@@ -3996,12 +4001,24 @@
               <a:rPr lang="en-US" dirty="0" err="1" smtClean="0"/>
               <a:t>user_id</a:t>
             </a:r>
-            <a:endParaRPr lang="en-US" dirty="0"/>
-          </a:p>
-          <a:p>
-            <a:r>
-              <a:rPr lang="en-US" dirty="0" smtClean="0"/>
-              <a:t>Output: auto publishing status of this user</a:t>
+            <a:r>
+              <a:rPr lang="en-US" dirty="0" smtClean="0"/>
+              <a:t>, </a:t>
+            </a:r>
+            <a:r>
+              <a:rPr lang="en-US" dirty="0" err="1" smtClean="0"/>
+              <a:t>auto_publishing</a:t>
+            </a:r>
+            <a:r>
+              <a:rPr lang="en-US" dirty="0" smtClean="0"/>
+              <a:t> status</a:t>
+            </a:r>
+            <a:endParaRPr lang="en-US" dirty="0"/>
+          </a:p>
+          <a:p>
+            <a:r>
+              <a:rPr lang="en-US" dirty="0" smtClean="0"/>
+              <a:t>Output: success or not</a:t>
             </a:r>
             <a:endParaRPr lang="en-US" dirty="0"/>
           </a:p>
@@ -4012,7 +4029,25 @@
             </a:r>
             <a:r>
               <a:rPr lang="en-US" dirty="0" smtClean="0"/>
-              <a:t>changes: no changes</a:t>
+              <a:t>changes</a:t>
+            </a:r>
+          </a:p>
+          <a:p>
+            <a:pPr lvl="1"/>
+            <a:r>
+              <a:rPr lang="en-US" dirty="0" err="1"/>
+              <a:t>usg_usnc_ap</a:t>
+            </a:r>
+            <a:endParaRPr lang="en-US" dirty="0" smtClean="0"/>
+          </a:p>
+          <a:p>
+            <a:r>
+              <a:rPr lang="en-US" dirty="0" smtClean="0"/>
+              <a:t>Notes: ignore the column </a:t>
+            </a:r>
+            <a:r>
+              <a:rPr lang="en-US" dirty="0" err="1" smtClean="0"/>
+              <a:t>ap_order</a:t>
             </a:r>
             <a:endParaRPr lang="en-US" dirty="0"/>
           </a:p>
@@ -4021,7 +4056,7 @@
     </p:spTree>
     <p:extLst>
       <p:ext uri="{BB962C8B-B14F-4D97-AF65-F5344CB8AC3E}">
-        <p14:creationId xmlns:p14="http://schemas.microsoft.com/office/powerpoint/2010/main" val="2480641174"/>
+        <p14:creationId xmlns:p14="http://schemas.microsoft.com/office/powerpoint/2010/main" val="2349672672"/>
       </p:ext>
     </p:extLst>
   </p:cSld>
@@ -4065,7 +4100,7 @@
           <a:p>
             <a:r>
               <a:rPr lang="en-US" dirty="0" err="1" smtClean="0"/>
-              <a:t>submitOptionsNotifications</a:t>
+              <a:t>showOptionsAutoPublish</a:t>
             </a:r>
             <a:endParaRPr lang="en-US" dirty="0"/>
           </a:p>
@@ -4092,7 +4127,7 @@
             </a:r>
             <a:r>
               <a:rPr lang="en-US" dirty="0" err="1"/>
-              <a:t>submitOptionsNotifications</a:t>
+              <a:t>showOptionsAutoPublish</a:t>
             </a:r>
             <a:endParaRPr lang="en-US" dirty="0"/>
           </a:p>
@@ -4103,7 +4138,15 @@
             </a:r>
             <a:r>
               <a:rPr lang="en-US" dirty="0" smtClean="0"/>
-              <a:t>by: when users make changes in Profile -&gt; Settings -&gt; Notification Settings </a:t>
+              <a:t>by: when users access </a:t>
+            </a:r>
+            <a:r>
+              <a:rPr lang="en-US" dirty="0"/>
+              <a:t>Profile -&gt; Settings -&gt; Social </a:t>
+            </a:r>
+            <a:r>
+              <a:rPr lang="en-US" dirty="0" smtClean="0"/>
+              <a:t>Networks </a:t>
             </a:r>
             <a:endParaRPr lang="en-US" dirty="0"/>
           </a:p>
@@ -4116,16 +4159,12 @@
               <a:rPr lang="en-US" dirty="0" err="1" smtClean="0"/>
               <a:t>user_id</a:t>
             </a:r>
-            <a:r>
-              <a:rPr lang="en-US" dirty="0" smtClean="0"/>
-              <a:t>, Notification options</a:t>
-            </a:r>
-            <a:endParaRPr lang="en-US" dirty="0"/>
-          </a:p>
-          <a:p>
-            <a:r>
-              <a:rPr lang="en-US" dirty="0" smtClean="0"/>
-              <a:t>Output: Success or not</a:t>
+            <a:endParaRPr lang="en-US" dirty="0"/>
+          </a:p>
+          <a:p>
+            <a:r>
+              <a:rPr lang="en-US" dirty="0" smtClean="0"/>
+              <a:t>Output: auto publishing status of this user</a:t>
             </a:r>
             <a:endParaRPr lang="en-US" dirty="0"/>
           </a:p>
@@ -4136,22 +4175,7 @@
             </a:r>
             <a:r>
               <a:rPr lang="en-US" dirty="0" smtClean="0"/>
-              <a:t>changes</a:t>
-            </a:r>
-          </a:p>
-          <a:p>
-            <a:pPr lvl="1"/>
-            <a:r>
-              <a:rPr lang="en-US" dirty="0" err="1" smtClean="0"/>
-              <a:t>user_notification_settings</a:t>
-            </a:r>
-            <a:r>
-              <a:rPr lang="en-US" dirty="0" smtClean="0"/>
-              <a:t>: ignore field </a:t>
-            </a:r>
-            <a:r>
-              <a:rPr lang="en-US" dirty="0" err="1" smtClean="0"/>
-              <a:t>nsid_type</a:t>
+              <a:t>changes: no changes</a:t>
             </a:r>
             <a:endParaRPr lang="en-US" dirty="0"/>
           </a:p>
@@ -4160,7 +4184,7 @@
     </p:spTree>
     <p:extLst>
       <p:ext uri="{BB962C8B-B14F-4D97-AF65-F5344CB8AC3E}">
-        <p14:creationId xmlns:p14="http://schemas.microsoft.com/office/powerpoint/2010/main" val="3798129977"/>
+        <p14:creationId xmlns:p14="http://schemas.microsoft.com/office/powerpoint/2010/main" val="2480641174"/>
       </p:ext>
     </p:extLst>
   </p:cSld>
@@ -4204,7 +4228,7 @@
           <a:p>
             <a:r>
               <a:rPr lang="en-US" dirty="0" err="1" smtClean="0"/>
-              <a:t>showOptionsNotifications</a:t>
+              <a:t>submitOptionsNotifications</a:t>
             </a:r>
             <a:endParaRPr lang="en-US" dirty="0"/>
           </a:p>
@@ -4231,7 +4255,7 @@
             </a:r>
             <a:r>
               <a:rPr lang="en-US" dirty="0" err="1"/>
-              <a:t>showOptionsNotifications</a:t>
+              <a:t>submitOptionsNotifications</a:t>
             </a:r>
             <a:endParaRPr lang="en-US" dirty="0"/>
           </a:p>
@@ -4242,15 +4266,7 @@
             </a:r>
             <a:r>
               <a:rPr lang="en-US" dirty="0" smtClean="0"/>
-              <a:t>by: when users make changes </a:t>
-            </a:r>
-            <a:r>
-              <a:rPr lang="en-US" dirty="0"/>
-              <a:t>Profile -&gt; Settings -&gt; Notification </a:t>
-            </a:r>
-            <a:r>
-              <a:rPr lang="en-US" dirty="0" smtClean="0"/>
-              <a:t>Settings</a:t>
+              <a:t>by: when users make changes in Profile -&gt; Settings -&gt; Notification Settings </a:t>
             </a:r>
             <a:endParaRPr lang="en-US" dirty="0"/>
           </a:p>
@@ -4263,12 +4279,16 @@
               <a:rPr lang="en-US" dirty="0" err="1" smtClean="0"/>
               <a:t>user_id</a:t>
             </a:r>
-            <a:endParaRPr lang="en-US" dirty="0"/>
-          </a:p>
-          <a:p>
-            <a:r>
-              <a:rPr lang="en-US" dirty="0" smtClean="0"/>
-              <a:t>Output: notification options</a:t>
+            <a:r>
+              <a:rPr lang="en-US" dirty="0" smtClean="0"/>
+              <a:t>, Notification options</a:t>
+            </a:r>
+            <a:endParaRPr lang="en-US" dirty="0"/>
+          </a:p>
+          <a:p>
+            <a:r>
+              <a:rPr lang="en-US" dirty="0" smtClean="0"/>
+              <a:t>Output: Success or not</a:t>
             </a:r>
             <a:endParaRPr lang="en-US" dirty="0"/>
           </a:p>
@@ -4279,15 +4299,31 @@
             </a:r>
             <a:r>
               <a:rPr lang="en-US" dirty="0" smtClean="0"/>
-              <a:t>changes: no changes</a:t>
-            </a:r>
+              <a:t>changes</a:t>
+            </a:r>
+          </a:p>
+          <a:p>
+            <a:pPr lvl="1"/>
+            <a:r>
+              <a:rPr lang="en-US" dirty="0" err="1" smtClean="0"/>
+              <a:t>user_notification_settings</a:t>
+            </a:r>
+            <a:r>
+              <a:rPr lang="en-US" dirty="0" smtClean="0"/>
+              <a:t>: ignore field </a:t>
+            </a:r>
+            <a:r>
+              <a:rPr lang="en-US" dirty="0" err="1" smtClean="0"/>
+              <a:t>nsid_type</a:t>
+            </a:r>
+            <a:endParaRPr lang="en-US" dirty="0"/>
           </a:p>
         </p:txBody>
       </p:sp>
     </p:spTree>
     <p:extLst>
       <p:ext uri="{BB962C8B-B14F-4D97-AF65-F5344CB8AC3E}">
-        <p14:creationId xmlns:p14="http://schemas.microsoft.com/office/powerpoint/2010/main" val="3956995550"/>
+        <p14:creationId xmlns:p14="http://schemas.microsoft.com/office/powerpoint/2010/main" val="3798129977"/>
       </p:ext>
     </p:extLst>
   </p:cSld>
@@ -4331,7 +4367,7 @@
           <a:p>
             <a:r>
               <a:rPr lang="en-US" dirty="0" err="1" smtClean="0"/>
-              <a:t>submitOptionsPrivacy</a:t>
+              <a:t>showOptionsNotifications</a:t>
             </a:r>
             <a:endParaRPr lang="en-US" dirty="0"/>
           </a:p>
@@ -4358,7 +4394,7 @@
             </a:r>
             <a:r>
               <a:rPr lang="en-US" dirty="0" err="1"/>
-              <a:t>submitOptionsPrivacy</a:t>
+              <a:t>showOptionsNotifications</a:t>
             </a:r>
             <a:endParaRPr lang="en-US" dirty="0"/>
           </a:p>
@@ -4369,7 +4405,15 @@
             </a:r>
             <a:r>
               <a:rPr lang="en-US" dirty="0" smtClean="0"/>
-              <a:t>by: when users make changes on Profile -&gt; Settings -&gt; Privacy Settings </a:t>
+              <a:t>by: when users make changes </a:t>
+            </a:r>
+            <a:r>
+              <a:rPr lang="en-US" dirty="0"/>
+              <a:t>Profile -&gt; Settings -&gt; Notification </a:t>
+            </a:r>
+            <a:r>
+              <a:rPr lang="en-US" dirty="0" smtClean="0"/>
+              <a:t>Settings</a:t>
             </a:r>
             <a:endParaRPr lang="en-US" dirty="0"/>
           </a:p>
@@ -4382,16 +4426,12 @@
               <a:rPr lang="en-US" dirty="0" err="1" smtClean="0"/>
               <a:t>user_id</a:t>
             </a:r>
-            <a:r>
-              <a:rPr lang="en-US" dirty="0" smtClean="0"/>
-              <a:t>, privacy options</a:t>
-            </a:r>
-            <a:endParaRPr lang="en-US" dirty="0"/>
-          </a:p>
-          <a:p>
-            <a:r>
-              <a:rPr lang="en-US" dirty="0" smtClean="0"/>
-              <a:t>Output: success or not</a:t>
+            <a:endParaRPr lang="en-US" dirty="0"/>
+          </a:p>
+          <a:p>
+            <a:r>
+              <a:rPr lang="en-US" dirty="0" smtClean="0"/>
+              <a:t>Output: notification options</a:t>
             </a:r>
             <a:endParaRPr lang="en-US" dirty="0"/>
           </a:p>
@@ -4402,23 +4442,15 @@
             </a:r>
             <a:r>
               <a:rPr lang="en-US" dirty="0" smtClean="0"/>
-              <a:t>changes:</a:t>
-            </a:r>
-          </a:p>
-          <a:p>
-            <a:pPr lvl="1"/>
-            <a:r>
-              <a:rPr lang="en-US" dirty="0" err="1"/>
-              <a:t>user_privacy_settings</a:t>
-            </a:r>
-            <a:endParaRPr lang="en-US" dirty="0"/>
+              <a:t>changes: no changes</a:t>
+            </a:r>
           </a:p>
         </p:txBody>
       </p:sp>
     </p:spTree>
     <p:extLst>
       <p:ext uri="{BB962C8B-B14F-4D97-AF65-F5344CB8AC3E}">
-        <p14:creationId xmlns:p14="http://schemas.microsoft.com/office/powerpoint/2010/main" val="1634600044"/>
+        <p14:creationId xmlns:p14="http://schemas.microsoft.com/office/powerpoint/2010/main" val="3956995550"/>
       </p:ext>
     </p:extLst>
   </p:cSld>
@@ -4462,7 +4494,7 @@
           <a:p>
             <a:r>
               <a:rPr lang="en-US" dirty="0" err="1" smtClean="0"/>
-              <a:t>showOptionsPrivacy</a:t>
+              <a:t>submitOptionsPrivacy</a:t>
             </a:r>
             <a:endParaRPr lang="en-US" dirty="0"/>
           </a:p>
@@ -4489,7 +4521,7 @@
             </a:r>
             <a:r>
               <a:rPr lang="en-US" dirty="0" err="1"/>
-              <a:t>showOptionsPrivacy</a:t>
+              <a:t>submitOptionsPrivacy</a:t>
             </a:r>
             <a:endParaRPr lang="en-US" dirty="0"/>
           </a:p>
@@ -4500,15 +4532,7 @@
             </a:r>
             <a:r>
               <a:rPr lang="en-US" dirty="0" smtClean="0"/>
-              <a:t>by: when users access </a:t>
-            </a:r>
-            <a:r>
-              <a:rPr lang="en-US" dirty="0"/>
-              <a:t>Profile -&gt; Settings -&gt; Privacy Settings</a:t>
-            </a:r>
-            <a:r>
-              <a:rPr lang="en-US" dirty="0" smtClean="0"/>
-              <a:t> </a:t>
+              <a:t>by: when users make changes on Profile -&gt; Settings -&gt; Privacy Settings </a:t>
             </a:r>
             <a:endParaRPr lang="en-US" dirty="0"/>
           </a:p>
@@ -4521,12 +4545,16 @@
               <a:rPr lang="en-US" dirty="0" err="1" smtClean="0"/>
               <a:t>user_id</a:t>
             </a:r>
-            <a:endParaRPr lang="en-US" dirty="0"/>
-          </a:p>
-          <a:p>
-            <a:r>
-              <a:rPr lang="en-US" dirty="0" smtClean="0"/>
-              <a:t>Output: privacy options</a:t>
+            <a:r>
+              <a:rPr lang="en-US" dirty="0" smtClean="0"/>
+              <a:t>, privacy options</a:t>
+            </a:r>
+            <a:endParaRPr lang="en-US" dirty="0"/>
+          </a:p>
+          <a:p>
+            <a:r>
+              <a:rPr lang="en-US" dirty="0" smtClean="0"/>
+              <a:t>Output: success or not</a:t>
             </a:r>
             <a:endParaRPr lang="en-US" dirty="0"/>
           </a:p>
@@ -4537,7 +4565,14 @@
             </a:r>
             <a:r>
               <a:rPr lang="en-US" dirty="0" smtClean="0"/>
-              <a:t>changes: no changes</a:t>
+              <a:t>changes:</a:t>
+            </a:r>
+          </a:p>
+          <a:p>
+            <a:pPr lvl="1"/>
+            <a:r>
+              <a:rPr lang="en-US" dirty="0" err="1"/>
+              <a:t>user_privacy_settings</a:t>
             </a:r>
             <a:endParaRPr lang="en-US" dirty="0"/>
           </a:p>
@@ -4546,7 +4581,7 @@
     </p:spTree>
     <p:extLst>
       <p:ext uri="{BB962C8B-B14F-4D97-AF65-F5344CB8AC3E}">
-        <p14:creationId xmlns:p14="http://schemas.microsoft.com/office/powerpoint/2010/main" val="2783335267"/>
+        <p14:creationId xmlns:p14="http://schemas.microsoft.com/office/powerpoint/2010/main" val="1634600044"/>
       </p:ext>
     </p:extLst>
   </p:cSld>
@@ -4589,12 +4624,8 @@
           <a:lstStyle/>
           <a:p>
             <a:r>
-              <a:rPr lang="en-US" dirty="0" err="1"/>
-              <a:t>c</a:t>
-            </a:r>
-            <a:r>
               <a:rPr lang="en-US" dirty="0" err="1" smtClean="0"/>
-              <a:t>ontactTastesync</a:t>
+              <a:t>showOptionsPrivacy</a:t>
             </a:r>
             <a:endParaRPr lang="en-US" dirty="0"/>
           </a:p>
@@ -4620,8 +4651,8 @@
               <a:t>API: </a:t>
             </a:r>
             <a:r>
-              <a:rPr lang="en-US" dirty="0" err="1" smtClean="0"/>
-              <a:t>contactTastesync</a:t>
+              <a:rPr lang="en-US" dirty="0" err="1"/>
+              <a:t>showOptionsPrivacy</a:t>
             </a:r>
             <a:endParaRPr lang="en-US" dirty="0"/>
           </a:p>
@@ -4632,11 +4663,15 @@
             </a:r>
             <a:r>
               <a:rPr lang="en-US" dirty="0" smtClean="0"/>
-              <a:t>by: when users try to contact with TS in Profile -&gt; Settings -&gt; Contact </a:t>
-            </a:r>
-            <a:r>
-              <a:rPr lang="en-US" dirty="0" err="1" smtClean="0"/>
-              <a:t>TasteSynce</a:t>
+              <a:t>by: when users access </a:t>
+            </a:r>
+            <a:r>
+              <a:rPr lang="en-US" dirty="0"/>
+              <a:t>Profile -&gt; Settings -&gt; Privacy Settings</a:t>
+            </a:r>
+            <a:r>
+              <a:rPr lang="en-US" dirty="0" smtClean="0"/>
+              <a:t> </a:t>
             </a:r>
             <a:endParaRPr lang="en-US" dirty="0"/>
           </a:p>
@@ -4649,20 +4684,12 @@
               <a:rPr lang="en-US" dirty="0" err="1" smtClean="0"/>
               <a:t>user_id</a:t>
             </a:r>
-            <a:r>
-              <a:rPr lang="en-US" dirty="0" smtClean="0"/>
-              <a:t>, </a:t>
-            </a:r>
-            <a:r>
-              <a:rPr lang="en-US" dirty="0" err="1" smtClean="0"/>
-              <a:t>contact_id</a:t>
-            </a:r>
-            <a:endParaRPr lang="en-US" dirty="0"/>
-          </a:p>
-          <a:p>
-            <a:r>
-              <a:rPr lang="en-US" dirty="0" smtClean="0"/>
-              <a:t>Output: success or not</a:t>
+            <a:endParaRPr lang="en-US" dirty="0"/>
+          </a:p>
+          <a:p>
+            <a:r>
+              <a:rPr lang="en-US" dirty="0" smtClean="0"/>
+              <a:t>Output: privacy options</a:t>
             </a:r>
             <a:endParaRPr lang="en-US" dirty="0"/>
           </a:p>
@@ -4673,14 +4700,7 @@
             </a:r>
             <a:r>
               <a:rPr lang="en-US" dirty="0" smtClean="0"/>
-              <a:t>changes</a:t>
-            </a:r>
-          </a:p>
-          <a:p>
-            <a:pPr lvl="1"/>
-            <a:r>
-              <a:rPr lang="en-US" dirty="0" err="1"/>
-              <a:t>user_contact_settings</a:t>
+              <a:t>changes: no changes</a:t>
             </a:r>
             <a:endParaRPr lang="en-US" dirty="0"/>
           </a:p>
@@ -4689,7 +4709,7 @@
     </p:spTree>
     <p:extLst>
       <p:ext uri="{BB962C8B-B14F-4D97-AF65-F5344CB8AC3E}">
-        <p14:creationId xmlns:p14="http://schemas.microsoft.com/office/powerpoint/2010/main" val="828945700"/>
+        <p14:creationId xmlns:p14="http://schemas.microsoft.com/office/powerpoint/2010/main" val="2783335267"/>
       </p:ext>
     </p:extLst>
   </p:cSld>
@@ -4732,8 +4752,12 @@
           <a:lstStyle/>
           <a:p>
             <a:r>
+              <a:rPr lang="en-US" dirty="0" err="1"/>
+              <a:t>c</a:t>
+            </a:r>
+            <a:r>
               <a:rPr lang="en-US" dirty="0" err="1" smtClean="0"/>
-              <a:t>showAboutTastesync</a:t>
+              <a:t>ontactTastesync</a:t>
             </a:r>
             <a:endParaRPr lang="en-US" dirty="0"/>
           </a:p>
@@ -4759,8 +4783,8 @@
               <a:t>API: </a:t>
             </a:r>
             <a:r>
-              <a:rPr lang="en-US" dirty="0" err="1"/>
-              <a:t>showAboutTastesync</a:t>
+              <a:rPr lang="en-US" dirty="0" err="1" smtClean="0"/>
+              <a:t>contactTastesync</a:t>
             </a:r>
             <a:endParaRPr lang="en-US" dirty="0"/>
           </a:p>
@@ -4771,15 +4795,11 @@
             </a:r>
             <a:r>
               <a:rPr lang="en-US" dirty="0" smtClean="0"/>
-              <a:t>by: when users access Profile -&gt; Settings -&gt; About </a:t>
+              <a:t>by: when users try to contact with TS in Profile -&gt; Settings -&gt; Contact </a:t>
             </a:r>
             <a:r>
               <a:rPr lang="en-US" dirty="0" err="1" smtClean="0"/>
-              <a:t>TasteSync</a:t>
-            </a:r>
-            <a:r>
-              <a:rPr lang="en-US" dirty="0" smtClean="0"/>
-              <a:t> </a:t>
+              <a:t>TasteSynce</a:t>
             </a:r>
             <a:endParaRPr lang="en-US" dirty="0"/>
           </a:p>
@@ -4790,14 +4810,22 @@
             </a:r>
             <a:r>
               <a:rPr lang="en-US" dirty="0" err="1" smtClean="0"/>
-              <a:t>about_tastesync_id</a:t>
-            </a:r>
-            <a:endParaRPr lang="en-US" dirty="0"/>
-          </a:p>
-          <a:p>
-            <a:r>
-              <a:rPr lang="en-US" dirty="0" smtClean="0"/>
-              <a:t>Output: “about TS content”</a:t>
+              <a:t>user_id</a:t>
+            </a:r>
+            <a:r>
+              <a:rPr lang="en-US" dirty="0" smtClean="0"/>
+              <a:t>, </a:t>
+            </a:r>
+            <a:r>
+              <a:rPr lang="en-US" dirty="0" err="1" smtClean="0"/>
+              <a:t>contact_id</a:t>
+            </a:r>
+            <a:endParaRPr lang="en-US" dirty="0"/>
+          </a:p>
+          <a:p>
+            <a:r>
+              <a:rPr lang="en-US" dirty="0" smtClean="0"/>
+              <a:t>Output: success or not</a:t>
             </a:r>
             <a:endParaRPr lang="en-US" dirty="0"/>
           </a:p>
@@ -4808,7 +4836,14 @@
             </a:r>
             <a:r>
               <a:rPr lang="en-US" dirty="0" smtClean="0"/>
-              <a:t>changes: no changes</a:t>
+              <a:t>changes</a:t>
+            </a:r>
+          </a:p>
+          <a:p>
+            <a:pPr lvl="1"/>
+            <a:r>
+              <a:rPr lang="en-US" dirty="0" err="1"/>
+              <a:t>user_contact_settings</a:t>
             </a:r>
             <a:endParaRPr lang="en-US" dirty="0"/>
           </a:p>
@@ -4817,7 +4852,7 @@
     </p:spTree>
     <p:extLst>
       <p:ext uri="{BB962C8B-B14F-4D97-AF65-F5344CB8AC3E}">
-        <p14:creationId xmlns:p14="http://schemas.microsoft.com/office/powerpoint/2010/main" val="2391184315"/>
+        <p14:creationId xmlns:p14="http://schemas.microsoft.com/office/powerpoint/2010/main" val="828945700"/>
       </p:ext>
     </p:extLst>
   </p:cSld>
@@ -4861,7 +4896,7 @@
           <a:p>
             <a:r>
               <a:rPr lang="en-US" dirty="0" err="1" smtClean="0"/>
-              <a:t>submitAboutMe</a:t>
+              <a:t>showAboutTastesync</a:t>
             </a:r>
             <a:endParaRPr lang="en-US" dirty="0"/>
           </a:p>
@@ -4888,7 +4923,7 @@
             </a:r>
             <a:r>
               <a:rPr lang="en-US" dirty="0" err="1"/>
-              <a:t>submitAboutMe</a:t>
+              <a:t>showAboutTastesync</a:t>
             </a:r>
             <a:endParaRPr lang="en-US" dirty="0"/>
           </a:p>
@@ -4899,7 +4934,15 @@
             </a:r>
             <a:r>
               <a:rPr lang="en-US" dirty="0" smtClean="0"/>
-              <a:t>by: when users click Edit button in Profile -&gt; Edit </a:t>
+              <a:t>by: when users access Profile -&gt; Settings -&gt; About </a:t>
+            </a:r>
+            <a:r>
+              <a:rPr lang="en-US" dirty="0" err="1" smtClean="0"/>
+              <a:t>TasteSync</a:t>
+            </a:r>
+            <a:r>
+              <a:rPr lang="en-US" dirty="0" smtClean="0"/>
+              <a:t> </a:t>
             </a:r>
             <a:endParaRPr lang="en-US" dirty="0"/>
           </a:p>
@@ -4910,18 +4953,14 @@
             </a:r>
             <a:r>
               <a:rPr lang="en-US" dirty="0" err="1" smtClean="0"/>
-              <a:t>user_id</a:t>
-            </a:r>
-            <a:r>
-              <a:rPr lang="en-US" dirty="0" smtClean="0"/>
-              <a:t>, “about me” content</a:t>
-            </a:r>
-            <a:endParaRPr lang="en-US" dirty="0"/>
-          </a:p>
-          <a:p>
-            <a:r>
-              <a:rPr lang="en-US" dirty="0" smtClean="0"/>
-              <a:t>Output: success or not</a:t>
+              <a:t>about_tastesync_id</a:t>
+            </a:r>
+            <a:endParaRPr lang="en-US" dirty="0"/>
+          </a:p>
+          <a:p>
+            <a:r>
+              <a:rPr lang="en-US" dirty="0" smtClean="0"/>
+              <a:t>Output: “about TS content”</a:t>
             </a:r>
             <a:endParaRPr lang="en-US" dirty="0"/>
           </a:p>
@@ -4932,14 +4971,7 @@
             </a:r>
             <a:r>
               <a:rPr lang="en-US" dirty="0" smtClean="0"/>
-              <a:t>changes</a:t>
-            </a:r>
-          </a:p>
-          <a:p>
-            <a:pPr lvl="1"/>
-            <a:r>
-              <a:rPr lang="en-US" dirty="0" smtClean="0"/>
-              <a:t>About column of table users</a:t>
+              <a:t>changes: no changes</a:t>
             </a:r>
             <a:endParaRPr lang="en-US" dirty="0"/>
           </a:p>
@@ -4948,7 +4980,7 @@
     </p:spTree>
     <p:extLst>
       <p:ext uri="{BB962C8B-B14F-4D97-AF65-F5344CB8AC3E}">
-        <p14:creationId xmlns:p14="http://schemas.microsoft.com/office/powerpoint/2010/main" val="1477502764"/>
+        <p14:creationId xmlns:p14="http://schemas.microsoft.com/office/powerpoint/2010/main" val="2391184315"/>
       </p:ext>
     </p:extLst>
   </p:cSld>
@@ -4982,180 +5014,304 @@
             <a:spLocks noGrp="1"/>
           </p:cNvSpPr>
           <p:nvPr>
-            <p:ph type="title"/>
-          </p:nvPr>
-        </p:nvSpPr>
-        <p:spPr/>
-        <p:txBody>
-          <a:bodyPr/>
-          <a:lstStyle/>
-          <a:p>
-            <a:r>
-              <a:rPr lang="en-US" dirty="0" err="1" smtClean="0"/>
-              <a:t>loginFacebook</a:t>
-            </a:r>
-            <a:endParaRPr lang="en-US" dirty="0"/>
-          </a:p>
-        </p:txBody>
-      </p:sp>
-      <p:sp>
-        <p:nvSpPr>
-          <p:cNvPr id="3" name="Content Placeholder 2"/>
-          <p:cNvSpPr>
-            <a:spLocks noGrp="1"/>
-          </p:cNvSpPr>
-          <p:nvPr>
-            <p:ph idx="1"/>
-          </p:nvPr>
-        </p:nvSpPr>
-        <p:spPr/>
-        <p:txBody>
-          <a:bodyPr>
-            <a:normAutofit fontScale="85000" lnSpcReduction="10000"/>
+            <p:ph type="ctrTitle"/>
+          </p:nvPr>
+        </p:nvSpPr>
+        <p:spPr>
+          <a:xfrm>
+            <a:off x="609600" y="304801"/>
+            <a:ext cx="7772400" cy="838200"/>
+          </a:xfrm>
+        </p:spPr>
+        <p:txBody>
+          <a:bodyPr/>
+          <a:lstStyle/>
+          <a:p>
+            <a:r>
+              <a:rPr lang="en-US" b="1" dirty="0" smtClean="0">
+                <a:solidFill>
+                  <a:srgbClr val="0000FF"/>
+                </a:solidFill>
+              </a:rPr>
+              <a:t>General Feedback</a:t>
+            </a:r>
+            <a:endParaRPr lang="en-US" b="1" dirty="0">
+              <a:solidFill>
+                <a:srgbClr val="0000FF"/>
+              </a:solidFill>
+            </a:endParaRPr>
+          </a:p>
+        </p:txBody>
+      </p:sp>
+      <p:sp>
+        <p:nvSpPr>
+          <p:cNvPr id="3" name="TextBox 2"/>
+          <p:cNvSpPr txBox="1"/>
+          <p:nvPr/>
+        </p:nvSpPr>
+        <p:spPr>
+          <a:xfrm>
+            <a:off x="457200" y="1371600"/>
+            <a:ext cx="8382000" cy="3785652"/>
+          </a:xfrm>
+          <a:prstGeom prst="rect">
+            <a:avLst/>
+          </a:prstGeom>
+          <a:noFill/>
+        </p:spPr>
+        <p:txBody>
+          <a:bodyPr wrap="square" rtlCol="0">
+            <a:spAutoFit/>
           </a:bodyPr>
           <a:lstStyle/>
           <a:p>
-            <a:r>
-              <a:rPr lang="en-US" dirty="0" smtClean="0"/>
-              <a:t>API: </a:t>
-            </a:r>
-            <a:r>
-              <a:rPr lang="en-US" dirty="0" err="1" smtClean="0"/>
-              <a:t>loginFacebook</a:t>
-            </a:r>
-            <a:endParaRPr lang="en-US" dirty="0" smtClean="0"/>
-          </a:p>
-          <a:p>
-            <a:r>
-              <a:rPr lang="en-US" dirty="0" smtClean="0"/>
-              <a:t>Called by: when user clicks on “Connect with Facebook” button on “Welcome to </a:t>
-            </a:r>
-            <a:r>
-              <a:rPr lang="en-US" dirty="0" err="1" smtClean="0"/>
-              <a:t>TasteSynce</a:t>
-            </a:r>
-            <a:r>
-              <a:rPr lang="en-US" dirty="0" smtClean="0"/>
-              <a:t>” screen</a:t>
-            </a:r>
-          </a:p>
-          <a:p>
-            <a:r>
-              <a:rPr lang="en-US" dirty="0" smtClean="0"/>
-              <a:t>Note: just called after connect to users’ FB successfully</a:t>
-            </a:r>
-          </a:p>
-          <a:p>
-            <a:r>
-              <a:rPr lang="en-US" dirty="0" smtClean="0"/>
-              <a:t>Input</a:t>
-            </a:r>
-          </a:p>
-          <a:p>
-            <a:pPr lvl="1"/>
-            <a:r>
-              <a:rPr lang="en-US" dirty="0"/>
-              <a:t>User’s </a:t>
-            </a:r>
-            <a:r>
-              <a:rPr lang="en-US" dirty="0" smtClean="0"/>
-              <a:t>info: </a:t>
-            </a:r>
-            <a:r>
-              <a:rPr lang="en-US" dirty="0" err="1"/>
-              <a:t>ts_user_email</a:t>
-            </a:r>
-            <a:r>
-              <a:rPr lang="en-US" dirty="0"/>
-              <a:t>, </a:t>
-            </a:r>
-            <a:r>
-              <a:rPr lang="en-US" dirty="0" err="1"/>
-              <a:t>ts_first_name</a:t>
-            </a:r>
-            <a:r>
-              <a:rPr lang="en-US" dirty="0"/>
-              <a:t>, </a:t>
-            </a:r>
-            <a:r>
-              <a:rPr lang="en-US" dirty="0" err="1"/>
-              <a:t>ts_last_name</a:t>
-            </a:r>
-            <a:r>
-              <a:rPr lang="en-US" dirty="0"/>
-              <a:t>, </a:t>
-            </a:r>
-            <a:r>
-              <a:rPr lang="en-US" dirty="0" err="1"/>
-              <a:t>user_created_initial_date</a:t>
-            </a:r>
-            <a:r>
-              <a:rPr lang="en-US" dirty="0"/>
-              <a:t>, </a:t>
-            </a:r>
-            <a:r>
-              <a:rPr lang="en-US" dirty="0" err="1"/>
-              <a:t>user_gender</a:t>
-            </a:r>
-            <a:r>
-              <a:rPr lang="en-US" dirty="0"/>
-              <a:t>, </a:t>
-            </a:r>
-            <a:r>
-              <a:rPr lang="en-US" dirty="0" err="1"/>
-              <a:t>user_city</a:t>
-            </a:r>
-            <a:r>
-              <a:rPr lang="en-US" dirty="0"/>
-              <a:t>, </a:t>
-            </a:r>
-            <a:r>
-              <a:rPr lang="en-US" dirty="0" err="1"/>
-              <a:t>user_state</a:t>
-            </a:r>
-            <a:r>
-              <a:rPr lang="en-US" dirty="0"/>
-              <a:t>, </a:t>
-            </a:r>
-            <a:r>
-              <a:rPr lang="en-US" dirty="0" err="1"/>
-              <a:t>user_country</a:t>
-            </a:r>
-            <a:r>
-              <a:rPr lang="en-US" dirty="0"/>
-              <a:t>, </a:t>
-            </a:r>
-            <a:r>
-              <a:rPr lang="en-US" dirty="0" err="1" smtClean="0"/>
-              <a:t>user_fb_id</a:t>
-            </a:r>
-            <a:endParaRPr lang="en-US" dirty="0" smtClean="0"/>
-          </a:p>
-          <a:p>
-            <a:pPr lvl="1"/>
-            <a:r>
-              <a:rPr lang="en-US" dirty="0" err="1" smtClean="0"/>
-              <a:t>User_friend_fb</a:t>
-            </a:r>
-            <a:endParaRPr lang="en-US" dirty="0" smtClean="0"/>
-          </a:p>
-          <a:p>
-            <a:r>
-              <a:rPr lang="en-US" dirty="0" smtClean="0"/>
-              <a:t>Output: </a:t>
-            </a:r>
-            <a:r>
-              <a:rPr lang="en-US" dirty="0" err="1" smtClean="0"/>
-              <a:t>user_activation_key</a:t>
-            </a:r>
-            <a:endParaRPr lang="en-US" dirty="0" smtClean="0"/>
+            <a:pPr marL="285750" indent="-285750">
+              <a:buFont typeface="Arial"/>
+              <a:buChar char="•"/>
+            </a:pPr>
+            <a:r>
+              <a:rPr lang="en-US" sz="1600" b="1" dirty="0" smtClean="0">
+                <a:solidFill>
+                  <a:srgbClr val="0000FF"/>
+                </a:solidFill>
+              </a:rPr>
+              <a:t>Change Input and Output field names to camel characters</a:t>
+            </a:r>
+            <a:r>
+              <a:rPr lang="en-US" sz="1600" b="1" dirty="0" smtClean="0">
+                <a:solidFill>
+                  <a:srgbClr val="0000FF"/>
+                </a:solidFill>
+              </a:rPr>
+              <a:t>.</a:t>
+            </a:r>
+          </a:p>
+          <a:p>
+            <a:pPr marL="285750" indent="-285750">
+              <a:buFont typeface="Arial"/>
+              <a:buChar char="•"/>
+            </a:pPr>
+            <a:r>
+              <a:rPr lang="en-US" sz="1600" b="1" dirty="0" smtClean="0">
+                <a:solidFill>
+                  <a:srgbClr val="0000FF"/>
+                </a:solidFill>
+              </a:rPr>
+              <a:t>Missing APIs:</a:t>
+            </a:r>
+          </a:p>
+          <a:p>
+            <a:pPr marL="742950" lvl="1" indent="-285750">
+              <a:buFont typeface="Arial"/>
+              <a:buChar char="•"/>
+            </a:pPr>
+            <a:r>
+              <a:rPr lang="en-US" sz="1600" b="1" u="sng" dirty="0" err="1" smtClean="0">
+                <a:solidFill>
+                  <a:srgbClr val="0000FF"/>
+                </a:solidFill>
+              </a:rPr>
+              <a:t>showSignupDetail</a:t>
+            </a:r>
+            <a:r>
+              <a:rPr lang="en-US" sz="1600" b="1" dirty="0" smtClean="0">
+                <a:solidFill>
+                  <a:srgbClr val="0000FF"/>
+                </a:solidFill>
+              </a:rPr>
+              <a:t> </a:t>
+            </a:r>
+            <a:r>
+              <a:rPr lang="en-US" sz="1600" dirty="0" smtClean="0">
+                <a:solidFill>
+                  <a:srgbClr val="0000FF"/>
+                </a:solidFill>
+              </a:rPr>
+              <a:t>(API to help populate the screen that appears immediately after user connects with FB OR creates new users – the one where user can add </a:t>
+            </a:r>
+            <a:r>
+              <a:rPr lang="en-US" sz="1600" dirty="0" err="1" smtClean="0">
+                <a:solidFill>
+                  <a:srgbClr val="0000FF"/>
+                </a:solidFill>
+              </a:rPr>
+              <a:t>fav</a:t>
+            </a:r>
+            <a:r>
+              <a:rPr lang="en-US" sz="1600" dirty="0" smtClean="0">
+                <a:solidFill>
+                  <a:srgbClr val="0000FF"/>
+                </a:solidFill>
+              </a:rPr>
+              <a:t> cuisine, top 5 restaurant, trusted friend etc.). You will need to retrieve which of the Users friends are already using TS (e.g. Paul G, Ron C and 5 other friends already use TasteSync)</a:t>
+            </a:r>
+          </a:p>
+          <a:p>
+            <a:pPr marL="742950" lvl="1" indent="-285750">
+              <a:buFont typeface="Arial"/>
+              <a:buChar char="•"/>
+            </a:pPr>
+            <a:r>
+              <a:rPr lang="en-US" sz="1600" b="1" u="sng" dirty="0" err="1" smtClean="0">
+                <a:solidFill>
+                  <a:srgbClr val="0000FF"/>
+                </a:solidFill>
+              </a:rPr>
+              <a:t>submitSignupDetail</a:t>
+            </a:r>
+            <a:r>
+              <a:rPr lang="en-US" sz="1600" dirty="0" smtClean="0">
+                <a:solidFill>
+                  <a:srgbClr val="0000FF"/>
+                </a:solidFill>
+              </a:rPr>
+              <a:t> (API to submit favorite cuisine, top 5 restaurants, trusted friend, </a:t>
+            </a:r>
+            <a:r>
+              <a:rPr lang="en-US" sz="1600" dirty="0" err="1" smtClean="0">
+                <a:solidFill>
+                  <a:srgbClr val="0000FF"/>
+                </a:solidFill>
+              </a:rPr>
+              <a:t>invite_y_n</a:t>
+            </a:r>
+            <a:r>
+              <a:rPr lang="en-US" sz="1600" dirty="0" smtClean="0">
+                <a:solidFill>
+                  <a:srgbClr val="0000FF"/>
+                </a:solidFill>
+              </a:rPr>
+              <a:t> info to the DB)</a:t>
+            </a:r>
+          </a:p>
+          <a:p>
+            <a:pPr marL="742950" lvl="1" indent="-285750">
+              <a:buFont typeface="Arial"/>
+              <a:buChar char="•"/>
+            </a:pPr>
+            <a:endParaRPr lang="en-US" sz="1600" dirty="0">
+              <a:solidFill>
+                <a:srgbClr val="0000FF"/>
+              </a:solidFill>
+            </a:endParaRPr>
+          </a:p>
+          <a:p>
+            <a:pPr marL="285750" indent="-285750">
+              <a:buFont typeface="Arial"/>
+              <a:buChar char="•"/>
+            </a:pPr>
+            <a:r>
+              <a:rPr lang="en-US" sz="1600" b="1" dirty="0" smtClean="0">
+                <a:solidFill>
+                  <a:srgbClr val="0000FF"/>
+                </a:solidFill>
+              </a:rPr>
+              <a:t>Questions:</a:t>
+            </a:r>
+          </a:p>
+          <a:p>
+            <a:pPr marL="742950" lvl="1" indent="-285750">
+              <a:buFont typeface="Arial"/>
+              <a:buChar char="•"/>
+            </a:pPr>
+            <a:r>
+              <a:rPr lang="en-US" sz="1600" dirty="0" smtClean="0">
+                <a:solidFill>
+                  <a:srgbClr val="0000FF"/>
+                </a:solidFill>
+              </a:rPr>
+              <a:t>For a FB connect user, will user have to do “Connect with Facebook” </a:t>
+            </a:r>
+            <a:r>
+              <a:rPr lang="en-US" sz="1600" dirty="0" err="1" smtClean="0">
+                <a:solidFill>
+                  <a:srgbClr val="0000FF"/>
+                </a:solidFill>
+              </a:rPr>
+              <a:t>everytime</a:t>
+            </a:r>
+            <a:r>
+              <a:rPr lang="en-US" sz="1600" dirty="0" smtClean="0">
+                <a:solidFill>
+                  <a:srgbClr val="0000FF"/>
+                </a:solidFill>
+              </a:rPr>
+              <a:t> they come to the app? Ideally they shouldn’t have to login again if they haven’t logged out. (similar to how you don’t have to login to Facebook </a:t>
+            </a:r>
+            <a:r>
+              <a:rPr lang="en-US" sz="1600" dirty="0" err="1" smtClean="0">
+                <a:solidFill>
+                  <a:srgbClr val="0000FF"/>
+                </a:solidFill>
+              </a:rPr>
+              <a:t>everytime</a:t>
+            </a:r>
+            <a:r>
+              <a:rPr lang="en-US" sz="1600" dirty="0" smtClean="0">
+                <a:solidFill>
+                  <a:srgbClr val="0000FF"/>
+                </a:solidFill>
+              </a:rPr>
+              <a:t> you go their app… )</a:t>
+            </a:r>
+          </a:p>
+          <a:p>
+            <a:pPr marL="742950" lvl="1" indent="-285750">
+              <a:buFont typeface="Arial"/>
+              <a:buChar char="•"/>
+            </a:pPr>
+            <a:r>
+              <a:rPr lang="en-US" sz="1600" dirty="0" smtClean="0">
+                <a:solidFill>
+                  <a:srgbClr val="0000FF"/>
+                </a:solidFill>
+              </a:rPr>
+              <a:t>How </a:t>
+            </a:r>
+            <a:r>
+              <a:rPr lang="en-US" sz="1600" dirty="0">
+                <a:solidFill>
+                  <a:srgbClr val="0000FF"/>
+                </a:solidFill>
+              </a:rPr>
+              <a:t>we will auto-suggest restaurant names, cuisine names and friend names when user starts typing on </a:t>
+            </a:r>
+            <a:r>
+              <a:rPr lang="en-US" sz="1600" dirty="0" err="1">
+                <a:solidFill>
+                  <a:srgbClr val="0000FF"/>
+                </a:solidFill>
+              </a:rPr>
+              <a:t>SignupDetail</a:t>
+            </a:r>
+            <a:r>
+              <a:rPr lang="en-US" sz="1600" dirty="0">
+                <a:solidFill>
+                  <a:srgbClr val="0000FF"/>
+                </a:solidFill>
+              </a:rPr>
+              <a:t> </a:t>
+            </a:r>
+            <a:r>
+              <a:rPr lang="en-US" sz="1600" dirty="0" smtClean="0">
+                <a:solidFill>
+                  <a:srgbClr val="0000FF"/>
+                </a:solidFill>
+              </a:rPr>
+              <a:t>screen?</a:t>
+            </a:r>
+            <a:endParaRPr lang="en-US" sz="1600" dirty="0">
+              <a:solidFill>
+                <a:srgbClr val="0000FF"/>
+              </a:solidFill>
+            </a:endParaRPr>
           </a:p>
         </p:txBody>
       </p:sp>
     </p:spTree>
     <p:extLst>
       <p:ext uri="{BB962C8B-B14F-4D97-AF65-F5344CB8AC3E}">
-        <p14:creationId xmlns:p14="http://schemas.microsoft.com/office/powerpoint/2010/main" val="2652596718"/>
+        <p14:creationId xmlns:p14="http://schemas.microsoft.com/office/powerpoint/2010/main" val="1461176908"/>
       </p:ext>
     </p:extLst>
   </p:cSld>
@@ -5206,7 +5362,7 @@
           <a:p>
             <a:r>
               <a:rPr lang="en-US" dirty="0" err="1" smtClean="0"/>
-              <a:t>showAboutMe</a:t>
+              <a:t>submitAboutMe</a:t>
             </a:r>
             <a:endParaRPr lang="en-US" dirty="0"/>
           </a:p>
@@ -5233,7 +5389,7 @@
             </a:r>
             <a:r>
               <a:rPr lang="en-US" dirty="0" err="1"/>
-              <a:t>showAboutMe</a:t>
+              <a:t>submitAboutMe</a:t>
             </a:r>
             <a:endParaRPr lang="en-US" dirty="0"/>
           </a:p>
@@ -5257,12 +5413,16 @@
               <a:rPr lang="en-US" dirty="0" err="1" smtClean="0"/>
               <a:t>user_id</a:t>
             </a:r>
-            <a:endParaRPr lang="en-US" dirty="0"/>
-          </a:p>
-          <a:p>
-            <a:r>
-              <a:rPr lang="en-US" dirty="0" smtClean="0"/>
-              <a:t>Output: “about me” content</a:t>
+            <a:r>
+              <a:rPr lang="en-US" dirty="0" smtClean="0"/>
+              <a:t>, “about me” content</a:t>
+            </a:r>
+            <a:endParaRPr lang="en-US" dirty="0"/>
+          </a:p>
+          <a:p>
+            <a:r>
+              <a:rPr lang="en-US" dirty="0" smtClean="0"/>
+              <a:t>Output: success or not</a:t>
             </a:r>
             <a:endParaRPr lang="en-US" dirty="0"/>
           </a:p>
@@ -5273,15 +5433,23 @@
             </a:r>
             <a:r>
               <a:rPr lang="en-US" dirty="0" smtClean="0"/>
-              <a:t>changes: no changes</a:t>
-            </a:r>
+              <a:t>changes</a:t>
+            </a:r>
+          </a:p>
+          <a:p>
+            <a:pPr lvl="1"/>
+            <a:r>
+              <a:rPr lang="en-US" dirty="0" smtClean="0"/>
+              <a:t>About column of table users</a:t>
+            </a:r>
+            <a:endParaRPr lang="en-US" dirty="0"/>
           </a:p>
         </p:txBody>
       </p:sp>
     </p:spTree>
     <p:extLst>
       <p:ext uri="{BB962C8B-B14F-4D97-AF65-F5344CB8AC3E}">
-        <p14:creationId xmlns:p14="http://schemas.microsoft.com/office/powerpoint/2010/main" val="622950393"/>
+        <p14:creationId xmlns:p14="http://schemas.microsoft.com/office/powerpoint/2010/main" val="1477502764"/>
       </p:ext>
     </p:extLst>
   </p:cSld>
@@ -5325,7 +5493,7 @@
           <a:p>
             <a:r>
               <a:rPr lang="en-US" dirty="0" err="1" smtClean="0"/>
-              <a:t>showNumberFollowing</a:t>
+              <a:t>showAboutMe</a:t>
             </a:r>
             <a:endParaRPr lang="en-US" dirty="0"/>
           </a:p>
@@ -5343,9 +5511,7 @@
         </p:nvSpPr>
         <p:spPr/>
         <p:txBody>
-          <a:bodyPr>
-            <a:normAutofit lnSpcReduction="10000"/>
-          </a:bodyPr>
+          <a:bodyPr/>
           <a:lstStyle/>
           <a:p>
             <a:r>
@@ -5354,7 +5520,7 @@
             </a:r>
             <a:r>
               <a:rPr lang="en-US" dirty="0" err="1"/>
-              <a:t>showNumberFollowing</a:t>
+              <a:t>showAboutMe</a:t>
             </a:r>
             <a:endParaRPr lang="en-US" dirty="0"/>
           </a:p>
@@ -5365,7 +5531,7 @@
             </a:r>
             <a:r>
               <a:rPr lang="en-US" dirty="0" smtClean="0"/>
-              <a:t>by: the number shown on user’s profile at Following </a:t>
+              <a:t>by: when users click Edit button in Profile -&gt; Edit </a:t>
             </a:r>
             <a:endParaRPr lang="en-US" dirty="0"/>
           </a:p>
@@ -5383,42 +5549,7 @@
           <a:p>
             <a:r>
               <a:rPr lang="en-US" dirty="0" smtClean="0"/>
-              <a:t>Output: number of members who the user is following</a:t>
-            </a:r>
-          </a:p>
-          <a:p>
-            <a:pPr lvl="1"/>
-            <a:r>
-              <a:rPr lang="en-US" dirty="0" smtClean="0"/>
-              <a:t>Note: on the </a:t>
-            </a:r>
-            <a:r>
-              <a:rPr lang="en-US" dirty="0"/>
-              <a:t>table </a:t>
-            </a:r>
-            <a:r>
-              <a:rPr lang="en-US" dirty="0" err="1" smtClean="0"/>
-              <a:t>user_follow_data</a:t>
-            </a:r>
-            <a:r>
-              <a:rPr lang="en-US" dirty="0" smtClean="0"/>
-              <a:t>, we need to count rows </a:t>
-            </a:r>
-            <a:r>
-              <a:rPr lang="en-US" dirty="0"/>
-              <a:t>with </a:t>
-            </a:r>
-            <a:r>
-              <a:rPr lang="en-US" dirty="0" err="1" smtClean="0"/>
-              <a:t>follower_user_id</a:t>
-            </a:r>
-            <a:r>
-              <a:rPr lang="en-US" dirty="0" smtClean="0"/>
-              <a:t> = </a:t>
-            </a:r>
-            <a:r>
-              <a:rPr lang="en-US" dirty="0" err="1" smtClean="0"/>
-              <a:t>user_id</a:t>
+              <a:t>Output: “about me” content</a:t>
             </a:r>
             <a:endParaRPr lang="en-US" dirty="0"/>
           </a:p>
@@ -5431,14 +5562,13 @@
               <a:rPr lang="en-US" dirty="0" smtClean="0"/>
               <a:t>changes: no changes</a:t>
             </a:r>
-            <a:endParaRPr lang="en-US" dirty="0"/>
           </a:p>
         </p:txBody>
       </p:sp>
     </p:spTree>
     <p:extLst>
       <p:ext uri="{BB962C8B-B14F-4D97-AF65-F5344CB8AC3E}">
-        <p14:creationId xmlns:p14="http://schemas.microsoft.com/office/powerpoint/2010/main" val="3233855986"/>
+        <p14:creationId xmlns:p14="http://schemas.microsoft.com/office/powerpoint/2010/main" val="622950393"/>
       </p:ext>
     </p:extLst>
   </p:cSld>
@@ -5482,7 +5612,7 @@
           <a:p>
             <a:r>
               <a:rPr lang="en-US" dirty="0" err="1" smtClean="0"/>
-              <a:t>showFollowingList</a:t>
+              <a:t>showNumberFollowing</a:t>
             </a:r>
             <a:endParaRPr lang="en-US" dirty="0"/>
           </a:p>
@@ -5500,7 +5630,9 @@
         </p:nvSpPr>
         <p:spPr/>
         <p:txBody>
-          <a:bodyPr/>
+          <a:bodyPr>
+            <a:normAutofit lnSpcReduction="10000"/>
+          </a:bodyPr>
           <a:lstStyle/>
           <a:p>
             <a:r>
@@ -5509,7 +5641,7 @@
             </a:r>
             <a:r>
               <a:rPr lang="en-US" dirty="0" err="1"/>
-              <a:t>showFollowingList</a:t>
+              <a:t>showNumberFollowing</a:t>
             </a:r>
             <a:endParaRPr lang="en-US" dirty="0"/>
           </a:p>
@@ -5520,7 +5652,7 @@
             </a:r>
             <a:r>
               <a:rPr lang="en-US" dirty="0" smtClean="0"/>
-              <a:t>by: when user clicks on the Profile -&gt; Following </a:t>
+              <a:t>by: the number shown on user’s profile at Following </a:t>
             </a:r>
             <a:endParaRPr lang="en-US" dirty="0"/>
           </a:p>
@@ -5538,7 +5670,42 @@
           <a:p>
             <a:r>
               <a:rPr lang="en-US" dirty="0" smtClean="0"/>
-              <a:t>Output: list of following members (photo, name)</a:t>
+              <a:t>Output: number of members who the user is following</a:t>
+            </a:r>
+          </a:p>
+          <a:p>
+            <a:pPr lvl="1"/>
+            <a:r>
+              <a:rPr lang="en-US" dirty="0" smtClean="0"/>
+              <a:t>Note: on the </a:t>
+            </a:r>
+            <a:r>
+              <a:rPr lang="en-US" dirty="0"/>
+              <a:t>table </a:t>
+            </a:r>
+            <a:r>
+              <a:rPr lang="en-US" dirty="0" err="1" smtClean="0"/>
+              <a:t>user_follow_data</a:t>
+            </a:r>
+            <a:r>
+              <a:rPr lang="en-US" dirty="0" smtClean="0"/>
+              <a:t>, we need to count rows </a:t>
+            </a:r>
+            <a:r>
+              <a:rPr lang="en-US" dirty="0"/>
+              <a:t>with </a:t>
+            </a:r>
+            <a:r>
+              <a:rPr lang="en-US" dirty="0" err="1" smtClean="0"/>
+              <a:t>follower_user_id</a:t>
+            </a:r>
+            <a:r>
+              <a:rPr lang="en-US" dirty="0" smtClean="0"/>
+              <a:t> = </a:t>
+            </a:r>
+            <a:r>
+              <a:rPr lang="en-US" dirty="0" err="1" smtClean="0"/>
+              <a:t>user_id</a:t>
             </a:r>
             <a:endParaRPr lang="en-US" dirty="0"/>
           </a:p>
@@ -5551,13 +5718,14 @@
               <a:rPr lang="en-US" dirty="0" smtClean="0"/>
               <a:t>changes: no changes</a:t>
             </a:r>
+            <a:endParaRPr lang="en-US" dirty="0"/>
           </a:p>
         </p:txBody>
       </p:sp>
     </p:spTree>
     <p:extLst>
       <p:ext uri="{BB962C8B-B14F-4D97-AF65-F5344CB8AC3E}">
-        <p14:creationId xmlns:p14="http://schemas.microsoft.com/office/powerpoint/2010/main" val="3582198819"/>
+        <p14:creationId xmlns:p14="http://schemas.microsoft.com/office/powerpoint/2010/main" val="3233855986"/>
       </p:ext>
     </p:extLst>
   </p:cSld>
@@ -5601,7 +5769,7 @@
           <a:p>
             <a:r>
               <a:rPr lang="en-US" dirty="0" err="1" smtClean="0"/>
-              <a:t>showNumberFollower</a:t>
+              <a:t>showFollowingList</a:t>
             </a:r>
             <a:endParaRPr lang="en-US" dirty="0"/>
           </a:p>
@@ -5628,7 +5796,7 @@
             </a:r>
             <a:r>
               <a:rPr lang="en-US" dirty="0" err="1"/>
-              <a:t>showNumberFollower</a:t>
+              <a:t>showFollowingList</a:t>
             </a:r>
             <a:endParaRPr lang="en-US" dirty="0"/>
           </a:p>
@@ -5639,7 +5807,7 @@
             </a:r>
             <a:r>
               <a:rPr lang="en-US" dirty="0" smtClean="0"/>
-              <a:t>by: the number shown on user’s profile at Followers </a:t>
+              <a:t>by: when user clicks on the Profile -&gt; Following </a:t>
             </a:r>
             <a:endParaRPr lang="en-US" dirty="0"/>
           </a:p>
@@ -5657,7 +5825,7 @@
           <a:p>
             <a:r>
               <a:rPr lang="en-US" dirty="0" smtClean="0"/>
-              <a:t>Output: number of followers</a:t>
+              <a:t>Output: list of following members (photo, name)</a:t>
             </a:r>
             <a:endParaRPr lang="en-US" dirty="0"/>
           </a:p>
@@ -5670,14 +5838,13 @@
               <a:rPr lang="en-US" dirty="0" smtClean="0"/>
               <a:t>changes: no changes</a:t>
             </a:r>
-            <a:endParaRPr lang="en-US" dirty="0"/>
           </a:p>
         </p:txBody>
       </p:sp>
     </p:spTree>
     <p:extLst>
       <p:ext uri="{BB962C8B-B14F-4D97-AF65-F5344CB8AC3E}">
-        <p14:creationId xmlns:p14="http://schemas.microsoft.com/office/powerpoint/2010/main" val="3233855986"/>
+        <p14:creationId xmlns:p14="http://schemas.microsoft.com/office/powerpoint/2010/main" val="3582198819"/>
       </p:ext>
     </p:extLst>
   </p:cSld>
@@ -5721,7 +5888,7 @@
           <a:p>
             <a:r>
               <a:rPr lang="en-US" dirty="0" err="1" smtClean="0"/>
-              <a:t>showFollowerList</a:t>
+              <a:t>showNumberFollower</a:t>
             </a:r>
             <a:endParaRPr lang="en-US" dirty="0"/>
           </a:p>
@@ -5748,7 +5915,7 @@
             </a:r>
             <a:r>
               <a:rPr lang="en-US" dirty="0" err="1"/>
-              <a:t>showFollowerList</a:t>
+              <a:t>showNumberFollower</a:t>
             </a:r>
             <a:endParaRPr lang="en-US" dirty="0"/>
           </a:p>
@@ -5759,7 +5926,7 @@
             </a:r>
             <a:r>
               <a:rPr lang="en-US" dirty="0" smtClean="0"/>
-              <a:t>by: when user clicks on Profile -&gt; Followers </a:t>
+              <a:t>by: the number shown on user’s profile at Followers </a:t>
             </a:r>
             <a:endParaRPr lang="en-US" dirty="0"/>
           </a:p>
@@ -5777,7 +5944,7 @@
           <a:p>
             <a:r>
               <a:rPr lang="en-US" dirty="0" smtClean="0"/>
-              <a:t>Output: list of members who are following the user</a:t>
+              <a:t>Output: number of followers</a:t>
             </a:r>
             <a:endParaRPr lang="en-US" dirty="0"/>
           </a:p>
@@ -5797,7 +5964,7 @@
     </p:spTree>
     <p:extLst>
       <p:ext uri="{BB962C8B-B14F-4D97-AF65-F5344CB8AC3E}">
-        <p14:creationId xmlns:p14="http://schemas.microsoft.com/office/powerpoint/2010/main" val="134437496"/>
+        <p14:creationId xmlns:p14="http://schemas.microsoft.com/office/powerpoint/2010/main" val="3233855986"/>
       </p:ext>
     </p:extLst>
   </p:cSld>
@@ -5841,7 +6008,7 @@
           <a:p>
             <a:r>
               <a:rPr lang="en-US" dirty="0" err="1" smtClean="0"/>
-              <a:t>showNumberFriend</a:t>
+              <a:t>showFollowerList</a:t>
             </a:r>
             <a:endParaRPr lang="en-US" dirty="0"/>
           </a:p>
@@ -5859,9 +6026,7 @@
         </p:nvSpPr>
         <p:spPr/>
         <p:txBody>
-          <a:bodyPr>
-            <a:normAutofit lnSpcReduction="10000"/>
-          </a:bodyPr>
+          <a:bodyPr/>
           <a:lstStyle/>
           <a:p>
             <a:r>
@@ -5870,7 +6035,7 @@
             </a:r>
             <a:r>
               <a:rPr lang="en-US" dirty="0" err="1"/>
-              <a:t>showNumberFriend</a:t>
+              <a:t>showFollowerList</a:t>
             </a:r>
             <a:endParaRPr lang="en-US" dirty="0"/>
           </a:p>
@@ -5881,12 +6046,9 @@
             </a:r>
             <a:r>
               <a:rPr lang="en-US" dirty="0" smtClean="0"/>
-              <a:t>by: </a:t>
-            </a:r>
-            <a:r>
-              <a:rPr lang="en-US" dirty="0"/>
-              <a:t>the number shown on user’s profile at Followers</a:t>
-            </a:r>
+              <a:t>by: when user clicks on Profile -&gt; Followers </a:t>
+            </a:r>
+            <a:endParaRPr lang="en-US" dirty="0"/>
           </a:p>
           <a:p>
             <a:r>
@@ -5902,34 +6064,7 @@
           <a:p>
             <a:r>
               <a:rPr lang="en-US" dirty="0" smtClean="0"/>
-              <a:t>Output: number of trusted FB friends who connected TS</a:t>
-            </a:r>
-          </a:p>
-          <a:p>
-            <a:pPr lvl="1"/>
-            <a:r>
-              <a:rPr lang="en-US" dirty="0"/>
-              <a:t>Note: on table </a:t>
-            </a:r>
-            <a:r>
-              <a:rPr lang="en-US" dirty="0" err="1" smtClean="0"/>
-              <a:t>user_friend_tastesync</a:t>
-            </a:r>
-            <a:r>
-              <a:rPr lang="en-US" dirty="0" smtClean="0"/>
-              <a:t>, count the rows with </a:t>
-            </a:r>
-            <a:r>
-              <a:rPr lang="en-US" dirty="0" err="1" smtClean="0"/>
-              <a:t>user_id</a:t>
-            </a:r>
-            <a:r>
-              <a:rPr lang="en-US" dirty="0" smtClean="0"/>
-              <a:t> = input </a:t>
-            </a:r>
-            <a:r>
-              <a:rPr lang="en-US" dirty="0" err="1" smtClean="0"/>
-              <a:t>user_id</a:t>
+              <a:t>Output: list of members who are following the user</a:t>
             </a:r>
             <a:endParaRPr lang="en-US" dirty="0"/>
           </a:p>
@@ -5949,7 +6084,7 @@
     </p:spTree>
     <p:extLst>
       <p:ext uri="{BB962C8B-B14F-4D97-AF65-F5344CB8AC3E}">
-        <p14:creationId xmlns:p14="http://schemas.microsoft.com/office/powerpoint/2010/main" val="3156820604"/>
+        <p14:creationId xmlns:p14="http://schemas.microsoft.com/office/powerpoint/2010/main" val="134437496"/>
       </p:ext>
     </p:extLst>
   </p:cSld>
@@ -5993,7 +6128,7 @@
           <a:p>
             <a:r>
               <a:rPr lang="en-US" dirty="0" err="1" smtClean="0"/>
-              <a:t>showFriendList</a:t>
+              <a:t>showNumberFriend</a:t>
             </a:r>
             <a:endParaRPr lang="en-US" dirty="0"/>
           </a:p>
@@ -6011,7 +6146,9 @@
         </p:nvSpPr>
         <p:spPr/>
         <p:txBody>
-          <a:bodyPr/>
+          <a:bodyPr>
+            <a:normAutofit lnSpcReduction="10000"/>
+          </a:bodyPr>
           <a:lstStyle/>
           <a:p>
             <a:r>
@@ -6020,7 +6157,7 @@
             </a:r>
             <a:r>
               <a:rPr lang="en-US" dirty="0" err="1"/>
-              <a:t>showFriendList</a:t>
+              <a:t>showNumberFriend</a:t>
             </a:r>
             <a:endParaRPr lang="en-US" dirty="0"/>
           </a:p>
@@ -6031,9 +6168,12 @@
             </a:r>
             <a:r>
               <a:rPr lang="en-US" dirty="0" smtClean="0"/>
-              <a:t>by: when user clicks on Profile -&gt; Friends </a:t>
-            </a:r>
-            <a:endParaRPr lang="en-US" dirty="0"/>
+              <a:t>by: </a:t>
+            </a:r>
+            <a:r>
+              <a:rPr lang="en-US" dirty="0"/>
+              <a:t>the number shown on user’s profile at Followers</a:t>
+            </a:r>
           </a:p>
           <a:p>
             <a:r>
@@ -6049,15 +6189,34 @@
           <a:p>
             <a:r>
               <a:rPr lang="en-US" dirty="0" smtClean="0"/>
-              <a:t>Output: list of trusted </a:t>
+              <a:t>Output: number of trusted FB friends who connected TS</a:t>
+            </a:r>
+          </a:p>
+          <a:p>
+            <a:pPr lvl="1"/>
+            <a:r>
+              <a:rPr lang="en-US" dirty="0"/>
+              <a:t>Note: on table </a:t>
             </a:r>
             <a:r>
               <a:rPr lang="en-US" dirty="0" err="1" smtClean="0"/>
-              <a:t>facebook</a:t>
-            </a:r>
-            <a:r>
-              <a:rPr lang="en-US" dirty="0" smtClean="0"/>
-              <a:t> friends who connected TS</a:t>
+              <a:t>user_friend_tastesync</a:t>
+            </a:r>
+            <a:r>
+              <a:rPr lang="en-US" dirty="0" smtClean="0"/>
+              <a:t>, count the rows with </a:t>
+            </a:r>
+            <a:r>
+              <a:rPr lang="en-US" dirty="0" err="1" smtClean="0"/>
+              <a:t>user_id</a:t>
+            </a:r>
+            <a:r>
+              <a:rPr lang="en-US" dirty="0" smtClean="0"/>
+              <a:t> = input </a:t>
+            </a:r>
+            <a:r>
+              <a:rPr lang="en-US" dirty="0" err="1" smtClean="0"/>
+              <a:t>user_id</a:t>
             </a:r>
             <a:endParaRPr lang="en-US" dirty="0"/>
           </a:p>
@@ -6077,7 +6236,7 @@
     </p:spTree>
     <p:extLst>
       <p:ext uri="{BB962C8B-B14F-4D97-AF65-F5344CB8AC3E}">
-        <p14:creationId xmlns:p14="http://schemas.microsoft.com/office/powerpoint/2010/main" val="1875355042"/>
+        <p14:creationId xmlns:p14="http://schemas.microsoft.com/office/powerpoint/2010/main" val="3156820604"/>
       </p:ext>
     </p:extLst>
   </p:cSld>
@@ -6121,7 +6280,7 @@
           <a:p>
             <a:r>
               <a:rPr lang="en-US" dirty="0" err="1" smtClean="0"/>
-              <a:t>submitFollowStatus</a:t>
+              <a:t>showFriendList</a:t>
             </a:r>
             <a:endParaRPr lang="en-US" dirty="0"/>
           </a:p>
@@ -6139,9 +6298,7 @@
         </p:nvSpPr>
         <p:spPr/>
         <p:txBody>
-          <a:bodyPr>
-            <a:normAutofit fontScale="77500" lnSpcReduction="20000"/>
-          </a:bodyPr>
+          <a:bodyPr/>
           <a:lstStyle/>
           <a:p>
             <a:r>
@@ -6150,7 +6307,7 @@
             </a:r>
             <a:r>
               <a:rPr lang="en-US" dirty="0" err="1"/>
-              <a:t>submitFollowStatus</a:t>
+              <a:t>showFriendList</a:t>
             </a:r>
             <a:endParaRPr lang="en-US" dirty="0"/>
           </a:p>
@@ -6161,7 +6318,7 @@
             </a:r>
             <a:r>
               <a:rPr lang="en-US" dirty="0" smtClean="0"/>
-              <a:t>by: when a user goes to other users’ profiles and would like to change follow status </a:t>
+              <a:t>by: when user clicks on Profile -&gt; Friends </a:t>
             </a:r>
             <a:endParaRPr lang="en-US" dirty="0"/>
           </a:p>
@@ -6174,20 +6331,20 @@
               <a:rPr lang="en-US" dirty="0" err="1" smtClean="0"/>
               <a:t>user_id</a:t>
             </a:r>
-            <a:r>
-              <a:rPr lang="en-US" dirty="0" smtClean="0"/>
-              <a:t>, </a:t>
+            <a:endParaRPr lang="en-US" dirty="0"/>
+          </a:p>
+          <a:p>
+            <a:r>
+              <a:rPr lang="en-US" dirty="0" smtClean="0"/>
+              <a:t>Output: list of trusted </a:t>
             </a:r>
             <a:r>
               <a:rPr lang="en-US" dirty="0" err="1" smtClean="0"/>
-              <a:t>dest_user_id</a:t>
-            </a:r>
-            <a:endParaRPr lang="en-US" dirty="0"/>
-          </a:p>
-          <a:p>
-            <a:r>
-              <a:rPr lang="en-US" dirty="0" smtClean="0"/>
-              <a:t>Output: success or not</a:t>
+              <a:t>facebook</a:t>
+            </a:r>
+            <a:r>
+              <a:rPr lang="en-US" dirty="0" smtClean="0"/>
+              <a:t> friends who connected TS</a:t>
             </a:r>
             <a:endParaRPr lang="en-US" dirty="0"/>
           </a:p>
@@ -6198,110 +6355,7 @@
             </a:r>
             <a:r>
               <a:rPr lang="en-US" dirty="0" smtClean="0"/>
-              <a:t>changes</a:t>
-            </a:r>
-          </a:p>
-          <a:p>
-            <a:pPr lvl="1"/>
-            <a:r>
-              <a:rPr lang="en-US" dirty="0" smtClean="0"/>
-              <a:t>No follow -&gt; Follow: add </a:t>
-            </a:r>
-            <a:r>
-              <a:rPr lang="en-US" dirty="0"/>
-              <a:t>one pair (</a:t>
-            </a:r>
-            <a:r>
-              <a:rPr lang="en-US" dirty="0" err="1" smtClean="0"/>
-              <a:t>follower_user_id</a:t>
-            </a:r>
-            <a:r>
-              <a:rPr lang="en-US" dirty="0" smtClean="0"/>
-              <a:t> = </a:t>
-            </a:r>
-            <a:r>
-              <a:rPr lang="en-US" dirty="0" err="1" smtClean="0"/>
-              <a:t>user_id</a:t>
-            </a:r>
-            <a:r>
-              <a:rPr lang="en-US" dirty="0" smtClean="0"/>
-              <a:t>, </a:t>
-            </a:r>
-            <a:r>
-              <a:rPr lang="en-US" dirty="0" err="1" smtClean="0"/>
-              <a:t>followee_user_id</a:t>
-            </a:r>
-            <a:r>
-              <a:rPr lang="en-US" dirty="0" smtClean="0"/>
-              <a:t> = </a:t>
-            </a:r>
-            <a:r>
-              <a:rPr lang="en-US" dirty="0" err="1" smtClean="0"/>
-              <a:t>dest_user_id</a:t>
-            </a:r>
-            <a:r>
-              <a:rPr lang="en-US" dirty="0" smtClean="0"/>
-              <a:t>) </a:t>
-            </a:r>
-            <a:r>
-              <a:rPr lang="en-US" dirty="0"/>
-              <a:t>to the table </a:t>
-            </a:r>
-            <a:r>
-              <a:rPr lang="en-US" dirty="0" err="1"/>
-              <a:t>user_follow_data</a:t>
-            </a:r>
-            <a:endParaRPr lang="en-US" dirty="0" smtClean="0"/>
-          </a:p>
-          <a:p>
-            <a:pPr lvl="1"/>
-            <a:r>
-              <a:rPr lang="en-US" dirty="0" smtClean="0"/>
-              <a:t>Follow -&gt; No follow: delete the pair with </a:t>
-            </a:r>
-            <a:r>
-              <a:rPr lang="en-US" dirty="0" err="1"/>
-              <a:t>follower_user_id</a:t>
-            </a:r>
-            <a:r>
-              <a:rPr lang="en-US" dirty="0"/>
-              <a:t> = </a:t>
-            </a:r>
-            <a:r>
-              <a:rPr lang="en-US" dirty="0" err="1"/>
-              <a:t>user_id</a:t>
-            </a:r>
-            <a:r>
-              <a:rPr lang="en-US" dirty="0"/>
-              <a:t>, </a:t>
-            </a:r>
-            <a:r>
-              <a:rPr lang="en-US" dirty="0" err="1"/>
-              <a:t>followee_user_id</a:t>
-            </a:r>
-            <a:r>
-              <a:rPr lang="en-US" dirty="0"/>
-              <a:t> = </a:t>
-            </a:r>
-            <a:r>
-              <a:rPr lang="en-US" dirty="0" err="1" smtClean="0"/>
-              <a:t>dest_user_id</a:t>
-            </a:r>
-            <a:r>
-              <a:rPr lang="en-US" dirty="0" smtClean="0"/>
-              <a:t> from the table </a:t>
-            </a:r>
-            <a:r>
-              <a:rPr lang="en-US" dirty="0" err="1"/>
-              <a:t>user_follow_data</a:t>
-            </a:r>
-            <a:endParaRPr lang="en-US" dirty="0" smtClean="0"/>
-          </a:p>
-          <a:p>
-            <a:pPr lvl="1"/>
-            <a:r>
-              <a:rPr lang="en-US" dirty="0" smtClean="0"/>
-              <a:t>Others: no changes </a:t>
+              <a:t>changes: no changes</a:t>
             </a:r>
             <a:endParaRPr lang="en-US" dirty="0"/>
           </a:p>
@@ -6310,7 +6364,7 @@
     </p:spTree>
     <p:extLst>
       <p:ext uri="{BB962C8B-B14F-4D97-AF65-F5344CB8AC3E}">
-        <p14:creationId xmlns:p14="http://schemas.microsoft.com/office/powerpoint/2010/main" val="1201918649"/>
+        <p14:creationId xmlns:p14="http://schemas.microsoft.com/office/powerpoint/2010/main" val="1875355042"/>
       </p:ext>
     </p:extLst>
   </p:cSld>
@@ -6354,7 +6408,7 @@
           <a:p>
             <a:r>
               <a:rPr lang="en-US" dirty="0" err="1" smtClean="0"/>
-              <a:t>showFollowStatus</a:t>
+              <a:t>submitFollowStatus</a:t>
             </a:r>
             <a:endParaRPr lang="en-US" dirty="0"/>
           </a:p>
@@ -6372,7 +6426,9 @@
         </p:nvSpPr>
         <p:spPr/>
         <p:txBody>
-          <a:bodyPr/>
+          <a:bodyPr>
+            <a:normAutofit fontScale="77500" lnSpcReduction="20000"/>
+          </a:bodyPr>
           <a:lstStyle/>
           <a:p>
             <a:r>
@@ -6381,7 +6437,7 @@
             </a:r>
             <a:r>
               <a:rPr lang="en-US" dirty="0" err="1"/>
-              <a:t>showFollowStatus</a:t>
+              <a:t>submitFollowStatus</a:t>
             </a:r>
             <a:endParaRPr lang="en-US" dirty="0"/>
           </a:p>
@@ -6392,7 +6448,7 @@
             </a:r>
             <a:r>
               <a:rPr lang="en-US" dirty="0" smtClean="0"/>
-              <a:t>by: when we would like to show user follow status </a:t>
+              <a:t>by: when a user goes to other users’ profiles and would like to change follow status </a:t>
             </a:r>
             <a:endParaRPr lang="en-US" dirty="0"/>
           </a:p>
@@ -6418,7 +6474,7 @@
           <a:p>
             <a:r>
               <a:rPr lang="en-US" dirty="0" smtClean="0"/>
-              <a:t>Output: follow or not follow</a:t>
+              <a:t>Output: success or not</a:t>
             </a:r>
             <a:endParaRPr lang="en-US" dirty="0"/>
           </a:p>
@@ -6429,7 +6485,110 @@
             </a:r>
             <a:r>
               <a:rPr lang="en-US" dirty="0" smtClean="0"/>
-              <a:t>changes: no changes</a:t>
+              <a:t>changes</a:t>
+            </a:r>
+          </a:p>
+          <a:p>
+            <a:pPr lvl="1"/>
+            <a:r>
+              <a:rPr lang="en-US" dirty="0" smtClean="0"/>
+              <a:t>No follow -&gt; Follow: add </a:t>
+            </a:r>
+            <a:r>
+              <a:rPr lang="en-US" dirty="0"/>
+              <a:t>one pair (</a:t>
+            </a:r>
+            <a:r>
+              <a:rPr lang="en-US" dirty="0" err="1" smtClean="0"/>
+              <a:t>follower_user_id</a:t>
+            </a:r>
+            <a:r>
+              <a:rPr lang="en-US" dirty="0" smtClean="0"/>
+              <a:t> = </a:t>
+            </a:r>
+            <a:r>
+              <a:rPr lang="en-US" dirty="0" err="1" smtClean="0"/>
+              <a:t>user_id</a:t>
+            </a:r>
+            <a:r>
+              <a:rPr lang="en-US" dirty="0" smtClean="0"/>
+              <a:t>, </a:t>
+            </a:r>
+            <a:r>
+              <a:rPr lang="en-US" dirty="0" err="1" smtClean="0"/>
+              <a:t>followee_user_id</a:t>
+            </a:r>
+            <a:r>
+              <a:rPr lang="en-US" dirty="0" smtClean="0"/>
+              <a:t> = </a:t>
+            </a:r>
+            <a:r>
+              <a:rPr lang="en-US" dirty="0" err="1" smtClean="0"/>
+              <a:t>dest_user_id</a:t>
+            </a:r>
+            <a:r>
+              <a:rPr lang="en-US" dirty="0" smtClean="0"/>
+              <a:t>) </a:t>
+            </a:r>
+            <a:r>
+              <a:rPr lang="en-US" dirty="0"/>
+              <a:t>to the table </a:t>
+            </a:r>
+            <a:r>
+              <a:rPr lang="en-US" dirty="0" err="1"/>
+              <a:t>user_follow_data</a:t>
+            </a:r>
+            <a:endParaRPr lang="en-US" dirty="0" smtClean="0"/>
+          </a:p>
+          <a:p>
+            <a:pPr lvl="1"/>
+            <a:r>
+              <a:rPr lang="en-US" dirty="0" smtClean="0"/>
+              <a:t>Follow -&gt; No follow: delete the pair with </a:t>
+            </a:r>
+            <a:r>
+              <a:rPr lang="en-US" dirty="0" err="1"/>
+              <a:t>follower_user_id</a:t>
+            </a:r>
+            <a:r>
+              <a:rPr lang="en-US" dirty="0"/>
+              <a:t> = </a:t>
+            </a:r>
+            <a:r>
+              <a:rPr lang="en-US" dirty="0" err="1"/>
+              <a:t>user_id</a:t>
+            </a:r>
+            <a:r>
+              <a:rPr lang="en-US" dirty="0"/>
+              <a:t>, </a:t>
+            </a:r>
+            <a:r>
+              <a:rPr lang="en-US" dirty="0" err="1"/>
+              <a:t>followee_user_id</a:t>
+            </a:r>
+            <a:r>
+              <a:rPr lang="en-US" dirty="0"/>
+              <a:t> = </a:t>
+            </a:r>
+            <a:r>
+              <a:rPr lang="en-US" dirty="0" err="1" smtClean="0"/>
+              <a:t>dest_user_id</a:t>
+            </a:r>
+            <a:r>
+              <a:rPr lang="en-US" dirty="0" smtClean="0"/>
+              <a:t> from the table </a:t>
+            </a:r>
+            <a:r>
+              <a:rPr lang="en-US" dirty="0" err="1"/>
+              <a:t>user_follow_data</a:t>
+            </a:r>
+            <a:endParaRPr lang="en-US" dirty="0" smtClean="0"/>
+          </a:p>
+          <a:p>
+            <a:pPr lvl="1"/>
+            <a:r>
+              <a:rPr lang="en-US" dirty="0" smtClean="0"/>
+              <a:t>Others: no changes </a:t>
             </a:r>
             <a:endParaRPr lang="en-US" dirty="0"/>
           </a:p>
@@ -6438,7 +6597,7 @@
     </p:spTree>
     <p:extLst>
       <p:ext uri="{BB962C8B-B14F-4D97-AF65-F5344CB8AC3E}">
-        <p14:creationId xmlns:p14="http://schemas.microsoft.com/office/powerpoint/2010/main" val="2337624587"/>
+        <p14:creationId xmlns:p14="http://schemas.microsoft.com/office/powerpoint/2010/main" val="1201918649"/>
       </p:ext>
     </p:extLst>
   </p:cSld>
@@ -6482,7 +6641,7 @@
           <a:p>
             <a:r>
               <a:rPr lang="en-US" dirty="0" err="1" smtClean="0"/>
-              <a:t>submitTrustedFriend</a:t>
+              <a:t>showFollowStatus</a:t>
             </a:r>
             <a:endParaRPr lang="en-US" dirty="0"/>
           </a:p>
@@ -6509,7 +6668,7 @@
             </a:r>
             <a:r>
               <a:rPr lang="en-US" dirty="0" err="1"/>
-              <a:t>submitTrustedFriend</a:t>
+              <a:t>showFollowStatus</a:t>
             </a:r>
             <a:endParaRPr lang="en-US" dirty="0"/>
           </a:p>
@@ -6520,7 +6679,7 @@
             </a:r>
             <a:r>
               <a:rPr lang="en-US" dirty="0" smtClean="0"/>
-              <a:t>by: when user clicks on Add Friend from other users’ profile pages </a:t>
+              <a:t>by: when we would like to show user follow status </a:t>
             </a:r>
             <a:endParaRPr lang="en-US" dirty="0"/>
           </a:p>
@@ -6546,7 +6705,7 @@
           <a:p>
             <a:r>
               <a:rPr lang="en-US" dirty="0" smtClean="0"/>
-              <a:t>Output: success or not</a:t>
+              <a:t>Output: follow or not follow</a:t>
             </a:r>
             <a:endParaRPr lang="en-US" dirty="0"/>
           </a:p>
@@ -6557,28 +6716,8 @@
             </a:r>
             <a:r>
               <a:rPr lang="en-US" dirty="0" smtClean="0"/>
-              <a:t>changes:</a:t>
-            </a:r>
-            <a:endParaRPr lang="en-US" dirty="0"/>
-          </a:p>
-          <a:p>
-            <a:pPr lvl="1"/>
-            <a:r>
-              <a:rPr lang="en-US" dirty="0" err="1" smtClean="0"/>
-              <a:t>user_friend_tastesync</a:t>
-            </a:r>
-            <a:r>
-              <a:rPr lang="en-US" dirty="0" smtClean="0"/>
-              <a:t>: similar to </a:t>
-            </a:r>
-            <a:r>
-              <a:rPr lang="en-US" dirty="0" err="1" smtClean="0"/>
-              <a:t>set_follow_status</a:t>
-            </a:r>
-            <a:endParaRPr lang="en-US" dirty="0" smtClean="0"/>
-          </a:p>
-          <a:p>
-            <a:pPr lvl="1"/>
+              <a:t>changes: no changes</a:t>
+            </a:r>
             <a:endParaRPr lang="en-US" dirty="0"/>
           </a:p>
         </p:txBody>
@@ -6586,7 +6725,7 @@
     </p:spTree>
     <p:extLst>
       <p:ext uri="{BB962C8B-B14F-4D97-AF65-F5344CB8AC3E}">
-        <p14:creationId xmlns:p14="http://schemas.microsoft.com/office/powerpoint/2010/main" val="1920850013"/>
+        <p14:creationId xmlns:p14="http://schemas.microsoft.com/office/powerpoint/2010/main" val="2337624587"/>
       </p:ext>
     </p:extLst>
   </p:cSld>
@@ -6629,222 +6768,212 @@
           <a:lstStyle/>
           <a:p>
             <a:r>
-              <a:rPr lang="en-US" dirty="0" err="1" smtClean="0"/>
-              <a:t>loginFacebook</a:t>
-            </a:r>
-            <a:endParaRPr lang="en-US" dirty="0"/>
-          </a:p>
-        </p:txBody>
-      </p:sp>
-      <p:sp>
-        <p:nvSpPr>
-          <p:cNvPr id="3" name="Content Placeholder 2"/>
-          <p:cNvSpPr>
-            <a:spLocks noGrp="1"/>
-          </p:cNvSpPr>
-          <p:nvPr>
-            <p:ph idx="1"/>
-          </p:nvPr>
-        </p:nvSpPr>
-        <p:spPr/>
-        <p:txBody>
-          <a:bodyPr>
-            <a:normAutofit fontScale="92500" lnSpcReduction="20000"/>
-          </a:bodyPr>
-          <a:lstStyle/>
-          <a:p>
-            <a:r>
-              <a:rPr lang="en-US" dirty="0"/>
-              <a:t>Database changes:</a:t>
-            </a:r>
-          </a:p>
-          <a:p>
-            <a:pPr lvl="1"/>
-            <a:r>
-              <a:rPr lang="en-US" dirty="0"/>
-              <a:t>Users: </a:t>
-            </a:r>
-            <a:r>
-              <a:rPr lang="en-US" dirty="0" err="1" smtClean="0">
+              <a:rPr lang="en-US" b="1" dirty="0" err="1" smtClean="0">
                 <a:solidFill>
-                  <a:srgbClr val="FF0000"/>
+                  <a:srgbClr val="0000FF"/>
                 </a:solidFill>
               </a:rPr>
-              <a:t>user_id</a:t>
-            </a:r>
-            <a:r>
-              <a:rPr lang="en-US" dirty="0"/>
-              <a:t>, </a:t>
-            </a:r>
-            <a:r>
-              <a:rPr lang="en-US" dirty="0" err="1">
+              <a:t>submitL</a:t>
+            </a:r>
+            <a:r>
+              <a:rPr lang="en-US" dirty="0" err="1" smtClean="0"/>
+              <a:t>oginFacebook</a:t>
+            </a:r>
+            <a:endParaRPr lang="en-US" dirty="0"/>
+          </a:p>
+        </p:txBody>
+      </p:sp>
+      <p:sp>
+        <p:nvSpPr>
+          <p:cNvPr id="3" name="Content Placeholder 2"/>
+          <p:cNvSpPr>
+            <a:spLocks noGrp="1"/>
+          </p:cNvSpPr>
+          <p:nvPr>
+            <p:ph idx="1"/>
+          </p:nvPr>
+        </p:nvSpPr>
+        <p:spPr/>
+        <p:txBody>
+          <a:bodyPr>
+            <a:normAutofit/>
+          </a:bodyPr>
+          <a:lstStyle/>
+          <a:p>
+            <a:r>
+              <a:rPr lang="en-US" sz="1800" dirty="0" smtClean="0"/>
+              <a:t>API: </a:t>
+            </a:r>
+            <a:r>
+              <a:rPr lang="en-US" sz="1800" b="1" dirty="0" err="1" smtClean="0">
                 <a:solidFill>
-                  <a:srgbClr val="FF0000"/>
+                  <a:srgbClr val="0000FF"/>
                 </a:solidFill>
               </a:rPr>
-              <a:t>ts_user_id</a:t>
-            </a:r>
-            <a:r>
-              <a:rPr lang="en-US" dirty="0"/>
+              <a:t>submitL</a:t>
+            </a:r>
+            <a:r>
+              <a:rPr lang="en-US" sz="1800" dirty="0" err="1" smtClean="0"/>
+              <a:t>oginFacebook</a:t>
+            </a:r>
+            <a:endParaRPr lang="en-US" sz="1800" dirty="0" smtClean="0"/>
+          </a:p>
+          <a:p>
+            <a:r>
+              <a:rPr lang="en-US" sz="1800" dirty="0" smtClean="0"/>
+              <a:t>Called by: when user clicks on “Connect with Facebook” button on “Welcome to </a:t>
+            </a:r>
+            <a:r>
+              <a:rPr lang="en-US" sz="1800" dirty="0" err="1" smtClean="0"/>
+              <a:t>TasteSynce</a:t>
+            </a:r>
+            <a:r>
+              <a:rPr lang="en-US" sz="1800" dirty="0" smtClean="0"/>
+              <a:t>” screen</a:t>
+            </a:r>
+          </a:p>
+          <a:p>
+            <a:r>
+              <a:rPr lang="en-US" sz="1800" dirty="0" smtClean="0"/>
+              <a:t>Note: just called after connect to users’ FB successfully</a:t>
+            </a:r>
+          </a:p>
+          <a:p>
+            <a:r>
+              <a:rPr lang="en-US" sz="1800" dirty="0" smtClean="0"/>
+              <a:t>Input</a:t>
+            </a:r>
+          </a:p>
+          <a:p>
+            <a:pPr lvl="1"/>
+            <a:r>
+              <a:rPr lang="en-US" sz="1800" dirty="0"/>
+              <a:t>User’s </a:t>
+            </a:r>
+            <a:r>
+              <a:rPr lang="en-US" sz="1800" dirty="0" smtClean="0"/>
+              <a:t>info: </a:t>
+            </a:r>
+            <a:r>
+              <a:rPr lang="en-US" sz="1800" dirty="0" err="1"/>
+              <a:t>ts_user_email</a:t>
+            </a:r>
+            <a:r>
+              <a:rPr lang="en-US" sz="1800" dirty="0"/>
               <a:t>, </a:t>
             </a:r>
             <a:r>
-              <a:rPr lang="en-US" dirty="0" err="1"/>
-              <a:t>ts_user_email</a:t>
-            </a:r>
-            <a:r>
-              <a:rPr lang="en-US" dirty="0"/>
+              <a:rPr lang="en-US" sz="1800" dirty="0" err="1"/>
+              <a:t>ts_first_name</a:t>
+            </a:r>
+            <a:r>
+              <a:rPr lang="en-US" sz="1800" dirty="0"/>
               <a:t>, </a:t>
             </a:r>
             <a:r>
-              <a:rPr lang="en-US" dirty="0" err="1"/>
-              <a:t>ts_first_name</a:t>
-            </a:r>
-            <a:r>
-              <a:rPr lang="en-US" dirty="0"/>
+              <a:rPr lang="en-US" sz="1800" dirty="0" err="1"/>
+              <a:t>ts_last_name</a:t>
+            </a:r>
+            <a:r>
+              <a:rPr lang="en-US" sz="1800" dirty="0"/>
               <a:t>, </a:t>
             </a:r>
             <a:r>
-              <a:rPr lang="en-US" dirty="0" err="1"/>
-              <a:t>ts_last_name</a:t>
-            </a:r>
-            <a:r>
-              <a:rPr lang="en-US" dirty="0"/>
+              <a:rPr lang="en-US" sz="1800" dirty="0" err="1"/>
+              <a:t>user_created_initial_date</a:t>
+            </a:r>
+            <a:r>
+              <a:rPr lang="en-US" sz="1800" dirty="0"/>
               <a:t>, </a:t>
             </a:r>
             <a:r>
-              <a:rPr lang="en-US" dirty="0" err="1"/>
-              <a:t>user_created_initial_date</a:t>
-            </a:r>
-            <a:r>
-              <a:rPr lang="en-US" dirty="0"/>
+              <a:rPr lang="en-US" sz="1800" dirty="0" err="1"/>
+              <a:t>user_gender</a:t>
+            </a:r>
+            <a:r>
+              <a:rPr lang="en-US" sz="1800" dirty="0"/>
               <a:t>, </a:t>
             </a:r>
             <a:r>
-              <a:rPr lang="en-US" dirty="0" err="1">
+              <a:rPr lang="en-US" sz="1800" dirty="0" err="1"/>
+              <a:t>user_city</a:t>
+            </a:r>
+            <a:r>
+              <a:rPr lang="en-US" sz="1800" dirty="0"/>
+              <a:t>, </a:t>
+            </a:r>
+            <a:r>
+              <a:rPr lang="en-US" sz="1800" dirty="0" err="1"/>
+              <a:t>user_state</a:t>
+            </a:r>
+            <a:r>
+              <a:rPr lang="en-US" sz="1800" dirty="0"/>
+              <a:t>, </a:t>
+            </a:r>
+            <a:r>
+              <a:rPr lang="en-US" sz="1800" dirty="0" err="1"/>
+              <a:t>user_country</a:t>
+            </a:r>
+            <a:r>
+              <a:rPr lang="en-US" sz="1800" dirty="0"/>
+              <a:t>, </a:t>
+            </a:r>
+            <a:r>
+              <a:rPr lang="en-US" sz="1800" dirty="0" err="1" smtClean="0"/>
+              <a:t>user_fb_id</a:t>
+            </a:r>
+            <a:endParaRPr lang="en-US" sz="1800" dirty="0" smtClean="0"/>
+          </a:p>
+          <a:p>
+            <a:pPr lvl="1"/>
+            <a:r>
+              <a:rPr lang="en-US" sz="1800" dirty="0" err="1" smtClean="0"/>
+              <a:t>User_friend_fb</a:t>
+            </a:r>
+            <a:endParaRPr lang="en-US" sz="1800" dirty="0" smtClean="0"/>
+          </a:p>
+          <a:p>
+            <a:r>
+              <a:rPr lang="en-US" sz="1800" dirty="0" smtClean="0"/>
+              <a:t>Output: </a:t>
+            </a:r>
+            <a:r>
+              <a:rPr lang="en-US" sz="1800" dirty="0" err="1" smtClean="0"/>
+              <a:t>user_activation_key</a:t>
+            </a:r>
+            <a:endParaRPr lang="en-US" sz="1800" dirty="0" smtClean="0"/>
+          </a:p>
+        </p:txBody>
+      </p:sp>
+      <p:sp>
+        <p:nvSpPr>
+          <p:cNvPr id="4" name="TextBox 3"/>
+          <p:cNvSpPr txBox="1"/>
+          <p:nvPr/>
+        </p:nvSpPr>
+        <p:spPr>
+          <a:xfrm>
+            <a:off x="609600" y="4876800"/>
+            <a:ext cx="7467600" cy="1477328"/>
+          </a:xfrm>
+          <a:prstGeom prst="rect">
+            <a:avLst/>
+          </a:prstGeom>
+          <a:noFill/>
+        </p:spPr>
+        <p:txBody>
+          <a:bodyPr wrap="square" rtlCol="0">
+            <a:spAutoFit/>
+          </a:bodyPr>
+          <a:lstStyle/>
+          <a:p>
+            <a:r>
+              <a:rPr lang="en-US" b="1" dirty="0" smtClean="0">
                 <a:solidFill>
-                  <a:srgbClr val="FF0000"/>
+                  <a:srgbClr val="0000FF"/>
                 </a:solidFill>
               </a:rPr>
-              <a:t>user_activation_key</a:t>
-            </a:r>
-            <a:r>
-              <a:rPr lang="en-US" dirty="0"/>
-              <a:t>, </a:t>
-            </a:r>
-            <a:r>
-              <a:rPr lang="en-US" dirty="0" err="1"/>
-              <a:t>user_gender</a:t>
-            </a:r>
-            <a:r>
-              <a:rPr lang="en-US" dirty="0"/>
-              <a:t>, </a:t>
-            </a:r>
-            <a:r>
-              <a:rPr lang="en-US" dirty="0" err="1"/>
-              <a:t>user_city</a:t>
-            </a:r>
-            <a:r>
-              <a:rPr lang="en-US" dirty="0"/>
-              <a:t>, </a:t>
-            </a:r>
-            <a:r>
-              <a:rPr lang="en-US" dirty="0" err="1">
-                <a:solidFill>
-                  <a:srgbClr val="FF0000"/>
-                </a:solidFill>
-              </a:rPr>
-              <a:t>user_city_id</a:t>
-            </a:r>
-            <a:r>
-              <a:rPr lang="en-US" dirty="0"/>
-              <a:t>, </a:t>
-            </a:r>
-            <a:r>
-              <a:rPr lang="en-US" dirty="0" err="1"/>
-              <a:t>user_state</a:t>
-            </a:r>
-            <a:r>
-              <a:rPr lang="en-US" dirty="0"/>
-              <a:t>, </a:t>
-            </a:r>
-            <a:r>
-              <a:rPr lang="en-US" dirty="0" err="1"/>
-              <a:t>is_online</a:t>
-            </a:r>
-            <a:r>
-              <a:rPr lang="en-US" dirty="0"/>
-              <a:t>, </a:t>
-            </a:r>
-            <a:r>
-              <a:rPr lang="en-US" dirty="0" err="1"/>
-              <a:t>user_country</a:t>
-            </a:r>
-            <a:r>
-              <a:rPr lang="en-US" dirty="0"/>
-              <a:t>, </a:t>
-            </a:r>
-            <a:r>
-              <a:rPr lang="en-US" dirty="0" err="1"/>
-              <a:t>user_fb_id</a:t>
-            </a:r>
-            <a:endParaRPr lang="en-US" dirty="0" smtClean="0"/>
-          </a:p>
-          <a:p>
-            <a:pPr lvl="1"/>
-            <a:r>
-              <a:rPr lang="en-US" dirty="0" err="1"/>
-              <a:t>F</a:t>
-            </a:r>
-            <a:r>
-              <a:rPr lang="en-US" dirty="0" err="1" smtClean="0"/>
-              <a:t>acebook_user_data</a:t>
-            </a:r>
-            <a:r>
-              <a:rPr lang="en-US" dirty="0" smtClean="0"/>
-              <a:t>: update </a:t>
-            </a:r>
-            <a:r>
-              <a:rPr lang="en-US" dirty="0" err="1" smtClean="0"/>
-              <a:t>facebook</a:t>
-            </a:r>
-            <a:r>
-              <a:rPr lang="en-US" dirty="0" smtClean="0"/>
-              <a:t> data for this user</a:t>
-            </a:r>
-          </a:p>
-          <a:p>
-            <a:pPr lvl="1"/>
-            <a:r>
-              <a:rPr lang="en-US" dirty="0" err="1" smtClean="0"/>
-              <a:t>User_friend_fb</a:t>
-            </a:r>
-            <a:r>
-              <a:rPr lang="en-US" dirty="0" smtClean="0"/>
-              <a:t>: for each friend of this user, we create a new row </a:t>
-            </a:r>
-          </a:p>
-          <a:p>
-            <a:pPr lvl="1"/>
-            <a:r>
-              <a:rPr lang="en-US" dirty="0" err="1"/>
-              <a:t>Users_log</a:t>
-            </a:r>
-            <a:r>
-              <a:rPr lang="en-US" dirty="0"/>
-              <a:t>: </a:t>
-            </a:r>
-            <a:r>
-              <a:rPr lang="en-US" dirty="0" err="1" smtClean="0"/>
-              <a:t>login_datetime</a:t>
-            </a:r>
-            <a:r>
-              <a:rPr lang="en-US" dirty="0" smtClean="0"/>
-              <a:t> (</a:t>
-            </a:r>
-            <a:r>
-              <a:rPr lang="en-US" dirty="0"/>
-              <a:t>update log for this user, each user just keeps one log)</a:t>
+              <a:t>For Input, please use the list of FB fields mentioned in spreadsheet “FB Fields and Permissions 021813.xlsx”. All fields mentioned there (except for the ones which are marked “extended permissions…”)  should be extracted from FB API and input into the DB. You may need to add additional fields in the DB to accommodate this info.</a:t>
             </a:r>
           </a:p>
         </p:txBody>
@@ -6852,7 +6981,162 @@
     </p:spTree>
     <p:extLst>
       <p:ext uri="{BB962C8B-B14F-4D97-AF65-F5344CB8AC3E}">
-        <p14:creationId xmlns:p14="http://schemas.microsoft.com/office/powerpoint/2010/main" val="3315236057"/>
+        <p14:creationId xmlns:p14="http://schemas.microsoft.com/office/powerpoint/2010/main" val="2652596718"/>
+      </p:ext>
+    </p:extLst>
+  </p:cSld>
+  <p:clrMapOvr>
+    <a:masterClrMapping/>
+  </p:clrMapOvr>
+  <p:timing>
+    <p:tnLst>
+      <p:par>
+        <p:cTn xmlns:p14="http://schemas.microsoft.com/office/powerpoint/2010/main" id="1" dur="indefinite" restart="never" nodeType="tmRoot"/>
+      </p:par>
+    </p:tnLst>
+  </p:timing>
+</p:sld>
+</file>
+
+<file path=ppt/slides/slide30.xml><?xml version="1.0" encoding="utf-8"?>
+<p:sld xmlns:a="http://schemas.openxmlformats.org/drawingml/2006/main" xmlns:r="http://schemas.openxmlformats.org/officeDocument/2006/relationships" xmlns:p="http://schemas.openxmlformats.org/presentationml/2006/main">
+  <p:cSld>
+    <p:spTree>
+      <p:nvGrpSpPr>
+        <p:cNvPr id="1" name=""/>
+        <p:cNvGrpSpPr/>
+        <p:nvPr/>
+      </p:nvGrpSpPr>
+      <p:grpSpPr>
+        <a:xfrm>
+          <a:off x="0" y="0"/>
+          <a:ext cx="0" cy="0"/>
+          <a:chOff x="0" y="0"/>
+          <a:chExt cx="0" cy="0"/>
+        </a:xfrm>
+      </p:grpSpPr>
+      <p:sp>
+        <p:nvSpPr>
+          <p:cNvPr id="2" name="Title 1"/>
+          <p:cNvSpPr>
+            <a:spLocks noGrp="1"/>
+          </p:cNvSpPr>
+          <p:nvPr>
+            <p:ph type="title"/>
+          </p:nvPr>
+        </p:nvSpPr>
+        <p:spPr/>
+        <p:txBody>
+          <a:bodyPr/>
+          <a:lstStyle/>
+          <a:p>
+            <a:r>
+              <a:rPr lang="en-US" dirty="0" err="1" smtClean="0"/>
+              <a:t>submitTrustedFriend</a:t>
+            </a:r>
+            <a:endParaRPr lang="en-US" dirty="0"/>
+          </a:p>
+        </p:txBody>
+      </p:sp>
+      <p:sp>
+        <p:nvSpPr>
+          <p:cNvPr id="3" name="Content Placeholder 2"/>
+          <p:cNvSpPr>
+            <a:spLocks noGrp="1"/>
+          </p:cNvSpPr>
+          <p:nvPr>
+            <p:ph idx="1"/>
+          </p:nvPr>
+        </p:nvSpPr>
+        <p:spPr/>
+        <p:txBody>
+          <a:bodyPr/>
+          <a:lstStyle/>
+          <a:p>
+            <a:r>
+              <a:rPr lang="en-US" dirty="0"/>
+              <a:t>API: </a:t>
+            </a:r>
+            <a:r>
+              <a:rPr lang="en-US" dirty="0" err="1"/>
+              <a:t>submitTrustedFriend</a:t>
+            </a:r>
+            <a:endParaRPr lang="en-US" dirty="0"/>
+          </a:p>
+          <a:p>
+            <a:r>
+              <a:rPr lang="en-US" dirty="0"/>
+              <a:t>Called </a:t>
+            </a:r>
+            <a:r>
+              <a:rPr lang="en-US" dirty="0" smtClean="0"/>
+              <a:t>by: when user clicks on Add Friend from other users’ profile pages </a:t>
+            </a:r>
+            <a:endParaRPr lang="en-US" dirty="0"/>
+          </a:p>
+          <a:p>
+            <a:r>
+              <a:rPr lang="en-US" dirty="0" smtClean="0"/>
+              <a:t>Input: </a:t>
+            </a:r>
+            <a:r>
+              <a:rPr lang="en-US" dirty="0" err="1" smtClean="0"/>
+              <a:t>user_id</a:t>
+            </a:r>
+            <a:r>
+              <a:rPr lang="en-US" dirty="0" smtClean="0"/>
+              <a:t>, </a:t>
+            </a:r>
+            <a:r>
+              <a:rPr lang="en-US" dirty="0" err="1" smtClean="0"/>
+              <a:t>dest_user_id</a:t>
+            </a:r>
+            <a:endParaRPr lang="en-US" dirty="0"/>
+          </a:p>
+          <a:p>
+            <a:r>
+              <a:rPr lang="en-US" dirty="0" smtClean="0"/>
+              <a:t>Output: success or not</a:t>
+            </a:r>
+            <a:endParaRPr lang="en-US" dirty="0"/>
+          </a:p>
+          <a:p>
+            <a:r>
+              <a:rPr lang="en-US" dirty="0"/>
+              <a:t>Database </a:t>
+            </a:r>
+            <a:r>
+              <a:rPr lang="en-US" dirty="0" smtClean="0"/>
+              <a:t>changes:</a:t>
+            </a:r>
+            <a:endParaRPr lang="en-US" dirty="0"/>
+          </a:p>
+          <a:p>
+            <a:pPr lvl="1"/>
+            <a:r>
+              <a:rPr lang="en-US" dirty="0" err="1" smtClean="0"/>
+              <a:t>user_friend_tastesync</a:t>
+            </a:r>
+            <a:r>
+              <a:rPr lang="en-US" dirty="0" smtClean="0"/>
+              <a:t>: similar to </a:t>
+            </a:r>
+            <a:r>
+              <a:rPr lang="en-US" dirty="0" err="1" smtClean="0"/>
+              <a:t>set_follow_status</a:t>
+            </a:r>
+            <a:endParaRPr lang="en-US" dirty="0" smtClean="0"/>
+          </a:p>
+          <a:p>
+            <a:pPr lvl="1"/>
+            <a:endParaRPr lang="en-US" dirty="0"/>
+          </a:p>
+        </p:txBody>
+      </p:sp>
+    </p:spTree>
+    <p:extLst>
+      <p:ext uri="{BB962C8B-B14F-4D97-AF65-F5344CB8AC3E}">
+        <p14:creationId xmlns:p14="http://schemas.microsoft.com/office/powerpoint/2010/main" val="1920850013"/>
       </p:ext>
     </p:extLst>
   </p:cSld>
@@ -6862,7 +7146,7 @@
 </p:sld>
 </file>
 
-<file path=ppt/slides/slide30.xml><?xml version="1.0" encoding="utf-8"?>
+<file path=ppt/slides/slide31.xml><?xml version="1.0" encoding="utf-8"?>
 <p:sld xmlns:a="http://schemas.openxmlformats.org/drawingml/2006/main" xmlns:r="http://schemas.openxmlformats.org/officeDocument/2006/relationships" xmlns:p="http://schemas.openxmlformats.org/presentationml/2006/main">
   <p:cSld>
     <p:spTree>
@@ -7046,8 +7330,16 @@
           <a:lstStyle/>
           <a:p>
             <a:r>
-              <a:rPr lang="en-US" dirty="0" smtClean="0"/>
-              <a:t>login</a:t>
+              <a:rPr lang="en-US" b="1" dirty="0" err="1">
+                <a:solidFill>
+                  <a:srgbClr val="0000FF"/>
+                </a:solidFill>
+              </a:rPr>
+              <a:t>submitL</a:t>
+            </a:r>
+            <a:r>
+              <a:rPr lang="en-US" dirty="0" err="1" smtClean="0"/>
+              <a:t>Facebook</a:t>
             </a:r>
             <a:endParaRPr lang="en-US" dirty="0"/>
           </a:p>
@@ -7066,111 +7358,326 @@
         <p:spPr/>
         <p:txBody>
           <a:bodyPr>
-            <a:normAutofit fontScale="85000" lnSpcReduction="20000"/>
+            <a:normAutofit/>
           </a:bodyPr>
           <a:lstStyle/>
           <a:p>
             <a:r>
-              <a:rPr lang="en-US" dirty="0" smtClean="0"/>
-              <a:t>API: login</a:t>
-            </a:r>
-          </a:p>
-          <a:p>
-            <a:r>
-              <a:rPr lang="en-US" dirty="0"/>
-              <a:t>Called </a:t>
-            </a:r>
-            <a:r>
-              <a:rPr lang="en-US" dirty="0" smtClean="0"/>
-              <a:t>by: when a user clicks on login button on login screen</a:t>
-            </a:r>
-          </a:p>
-          <a:p>
-            <a:r>
-              <a:rPr lang="en-US" dirty="0" smtClean="0"/>
-              <a:t>Input: email, password</a:t>
-            </a:r>
-          </a:p>
-          <a:p>
-            <a:r>
-              <a:rPr lang="en-US" dirty="0" smtClean="0"/>
-              <a:t>Output: </a:t>
+              <a:rPr lang="en-US" sz="1800" dirty="0"/>
+              <a:t>Database changes:</a:t>
             </a:r>
           </a:p>
           <a:p>
             <a:pPr lvl="1"/>
             <a:r>
-              <a:rPr lang="en-US" dirty="0" smtClean="0"/>
-              <a:t>all user’s information in users table</a:t>
-            </a:r>
+              <a:rPr lang="en-US" sz="1800" dirty="0"/>
+              <a:t>Users: </a:t>
+            </a:r>
+            <a:r>
+              <a:rPr lang="en-US" sz="1800" dirty="0" err="1" smtClean="0">
+                <a:solidFill>
+                  <a:srgbClr val="FF0000"/>
+                </a:solidFill>
+              </a:rPr>
+              <a:t>user_id</a:t>
+            </a:r>
+            <a:r>
+              <a:rPr lang="en-US" sz="1800" dirty="0"/>
+              <a:t>, </a:t>
+            </a:r>
+            <a:r>
+              <a:rPr lang="en-US" sz="1800" dirty="0" err="1">
+                <a:solidFill>
+                  <a:srgbClr val="FF0000"/>
+                </a:solidFill>
+              </a:rPr>
+              <a:t>ts_user_id</a:t>
+            </a:r>
+            <a:r>
+              <a:rPr lang="en-US" sz="1800" dirty="0"/>
+              <a:t>, </a:t>
+            </a:r>
+            <a:r>
+              <a:rPr lang="en-US" sz="1800" dirty="0" err="1"/>
+              <a:t>ts_user_email</a:t>
+            </a:r>
+            <a:r>
+              <a:rPr lang="en-US" sz="1800" dirty="0"/>
+              <a:t>, </a:t>
+            </a:r>
+            <a:r>
+              <a:rPr lang="en-US" sz="1800" dirty="0" err="1"/>
+              <a:t>ts_first_name</a:t>
+            </a:r>
+            <a:r>
+              <a:rPr lang="en-US" sz="1800" dirty="0"/>
+              <a:t>, </a:t>
+            </a:r>
+            <a:r>
+              <a:rPr lang="en-US" sz="1800" dirty="0" err="1"/>
+              <a:t>ts_last_name</a:t>
+            </a:r>
+            <a:r>
+              <a:rPr lang="en-US" sz="1800" dirty="0"/>
+              <a:t>, </a:t>
+            </a:r>
+            <a:r>
+              <a:rPr lang="en-US" sz="1800" dirty="0" err="1"/>
+              <a:t>user_created_initial_date</a:t>
+            </a:r>
+            <a:r>
+              <a:rPr lang="en-US" sz="1800" dirty="0"/>
+              <a:t>, </a:t>
+            </a:r>
+            <a:r>
+              <a:rPr lang="en-US" sz="1800" dirty="0" err="1">
+                <a:solidFill>
+                  <a:srgbClr val="FF0000"/>
+                </a:solidFill>
+              </a:rPr>
+              <a:t>user_activation_key</a:t>
+            </a:r>
+            <a:r>
+              <a:rPr lang="en-US" sz="1800" dirty="0"/>
+              <a:t>, </a:t>
+            </a:r>
+            <a:r>
+              <a:rPr lang="en-US" sz="1800" dirty="0" err="1"/>
+              <a:t>user_gender</a:t>
+            </a:r>
+            <a:r>
+              <a:rPr lang="en-US" sz="1800" dirty="0"/>
+              <a:t>, </a:t>
+            </a:r>
+            <a:r>
+              <a:rPr lang="en-US" sz="1800" dirty="0" err="1"/>
+              <a:t>user_city</a:t>
+            </a:r>
+            <a:r>
+              <a:rPr lang="en-US" sz="1800" dirty="0"/>
+              <a:t>, </a:t>
+            </a:r>
+            <a:r>
+              <a:rPr lang="en-US" sz="1800" dirty="0" err="1">
+                <a:solidFill>
+                  <a:srgbClr val="FF0000"/>
+                </a:solidFill>
+              </a:rPr>
+              <a:t>user_city_id</a:t>
+            </a:r>
+            <a:r>
+              <a:rPr lang="en-US" sz="1800" dirty="0"/>
+              <a:t>, </a:t>
+            </a:r>
+            <a:r>
+              <a:rPr lang="en-US" sz="1800" dirty="0" err="1"/>
+              <a:t>user_state</a:t>
+            </a:r>
+            <a:r>
+              <a:rPr lang="en-US" sz="1800" dirty="0"/>
+              <a:t>, </a:t>
+            </a:r>
+            <a:r>
+              <a:rPr lang="en-US" sz="1800" dirty="0" err="1"/>
+              <a:t>is_online</a:t>
+            </a:r>
+            <a:r>
+              <a:rPr lang="en-US" sz="1800" dirty="0"/>
+              <a:t>, </a:t>
+            </a:r>
+            <a:r>
+              <a:rPr lang="en-US" sz="1800" dirty="0" err="1"/>
+              <a:t>user_country</a:t>
+            </a:r>
+            <a:r>
+              <a:rPr lang="en-US" sz="1800" dirty="0"/>
+              <a:t>, </a:t>
+            </a:r>
+            <a:r>
+              <a:rPr lang="en-US" sz="1800" dirty="0" err="1" smtClean="0"/>
+              <a:t>user_fb_id</a:t>
+            </a:r>
+            <a:r>
+              <a:rPr lang="en-US" sz="1800" dirty="0" smtClean="0"/>
+              <a:t>, </a:t>
+            </a:r>
+            <a:r>
+              <a:rPr lang="en-US" sz="1800" b="1" dirty="0" err="1" smtClean="0">
+                <a:solidFill>
+                  <a:srgbClr val="0000FF"/>
+                </a:solidFill>
+              </a:rPr>
+              <a:t>is_online</a:t>
+            </a:r>
+            <a:endParaRPr lang="en-US" sz="1800" dirty="0" smtClean="0"/>
           </a:p>
           <a:p>
             <a:pPr lvl="1"/>
             <a:r>
-              <a:rPr lang="en-US" dirty="0" smtClean="0"/>
-              <a:t>User photo</a:t>
-            </a:r>
-          </a:p>
-          <a:p>
-            <a:r>
-              <a:rPr lang="en-US" dirty="0" smtClean="0"/>
-              <a:t>Database changes</a:t>
+              <a:rPr lang="en-US" sz="1800" dirty="0" err="1"/>
+              <a:t>F</a:t>
+            </a:r>
+            <a:r>
+              <a:rPr lang="en-US" sz="1800" dirty="0" err="1" smtClean="0"/>
+              <a:t>acebook_user_data</a:t>
+            </a:r>
+            <a:r>
+              <a:rPr lang="en-US" sz="1800" dirty="0" smtClean="0"/>
+              <a:t>: update </a:t>
+            </a:r>
+            <a:r>
+              <a:rPr lang="en-US" sz="1800" dirty="0" err="1" smtClean="0"/>
+              <a:t>facebook</a:t>
+            </a:r>
+            <a:r>
+              <a:rPr lang="en-US" sz="1800" dirty="0" smtClean="0"/>
+              <a:t> data for this user</a:t>
             </a:r>
           </a:p>
           <a:p>
             <a:pPr lvl="1"/>
             <a:r>
-              <a:rPr lang="en-US" dirty="0" smtClean="0"/>
-              <a:t>Users: </a:t>
-            </a:r>
-            <a:r>
-              <a:rPr lang="en-US" dirty="0" err="1" smtClean="0"/>
-              <a:t>is_online</a:t>
-            </a:r>
-            <a:endParaRPr lang="en-US" dirty="0"/>
+              <a:rPr lang="en-US" sz="1800" dirty="0" err="1" smtClean="0"/>
+              <a:t>User_friend_fb</a:t>
+            </a:r>
+            <a:r>
+              <a:rPr lang="en-US" sz="1800" dirty="0" smtClean="0"/>
+              <a:t>: for each friend of this user, we create a new row </a:t>
+            </a:r>
           </a:p>
           <a:p>
             <a:pPr lvl="1"/>
             <a:r>
-              <a:rPr lang="en-US" dirty="0" err="1" smtClean="0"/>
+              <a:rPr lang="en-US" sz="1800" dirty="0" err="1"/>
               <a:t>Users_log</a:t>
             </a:r>
             <a:r>
-              <a:rPr lang="en-US" dirty="0" smtClean="0"/>
+              <a:rPr lang="en-US" sz="1800" dirty="0"/>
               <a:t>: </a:t>
             </a:r>
             <a:r>
-              <a:rPr lang="en-US" dirty="0" err="1" smtClean="0"/>
+              <a:rPr lang="en-US" sz="1800" dirty="0" err="1" smtClean="0"/>
               <a:t>login_datetime</a:t>
             </a:r>
             <a:r>
-              <a:rPr lang="en-US" dirty="0" smtClean="0"/>
-              <a:t> (update log for this user, each user just keeps one log)</a:t>
-            </a:r>
-          </a:p>
-          <a:p>
-            <a:pPr lvl="2"/>
-            <a:endParaRPr lang="en-US" dirty="0" smtClean="0"/>
+              <a:rPr lang="en-US" sz="1800" dirty="0" smtClean="0"/>
+              <a:t> </a:t>
+            </a:r>
+            <a:r>
+              <a:rPr lang="en-US" sz="1800" b="1" strike="sngStrike" dirty="0">
+                <a:solidFill>
+                  <a:srgbClr val="0000FF"/>
+                </a:solidFill>
+              </a:rPr>
+              <a:t>(update log for this user, each user just keeps one log)</a:t>
+            </a:r>
+            <a:r>
+              <a:rPr lang="en-US" sz="1800" b="1" dirty="0">
+                <a:solidFill>
+                  <a:srgbClr val="0000FF"/>
+                </a:solidFill>
+              </a:rPr>
+              <a:t> Please insert new logs. Store ALL login/logout/</a:t>
+            </a:r>
+            <a:r>
+              <a:rPr lang="en-US" sz="1800" b="1" dirty="0" err="1">
+                <a:solidFill>
+                  <a:srgbClr val="0000FF"/>
+                </a:solidFill>
+              </a:rPr>
+              <a:t>user_created</a:t>
+            </a:r>
+            <a:r>
+              <a:rPr lang="en-US" sz="1800" b="1" dirty="0">
+                <a:solidFill>
+                  <a:srgbClr val="0000FF"/>
+                </a:solidFill>
+              </a:rPr>
+              <a:t> events in </a:t>
+            </a:r>
+            <a:r>
+              <a:rPr lang="en-US" sz="1800" b="1" dirty="0" err="1">
+                <a:solidFill>
+                  <a:srgbClr val="0000FF"/>
+                </a:solidFill>
+              </a:rPr>
+              <a:t>users_log</a:t>
+            </a:r>
+            <a:r>
+              <a:rPr lang="en-US" sz="1800" b="1" dirty="0">
+                <a:solidFill>
+                  <a:srgbClr val="0000FF"/>
+                </a:solidFill>
+              </a:rPr>
+              <a:t> table</a:t>
+            </a:r>
+            <a:r>
+              <a:rPr lang="en-US" sz="1800" b="1" dirty="0" smtClean="0">
+                <a:solidFill>
+                  <a:srgbClr val="0000FF"/>
+                </a:solidFill>
+              </a:rPr>
+              <a:t>.</a:t>
+            </a:r>
+          </a:p>
+          <a:p>
+            <a:pPr marL="457200" lvl="1" indent="0">
+              <a:buNone/>
+            </a:pPr>
+            <a:endParaRPr lang="en-US" sz="1800" b="1" dirty="0">
+              <a:solidFill>
+                <a:srgbClr val="8EB4E3"/>
+              </a:solidFill>
+            </a:endParaRPr>
           </a:p>
           <a:p>
             <a:pPr lvl="1"/>
-            <a:endParaRPr lang="en-US" dirty="0" smtClean="0"/>
-          </a:p>
-          <a:p>
-            <a:endParaRPr lang="en-US" dirty="0" smtClean="0"/>
-          </a:p>
-          <a:p>
-            <a:endParaRPr lang="en-US" dirty="0" smtClean="0"/>
-          </a:p>
-          <a:p>
-            <a:endParaRPr lang="en-US" dirty="0"/>
+            <a:endParaRPr lang="en-US" sz="1800" dirty="0"/>
+          </a:p>
+        </p:txBody>
+      </p:sp>
+      <p:sp>
+        <p:nvSpPr>
+          <p:cNvPr id="4" name="TextBox 3"/>
+          <p:cNvSpPr txBox="1"/>
+          <p:nvPr/>
+        </p:nvSpPr>
+        <p:spPr>
+          <a:xfrm>
+            <a:off x="609600" y="4876800"/>
+            <a:ext cx="7467600" cy="923330"/>
+          </a:xfrm>
+          <a:prstGeom prst="rect">
+            <a:avLst/>
+          </a:prstGeom>
+          <a:noFill/>
+        </p:spPr>
+        <p:txBody>
+          <a:bodyPr wrap="square" rtlCol="0">
+            <a:spAutoFit/>
+          </a:bodyPr>
+          <a:lstStyle/>
+          <a:p>
+            <a:r>
+              <a:rPr lang="en-US" b="1" dirty="0" smtClean="0">
+                <a:solidFill>
+                  <a:srgbClr val="0000FF"/>
+                </a:solidFill>
+              </a:rPr>
+              <a:t>Please see comment on previous page. You will need to ensure that all the fields coming in from FB API are being captured. Once you have revised this list based on the spreadsheet, I can give you more specific feedback.</a:t>
+            </a:r>
+            <a:endParaRPr lang="en-US" b="1" dirty="0">
+              <a:solidFill>
+                <a:srgbClr val="8EB4E3"/>
+              </a:solidFill>
+            </a:endParaRPr>
           </a:p>
         </p:txBody>
       </p:sp>
     </p:spTree>
     <p:extLst>
       <p:ext uri="{BB962C8B-B14F-4D97-AF65-F5344CB8AC3E}">
-        <p14:creationId xmlns:p14="http://schemas.microsoft.com/office/powerpoint/2010/main" val="2978962533"/>
+        <p14:creationId xmlns:p14="http://schemas.microsoft.com/office/powerpoint/2010/main" val="3315236057"/>
       </p:ext>
     </p:extLst>
   </p:cSld>
@@ -7213,8 +7720,16 @@
           <a:lstStyle/>
           <a:p>
             <a:r>
-              <a:rPr lang="en-US" dirty="0" smtClean="0"/>
-              <a:t>logout</a:t>
+              <a:rPr lang="en-US" b="1" dirty="0" err="1" smtClean="0">
+                <a:solidFill>
+                  <a:srgbClr val="0000FF"/>
+                </a:solidFill>
+              </a:rPr>
+              <a:t>submitL</a:t>
+            </a:r>
+            <a:r>
+              <a:rPr lang="en-US" dirty="0" err="1" smtClean="0"/>
+              <a:t>ogin</a:t>
             </a:r>
             <a:endParaRPr lang="en-US" dirty="0"/>
           </a:p>
@@ -7233,96 +7748,213 @@
         <p:spPr/>
         <p:txBody>
           <a:bodyPr>
-            <a:normAutofit fontScale="92500" lnSpcReduction="10000"/>
+            <a:normAutofit/>
           </a:bodyPr>
           <a:lstStyle/>
           <a:p>
             <a:r>
-              <a:rPr lang="en-US" dirty="0" smtClean="0"/>
-              <a:t>API: logout</a:t>
-            </a:r>
-          </a:p>
-          <a:p>
-            <a:r>
-              <a:rPr lang="en-US" dirty="0"/>
+              <a:rPr lang="en-US" sz="1800" dirty="0" smtClean="0"/>
+              <a:t>API: login</a:t>
+            </a:r>
+          </a:p>
+          <a:p>
+            <a:r>
+              <a:rPr lang="en-US" sz="1800" dirty="0"/>
               <a:t>Called </a:t>
             </a:r>
             <a:r>
-              <a:rPr lang="en-US" dirty="0" smtClean="0"/>
-              <a:t>by: when user clicks on button logout on settings screen</a:t>
-            </a:r>
-          </a:p>
-          <a:p>
-            <a:r>
-              <a:rPr lang="en-US" dirty="0" smtClean="0"/>
-              <a:t>Input: </a:t>
-            </a:r>
-            <a:r>
-              <a:rPr lang="en-US" dirty="0" err="1" smtClean="0"/>
-              <a:t>user_id</a:t>
-            </a:r>
-            <a:endParaRPr lang="en-US" dirty="0" smtClean="0"/>
-          </a:p>
-          <a:p>
-            <a:r>
-              <a:rPr lang="en-US" dirty="0" smtClean="0"/>
-              <a:t>Output: return success or not</a:t>
-            </a:r>
-          </a:p>
-          <a:p>
-            <a:r>
-              <a:rPr lang="en-US" dirty="0" smtClean="0"/>
-              <a:t>Database changes:</a:t>
+              <a:rPr lang="en-US" sz="1800" dirty="0" smtClean="0"/>
+              <a:t>by: when a user clicks on login button on login screen</a:t>
+            </a:r>
+          </a:p>
+          <a:p>
+            <a:r>
+              <a:rPr lang="en-US" sz="1800" dirty="0" smtClean="0"/>
+              <a:t>Input: email, password</a:t>
+            </a:r>
+          </a:p>
+          <a:p>
+            <a:r>
+              <a:rPr lang="en-US" sz="1800" dirty="0" smtClean="0"/>
+              <a:t>Output: </a:t>
             </a:r>
           </a:p>
           <a:p>
             <a:pPr lvl="1"/>
             <a:r>
-              <a:rPr lang="en-US" dirty="0" smtClean="0"/>
+              <a:rPr lang="en-US" sz="1800" dirty="0" smtClean="0"/>
+              <a:t>all user’s information in users table</a:t>
+            </a:r>
+          </a:p>
+          <a:p>
+            <a:pPr lvl="1"/>
+            <a:r>
+              <a:rPr lang="en-US" sz="1800" dirty="0" smtClean="0"/>
+              <a:t>User photo</a:t>
+            </a:r>
+          </a:p>
+          <a:p>
+            <a:r>
+              <a:rPr lang="en-US" sz="1800" dirty="0" smtClean="0"/>
+              <a:t>Database changes</a:t>
+            </a:r>
+          </a:p>
+          <a:p>
+            <a:pPr lvl="1"/>
+            <a:r>
+              <a:rPr lang="en-US" sz="1800" dirty="0" smtClean="0"/>
               <a:t>Users: </a:t>
             </a:r>
             <a:r>
-              <a:rPr lang="en-US" dirty="0" err="1" smtClean="0"/>
+              <a:rPr lang="en-US" sz="1800" dirty="0" err="1" smtClean="0"/>
               <a:t>is_online</a:t>
             </a:r>
-            <a:endParaRPr lang="en-US" dirty="0" smtClean="0"/>
+            <a:endParaRPr lang="en-US" sz="1800" dirty="0"/>
           </a:p>
           <a:p>
             <a:pPr lvl="1"/>
             <a:r>
-              <a:rPr lang="en-US" dirty="0" err="1"/>
+              <a:rPr lang="en-US" sz="1800" dirty="0" err="1" smtClean="0"/>
               <a:t>Users_log</a:t>
             </a:r>
             <a:r>
-              <a:rPr lang="en-US" dirty="0"/>
+              <a:rPr lang="en-US" sz="1800" dirty="0" smtClean="0"/>
               <a:t>: </a:t>
             </a:r>
             <a:r>
-              <a:rPr lang="en-US" dirty="0" err="1" smtClean="0"/>
-              <a:t>logout_datetime</a:t>
-            </a:r>
-            <a:r>
-              <a:rPr lang="en-US" dirty="0" smtClean="0"/>
+              <a:rPr lang="en-US" sz="1800" dirty="0" err="1" smtClean="0"/>
+              <a:t>login_datetime</a:t>
+            </a:r>
+            <a:r>
+              <a:rPr lang="en-US" sz="1800" dirty="0" smtClean="0"/>
               <a:t> </a:t>
             </a:r>
             <a:r>
-              <a:rPr lang="en-US" dirty="0"/>
+              <a:rPr lang="en-US" sz="1800" b="1" strike="sngStrike" dirty="0" smtClean="0">
+                <a:solidFill>
+                  <a:srgbClr val="0000FF"/>
+                </a:solidFill>
+              </a:rPr>
               <a:t>(update log for this user, each user just keeps one log)</a:t>
             </a:r>
-            <a:endParaRPr lang="en-US" dirty="0" smtClean="0"/>
-          </a:p>
-          <a:p>
-            <a:endParaRPr lang="en-US" dirty="0" smtClean="0"/>
-          </a:p>
-          <a:p>
-            <a:endParaRPr lang="en-US" dirty="0"/>
+            <a:r>
+              <a:rPr lang="en-US" sz="1800" b="1" dirty="0" smtClean="0">
+                <a:solidFill>
+                  <a:srgbClr val="0000FF"/>
+                </a:solidFill>
+              </a:rPr>
+              <a:t> Please insert new logs. Store </a:t>
+            </a:r>
+            <a:r>
+              <a:rPr lang="en-US" sz="1800" b="1" dirty="0">
+                <a:solidFill>
+                  <a:srgbClr val="0000FF"/>
+                </a:solidFill>
+              </a:rPr>
+              <a:t>ALL login/logout/</a:t>
+            </a:r>
+            <a:r>
+              <a:rPr lang="en-US" sz="1800" b="1" dirty="0" err="1">
+                <a:solidFill>
+                  <a:srgbClr val="0000FF"/>
+                </a:solidFill>
+              </a:rPr>
+              <a:t>user_created</a:t>
+            </a:r>
+            <a:r>
+              <a:rPr lang="en-US" sz="1800" b="1" dirty="0">
+                <a:solidFill>
+                  <a:srgbClr val="0000FF"/>
+                </a:solidFill>
+              </a:rPr>
+              <a:t> events in </a:t>
+            </a:r>
+            <a:r>
+              <a:rPr lang="en-US" sz="1800" b="1" dirty="0" err="1">
+                <a:solidFill>
+                  <a:srgbClr val="0000FF"/>
+                </a:solidFill>
+              </a:rPr>
+              <a:t>users_log</a:t>
+            </a:r>
+            <a:r>
+              <a:rPr lang="en-US" sz="1800" b="1" dirty="0">
+                <a:solidFill>
+                  <a:srgbClr val="0000FF"/>
+                </a:solidFill>
+              </a:rPr>
+              <a:t> table.</a:t>
+            </a:r>
+            <a:endParaRPr lang="en-US" sz="1800" b="1" dirty="0">
+              <a:solidFill>
+                <a:srgbClr val="8EB4E3"/>
+              </a:solidFill>
+            </a:endParaRPr>
+          </a:p>
+          <a:p>
+            <a:pPr lvl="1"/>
+            <a:endParaRPr lang="en-US" sz="1800" b="1" strike="sngStrike" dirty="0" smtClean="0">
+              <a:solidFill>
+                <a:srgbClr val="0000FF"/>
+              </a:solidFill>
+            </a:endParaRPr>
+          </a:p>
+          <a:p>
+            <a:pPr lvl="2"/>
+            <a:endParaRPr lang="en-US" sz="1800" dirty="0" smtClean="0"/>
+          </a:p>
+          <a:p>
+            <a:pPr lvl="1"/>
+            <a:endParaRPr lang="en-US" sz="1800" dirty="0" smtClean="0"/>
+          </a:p>
+          <a:p>
+            <a:endParaRPr lang="en-US" sz="1800" dirty="0" smtClean="0"/>
+          </a:p>
+          <a:p>
+            <a:endParaRPr lang="en-US" sz="1800" dirty="0" smtClean="0"/>
+          </a:p>
+          <a:p>
+            <a:endParaRPr lang="en-US" sz="1800" dirty="0"/>
+          </a:p>
+        </p:txBody>
+      </p:sp>
+      <p:sp>
+        <p:nvSpPr>
+          <p:cNvPr id="4" name="TextBox 3"/>
+          <p:cNvSpPr txBox="1"/>
+          <p:nvPr/>
+        </p:nvSpPr>
+        <p:spPr>
+          <a:xfrm>
+            <a:off x="609600" y="5498068"/>
+            <a:ext cx="7467600" cy="369332"/>
+          </a:xfrm>
+          <a:prstGeom prst="rect">
+            <a:avLst/>
+          </a:prstGeom>
+          <a:noFill/>
+        </p:spPr>
+        <p:txBody>
+          <a:bodyPr wrap="square" rtlCol="0">
+            <a:spAutoFit/>
+          </a:bodyPr>
+          <a:lstStyle/>
+          <a:p>
+            <a:r>
+              <a:rPr lang="en-US" b="1" dirty="0" smtClean="0">
+                <a:solidFill>
+                  <a:srgbClr val="0000FF"/>
+                </a:solidFill>
+              </a:rPr>
+              <a:t>Question: Do you need to retrieve ALL the user info from users table?</a:t>
+            </a:r>
           </a:p>
         </p:txBody>
       </p:sp>
     </p:spTree>
     <p:extLst>
       <p:ext uri="{BB962C8B-B14F-4D97-AF65-F5344CB8AC3E}">
-        <p14:creationId xmlns:p14="http://schemas.microsoft.com/office/powerpoint/2010/main" val="2385688724"/>
+        <p14:creationId xmlns:p14="http://schemas.microsoft.com/office/powerpoint/2010/main" val="2978962533"/>
       </p:ext>
     </p:extLst>
   </p:cSld>
@@ -7365,8 +7997,16 @@
           <a:lstStyle/>
           <a:p>
             <a:r>
-              <a:rPr lang="en-US" dirty="0" smtClean="0"/>
-              <a:t>signup</a:t>
+              <a:rPr lang="en-US" b="1" dirty="0" err="1" smtClean="0">
+                <a:solidFill>
+                  <a:srgbClr val="0000FF"/>
+                </a:solidFill>
+              </a:rPr>
+              <a:t>submitL</a:t>
+            </a:r>
+            <a:r>
+              <a:rPr lang="en-US" dirty="0" err="1" smtClean="0"/>
+              <a:t>ogout</a:t>
             </a:r>
             <a:endParaRPr lang="en-US" dirty="0"/>
           </a:p>
@@ -7385,85 +8025,148 @@
         <p:spPr/>
         <p:txBody>
           <a:bodyPr>
-            <a:normAutofit fontScale="92500" lnSpcReduction="10000"/>
+            <a:normAutofit/>
           </a:bodyPr>
           <a:lstStyle/>
           <a:p>
             <a:r>
-              <a:rPr lang="en-US" dirty="0" smtClean="0"/>
-              <a:t>API: signup</a:t>
-            </a:r>
-          </a:p>
-          <a:p>
-            <a:r>
-              <a:rPr lang="en-US" dirty="0"/>
+              <a:rPr lang="en-US" sz="1800" dirty="0" smtClean="0"/>
+              <a:t>API: logout</a:t>
+            </a:r>
+          </a:p>
+          <a:p>
+            <a:r>
+              <a:rPr lang="en-US" sz="1800" dirty="0"/>
               <a:t>Called </a:t>
             </a:r>
             <a:r>
-              <a:rPr lang="en-US" dirty="0" smtClean="0"/>
-              <a:t>by: when a person signs up</a:t>
-            </a:r>
-          </a:p>
-          <a:p>
-            <a:r>
-              <a:rPr lang="en-US" dirty="0" smtClean="0"/>
-              <a:t>Input: photo, email, password, first name, last name, city, state, gender</a:t>
-            </a:r>
-          </a:p>
-          <a:p>
-            <a:r>
-              <a:rPr lang="en-US" dirty="0" smtClean="0"/>
-              <a:t>Output: </a:t>
-            </a:r>
-          </a:p>
-          <a:p>
-            <a:r>
-              <a:rPr lang="en-US" dirty="0" smtClean="0"/>
-              <a:t>Database changes</a:t>
+              <a:rPr lang="en-US" sz="1800" dirty="0" smtClean="0"/>
+              <a:t>by: when user clicks on button logout on settings screen</a:t>
+            </a:r>
+          </a:p>
+          <a:p>
+            <a:r>
+              <a:rPr lang="en-US" sz="1800" dirty="0" smtClean="0"/>
+              <a:t>Input: </a:t>
+            </a:r>
+            <a:r>
+              <a:rPr lang="en-US" sz="1800" dirty="0" err="1" smtClean="0"/>
+              <a:t>user_id</a:t>
+            </a:r>
+            <a:endParaRPr lang="en-US" sz="1800" dirty="0" smtClean="0"/>
+          </a:p>
+          <a:p>
+            <a:r>
+              <a:rPr lang="en-US" sz="1800" dirty="0" smtClean="0"/>
+              <a:t>Output: return success or not</a:t>
+            </a:r>
+          </a:p>
+          <a:p>
+            <a:r>
+              <a:rPr lang="en-US" sz="1800" dirty="0" smtClean="0"/>
+              <a:t>Database changes:</a:t>
             </a:r>
           </a:p>
           <a:p>
             <a:pPr lvl="1"/>
             <a:r>
-              <a:rPr lang="en-US" dirty="0" smtClean="0"/>
-              <a:t>Users: all columns</a:t>
-            </a:r>
+              <a:rPr lang="en-US" sz="1800" dirty="0" smtClean="0"/>
+              <a:t>Users: </a:t>
+            </a:r>
+            <a:r>
+              <a:rPr lang="en-US" sz="1800" dirty="0" err="1" smtClean="0"/>
+              <a:t>is_online</a:t>
+            </a:r>
+            <a:endParaRPr lang="en-US" sz="1800" dirty="0" smtClean="0"/>
           </a:p>
           <a:p>
             <a:pPr lvl="1"/>
             <a:r>
-              <a:rPr lang="en-US" dirty="0" err="1" smtClean="0"/>
+              <a:rPr lang="en-US" sz="1800" dirty="0" err="1"/>
               <a:t>Users_log</a:t>
             </a:r>
             <a:r>
-              <a:rPr lang="en-US" dirty="0"/>
+              <a:rPr lang="en-US" sz="1800" dirty="0"/>
               <a:t>: </a:t>
             </a:r>
             <a:r>
-              <a:rPr lang="en-US" dirty="0" err="1"/>
-              <a:t>login_datetime</a:t>
-            </a:r>
-            <a:r>
-              <a:rPr lang="en-US" dirty="0"/>
-              <a:t> (update log for this user, each user just keeps one log</a:t>
-            </a:r>
-            <a:r>
-              <a:rPr lang="en-US" dirty="0" smtClean="0"/>
-              <a:t>)</a:t>
-            </a:r>
-          </a:p>
-          <a:p>
-            <a:endParaRPr lang="en-US" dirty="0" smtClean="0"/>
-          </a:p>
-          <a:p>
-            <a:endParaRPr lang="en-US" dirty="0"/>
+              <a:rPr lang="en-US" sz="1800" dirty="0" err="1" smtClean="0"/>
+              <a:t>logout_datetime</a:t>
+            </a:r>
+            <a:r>
+              <a:rPr lang="en-US" sz="1800" dirty="0" smtClean="0"/>
+              <a:t> </a:t>
+            </a:r>
+            <a:r>
+              <a:rPr lang="en-US" sz="1800" b="1" strike="sngStrike" dirty="0">
+                <a:solidFill>
+                  <a:srgbClr val="0000FF"/>
+                </a:solidFill>
+              </a:rPr>
+              <a:t>(update log for this user, each user just keeps one log)</a:t>
+            </a:r>
+            <a:r>
+              <a:rPr lang="en-US" sz="1800" b="1" dirty="0">
+                <a:solidFill>
+                  <a:srgbClr val="0000FF"/>
+                </a:solidFill>
+              </a:rPr>
+              <a:t> Please insert new logs. Store ALL login/logout/</a:t>
+            </a:r>
+            <a:r>
+              <a:rPr lang="en-US" sz="1800" b="1" dirty="0" err="1">
+                <a:solidFill>
+                  <a:srgbClr val="0000FF"/>
+                </a:solidFill>
+              </a:rPr>
+              <a:t>user_created</a:t>
+            </a:r>
+            <a:r>
+              <a:rPr lang="en-US" sz="1800" b="1" dirty="0">
+                <a:solidFill>
+                  <a:srgbClr val="0000FF"/>
+                </a:solidFill>
+              </a:rPr>
+              <a:t> events in </a:t>
+            </a:r>
+            <a:r>
+              <a:rPr lang="en-US" sz="1800" b="1" dirty="0" err="1">
+                <a:solidFill>
+                  <a:srgbClr val="0000FF"/>
+                </a:solidFill>
+              </a:rPr>
+              <a:t>users_log</a:t>
+            </a:r>
+            <a:r>
+              <a:rPr lang="en-US" sz="1800" b="1" dirty="0">
+                <a:solidFill>
+                  <a:srgbClr val="0000FF"/>
+                </a:solidFill>
+              </a:rPr>
+              <a:t> table.</a:t>
+            </a:r>
+            <a:endParaRPr lang="en-US" sz="1800" b="1" dirty="0">
+              <a:solidFill>
+                <a:srgbClr val="8EB4E3"/>
+              </a:solidFill>
+            </a:endParaRPr>
+          </a:p>
+          <a:p>
+            <a:pPr lvl="1"/>
+            <a:endParaRPr lang="en-US" sz="1800" dirty="0" smtClean="0"/>
+          </a:p>
+          <a:p>
+            <a:endParaRPr lang="en-US" sz="1800" dirty="0" smtClean="0"/>
+          </a:p>
+          <a:p>
+            <a:endParaRPr lang="en-US" sz="1800" dirty="0"/>
           </a:p>
         </p:txBody>
       </p:sp>
     </p:spTree>
     <p:extLst>
       <p:ext uri="{BB962C8B-B14F-4D97-AF65-F5344CB8AC3E}">
-        <p14:creationId xmlns:p14="http://schemas.microsoft.com/office/powerpoint/2010/main" val="3820825600"/>
+        <p14:creationId xmlns:p14="http://schemas.microsoft.com/office/powerpoint/2010/main" val="2385688724"/>
       </p:ext>
     </p:extLst>
   </p:cSld>
@@ -7506,8 +8209,16 @@
           <a:lstStyle/>
           <a:p>
             <a:r>
+              <a:rPr lang="en-US" b="1" dirty="0" err="1" smtClean="0">
+                <a:solidFill>
+                  <a:srgbClr val="0000FF"/>
+                </a:solidFill>
+              </a:rPr>
+              <a:t>submitS</a:t>
+            </a:r>
+            <a:r>
               <a:rPr lang="en-US" dirty="0" err="1" smtClean="0"/>
-              <a:t>uploadAvatar</a:t>
+              <a:t>ignup</a:t>
             </a:r>
             <a:endParaRPr lang="en-US" dirty="0"/>
           </a:p>
@@ -7525,70 +8236,163 @@
         </p:nvSpPr>
         <p:spPr/>
         <p:txBody>
-          <a:bodyPr/>
-          <a:lstStyle/>
-          <a:p>
-            <a:r>
-              <a:rPr lang="en-US" dirty="0" smtClean="0"/>
-              <a:t>API: </a:t>
-            </a:r>
-            <a:r>
-              <a:rPr lang="en-US" dirty="0" err="1" smtClean="0"/>
-              <a:t>uploadAvatar</a:t>
-            </a:r>
-            <a:endParaRPr lang="en-US" dirty="0" smtClean="0"/>
-          </a:p>
-          <a:p>
-            <a:r>
-              <a:rPr lang="en-US" dirty="0"/>
+          <a:bodyPr>
+            <a:normAutofit/>
+          </a:bodyPr>
+          <a:lstStyle/>
+          <a:p>
+            <a:r>
+              <a:rPr lang="en-US" sz="1800" dirty="0" smtClean="0"/>
+              <a:t>API: signup</a:t>
+            </a:r>
+          </a:p>
+          <a:p>
+            <a:r>
+              <a:rPr lang="en-US" sz="1800" dirty="0"/>
               <a:t>Called </a:t>
             </a:r>
             <a:r>
-              <a:rPr lang="en-US" dirty="0" smtClean="0"/>
-              <a:t>by: when a user creates new profile or update his avatar</a:t>
-            </a:r>
-          </a:p>
-          <a:p>
-            <a:r>
-              <a:rPr lang="en-US" dirty="0" smtClean="0"/>
-              <a:t>Input: photo</a:t>
-            </a:r>
-          </a:p>
-          <a:p>
-            <a:r>
-              <a:rPr lang="en-US" dirty="0" smtClean="0"/>
-              <a:t>Output: success or not</a:t>
-            </a:r>
-          </a:p>
-          <a:p>
-            <a:r>
-              <a:rPr lang="en-US" dirty="0" smtClean="0"/>
-              <a:t>Database changes:</a:t>
+              <a:rPr lang="en-US" sz="1800" dirty="0" smtClean="0"/>
+              <a:t>by: when a person signs up</a:t>
+            </a:r>
+          </a:p>
+          <a:p>
+            <a:r>
+              <a:rPr lang="en-US" sz="1800" dirty="0" smtClean="0"/>
+              <a:t>Input: photo, email, password, first name, last name, city, state, gender</a:t>
+            </a:r>
+          </a:p>
+          <a:p>
+            <a:r>
+              <a:rPr lang="en-US" sz="1800" dirty="0" smtClean="0"/>
+              <a:t>Output: </a:t>
+            </a:r>
+          </a:p>
+          <a:p>
+            <a:r>
+              <a:rPr lang="en-US" sz="1800" dirty="0" smtClean="0"/>
+              <a:t>Database changes</a:t>
             </a:r>
           </a:p>
           <a:p>
             <a:pPr lvl="1"/>
             <a:r>
-              <a:rPr lang="en-US" dirty="0" err="1" smtClean="0"/>
-              <a:t>User_photo</a:t>
-            </a:r>
-            <a:endParaRPr lang="en-US" dirty="0" smtClean="0"/>
-          </a:p>
-          <a:p>
-            <a:endParaRPr lang="en-US" dirty="0" smtClean="0"/>
-          </a:p>
-          <a:p>
-            <a:endParaRPr lang="en-US" dirty="0" smtClean="0"/>
-          </a:p>
-          <a:p>
-            <a:endParaRPr lang="en-US" dirty="0"/>
+              <a:rPr lang="en-US" sz="1800" dirty="0" smtClean="0"/>
+              <a:t>Users: all columns</a:t>
+            </a:r>
+            <a:r>
+              <a:rPr lang="en-US" sz="1800" b="1" dirty="0" smtClean="0">
+                <a:solidFill>
+                  <a:srgbClr val="0000FF"/>
+                </a:solidFill>
+              </a:rPr>
+              <a:t> (including </a:t>
+            </a:r>
+            <a:r>
+              <a:rPr lang="en-US" sz="1800" b="1" dirty="0" err="1" smtClean="0">
+                <a:solidFill>
+                  <a:srgbClr val="0000FF"/>
+                </a:solidFill>
+              </a:rPr>
+              <a:t>is_online</a:t>
+            </a:r>
+            <a:r>
+              <a:rPr lang="en-US" sz="1800" b="1" dirty="0" smtClean="0">
+                <a:solidFill>
+                  <a:srgbClr val="0000FF"/>
+                </a:solidFill>
+              </a:rPr>
+              <a:t>)</a:t>
+            </a:r>
+          </a:p>
+          <a:p>
+            <a:pPr lvl="1"/>
+            <a:r>
+              <a:rPr lang="en-US" sz="1800" dirty="0" err="1" smtClean="0"/>
+              <a:t>Users_log</a:t>
+            </a:r>
+            <a:r>
+              <a:rPr lang="en-US" sz="1800" dirty="0"/>
+              <a:t>: </a:t>
+            </a:r>
+            <a:r>
+              <a:rPr lang="en-US" sz="1800" dirty="0" err="1"/>
+              <a:t>login_datetime</a:t>
+            </a:r>
+            <a:r>
+              <a:rPr lang="en-US" sz="1800" dirty="0"/>
+              <a:t> </a:t>
+            </a:r>
+            <a:r>
+              <a:rPr lang="en-US" sz="1800" b="1" strike="sngStrike" dirty="0">
+                <a:solidFill>
+                  <a:srgbClr val="0000FF"/>
+                </a:solidFill>
+              </a:rPr>
+              <a:t>(update log for this user, each user just keeps one log)</a:t>
+            </a:r>
+            <a:r>
+              <a:rPr lang="en-US" sz="1800" b="1" dirty="0">
+                <a:solidFill>
+                  <a:srgbClr val="0000FF"/>
+                </a:solidFill>
+              </a:rPr>
+              <a:t> Please insert new logs. Store ALL login/logout/</a:t>
+            </a:r>
+            <a:r>
+              <a:rPr lang="en-US" sz="1800" b="1" dirty="0" err="1">
+                <a:solidFill>
+                  <a:srgbClr val="0000FF"/>
+                </a:solidFill>
+              </a:rPr>
+              <a:t>user_created</a:t>
+            </a:r>
+            <a:r>
+              <a:rPr lang="en-US" sz="1800" b="1" dirty="0">
+                <a:solidFill>
+                  <a:srgbClr val="0000FF"/>
+                </a:solidFill>
+              </a:rPr>
+              <a:t> events in </a:t>
+            </a:r>
+            <a:r>
+              <a:rPr lang="en-US" sz="1800" b="1" dirty="0" err="1">
+                <a:solidFill>
+                  <a:srgbClr val="0000FF"/>
+                </a:solidFill>
+              </a:rPr>
+              <a:t>users_log</a:t>
+            </a:r>
+            <a:r>
+              <a:rPr lang="en-US" sz="1800" b="1" dirty="0">
+                <a:solidFill>
+                  <a:srgbClr val="0000FF"/>
+                </a:solidFill>
+              </a:rPr>
+              <a:t> table.</a:t>
+            </a:r>
+            <a:endParaRPr lang="en-US" sz="1800" b="1" dirty="0">
+              <a:solidFill>
+                <a:srgbClr val="8EB4E3"/>
+              </a:solidFill>
+            </a:endParaRPr>
+          </a:p>
+          <a:p>
+            <a:pPr lvl="1"/>
+            <a:endParaRPr lang="en-US" sz="1800" dirty="0" smtClean="0"/>
+          </a:p>
+          <a:p>
+            <a:endParaRPr lang="en-US" sz="1800" dirty="0" smtClean="0"/>
+          </a:p>
+          <a:p>
+            <a:endParaRPr lang="en-US" sz="1800" dirty="0"/>
           </a:p>
         </p:txBody>
       </p:sp>
     </p:spTree>
     <p:extLst>
       <p:ext uri="{BB962C8B-B14F-4D97-AF65-F5344CB8AC3E}">
-        <p14:creationId xmlns:p14="http://schemas.microsoft.com/office/powerpoint/2010/main" val="1078897538"/>
+        <p14:creationId xmlns:p14="http://schemas.microsoft.com/office/powerpoint/2010/main" val="3820825600"/>
       </p:ext>
     </p:extLst>
   </p:cSld>
@@ -7631,8 +8435,24 @@
           <a:lstStyle/>
           <a:p>
             <a:r>
+              <a:rPr lang="en-US" b="1" dirty="0" err="1" smtClean="0">
+                <a:solidFill>
+                  <a:srgbClr val="0000FF"/>
+                </a:solidFill>
+              </a:rPr>
+              <a:t>submit</a:t>
+            </a:r>
+            <a:r>
+              <a:rPr lang="en-US" b="1" strike="sngStrike" dirty="0" err="1" smtClean="0">
+                <a:solidFill>
+                  <a:srgbClr val="0000FF"/>
+                </a:solidFill>
+              </a:rPr>
+              <a:t>upload</a:t>
+            </a:r>
+            <a:r>
               <a:rPr lang="en-US" dirty="0" err="1" smtClean="0"/>
-              <a:t>forgotPassword</a:t>
+              <a:t>Avatar</a:t>
             </a:r>
             <a:endParaRPr lang="en-US" dirty="0"/>
           </a:p>
@@ -7650,65 +8470,105 @@
         </p:nvSpPr>
         <p:spPr/>
         <p:txBody>
-          <a:bodyPr/>
-          <a:lstStyle/>
-          <a:p>
-            <a:r>
-              <a:rPr lang="en-US" dirty="0" smtClean="0"/>
+          <a:bodyPr>
+            <a:normAutofit/>
+          </a:bodyPr>
+          <a:lstStyle/>
+          <a:p>
+            <a:r>
+              <a:rPr lang="en-US" sz="1800" dirty="0" smtClean="0"/>
               <a:t>API: </a:t>
             </a:r>
             <a:r>
-              <a:rPr lang="en-US" dirty="0" err="1" smtClean="0"/>
-              <a:t>forgotPassword</a:t>
-            </a:r>
-            <a:endParaRPr lang="en-US" dirty="0" smtClean="0"/>
-          </a:p>
-          <a:p>
-            <a:r>
-              <a:rPr lang="en-US" dirty="0"/>
+              <a:rPr lang="en-US" sz="1800" dirty="0" err="1" smtClean="0"/>
+              <a:t>uploadAvatar</a:t>
+            </a:r>
+            <a:endParaRPr lang="en-US" sz="1800" dirty="0" smtClean="0"/>
+          </a:p>
+          <a:p>
+            <a:r>
+              <a:rPr lang="en-US" sz="1800" dirty="0"/>
               <a:t>Called </a:t>
             </a:r>
             <a:r>
-              <a:rPr lang="en-US" dirty="0" smtClean="0"/>
-              <a:t>by: when user clicks on forgot password on login screen</a:t>
-            </a:r>
-          </a:p>
-          <a:p>
-            <a:r>
-              <a:rPr lang="en-US" dirty="0" smtClean="0"/>
-              <a:t>Input: email</a:t>
-            </a:r>
-          </a:p>
-          <a:p>
-            <a:r>
-              <a:rPr lang="en-US" dirty="0" smtClean="0"/>
-              <a:t>Output: return success or not</a:t>
-            </a:r>
-          </a:p>
-          <a:p>
-            <a:r>
-              <a:rPr lang="en-US" dirty="0" smtClean="0"/>
-              <a:t>Database changes</a:t>
+              <a:rPr lang="en-US" sz="1800" dirty="0" smtClean="0"/>
+              <a:t>by: when a user creates new profile or update his avatar</a:t>
+            </a:r>
+          </a:p>
+          <a:p>
+            <a:r>
+              <a:rPr lang="en-US" sz="1800" dirty="0" smtClean="0"/>
+              <a:t>Input: photo</a:t>
+            </a:r>
+          </a:p>
+          <a:p>
+            <a:r>
+              <a:rPr lang="en-US" sz="1800" dirty="0" smtClean="0"/>
+              <a:t>Output: success or not</a:t>
+            </a:r>
+          </a:p>
+          <a:p>
+            <a:r>
+              <a:rPr lang="en-US" sz="1800" dirty="0" smtClean="0"/>
+              <a:t>Database changes:</a:t>
             </a:r>
           </a:p>
           <a:p>
             <a:pPr lvl="1"/>
             <a:r>
-              <a:rPr lang="en-US" dirty="0" smtClean="0"/>
-              <a:t>Users: update </a:t>
-            </a:r>
-            <a:r>
-              <a:rPr lang="en-US" dirty="0" err="1" smtClean="0"/>
-              <a:t>user_activation_key</a:t>
-            </a:r>
-            <a:endParaRPr lang="en-US" dirty="0" smtClean="0"/>
+              <a:rPr lang="en-US" sz="1800" dirty="0" err="1" smtClean="0"/>
+              <a:t>User_photo</a:t>
+            </a:r>
+            <a:endParaRPr lang="en-US" sz="1800" dirty="0" smtClean="0"/>
+          </a:p>
+          <a:p>
+            <a:endParaRPr lang="en-US" sz="1800" dirty="0" smtClean="0"/>
+          </a:p>
+          <a:p>
+            <a:endParaRPr lang="en-US" sz="1800" dirty="0" smtClean="0"/>
+          </a:p>
+          <a:p>
+            <a:endParaRPr lang="en-US" sz="1800" dirty="0"/>
+          </a:p>
+        </p:txBody>
+      </p:sp>
+      <p:sp>
+        <p:nvSpPr>
+          <p:cNvPr id="4" name="TextBox 3"/>
+          <p:cNvSpPr txBox="1"/>
+          <p:nvPr/>
+        </p:nvSpPr>
+        <p:spPr>
+          <a:xfrm>
+            <a:off x="609600" y="5498068"/>
+            <a:ext cx="7467600" cy="369332"/>
+          </a:xfrm>
+          <a:prstGeom prst="rect">
+            <a:avLst/>
+          </a:prstGeom>
+          <a:noFill/>
+        </p:spPr>
+        <p:txBody>
+          <a:bodyPr wrap="square" rtlCol="0">
+            <a:spAutoFit/>
+          </a:bodyPr>
+          <a:lstStyle/>
+          <a:p>
+            <a:r>
+              <a:rPr lang="en-US" b="1" dirty="0" smtClean="0">
+                <a:solidFill>
+                  <a:srgbClr val="0000FF"/>
+                </a:solidFill>
+              </a:rPr>
+              <a:t>OK</a:t>
+            </a:r>
           </a:p>
         </p:txBody>
       </p:sp>
     </p:spTree>
     <p:extLst>
       <p:ext uri="{BB962C8B-B14F-4D97-AF65-F5344CB8AC3E}">
-        <p14:creationId xmlns:p14="http://schemas.microsoft.com/office/powerpoint/2010/main" val="1468172318"/>
+        <p14:creationId xmlns:p14="http://schemas.microsoft.com/office/powerpoint/2010/main" val="1078897538"/>
       </p:ext>
     </p:extLst>
   </p:cSld>
@@ -7747,130 +8607,131 @@
         </p:nvSpPr>
         <p:spPr/>
         <p:txBody>
+          <a:bodyPr/>
+          <a:lstStyle/>
+          <a:p>
+            <a:r>
+              <a:rPr lang="en-US" b="1" dirty="0" err="1" smtClean="0">
+                <a:solidFill>
+                  <a:srgbClr val="0000FF"/>
+                </a:solidFill>
+              </a:rPr>
+              <a:t>submitF</a:t>
+            </a:r>
+            <a:r>
+              <a:rPr lang="en-US" dirty="0" err="1" smtClean="0"/>
+              <a:t>orgotPassword</a:t>
+            </a:r>
+            <a:endParaRPr lang="en-US" dirty="0"/>
+          </a:p>
+        </p:txBody>
+      </p:sp>
+      <p:sp>
+        <p:nvSpPr>
+          <p:cNvPr id="3" name="Content Placeholder 2"/>
+          <p:cNvSpPr>
+            <a:spLocks noGrp="1"/>
+          </p:cNvSpPr>
+          <p:nvPr>
+            <p:ph idx="1"/>
+          </p:nvPr>
+        </p:nvSpPr>
+        <p:spPr/>
+        <p:txBody>
           <a:bodyPr>
             <a:normAutofit/>
           </a:bodyPr>
           <a:lstStyle/>
           <a:p>
             <a:r>
-              <a:rPr lang="en-US" dirty="0" err="1" smtClean="0"/>
-              <a:t>submitOptionsSocialNetworks</a:t>
-            </a:r>
-            <a:endParaRPr lang="en-US" dirty="0"/>
-          </a:p>
-        </p:txBody>
-      </p:sp>
-      <p:sp>
-        <p:nvSpPr>
-          <p:cNvPr id="3" name="Content Placeholder 2"/>
-          <p:cNvSpPr>
-            <a:spLocks noGrp="1"/>
-          </p:cNvSpPr>
-          <p:nvPr>
-            <p:ph idx="1"/>
-          </p:nvPr>
-        </p:nvSpPr>
-        <p:spPr/>
-        <p:txBody>
-          <a:bodyPr>
-            <a:normAutofit fontScale="92500" lnSpcReduction="10000"/>
+              <a:rPr lang="en-US" sz="1800" dirty="0" smtClean="0"/>
+              <a:t>API: </a:t>
+            </a:r>
+            <a:r>
+              <a:rPr lang="en-US" sz="1800" dirty="0" err="1" smtClean="0"/>
+              <a:t>forgotPassword</a:t>
+            </a:r>
+            <a:endParaRPr lang="en-US" sz="1800" dirty="0" smtClean="0"/>
+          </a:p>
+          <a:p>
+            <a:r>
+              <a:rPr lang="en-US" sz="1800" dirty="0"/>
+              <a:t>Called </a:t>
+            </a:r>
+            <a:r>
+              <a:rPr lang="en-US" sz="1800" dirty="0" smtClean="0"/>
+              <a:t>by: when user clicks on forgot password on login screen</a:t>
+            </a:r>
+          </a:p>
+          <a:p>
+            <a:r>
+              <a:rPr lang="en-US" sz="1800" dirty="0" smtClean="0"/>
+              <a:t>Input: email</a:t>
+            </a:r>
+          </a:p>
+          <a:p>
+            <a:r>
+              <a:rPr lang="en-US" sz="1800" dirty="0" smtClean="0"/>
+              <a:t>Output: return success or not</a:t>
+            </a:r>
+          </a:p>
+          <a:p>
+            <a:r>
+              <a:rPr lang="en-US" sz="1800" dirty="0" smtClean="0"/>
+              <a:t>Database changes</a:t>
+            </a:r>
+          </a:p>
+          <a:p>
+            <a:pPr lvl="1"/>
+            <a:r>
+              <a:rPr lang="en-US" sz="1800" dirty="0" smtClean="0"/>
+              <a:t>Users: update </a:t>
+            </a:r>
+            <a:r>
+              <a:rPr lang="en-US" sz="1800" dirty="0" err="1" smtClean="0"/>
+              <a:t>user_activation_key</a:t>
+            </a:r>
+            <a:endParaRPr lang="en-US" sz="1800" dirty="0" smtClean="0"/>
+          </a:p>
+        </p:txBody>
+      </p:sp>
+      <p:sp>
+        <p:nvSpPr>
+          <p:cNvPr id="4" name="TextBox 3"/>
+          <p:cNvSpPr txBox="1"/>
+          <p:nvPr/>
+        </p:nvSpPr>
+        <p:spPr>
+          <a:xfrm>
+            <a:off x="609600" y="5498068"/>
+            <a:ext cx="7467600" cy="646331"/>
+          </a:xfrm>
+          <a:prstGeom prst="rect">
+            <a:avLst/>
+          </a:prstGeom>
+          <a:noFill/>
+        </p:spPr>
+        <p:txBody>
+          <a:bodyPr wrap="square" rtlCol="0">
+            <a:spAutoFit/>
           </a:bodyPr>
           <a:lstStyle/>
           <a:p>
             <a:r>
-              <a:rPr lang="en-US" dirty="0"/>
-              <a:t>API: </a:t>
-            </a:r>
-            <a:r>
-              <a:rPr lang="en-US" dirty="0" err="1" smtClean="0"/>
-              <a:t>submitOptionsSocialNetworks</a:t>
-            </a:r>
-            <a:endParaRPr lang="en-US" dirty="0"/>
-          </a:p>
-          <a:p>
-            <a:r>
-              <a:rPr lang="en-US" dirty="0"/>
-              <a:t>Called </a:t>
-            </a:r>
-            <a:r>
-              <a:rPr lang="en-US" dirty="0" smtClean="0"/>
-              <a:t>by: when users make changes in User Profile -&gt; Social Networks -&gt; Connections</a:t>
-            </a:r>
-            <a:endParaRPr lang="en-US" dirty="0"/>
-          </a:p>
-          <a:p>
-            <a:r>
-              <a:rPr lang="en-US" dirty="0" smtClean="0"/>
-              <a:t>Input: </a:t>
-            </a:r>
-            <a:r>
-              <a:rPr lang="en-US" dirty="0" err="1" smtClean="0"/>
-              <a:t>user_id</a:t>
-            </a:r>
-            <a:r>
-              <a:rPr lang="en-US" dirty="0" smtClean="0"/>
-              <a:t>, connection status to social networks (</a:t>
-            </a:r>
-            <a:r>
-              <a:rPr lang="en-US" dirty="0" err="1" smtClean="0"/>
-              <a:t>facebook</a:t>
-            </a:r>
-            <a:r>
-              <a:rPr lang="en-US" dirty="0" smtClean="0"/>
-              <a:t>, twitter, foursquare, </a:t>
-            </a:r>
-            <a:r>
-              <a:rPr lang="en-US" dirty="0" err="1" smtClean="0"/>
-              <a:t>tumblr</a:t>
-            </a:r>
-            <a:r>
-              <a:rPr lang="en-US" dirty="0" smtClean="0"/>
-              <a:t>)</a:t>
-            </a:r>
-            <a:endParaRPr lang="en-US" dirty="0"/>
-          </a:p>
-          <a:p>
-            <a:r>
-              <a:rPr lang="en-US" dirty="0" smtClean="0"/>
-              <a:t>Output: success or not</a:t>
-            </a:r>
-            <a:endParaRPr lang="en-US" dirty="0"/>
-          </a:p>
-          <a:p>
-            <a:r>
-              <a:rPr lang="en-US" dirty="0"/>
-              <a:t>Database </a:t>
-            </a:r>
-            <a:r>
-              <a:rPr lang="en-US" dirty="0" smtClean="0"/>
-              <a:t>changes:</a:t>
-            </a:r>
-          </a:p>
-          <a:p>
-            <a:pPr lvl="1"/>
-            <a:r>
-              <a:rPr lang="en-US" dirty="0" err="1" smtClean="0"/>
-              <a:t>user_usnc</a:t>
-            </a:r>
-            <a:endParaRPr lang="en-US" dirty="0" smtClean="0"/>
-          </a:p>
-          <a:p>
-            <a:r>
-              <a:rPr lang="en-US" dirty="0" smtClean="0"/>
-              <a:t>Notes: Ignore the column </a:t>
-            </a:r>
-            <a:r>
-              <a:rPr lang="en-US" dirty="0" err="1" smtClean="0"/>
-              <a:t>usnc_order</a:t>
-            </a:r>
-            <a:endParaRPr lang="en-US" dirty="0"/>
+              <a:rPr lang="en-US" b="1" dirty="0" smtClean="0">
+                <a:solidFill>
+                  <a:srgbClr val="0000FF"/>
+                </a:solidFill>
+              </a:rPr>
+              <a:t>We will also need to send an email/SMS to user to help them retrieve password.</a:t>
+            </a:r>
           </a:p>
         </p:txBody>
       </p:sp>
     </p:spTree>
     <p:extLst>
       <p:ext uri="{BB962C8B-B14F-4D97-AF65-F5344CB8AC3E}">
-        <p14:creationId xmlns:p14="http://schemas.microsoft.com/office/powerpoint/2010/main" val="1512642130"/>
+        <p14:creationId xmlns:p14="http://schemas.microsoft.com/office/powerpoint/2010/main" val="1468172318"/>
       </p:ext>
     </p:extLst>
   </p:cSld>

</xml_diff>

<commit_message>
Response to Loc's questions on API_Listing
</commit_message>
<xml_diff>
--- a/ws/WS Design Docs/API_Listing.pptx
+++ b/ws/WS Design Docs/API_Listing.pptx
@@ -228,7 +228,7 @@
           <a:p>
             <a:fld id="{85D437FA-61C4-4F60-BBA9-12B90A6957B9}" type="datetimeFigureOut">
               <a:rPr lang="en-US" smtClean="0"/>
-              <a:t>7/1/2013</a:t>
+              <a:t>7/2/13</a:t>
             </a:fld>
             <a:endParaRPr lang="en-US"/>
           </a:p>
@@ -761,7 +761,7 @@
           <a:p>
             <a:fld id="{21D9A4ED-2051-4D40-B2A0-D196034AFE37}" type="datetime1">
               <a:rPr lang="en-US" smtClean="0"/>
-              <a:t>7/1/2013</a:t>
+              <a:t>7/2/13</a:t>
             </a:fld>
             <a:endParaRPr lang="en-US"/>
           </a:p>
@@ -931,7 +931,7 @@
           <a:p>
             <a:fld id="{1D849BA3-356A-4FDA-9681-56059371C4AF}" type="datetime1">
               <a:rPr lang="en-US" smtClean="0"/>
-              <a:t>7/1/2013</a:t>
+              <a:t>7/2/13</a:t>
             </a:fld>
             <a:endParaRPr lang="en-US"/>
           </a:p>
@@ -1111,7 +1111,7 @@
           <a:p>
             <a:fld id="{4B9D6E2D-8814-40A6-B242-857A370609E5}" type="datetime1">
               <a:rPr lang="en-US" smtClean="0"/>
-              <a:t>7/1/2013</a:t>
+              <a:t>7/2/13</a:t>
             </a:fld>
             <a:endParaRPr lang="en-US"/>
           </a:p>
@@ -1281,7 +1281,7 @@
           <a:p>
             <a:fld id="{952DBA09-5CC5-40A9-961E-39C1A36306C6}" type="datetime1">
               <a:rPr lang="en-US" smtClean="0"/>
-              <a:t>7/1/2013</a:t>
+              <a:t>7/2/13</a:t>
             </a:fld>
             <a:endParaRPr lang="en-US"/>
           </a:p>
@@ -1527,7 +1527,7 @@
           <a:p>
             <a:fld id="{5A803532-6116-429A-A526-BD6B3C1CCC8E}" type="datetime1">
               <a:rPr lang="en-US" smtClean="0"/>
-              <a:t>7/1/2013</a:t>
+              <a:t>7/2/13</a:t>
             </a:fld>
             <a:endParaRPr lang="en-US"/>
           </a:p>
@@ -1815,7 +1815,7 @@
           <a:p>
             <a:fld id="{2AC1DA2A-7926-4BAE-8E13-21187001580C}" type="datetime1">
               <a:rPr lang="en-US" smtClean="0"/>
-              <a:t>7/1/2013</a:t>
+              <a:t>7/2/13</a:t>
             </a:fld>
             <a:endParaRPr lang="en-US"/>
           </a:p>
@@ -2237,7 +2237,7 @@
           <a:p>
             <a:fld id="{008A6896-1B9E-40A6-A210-34DE713C2159}" type="datetime1">
               <a:rPr lang="en-US" smtClean="0"/>
-              <a:t>7/1/2013</a:t>
+              <a:t>7/2/13</a:t>
             </a:fld>
             <a:endParaRPr lang="en-US"/>
           </a:p>
@@ -2355,7 +2355,7 @@
           <a:p>
             <a:fld id="{CDFFEF83-CF6A-46A1-B35F-3CAB08D23A60}" type="datetime1">
               <a:rPr lang="en-US" smtClean="0"/>
-              <a:t>7/1/2013</a:t>
+              <a:t>7/2/13</a:t>
             </a:fld>
             <a:endParaRPr lang="en-US"/>
           </a:p>
@@ -2450,7 +2450,7 @@
           <a:p>
             <a:fld id="{9518C67C-5389-400E-AA1A-CCFE629880B8}" type="datetime1">
               <a:rPr lang="en-US" smtClean="0"/>
-              <a:t>7/1/2013</a:t>
+              <a:t>7/2/13</a:t>
             </a:fld>
             <a:endParaRPr lang="en-US"/>
           </a:p>
@@ -2727,7 +2727,7 @@
           <a:p>
             <a:fld id="{F5515E0A-5C94-4424-8521-EB451BCC75BA}" type="datetime1">
               <a:rPr lang="en-US" smtClean="0"/>
-              <a:t>7/1/2013</a:t>
+              <a:t>7/2/13</a:t>
             </a:fld>
             <a:endParaRPr lang="en-US"/>
           </a:p>
@@ -2980,7 +2980,7 @@
           <a:p>
             <a:fld id="{6EA29519-ADDC-481E-8203-A2D3B7AE1293}" type="datetime1">
               <a:rPr lang="en-US" smtClean="0"/>
-              <a:t>7/1/2013</a:t>
+              <a:t>7/2/13</a:t>
             </a:fld>
             <a:endParaRPr lang="en-US"/>
           </a:p>
@@ -3193,7 +3193,7 @@
           <a:p>
             <a:fld id="{4F25BF09-2D07-4E14-AAAB-D75445BDC1D6}" type="datetime1">
               <a:rPr lang="en-US" smtClean="0"/>
-              <a:t>7/1/2013</a:t>
+              <a:t>7/2/13</a:t>
             </a:fld>
             <a:endParaRPr lang="en-US"/>
           </a:p>
@@ -3628,7 +3628,7 @@
   <p:timing>
     <p:tnLst>
       <p:par>
-        <p:cTn id="1" dur="indefinite" restart="never" nodeType="tmRoot"/>
+        <p:cTn xmlns:p14="http://schemas.microsoft.com/office/powerpoint/2010/main" id="1" dur="indefinite" restart="never" nodeType="tmRoot"/>
       </p:par>
     </p:tnLst>
   </p:timing>
@@ -3799,7 +3799,7 @@
   <p:timing>
     <p:tnLst>
       <p:par>
-        <p:cTn id="1" dur="indefinite" restart="never" nodeType="tmRoot"/>
+        <p:cTn xmlns:p14="http://schemas.microsoft.com/office/powerpoint/2010/main" id="1" dur="indefinite" restart="never" nodeType="tmRoot"/>
       </p:par>
     </p:tnLst>
   </p:timing>
@@ -3999,7 +3999,7 @@
   <p:timing>
     <p:tnLst>
       <p:par>
-        <p:cTn id="1" dur="indefinite" restart="never" nodeType="tmRoot"/>
+        <p:cTn xmlns:p14="http://schemas.microsoft.com/office/powerpoint/2010/main" id="1" dur="indefinite" restart="never" nodeType="tmRoot"/>
       </p:par>
     </p:tnLst>
   </p:timing>
@@ -4173,7 +4173,7 @@
   <p:timing>
     <p:tnLst>
       <p:par>
-        <p:cTn id="1" dur="indefinite" restart="never" nodeType="tmRoot"/>
+        <p:cTn xmlns:p14="http://schemas.microsoft.com/office/powerpoint/2010/main" id="1" dur="indefinite" restart="never" nodeType="tmRoot"/>
       </p:par>
     </p:tnLst>
   </p:timing>
@@ -4364,8 +4364,29 @@
                   <a:srgbClr val="C00000"/>
                 </a:solidFill>
               </a:rPr>
-              <a:t>Which API name should be used?</a:t>
-            </a:r>
+              <a:t>Which API name should be used</a:t>
+            </a:r>
+            <a:r>
+              <a:rPr lang="en-US" dirty="0" smtClean="0">
+                <a:solidFill>
+                  <a:srgbClr val="C00000"/>
+                </a:solidFill>
+              </a:rPr>
+              <a:t>? </a:t>
+            </a:r>
+            <a:r>
+              <a:rPr lang="en-US" b="1" dirty="0" smtClean="0">
+                <a:solidFill>
+                  <a:srgbClr val="0000FF"/>
+                </a:solidFill>
+              </a:rPr>
+              <a:t>&gt; the name that Jags gave</a:t>
+            </a:r>
+            <a:endParaRPr lang="en-US" dirty="0" smtClean="0">
+              <a:solidFill>
+                <a:srgbClr val="C00000"/>
+              </a:solidFill>
+            </a:endParaRPr>
           </a:p>
         </p:txBody>
       </p:sp>
@@ -4405,7 +4426,7 @@
   <p:timing>
     <p:tnLst>
       <p:par>
-        <p:cTn id="1" dur="indefinite" restart="never" nodeType="tmRoot"/>
+        <p:cTn xmlns:p14="http://schemas.microsoft.com/office/powerpoint/2010/main" id="1" dur="indefinite" restart="never" nodeType="tmRoot"/>
       </p:par>
     </p:tnLst>
   </p:timing>
@@ -4562,7 +4583,7 @@
   <p:timing>
     <p:tnLst>
       <p:par>
-        <p:cTn id="1" dur="indefinite" restart="never" nodeType="tmRoot"/>
+        <p:cTn xmlns:p14="http://schemas.microsoft.com/office/powerpoint/2010/main" id="1" dur="indefinite" restart="never" nodeType="tmRoot"/>
       </p:par>
     </p:tnLst>
   </p:timing>
@@ -4743,8 +4764,29 @@
                   <a:srgbClr val="C00000"/>
                 </a:solidFill>
               </a:rPr>
-              <a:t>Which API name should be used?</a:t>
-            </a:r>
+              <a:t>Which API name should be used</a:t>
+            </a:r>
+            <a:r>
+              <a:rPr lang="en-US" dirty="0" smtClean="0">
+                <a:solidFill>
+                  <a:srgbClr val="C00000"/>
+                </a:solidFill>
+              </a:rPr>
+              <a:t>? </a:t>
+            </a:r>
+            <a:r>
+              <a:rPr lang="en-US" b="1" dirty="0" smtClean="0">
+                <a:solidFill>
+                  <a:srgbClr val="0000FF"/>
+                </a:solidFill>
+              </a:rPr>
+              <a:t>&gt; the name that Jags gave</a:t>
+            </a:r>
+            <a:endParaRPr lang="en-US" dirty="0" smtClean="0">
+              <a:solidFill>
+                <a:srgbClr val="C00000"/>
+              </a:solidFill>
+            </a:endParaRPr>
           </a:p>
         </p:txBody>
       </p:sp>
@@ -4784,7 +4826,7 @@
   <p:timing>
     <p:tnLst>
       <p:par>
-        <p:cTn id="1" dur="indefinite" restart="never" nodeType="tmRoot"/>
+        <p:cTn xmlns:p14="http://schemas.microsoft.com/office/powerpoint/2010/main" id="1" dur="indefinite" restart="never" nodeType="tmRoot"/>
       </p:par>
     </p:tnLst>
   </p:timing>
@@ -4942,7 +4984,7 @@
   <p:timing>
     <p:tnLst>
       <p:par>
-        <p:cTn id="1" dur="indefinite" restart="never" nodeType="tmRoot"/>
+        <p:cTn xmlns:p14="http://schemas.microsoft.com/office/powerpoint/2010/main" id="1" dur="indefinite" restart="never" nodeType="tmRoot"/>
       </p:par>
     </p:tnLst>
   </p:timing>
@@ -5111,7 +5153,7 @@
   <p:timing>
     <p:tnLst>
       <p:par>
-        <p:cTn id="1" dur="indefinite" restart="never" nodeType="tmRoot"/>
+        <p:cTn xmlns:p14="http://schemas.microsoft.com/office/powerpoint/2010/main" id="1" dur="indefinite" restart="never" nodeType="tmRoot"/>
       </p:par>
     </p:tnLst>
   </p:timing>
@@ -5269,7 +5311,7 @@
   <p:timing>
     <p:tnLst>
       <p:par>
-        <p:cTn id="1" dur="indefinite" restart="never" nodeType="tmRoot"/>
+        <p:cTn xmlns:p14="http://schemas.microsoft.com/office/powerpoint/2010/main" id="1" dur="indefinite" restart="never" nodeType="tmRoot"/>
       </p:par>
     </p:tnLst>
   </p:timing>
@@ -5430,7 +5472,7 @@
   <p:timing>
     <p:tnLst>
       <p:par>
-        <p:cTn id="1" dur="indefinite" restart="never" nodeType="tmRoot"/>
+        <p:cTn xmlns:p14="http://schemas.microsoft.com/office/powerpoint/2010/main" id="1" dur="indefinite" restart="never" nodeType="tmRoot"/>
       </p:par>
     </p:tnLst>
   </p:timing>
@@ -5566,39 +5608,7 @@
                   <a:srgbClr val="0000FF"/>
                 </a:solidFill>
               </a:rPr>
-              <a:t>(</a:t>
-            </a:r>
-            <a:r>
-              <a:rPr lang="en-US" sz="1600" dirty="0" smtClean="0">
-                <a:solidFill>
-                  <a:srgbClr val="0000FF"/>
-                </a:solidFill>
-              </a:rPr>
-              <a:t>API </a:t>
-            </a:r>
-            <a:r>
-              <a:rPr lang="en-US" sz="1600" dirty="0" smtClean="0">
-                <a:solidFill>
-                  <a:srgbClr val="0000FF"/>
-                </a:solidFill>
-              </a:rPr>
-              <a:t>to help </a:t>
-            </a:r>
-            <a:r>
-              <a:rPr lang="en-US" sz="1600" dirty="0" smtClean="0">
-                <a:solidFill>
-                  <a:srgbClr val="0000FF"/>
-                </a:solidFill>
-              </a:rPr>
-              <a:t>populate the screen that appears immediately after user connects with FB OR </a:t>
-            </a:r>
-            <a:r>
-              <a:rPr lang="en-US" sz="1600" dirty="0" smtClean="0">
-                <a:solidFill>
-                  <a:srgbClr val="0000FF"/>
-                </a:solidFill>
-              </a:rPr>
-              <a:t>creates new users – the one where user can add </a:t>
+              <a:t>(API to help populate the screen that appears immediately after user connects with FB OR creates new users – the one where user can add </a:t>
             </a:r>
             <a:r>
               <a:rPr lang="en-US" sz="1600" dirty="0" err="1" smtClean="0">
@@ -5861,7 +5871,7 @@
   <p:timing>
     <p:tnLst>
       <p:par>
-        <p:cTn id="1" dur="indefinite" restart="never" nodeType="tmRoot"/>
+        <p:cTn xmlns:p14="http://schemas.microsoft.com/office/powerpoint/2010/main" id="1" dur="indefinite" restart="never" nodeType="tmRoot"/>
       </p:par>
     </p:tnLst>
   </p:timing>
@@ -6010,7 +6020,7 @@
   <p:timing>
     <p:tnLst>
       <p:par>
-        <p:cTn id="1" dur="indefinite" restart="never" nodeType="tmRoot"/>
+        <p:cTn xmlns:p14="http://schemas.microsoft.com/office/powerpoint/2010/main" id="1" dur="indefinite" restart="never" nodeType="tmRoot"/>
       </p:par>
     </p:tnLst>
   </p:timing>
@@ -6174,8 +6184,8 @@
         </p:nvSpPr>
         <p:spPr>
           <a:xfrm>
-            <a:off x="609600" y="5181600"/>
-            <a:ext cx="8077200" cy="1477328"/>
+            <a:off x="609600" y="4648200"/>
+            <a:ext cx="8077200" cy="1754327"/>
           </a:xfrm>
           <a:prstGeom prst="rect">
             <a:avLst/>
@@ -6220,8 +6230,29 @@
                   <a:srgbClr val="C00000"/>
                 </a:solidFill>
               </a:rPr>
-              <a:t>I thought about this already. We may not need the API for now, but we may need it for phase 2 when we show the number along with a user photo’s avatar. How do you think?</a:t>
-            </a:r>
+              <a:t>I thought about this already. We may not need the API for now, but we may need it for phase 2 when we show the number along with a user photo’s avatar. How do you think</a:t>
+            </a:r>
+            <a:r>
+              <a:rPr lang="en-US" dirty="0" smtClean="0">
+                <a:solidFill>
+                  <a:srgbClr val="C00000"/>
+                </a:solidFill>
+              </a:rPr>
+              <a:t>? </a:t>
+            </a:r>
+            <a:r>
+              <a:rPr lang="en-US" b="1" dirty="0" smtClean="0">
+                <a:solidFill>
+                  <a:srgbClr val="0000FF"/>
+                </a:solidFill>
+              </a:rPr>
+              <a:t>&gt; I don’t recall where we need to show # of Following in Phase 2. Can you please explain?</a:t>
+            </a:r>
+            <a:endParaRPr lang="en-US" dirty="0" smtClean="0">
+              <a:solidFill>
+                <a:srgbClr val="C00000"/>
+              </a:solidFill>
+            </a:endParaRPr>
           </a:p>
         </p:txBody>
       </p:sp>
@@ -6261,7 +6292,7 @@
   <p:timing>
     <p:tnLst>
       <p:par>
-        <p:cTn id="1" dur="indefinite" restart="never" nodeType="tmRoot"/>
+        <p:cTn xmlns:p14="http://schemas.microsoft.com/office/powerpoint/2010/main" id="1" dur="indefinite" restart="never" nodeType="tmRoot"/>
       </p:par>
     </p:tnLst>
   </p:timing>
@@ -6427,7 +6458,7 @@
   <p:timing>
     <p:tnLst>
       <p:par>
-        <p:cTn id="1" dur="indefinite" restart="never" nodeType="tmRoot"/>
+        <p:cTn xmlns:p14="http://schemas.microsoft.com/office/powerpoint/2010/main" id="1" dur="indefinite" restart="never" nodeType="tmRoot"/>
       </p:par>
     </p:tnLst>
   </p:timing>
@@ -6550,7 +6581,7 @@
         <p:spPr>
           <a:xfrm>
             <a:off x="609600" y="5486400"/>
-            <a:ext cx="8077200" cy="646331"/>
+            <a:ext cx="8077200" cy="1754327"/>
           </a:xfrm>
           <a:prstGeom prst="rect">
             <a:avLst/>
@@ -6585,8 +6616,45 @@
                   <a:srgbClr val="0000FF"/>
                 </a:solidFill>
               </a:rPr>
-              <a:t> API (mentioned in General feedback – Missing APIs).</a:t>
-            </a:r>
+              <a:t> API (mentioned in General feedback – Missing APIs)</a:t>
+            </a:r>
+            <a:r>
+              <a:rPr lang="en-US" b="1" dirty="0" smtClean="0">
+                <a:solidFill>
+                  <a:srgbClr val="0000FF"/>
+                </a:solidFill>
+              </a:rPr>
+              <a:t>.</a:t>
+            </a:r>
+          </a:p>
+          <a:p>
+            <a:endParaRPr lang="en-US" b="1" dirty="0">
+              <a:solidFill>
+                <a:srgbClr val="0000FF"/>
+              </a:solidFill>
+            </a:endParaRPr>
+          </a:p>
+          <a:p>
+            <a:r>
+              <a:rPr lang="en-US" b="1" dirty="0">
+                <a:solidFill>
+                  <a:srgbClr val="0000FF"/>
+                </a:solidFill>
+              </a:rPr>
+              <a:t>&gt; I don’t recall where we need to show # of Followers in Phase 2. Can you please explain?</a:t>
+            </a:r>
+            <a:endParaRPr lang="en-US" dirty="0">
+              <a:solidFill>
+                <a:srgbClr val="C00000"/>
+              </a:solidFill>
+            </a:endParaRPr>
+          </a:p>
+          <a:p>
+            <a:endParaRPr lang="en-US" b="1" dirty="0" smtClean="0">
+              <a:solidFill>
+                <a:srgbClr val="0000FF"/>
+              </a:solidFill>
+            </a:endParaRPr>
           </a:p>
         </p:txBody>
       </p:sp>
@@ -6626,7 +6694,7 @@
   <p:timing>
     <p:tnLst>
       <p:par>
-        <p:cTn id="1" dur="indefinite" restart="never" nodeType="tmRoot"/>
+        <p:cTn xmlns:p14="http://schemas.microsoft.com/office/powerpoint/2010/main" id="1" dur="indefinite" restart="never" nodeType="tmRoot"/>
       </p:par>
     </p:tnLst>
   </p:timing>
@@ -6792,7 +6860,7 @@
   <p:timing>
     <p:tnLst>
       <p:par>
-        <p:cTn id="1" dur="indefinite" restart="never" nodeType="tmRoot"/>
+        <p:cTn xmlns:p14="http://schemas.microsoft.com/office/powerpoint/2010/main" id="1" dur="indefinite" restart="never" nodeType="tmRoot"/>
       </p:par>
     </p:tnLst>
   </p:timing>
@@ -6951,7 +7019,7 @@
         <p:spPr>
           <a:xfrm>
             <a:off x="609600" y="5498068"/>
-            <a:ext cx="8077200" cy="646331"/>
+            <a:ext cx="8077200" cy="1754327"/>
           </a:xfrm>
           <a:prstGeom prst="rect">
             <a:avLst/>
@@ -6986,8 +7054,61 @@
                   <a:srgbClr val="0000FF"/>
                 </a:solidFill>
               </a:rPr>
-              <a:t> API (mentioned in General feedback – Missing APIs).</a:t>
-            </a:r>
+              <a:t> API (mentioned in General feedback – Missing APIs)</a:t>
+            </a:r>
+            <a:r>
+              <a:rPr lang="en-US" b="1" dirty="0" smtClean="0">
+                <a:solidFill>
+                  <a:srgbClr val="0000FF"/>
+                </a:solidFill>
+              </a:rPr>
+              <a:t>.</a:t>
+            </a:r>
+          </a:p>
+          <a:p>
+            <a:endParaRPr lang="en-US" b="1" dirty="0">
+              <a:solidFill>
+                <a:srgbClr val="0000FF"/>
+              </a:solidFill>
+            </a:endParaRPr>
+          </a:p>
+          <a:p>
+            <a:r>
+              <a:rPr lang="en-US" b="1" dirty="0">
+                <a:solidFill>
+                  <a:srgbClr val="0000FF"/>
+                </a:solidFill>
+              </a:rPr>
+              <a:t>&gt; I don’t recall where we need to show # of </a:t>
+            </a:r>
+            <a:r>
+              <a:rPr lang="en-US" b="1" dirty="0" smtClean="0">
+                <a:solidFill>
+                  <a:srgbClr val="0000FF"/>
+                </a:solidFill>
+              </a:rPr>
+              <a:t>Friends </a:t>
+            </a:r>
+            <a:r>
+              <a:rPr lang="en-US" b="1" dirty="0">
+                <a:solidFill>
+                  <a:srgbClr val="0000FF"/>
+                </a:solidFill>
+              </a:rPr>
+              <a:t>in Phase 2. Can you please explain?</a:t>
+            </a:r>
+            <a:endParaRPr lang="en-US" dirty="0">
+              <a:solidFill>
+                <a:srgbClr val="C00000"/>
+              </a:solidFill>
+            </a:endParaRPr>
+          </a:p>
+          <a:p>
+            <a:endParaRPr lang="en-US" b="1" dirty="0" smtClean="0">
+              <a:solidFill>
+                <a:srgbClr val="0000FF"/>
+              </a:solidFill>
+            </a:endParaRPr>
           </a:p>
         </p:txBody>
       </p:sp>
@@ -7027,7 +7148,7 @@
   <p:timing>
     <p:tnLst>
       <p:par>
-        <p:cTn id="1" dur="indefinite" restart="never" nodeType="tmRoot"/>
+        <p:cTn xmlns:p14="http://schemas.microsoft.com/office/powerpoint/2010/main" id="1" dur="indefinite" restart="never" nodeType="tmRoot"/>
       </p:par>
     </p:tnLst>
   </p:timing>
@@ -7187,7 +7308,7 @@
   <p:timing>
     <p:tnLst>
       <p:par>
-        <p:cTn id="1" dur="indefinite" restart="never" nodeType="tmRoot"/>
+        <p:cTn xmlns:p14="http://schemas.microsoft.com/office/powerpoint/2010/main" id="1" dur="indefinite" restart="never" nodeType="tmRoot"/>
       </p:par>
     </p:tnLst>
   </p:timing>
@@ -7477,7 +7598,7 @@
   <p:timing>
     <p:tnLst>
       <p:par>
-        <p:cTn id="1" dur="indefinite" restart="never" nodeType="tmRoot"/>
+        <p:cTn xmlns:p14="http://schemas.microsoft.com/office/powerpoint/2010/main" id="1" dur="indefinite" restart="never" nodeType="tmRoot"/>
       </p:par>
     </p:tnLst>
   </p:timing>
@@ -7635,7 +7756,7 @@
   <p:timing>
     <p:tnLst>
       <p:par>
-        <p:cTn id="1" dur="indefinite" restart="never" nodeType="tmRoot"/>
+        <p:cTn xmlns:p14="http://schemas.microsoft.com/office/powerpoint/2010/main" id="1" dur="indefinite" restart="never" nodeType="tmRoot"/>
       </p:par>
     </p:tnLst>
   </p:timing>
@@ -7834,7 +7955,7 @@
   <p:timing>
     <p:tnLst>
       <p:par>
-        <p:cTn id="1" dur="indefinite" restart="never" nodeType="tmRoot"/>
+        <p:cTn xmlns:p14="http://schemas.microsoft.com/office/powerpoint/2010/main" id="1" dur="indefinite" restart="never" nodeType="tmRoot"/>
       </p:par>
     </p:tnLst>
   </p:timing>
@@ -7902,8 +8023,8 @@
         </p:nvSpPr>
         <p:spPr>
           <a:xfrm>
-            <a:off x="457200" y="1371600"/>
-            <a:ext cx="8382000" cy="3785652"/>
+            <a:off x="0" y="990600"/>
+            <a:ext cx="8839200" cy="5755423"/>
           </a:xfrm>
           <a:prstGeom prst="rect">
             <a:avLst/>
@@ -7986,7 +8107,23 @@
                   <a:srgbClr val="C00000"/>
                 </a:solidFill>
               </a:rPr>
-              <a:t>Yes, I know this. It’s quite popular.</a:t>
+              <a:t>Yes, I know this. It’s quite popular</a:t>
+            </a:r>
+            <a:r>
+              <a:rPr lang="en-US" sz="1600" dirty="0" smtClean="0">
+                <a:solidFill>
+                  <a:srgbClr val="C00000"/>
+                </a:solidFill>
+              </a:rPr>
+              <a:t>. </a:t>
+            </a:r>
+            <a:r>
+              <a:rPr lang="en-US" sz="1600" b="1" dirty="0" smtClean="0">
+                <a:solidFill>
+                  <a:srgbClr val="0000FF"/>
+                </a:solidFill>
+              </a:rPr>
+              <a:t>&gt; OK</a:t>
             </a:r>
             <a:endParaRPr lang="en-US" sz="1600" dirty="0" smtClean="0">
               <a:solidFill>
@@ -8051,8 +8188,37 @@
                   <a:srgbClr val="C00000"/>
                 </a:solidFill>
               </a:rPr>
-              <a:t>For friend names, the information should be collected by client app when the user does FB connect. So we will keep the list on the client app to be used for friend suggestion.</a:t>
-            </a:r>
+              <a:t>For friend names, the information should be collected by client app when the user does FB connect. So we will keep the list on the client app to be used for friend suggestion</a:t>
+            </a:r>
+            <a:r>
+              <a:rPr lang="en-US" sz="1600" dirty="0" smtClean="0">
+                <a:solidFill>
+                  <a:srgbClr val="C00000"/>
+                </a:solidFill>
+              </a:rPr>
+              <a:t>.</a:t>
+            </a:r>
+            <a:r>
+              <a:rPr lang="en-US" sz="1600" b="1" dirty="0">
+                <a:solidFill>
+                  <a:srgbClr val="0000FF"/>
+                </a:solidFill>
+              </a:rPr>
+              <a:t> </a:t>
+            </a:r>
+            <a:r>
+              <a:rPr lang="en-US" sz="1600" b="1" dirty="0" smtClean="0">
+                <a:solidFill>
+                  <a:srgbClr val="0000FF"/>
+                </a:solidFill>
+              </a:rPr>
+              <a:t>&gt; OK sounds good. You should also think about periodically refreshing the friend list through Facebook API (in case user adds/deletes friend). When you refresh, you should also update DB.</a:t>
+            </a:r>
+            <a:endParaRPr lang="en-US" sz="1600" dirty="0" smtClean="0">
+              <a:solidFill>
+                <a:srgbClr val="C00000"/>
+              </a:solidFill>
+            </a:endParaRPr>
           </a:p>
           <a:p>
             <a:pPr marL="1200150" lvl="2" indent="-285750">
@@ -8065,8 +8231,29 @@
                   <a:srgbClr val="C00000"/>
                 </a:solidFill>
               </a:rPr>
-              <a:t>For cuisine names, because the cuisine list is small, I think that we will query all the table to the client app and use them for cuisine suggestion</a:t>
-            </a:r>
+              <a:t>For cuisine names, because the cuisine list is small, I think that we will query all the table to the client app and use them for cuisine </a:t>
+            </a:r>
+            <a:r>
+              <a:rPr lang="en-US" sz="1600" dirty="0" smtClean="0">
+                <a:solidFill>
+                  <a:srgbClr val="C00000"/>
+                </a:solidFill>
+              </a:rPr>
+              <a:t>suggestion </a:t>
+            </a:r>
+            <a:r>
+              <a:rPr lang="en-US" sz="1600" b="1" dirty="0" smtClean="0">
+                <a:solidFill>
+                  <a:srgbClr val="0000FF"/>
+                </a:solidFill>
+              </a:rPr>
+              <a:t>&gt; OK</a:t>
+            </a:r>
+            <a:endParaRPr lang="en-US" sz="1600" dirty="0" smtClean="0">
+              <a:solidFill>
+                <a:srgbClr val="C00000"/>
+              </a:solidFill>
+            </a:endParaRPr>
           </a:p>
           <a:p>
             <a:pPr marL="1200150" lvl="2" indent="-285750">
@@ -8079,8 +8266,77 @@
                   <a:srgbClr val="C00000"/>
                 </a:solidFill>
               </a:rPr>
-              <a:t>For restaurant names, the restaurant name column is long, I worry that we cannot index the table for fast query. How about we just suggest the restaurants in that city and run the query every 3 seconds if the field input changed</a:t>
-            </a:r>
+              <a:t>For restaurant names, the restaurant name column is long, I worry that we cannot index the table for fast query. How about we just suggest the restaurants in that city and run the query every 3 seconds if the field input </a:t>
+            </a:r>
+            <a:r>
+              <a:rPr lang="en-US" sz="1600" dirty="0" smtClean="0">
+                <a:solidFill>
+                  <a:srgbClr val="C00000"/>
+                </a:solidFill>
+              </a:rPr>
+              <a:t>changed </a:t>
+            </a:r>
+            <a:r>
+              <a:rPr lang="en-US" sz="1600" b="1" dirty="0" smtClean="0">
+                <a:solidFill>
+                  <a:srgbClr val="0000FF"/>
+                </a:solidFill>
+              </a:rPr>
+              <a:t>&gt; Lets restrict restaurants to that city + </a:t>
+            </a:r>
+            <a:r>
+              <a:rPr lang="en-US" sz="1600" b="1" dirty="0" err="1" smtClean="0">
+                <a:solidFill>
+                  <a:srgbClr val="0000FF"/>
+                </a:solidFill>
+              </a:rPr>
+              <a:t>nearest_cities</a:t>
+            </a:r>
+            <a:r>
+              <a:rPr lang="en-US" sz="1600" b="1" dirty="0" smtClean="0">
+                <a:solidFill>
+                  <a:srgbClr val="0000FF"/>
+                </a:solidFill>
+              </a:rPr>
+              <a:t>. You can wait till the user has typed </a:t>
+            </a:r>
+            <a:r>
+              <a:rPr lang="en-US" sz="1600" b="1" dirty="0" err="1" smtClean="0">
+                <a:solidFill>
+                  <a:srgbClr val="0000FF"/>
+                </a:solidFill>
+              </a:rPr>
+              <a:t>atleast</a:t>
+            </a:r>
+            <a:r>
+              <a:rPr lang="en-US" sz="1600" b="1" dirty="0" smtClean="0">
+                <a:solidFill>
+                  <a:srgbClr val="0000FF"/>
+                </a:solidFill>
+              </a:rPr>
+              <a:t> 3 characters before you auto-suggest. Hopefully this will reduce the number of matches? Let me know if this seems like a workable solution. I saw on Google about this idea of Asynchronous calls… i.e. as soon as user comes to that page, retrieve all restaurants from user’s city + </a:t>
+            </a:r>
+            <a:r>
+              <a:rPr lang="en-US" sz="1600" b="1" dirty="0" err="1" smtClean="0">
+                <a:solidFill>
+                  <a:srgbClr val="0000FF"/>
+                </a:solidFill>
+              </a:rPr>
+              <a:t>nearest_city</a:t>
+            </a:r>
+            <a:r>
+              <a:rPr lang="en-US" sz="1600" b="1" dirty="0" smtClean="0">
+                <a:solidFill>
+                  <a:srgbClr val="0000FF"/>
+                </a:solidFill>
+              </a:rPr>
+              <a:t> from the DB. When the user actually starts typing, you can then retrieve from client side… just an idea… let me know what you think.</a:t>
+            </a:r>
+            <a:endParaRPr lang="en-US" sz="1600" dirty="0" smtClean="0">
+              <a:solidFill>
+                <a:srgbClr val="C00000"/>
+              </a:solidFill>
+            </a:endParaRPr>
           </a:p>
         </p:txBody>
       </p:sp>
@@ -8120,7 +8376,7 @@
   <p:timing>
     <p:tnLst>
       <p:par>
-        <p:cTn id="1" dur="indefinite" restart="never" nodeType="tmRoot"/>
+        <p:cTn xmlns:p14="http://schemas.microsoft.com/office/powerpoint/2010/main" id="1" dur="indefinite" restart="never" nodeType="tmRoot"/>
       </p:par>
     </p:tnLst>
   </p:timing>
@@ -8301,7 +8557,7 @@
   <p:timing>
     <p:tnLst>
       <p:par>
-        <p:cTn id="1" dur="indefinite" restart="never" nodeType="tmRoot"/>
+        <p:cTn xmlns:p14="http://schemas.microsoft.com/office/powerpoint/2010/main" id="1" dur="indefinite" restart="never" nodeType="tmRoot"/>
       </p:par>
     </p:tnLst>
   </p:timing>
@@ -8361,7 +8617,7 @@
         <p:spPr/>
         <p:txBody>
           <a:bodyPr>
-            <a:normAutofit fontScale="70000" lnSpcReduction="20000"/>
+            <a:normAutofit fontScale="62500" lnSpcReduction="20000"/>
           </a:bodyPr>
           <a:lstStyle/>
           <a:p>
@@ -8382,11 +8638,7 @@
             </a:r>
             <a:r>
               <a:rPr lang="en-US" dirty="0" smtClean="0"/>
-              <a:t>by: when user clicks on “I’m Done!” button on </a:t>
-            </a:r>
-            <a:r>
-              <a:rPr lang="en-US" dirty="0" smtClean="0"/>
-              <a:t>the </a:t>
+              <a:t>by: when user clicks on “I’m Done!” button on the </a:t>
             </a:r>
             <a:r>
               <a:rPr lang="en-US" dirty="0"/>
@@ -8436,11 +8688,7 @@
           <a:p>
             <a:r>
               <a:rPr lang="en-US" dirty="0" smtClean="0"/>
-              <a:t>Database </a:t>
-            </a:r>
-            <a:r>
-              <a:rPr lang="en-US" dirty="0" smtClean="0"/>
-              <a:t>changes</a:t>
+              <a:t>Database changes</a:t>
             </a:r>
           </a:p>
           <a:p>
@@ -8481,8 +8729,47 @@
                   <a:srgbClr val="C00000"/>
                 </a:solidFill>
               </a:rPr>
-              <a:t>Can you send me the invitation message sent to user’s friends?</a:t>
-            </a:r>
+              <a:t>Can you send me the invitation message sent to user’s friends</a:t>
+            </a:r>
+            <a:r>
+              <a:rPr lang="en-US" dirty="0" smtClean="0">
+                <a:solidFill>
+                  <a:srgbClr val="C00000"/>
+                </a:solidFill>
+              </a:rPr>
+              <a:t>?</a:t>
+            </a:r>
+          </a:p>
+          <a:p>
+            <a:pPr marL="457200" lvl="1" indent="0">
+              <a:buNone/>
+            </a:pPr>
+            <a:r>
+              <a:rPr lang="en-US" b="1" dirty="0">
+                <a:solidFill>
+                  <a:srgbClr val="0000FF"/>
+                </a:solidFill>
+              </a:rPr>
+              <a:t>&gt; </a:t>
+            </a:r>
+            <a:r>
+              <a:rPr lang="en-US" b="1" dirty="0" smtClean="0">
+                <a:solidFill>
+                  <a:srgbClr val="0000FF"/>
+                </a:solidFill>
+              </a:rPr>
+              <a:t>For now, please use dummy text. We will create/modify all messages at the end.</a:t>
+            </a:r>
+            <a:endParaRPr lang="en-US" dirty="0">
+              <a:solidFill>
+                <a:srgbClr val="C00000"/>
+              </a:solidFill>
+            </a:endParaRPr>
+          </a:p>
+          <a:p>
+            <a:pPr marL="457200" lvl="1" indent="0">
+              <a:buNone/>
+            </a:pPr>
             <a:endParaRPr lang="en-US" dirty="0">
               <a:solidFill>
                 <a:srgbClr val="C00000"/>
@@ -8527,7 +8814,7 @@
   <p:timing>
     <p:tnLst>
       <p:par>
-        <p:cTn id="1" dur="indefinite" restart="never" nodeType="tmRoot"/>
+        <p:cTn xmlns:p14="http://schemas.microsoft.com/office/powerpoint/2010/main" id="1" dur="indefinite" restart="never" nodeType="tmRoot"/>
       </p:par>
     </p:tnLst>
   </p:timing>
@@ -8614,7 +8901,6 @@
               <a:rPr lang="en-US" dirty="0"/>
               <a:t>help populate the screen that appears immediately after user connects with FB OR creates new users</a:t>
             </a:r>
-            <a:endParaRPr lang="en-US" dirty="0"/>
           </a:p>
           <a:p>
             <a:r>
@@ -8715,7 +9001,7 @@
   <p:timing>
     <p:tnLst>
       <p:par>
-        <p:cTn id="1" dur="indefinite" restart="never" nodeType="tmRoot"/>
+        <p:cTn xmlns:p14="http://schemas.microsoft.com/office/powerpoint/2010/main" id="1" dur="indefinite" restart="never" nodeType="tmRoot"/>
       </p:par>
     </p:tnLst>
   </p:timing>
@@ -8772,7 +9058,12 @@
             <p:ph idx="1"/>
           </p:nvPr>
         </p:nvSpPr>
-        <p:spPr/>
+        <p:spPr>
+          <a:xfrm>
+            <a:off x="457200" y="1600200"/>
+            <a:ext cx="8229600" cy="5029200"/>
+          </a:xfrm>
+        </p:spPr>
         <p:txBody>
           <a:bodyPr>
             <a:normAutofit fontScale="62500" lnSpcReduction="20000"/>
@@ -8829,101 +9120,149 @@
                   <a:srgbClr val="C00000"/>
                 </a:solidFill>
               </a:rPr>
-              <a:t>(which table contains the information?)</a:t>
-            </a:r>
-          </a:p>
-          <a:p>
-            <a:pPr lvl="1"/>
-            <a:r>
-              <a:rPr lang="en-US" dirty="0" smtClean="0"/>
-              <a:t>“About” from users table</a:t>
-            </a:r>
-          </a:p>
-          <a:p>
-            <a:pPr lvl="1"/>
-            <a:r>
-              <a:rPr lang="en-US" dirty="0" smtClean="0"/>
-              <a:t>Number of </a:t>
-            </a:r>
-            <a:r>
-              <a:rPr lang="en-US" dirty="0" err="1" smtClean="0"/>
-              <a:t>followees</a:t>
-            </a:r>
-            <a:r>
-              <a:rPr lang="en-US" dirty="0" smtClean="0"/>
-              <a:t>, followers, trusted friends</a:t>
-            </a:r>
-          </a:p>
-          <a:p>
-            <a:pPr lvl="1"/>
-            <a:r>
-              <a:rPr lang="en-US" dirty="0" smtClean="0"/>
-              <a:t>User points from users table</a:t>
-            </a:r>
-          </a:p>
-          <a:p>
-            <a:pPr lvl="1"/>
-            <a:r>
-              <a:rPr lang="en-US" dirty="0" smtClean="0"/>
-              <a:t>List of favorite, recommended, saved, tip-left restaurants of the user </a:t>
-            </a:r>
-            <a:r>
-              <a:rPr lang="en-US" dirty="0"/>
-              <a:t>(from </a:t>
-            </a:r>
-            <a:r>
-              <a:rPr lang="en-US" dirty="0" smtClean="0"/>
-              <a:t>the tables </a:t>
-            </a:r>
-            <a:r>
-              <a:rPr lang="en-US" dirty="0" err="1" smtClean="0"/>
-              <a:t>user_restaurant_fav</a:t>
-            </a:r>
-            <a:r>
-              <a:rPr lang="en-US" dirty="0"/>
-              <a:t>, </a:t>
-            </a:r>
-            <a:r>
-              <a:rPr lang="en-US" dirty="0" err="1"/>
-              <a:t>user_restaurant_reco</a:t>
-            </a:r>
-            <a:r>
-              <a:rPr lang="en-US" dirty="0"/>
-              <a:t>, </a:t>
-            </a:r>
-            <a:r>
-              <a:rPr lang="en-US" dirty="0" err="1"/>
-              <a:t>user_restaurant_saved</a:t>
-            </a:r>
-            <a:r>
-              <a:rPr lang="en-US" dirty="0"/>
-              <a:t>, </a:t>
-            </a:r>
-            <a:r>
-              <a:rPr lang="en-US" dirty="0" err="1" smtClean="0"/>
-              <a:t>restaurant_tips_tastesync</a:t>
-            </a:r>
-            <a:r>
-              <a:rPr lang="en-US" dirty="0" smtClean="0"/>
+              <a:t>(which table contains the information?</a:t>
+            </a:r>
+            <a:r>
+              <a:rPr lang="en-US" dirty="0" smtClean="0">
+                <a:solidFill>
+                  <a:srgbClr val="C00000"/>
+                </a:solidFill>
+              </a:rPr>
               <a:t>) </a:t>
             </a:r>
             <a:r>
-              <a:rPr lang="en-US" dirty="0" smtClean="0">
-                <a:solidFill>
-                  <a:srgbClr val="C00000"/>
+              <a:rPr lang="en-US" b="1" dirty="0">
+                <a:solidFill>
+                  <a:srgbClr val="0000FF"/>
                 </a:solidFill>
               </a:rPr>
-              <a:t>(how many restaurants do we need to get?)</a:t>
-            </a:r>
-            <a:endParaRPr lang="en-US" dirty="0">
+              <a:t>&gt; </a:t>
+            </a:r>
+            <a:r>
+              <a:rPr lang="en-US" b="1" dirty="0" smtClean="0">
+                <a:solidFill>
+                  <a:srgbClr val="0000FF"/>
+                </a:solidFill>
+              </a:rPr>
+              <a:t>Please add in Users table. </a:t>
+            </a:r>
+            <a:endParaRPr lang="en-US" dirty="0" smtClean="0">
               <a:solidFill>
                 <a:srgbClr val="C00000"/>
               </a:solidFill>
             </a:endParaRPr>
           </a:p>
           <a:p>
-            <a:r>
-              <a:rPr lang="en-US" dirty="0"/>
+            <a:pPr lvl="1"/>
+            <a:r>
+              <a:rPr lang="en-US" dirty="0" smtClean="0"/>
+              <a:t>“About” from users table</a:t>
+            </a:r>
+          </a:p>
+          <a:p>
+            <a:pPr lvl="1"/>
+            <a:r>
+              <a:rPr lang="en-US" dirty="0" smtClean="0"/>
+              <a:t>Number of </a:t>
+            </a:r>
+            <a:r>
+              <a:rPr lang="en-US" dirty="0" err="1" smtClean="0"/>
+              <a:t>followees</a:t>
+            </a:r>
+            <a:r>
+              <a:rPr lang="en-US" dirty="0" smtClean="0"/>
+              <a:t>, followers, trusted friends</a:t>
+            </a:r>
+          </a:p>
+          <a:p>
+            <a:pPr lvl="1"/>
+            <a:r>
+              <a:rPr lang="en-US" dirty="0" smtClean="0"/>
+              <a:t>User points from users table</a:t>
+            </a:r>
+          </a:p>
+          <a:p>
+            <a:pPr lvl="1"/>
+            <a:r>
+              <a:rPr lang="en-US" dirty="0" smtClean="0"/>
+              <a:t>List of favorite, recommended, saved, tip-left restaurants of the user (from the tables </a:t>
+            </a:r>
+            <a:r>
+              <a:rPr lang="en-US" dirty="0" err="1" smtClean="0"/>
+              <a:t>user_restaurant_fav</a:t>
+            </a:r>
+            <a:r>
+              <a:rPr lang="en-US" dirty="0" smtClean="0"/>
+              <a:t>, </a:t>
+            </a:r>
+            <a:r>
+              <a:rPr lang="en-US" dirty="0" err="1" smtClean="0"/>
+              <a:t>user_restaurant_reco</a:t>
+            </a:r>
+            <a:r>
+              <a:rPr lang="en-US" dirty="0" smtClean="0"/>
+              <a:t>, </a:t>
+            </a:r>
+            <a:r>
+              <a:rPr lang="en-US" dirty="0" err="1" smtClean="0"/>
+              <a:t>user_restaurant_saved</a:t>
+            </a:r>
+            <a:r>
+              <a:rPr lang="en-US" dirty="0" smtClean="0"/>
+              <a:t>, </a:t>
+            </a:r>
+            <a:r>
+              <a:rPr lang="en-US" dirty="0" err="1" smtClean="0"/>
+              <a:t>restaurant_tips_tastesync</a:t>
+            </a:r>
+            <a:r>
+              <a:rPr lang="en-US" dirty="0" smtClean="0"/>
+              <a:t>) </a:t>
+            </a:r>
+            <a:r>
+              <a:rPr lang="en-US" dirty="0" smtClean="0">
+                <a:solidFill>
+                  <a:srgbClr val="C00000"/>
+                </a:solidFill>
+              </a:rPr>
+              <a:t>(how many restaurants do we need to get? </a:t>
+            </a:r>
+            <a:r>
+              <a:rPr lang="en-US" b="1" dirty="0" smtClean="0">
+                <a:solidFill>
+                  <a:srgbClr val="0000FF"/>
+                </a:solidFill>
+              </a:rPr>
+              <a:t>&gt; For My Profile Home, you only need 3 (because that</a:t>
+            </a:r>
+            <a:r>
+              <a:rPr lang="fr-FR" b="1" dirty="0" smtClean="0">
+                <a:solidFill>
+                  <a:srgbClr val="0000FF"/>
+                </a:solidFill>
+              </a:rPr>
+              <a:t>’</a:t>
+            </a:r>
+            <a:r>
+              <a:rPr lang="en-US" b="1" dirty="0" smtClean="0">
+                <a:solidFill>
+                  <a:srgbClr val="0000FF"/>
+                </a:solidFill>
+              </a:rPr>
+              <a:t>s the max number of photos you can show in the UI on Profile Home page.) if User clicks on My Profile&gt;Restaurants, then you can get the remaining ones</a:t>
+            </a:r>
+            <a:r>
+              <a:rPr lang="en-US" dirty="0" smtClean="0">
+                <a:solidFill>
+                  <a:srgbClr val="C00000"/>
+                </a:solidFill>
+              </a:rPr>
+              <a:t>)</a:t>
+            </a:r>
+          </a:p>
+          <a:p>
+            <a:r>
+              <a:rPr lang="en-US" dirty="0" smtClean="0"/>
               <a:t>Database </a:t>
             </a:r>
             <a:r>
@@ -8976,7 +9315,7 @@
   <p:timing>
     <p:tnLst>
       <p:par>
-        <p:cTn id="1" dur="indefinite" restart="never" nodeType="tmRoot"/>
+        <p:cTn xmlns:p14="http://schemas.microsoft.com/office/powerpoint/2010/main" id="1" dur="indefinite" restart="never" nodeType="tmRoot"/>
       </p:par>
     </p:tnLst>
   </p:timing>
@@ -9071,7 +9410,6 @@
               <a:rPr lang="en-US" dirty="0"/>
               <a:t>, saved</a:t>
             </a:r>
-            <a:endParaRPr lang="en-US" dirty="0"/>
           </a:p>
           <a:p>
             <a:r>
@@ -9121,7 +9459,6 @@
               <a:rPr lang="en-US" dirty="0"/>
               <a:t>)</a:t>
             </a:r>
-            <a:endParaRPr lang="en-US" dirty="0"/>
           </a:p>
           <a:p>
             <a:r>
@@ -9172,7 +9509,7 @@
   <p:timing>
     <p:tnLst>
       <p:par>
-        <p:cTn id="1" dur="indefinite" restart="never" nodeType="tmRoot"/>
+        <p:cTn xmlns:p14="http://schemas.microsoft.com/office/powerpoint/2010/main" id="1" dur="indefinite" restart="never" nodeType="tmRoot"/>
       </p:par>
     </p:tnLst>
   </p:timing>
@@ -9372,7 +9709,7 @@
   <p:timing>
     <p:tnLst>
       <p:par>
-        <p:cTn id="1" dur="indefinite" restart="never" nodeType="tmRoot"/>
+        <p:cTn xmlns:p14="http://schemas.microsoft.com/office/powerpoint/2010/main" id="1" dur="indefinite" restart="never" nodeType="tmRoot"/>
       </p:par>
     </p:tnLst>
   </p:timing>
@@ -9478,7 +9815,6 @@
               <a:rPr lang="en-US" dirty="0"/>
               <a:t>, REPORTED_REASON</a:t>
             </a:r>
-            <a:endParaRPr lang="en-US" dirty="0"/>
           </a:p>
           <a:p>
             <a:r>
@@ -9550,7 +9886,7 @@
   <p:timing>
     <p:tnLst>
       <p:par>
-        <p:cTn id="1" dur="indefinite" restart="never" nodeType="tmRoot"/>
+        <p:cTn xmlns:p14="http://schemas.microsoft.com/office/powerpoint/2010/main" id="1" dur="indefinite" restart="never" nodeType="tmRoot"/>
       </p:par>
     </p:tnLst>
   </p:timing>
@@ -9729,7 +10065,7 @@
   <p:timing>
     <p:tnLst>
       <p:par>
-        <p:cTn id="1" dur="indefinite" restart="never" nodeType="tmRoot"/>
+        <p:cTn xmlns:p14="http://schemas.microsoft.com/office/powerpoint/2010/main" id="1" dur="indefinite" restart="never" nodeType="tmRoot"/>
       </p:par>
     </p:tnLst>
   </p:timing>
@@ -9929,7 +10265,7 @@
   <p:timing>
     <p:tnLst>
       <p:par>
-        <p:cTn id="1" dur="indefinite" restart="never" nodeType="tmRoot"/>
+        <p:cTn xmlns:p14="http://schemas.microsoft.com/office/powerpoint/2010/main" id="1" dur="indefinite" restart="never" nodeType="tmRoot"/>
       </p:par>
     </p:tnLst>
   </p:timing>
@@ -10239,7 +10575,7 @@
   <p:timing>
     <p:tnLst>
       <p:par>
-        <p:cTn id="1" dur="indefinite" restart="never" nodeType="tmRoot"/>
+        <p:cTn xmlns:p14="http://schemas.microsoft.com/office/powerpoint/2010/main" id="1" dur="indefinite" restart="never" nodeType="tmRoot"/>
       </p:par>
     </p:tnLst>
   </p:timing>
@@ -10472,8 +10808,29 @@
                   <a:srgbClr val="C00000"/>
                 </a:solidFill>
               </a:rPr>
-              <a:t>Answer: I would like to retrieve ALL the user info for any future usage</a:t>
-            </a:r>
+              <a:t>Answer: I would like to retrieve ALL the user info for any future </a:t>
+            </a:r>
+            <a:r>
+              <a:rPr lang="en-US" dirty="0" smtClean="0">
+                <a:solidFill>
+                  <a:srgbClr val="C00000"/>
+                </a:solidFill>
+              </a:rPr>
+              <a:t>usage </a:t>
+            </a:r>
+            <a:r>
+              <a:rPr lang="en-US" b="1" dirty="0" smtClean="0">
+                <a:solidFill>
+                  <a:srgbClr val="0000FF"/>
+                </a:solidFill>
+              </a:rPr>
+              <a:t>&gt; OK</a:t>
+            </a:r>
+            <a:endParaRPr lang="en-US" dirty="0" smtClean="0">
+              <a:solidFill>
+                <a:srgbClr val="C00000"/>
+              </a:solidFill>
+            </a:endParaRPr>
           </a:p>
         </p:txBody>
       </p:sp>
@@ -10513,7 +10870,7 @@
   <p:timing>
     <p:tnLst>
       <p:par>
-        <p:cTn id="1" dur="indefinite" restart="never" nodeType="tmRoot"/>
+        <p:cTn xmlns:p14="http://schemas.microsoft.com/office/powerpoint/2010/main" id="1" dur="indefinite" restart="never" nodeType="tmRoot"/>
       </p:par>
     </p:tnLst>
   </p:timing>
@@ -10715,7 +11072,7 @@
   <p:timing>
     <p:tnLst>
       <p:par>
-        <p:cTn id="1" dur="indefinite" restart="never" nodeType="tmRoot"/>
+        <p:cTn xmlns:p14="http://schemas.microsoft.com/office/powerpoint/2010/main" id="1" dur="indefinite" restart="never" nodeType="tmRoot"/>
       </p:par>
     </p:tnLst>
   </p:timing>
@@ -10940,7 +11297,7 @@
   <p:timing>
     <p:tnLst>
       <p:par>
-        <p:cTn id="1" dur="indefinite" restart="never" nodeType="tmRoot"/>
+        <p:cTn xmlns:p14="http://schemas.microsoft.com/office/powerpoint/2010/main" id="1" dur="indefinite" restart="never" nodeType="tmRoot"/>
       </p:par>
     </p:tnLst>
   </p:timing>
@@ -11110,7 +11467,7 @@
   <p:timing>
     <p:tnLst>
       <p:par>
-        <p:cTn id="1" dur="indefinite" restart="never" nodeType="tmRoot"/>
+        <p:cTn xmlns:p14="http://schemas.microsoft.com/office/powerpoint/2010/main" id="1" dur="indefinite" restart="never" nodeType="tmRoot"/>
       </p:par>
     </p:tnLst>
   </p:timing>

</xml_diff>

<commit_message>
Source submitSignupDetail and Fix Document
Source code submitSignupDetail and Delete rows is not use in Document
Webservice.
</commit_message>
<xml_diff>
--- a/ws/WS Design Docs/API_Listing.pptx
+++ b/ws/WS Design Docs/API_Listing.pptx
@@ -270,14 +270,14 @@
           </a:ln>
           <a:effectLst/>
           <a:extLst>
-            <a:ext uri="{909E8E84-426E-40dd-AFC4-6F175D3DCCD1}">
+            <a:ext uri="{909E8E84-426E-40DD-AFC4-6F175D3DCCD1}">
               <a14:hiddenFill xmlns:a14="http://schemas.microsoft.com/office/drawing/2010/main">
                 <a:solidFill>
                   <a:srgbClr val="FFFFFF"/>
                 </a:solidFill>
               </a14:hiddenFill>
             </a:ext>
-            <a:ext uri="{91240B29-F687-4f45-9708-019B960494DF}">
+            <a:ext uri="{91240B29-F687-4F45-9708-019B960494DF}">
               <a14:hiddenLine xmlns:a14="http://schemas.microsoft.com/office/drawing/2010/main" w="9525" cap="flat">
                 <a:solidFill>
                   <a:srgbClr val="808080"/>
@@ -287,7 +287,7 @@
                 <a:tailEnd/>
               </a14:hiddenLine>
             </a:ext>
-            <a:ext uri="{AF507438-7753-43e0-B8FC-AC1667EBCBE1}">
+            <a:ext uri="{AF507438-7753-43E0-B8FC-AC1667EBCBE1}">
               <a14:hiddenEffects xmlns:a14="http://schemas.microsoft.com/office/drawing/2010/main">
                 <a:effectLst>
                   <a:outerShdw dist="35921" dir="2700000" algn="ctr" rotWithShape="0">
@@ -323,14 +323,14 @@
           </a:ln>
           <a:effectLst/>
           <a:extLst>
-            <a:ext uri="{909E8E84-426E-40dd-AFC4-6F175D3DCCD1}">
+            <a:ext uri="{909E8E84-426E-40DD-AFC4-6F175D3DCCD1}">
               <a14:hiddenFill xmlns:a14="http://schemas.microsoft.com/office/drawing/2010/main">
                 <a:solidFill>
                   <a:srgbClr val="FFFFFF"/>
                 </a:solidFill>
               </a14:hiddenFill>
             </a:ext>
-            <a:ext uri="{91240B29-F687-4f45-9708-019B960494DF}">
+            <a:ext uri="{91240B29-F687-4F45-9708-019B960494DF}">
               <a14:hiddenLine xmlns:a14="http://schemas.microsoft.com/office/drawing/2010/main" w="9525" cap="flat">
                 <a:solidFill>
                   <a:srgbClr val="808080"/>
@@ -340,7 +340,7 @@
                 <a:tailEnd/>
               </a14:hiddenLine>
             </a:ext>
-            <a:ext uri="{AF507438-7753-43e0-B8FC-AC1667EBCBE1}">
+            <a:ext uri="{AF507438-7753-43E0-B8FC-AC1667EBCBE1}">
               <a14:hiddenEffects xmlns:a14="http://schemas.microsoft.com/office/drawing/2010/main">
                 <a:effectLst>
                   <a:outerShdw dist="35921" dir="2700000" algn="ctr" rotWithShape="0">
@@ -388,14 +388,14 @@
           </a:ln>
           <a:effectLst/>
           <a:extLst>
-            <a:ext uri="{909E8E84-426E-40dd-AFC4-6F175D3DCCD1}">
+            <a:ext uri="{909E8E84-426E-40DD-AFC4-6F175D3DCCD1}">
               <a14:hiddenFill xmlns:a14="http://schemas.microsoft.com/office/drawing/2010/main">
                 <a:solidFill>
                   <a:srgbClr val="FFFFFF"/>
                 </a:solidFill>
               </a14:hiddenFill>
             </a:ext>
-            <a:ext uri="{91240B29-F687-4f45-9708-019B960494DF}">
+            <a:ext uri="{91240B29-F687-4F45-9708-019B960494DF}">
               <a14:hiddenLine xmlns:a14="http://schemas.microsoft.com/office/drawing/2010/main" w="9525" cap="flat">
                 <a:solidFill>
                   <a:srgbClr val="808080"/>
@@ -405,7 +405,7 @@
                 <a:tailEnd/>
               </a14:hiddenLine>
             </a:ext>
-            <a:ext uri="{AF507438-7753-43e0-B8FC-AC1667EBCBE1}">
+            <a:ext uri="{AF507438-7753-43E0-B8FC-AC1667EBCBE1}">
               <a14:hiddenEffects xmlns:a14="http://schemas.microsoft.com/office/drawing/2010/main">
                 <a:effectLst>
                   <a:outerShdw dist="35921" dir="2700000" algn="ctr" rotWithShape="0">
@@ -467,14 +467,14 @@
           </a:ln>
           <a:effectLst/>
           <a:extLst>
-            <a:ext uri="{909E8E84-426E-40dd-AFC4-6F175D3DCCD1}">
+            <a:ext uri="{909E8E84-426E-40DD-AFC4-6F175D3DCCD1}">
               <a14:hiddenFill xmlns:a14="http://schemas.microsoft.com/office/drawing/2010/main">
                 <a:solidFill>
                   <a:srgbClr val="FFFFFF"/>
                 </a:solidFill>
               </a14:hiddenFill>
             </a:ext>
-            <a:ext uri="{91240B29-F687-4f45-9708-019B960494DF}">
+            <a:ext uri="{91240B29-F687-4F45-9708-019B960494DF}">
               <a14:hiddenLine xmlns:a14="http://schemas.microsoft.com/office/drawing/2010/main" w="9525" cap="flat">
                 <a:solidFill>
                   <a:srgbClr val="808080"/>
@@ -484,7 +484,7 @@
                 <a:tailEnd/>
               </a14:hiddenLine>
             </a:ext>
-            <a:ext uri="{AF507438-7753-43e0-B8FC-AC1667EBCBE1}">
+            <a:ext uri="{AF507438-7753-43E0-B8FC-AC1667EBCBE1}">
               <a14:hiddenEffects xmlns:a14="http://schemas.microsoft.com/office/drawing/2010/main">
                 <a:effectLst>
                   <a:outerShdw dist="35921" dir="2700000" algn="ctr" rotWithShape="0">
@@ -546,14 +546,14 @@
           </a:ln>
           <a:effectLst/>
           <a:extLst>
-            <a:ext uri="{909E8E84-426E-40dd-AFC4-6F175D3DCCD1}">
+            <a:ext uri="{909E8E84-426E-40DD-AFC4-6F175D3DCCD1}">
               <a14:hiddenFill xmlns:a14="http://schemas.microsoft.com/office/drawing/2010/main">
                 <a:solidFill>
                   <a:srgbClr val="FFFFFF"/>
                 </a:solidFill>
               </a14:hiddenFill>
             </a:ext>
-            <a:ext uri="{91240B29-F687-4f45-9708-019B960494DF}">
+            <a:ext uri="{91240B29-F687-4F45-9708-019B960494DF}">
               <a14:hiddenLine xmlns:a14="http://schemas.microsoft.com/office/drawing/2010/main" w="9525" cap="flat">
                 <a:solidFill>
                   <a:srgbClr val="808080"/>
@@ -563,7 +563,7 @@
                 <a:tailEnd/>
               </a14:hiddenLine>
             </a:ext>
-            <a:ext uri="{AF507438-7753-43e0-B8FC-AC1667EBCBE1}">
+            <a:ext uri="{AF507438-7753-43E0-B8FC-AC1667EBCBE1}">
               <a14:hiddenEffects xmlns:a14="http://schemas.microsoft.com/office/drawing/2010/main">
                 <a:effectLst>
                   <a:outerShdw dist="35921" dir="2700000" algn="ctr" rotWithShape="0">
@@ -625,14 +625,14 @@
           </a:ln>
           <a:effectLst/>
           <a:extLst>
-            <a:ext uri="{909E8E84-426E-40dd-AFC4-6F175D3DCCD1}">
+            <a:ext uri="{909E8E84-426E-40DD-AFC4-6F175D3DCCD1}">
               <a14:hiddenFill xmlns:a14="http://schemas.microsoft.com/office/drawing/2010/main">
                 <a:solidFill>
                   <a:srgbClr val="FFFFFF"/>
                 </a:solidFill>
               </a14:hiddenFill>
             </a:ext>
-            <a:ext uri="{91240B29-F687-4f45-9708-019B960494DF}">
+            <a:ext uri="{91240B29-F687-4F45-9708-019B960494DF}">
               <a14:hiddenLine xmlns:a14="http://schemas.microsoft.com/office/drawing/2010/main" w="9525" cap="flat">
                 <a:solidFill>
                   <a:srgbClr val="808080"/>
@@ -642,7 +642,7 @@
                 <a:tailEnd/>
               </a14:hiddenLine>
             </a:ext>
-            <a:ext uri="{AF507438-7753-43e0-B8FC-AC1667EBCBE1}">
+            <a:ext uri="{AF507438-7753-43E0-B8FC-AC1667EBCBE1}">
               <a14:hiddenEffects xmlns:a14="http://schemas.microsoft.com/office/drawing/2010/main">
                 <a:effectLst>
                   <a:outerShdw dist="35921" dir="2700000" algn="ctr" rotWithShape="0">
@@ -924,7 +924,7 @@
             <a:tailEnd/>
           </a:ln>
           <a:extLst>
-            <a:ext uri="{AF507438-7753-43e0-B8FC-AC1667EBCBE1}">
+            <a:ext uri="{AF507438-7753-43E0-B8FC-AC1667EBCBE1}">
               <a14:hiddenEffects xmlns:a14="http://schemas.microsoft.com/office/drawing/2010/main">
                 <a:effectLst>
                   <a:outerShdw dist="35921" dir="2700000" algn="ctr" rotWithShape="0">
@@ -957,14 +957,14 @@
           <a:noFill/>
           <a:ln/>
           <a:extLst>
-            <a:ext uri="{909E8E84-426E-40dd-AFC4-6F175D3DCCD1}">
+            <a:ext uri="{909E8E84-426E-40DD-AFC4-6F175D3DCCD1}">
               <a14:hiddenFill xmlns:a14="http://schemas.microsoft.com/office/drawing/2010/main">
                 <a:solidFill>
                   <a:srgbClr val="FFFFFF"/>
                 </a:solidFill>
               </a14:hiddenFill>
             </a:ext>
-            <a:ext uri="{91240B29-F687-4f45-9708-019B960494DF}">
+            <a:ext uri="{91240B29-F687-4F45-9708-019B960494DF}">
               <a14:hiddenLine xmlns:a14="http://schemas.microsoft.com/office/drawing/2010/main" w="9525" cap="flat">
                 <a:solidFill>
                   <a:srgbClr val="808080"/>
@@ -974,7 +974,7 @@
                 <a:tailEnd/>
               </a14:hiddenLine>
             </a:ext>
-            <a:ext uri="{AF507438-7753-43e0-B8FC-AC1667EBCBE1}">
+            <a:ext uri="{AF507438-7753-43E0-B8FC-AC1667EBCBE1}">
               <a14:hiddenEffects xmlns:a14="http://schemas.microsoft.com/office/drawing/2010/main">
                 <a:effectLst>
                   <a:outerShdw dist="35921" dir="2700000" algn="ctr" rotWithShape="0">
@@ -1082,7 +1082,7 @@
             <a:tailEnd/>
           </a:ln>
           <a:extLst>
-            <a:ext uri="{AF507438-7753-43e0-B8FC-AC1667EBCBE1}">
+            <a:ext uri="{AF507438-7753-43E0-B8FC-AC1667EBCBE1}">
               <a14:hiddenEffects xmlns:a14="http://schemas.microsoft.com/office/drawing/2010/main">
                 <a:effectLst>
                   <a:outerShdw dist="35921" dir="2700000" algn="ctr" rotWithShape="0">
@@ -1115,14 +1115,14 @@
           <a:noFill/>
           <a:ln/>
           <a:extLst>
-            <a:ext uri="{909E8E84-426E-40dd-AFC4-6F175D3DCCD1}">
+            <a:ext uri="{909E8E84-426E-40DD-AFC4-6F175D3DCCD1}">
               <a14:hiddenFill xmlns:a14="http://schemas.microsoft.com/office/drawing/2010/main">
                 <a:solidFill>
                   <a:srgbClr val="FFFFFF"/>
                 </a:solidFill>
               </a14:hiddenFill>
             </a:ext>
-            <a:ext uri="{91240B29-F687-4f45-9708-019B960494DF}">
+            <a:ext uri="{91240B29-F687-4F45-9708-019B960494DF}">
               <a14:hiddenLine xmlns:a14="http://schemas.microsoft.com/office/drawing/2010/main" w="9525" cap="flat">
                 <a:solidFill>
                   <a:srgbClr val="808080"/>
@@ -1132,7 +1132,7 @@
                 <a:tailEnd/>
               </a14:hiddenLine>
             </a:ext>
-            <a:ext uri="{AF507438-7753-43e0-B8FC-AC1667EBCBE1}">
+            <a:ext uri="{AF507438-7753-43E0-B8FC-AC1667EBCBE1}">
               <a14:hiddenEffects xmlns:a14="http://schemas.microsoft.com/office/drawing/2010/main">
                 <a:effectLst>
                   <a:outerShdw dist="35921" dir="2700000" algn="ctr" rotWithShape="0">
@@ -1240,7 +1240,7 @@
             <a:tailEnd/>
           </a:ln>
           <a:extLst>
-            <a:ext uri="{AF507438-7753-43e0-B8FC-AC1667EBCBE1}">
+            <a:ext uri="{AF507438-7753-43E0-B8FC-AC1667EBCBE1}">
               <a14:hiddenEffects xmlns:a14="http://schemas.microsoft.com/office/drawing/2010/main">
                 <a:effectLst>
                   <a:outerShdw dist="35921" dir="2700000" algn="ctr" rotWithShape="0">
@@ -1273,14 +1273,14 @@
           <a:noFill/>
           <a:ln/>
           <a:extLst>
-            <a:ext uri="{909E8E84-426E-40dd-AFC4-6F175D3DCCD1}">
+            <a:ext uri="{909E8E84-426E-40DD-AFC4-6F175D3DCCD1}">
               <a14:hiddenFill xmlns:a14="http://schemas.microsoft.com/office/drawing/2010/main">
                 <a:solidFill>
                   <a:srgbClr val="FFFFFF"/>
                 </a:solidFill>
               </a14:hiddenFill>
             </a:ext>
-            <a:ext uri="{91240B29-F687-4f45-9708-019B960494DF}">
+            <a:ext uri="{91240B29-F687-4F45-9708-019B960494DF}">
               <a14:hiddenLine xmlns:a14="http://schemas.microsoft.com/office/drawing/2010/main" w="9525" cap="flat">
                 <a:solidFill>
                   <a:srgbClr val="808080"/>
@@ -1290,7 +1290,7 @@
                 <a:tailEnd/>
               </a14:hiddenLine>
             </a:ext>
-            <a:ext uri="{AF507438-7753-43e0-B8FC-AC1667EBCBE1}">
+            <a:ext uri="{AF507438-7753-43E0-B8FC-AC1667EBCBE1}">
               <a14:hiddenEffects xmlns:a14="http://schemas.microsoft.com/office/drawing/2010/main">
                 <a:effectLst>
                   <a:outerShdw dist="35921" dir="2700000" algn="ctr" rotWithShape="0">
@@ -1398,7 +1398,7 @@
             <a:tailEnd/>
           </a:ln>
           <a:extLst>
-            <a:ext uri="{AF507438-7753-43e0-B8FC-AC1667EBCBE1}">
+            <a:ext uri="{AF507438-7753-43E0-B8FC-AC1667EBCBE1}">
               <a14:hiddenEffects xmlns:a14="http://schemas.microsoft.com/office/drawing/2010/main">
                 <a:effectLst>
                   <a:outerShdw dist="35921" dir="2700000" algn="ctr" rotWithShape="0">
@@ -1431,14 +1431,14 @@
           <a:noFill/>
           <a:ln/>
           <a:extLst>
-            <a:ext uri="{909E8E84-426E-40dd-AFC4-6F175D3DCCD1}">
+            <a:ext uri="{909E8E84-426E-40DD-AFC4-6F175D3DCCD1}">
               <a14:hiddenFill xmlns:a14="http://schemas.microsoft.com/office/drawing/2010/main">
                 <a:solidFill>
                   <a:srgbClr val="FFFFFF"/>
                 </a:solidFill>
               </a14:hiddenFill>
             </a:ext>
-            <a:ext uri="{91240B29-F687-4f45-9708-019B960494DF}">
+            <a:ext uri="{91240B29-F687-4F45-9708-019B960494DF}">
               <a14:hiddenLine xmlns:a14="http://schemas.microsoft.com/office/drawing/2010/main" w="9525" cap="flat">
                 <a:solidFill>
                   <a:srgbClr val="808080"/>
@@ -1448,7 +1448,7 @@
                 <a:tailEnd/>
               </a14:hiddenLine>
             </a:ext>
-            <a:ext uri="{AF507438-7753-43e0-B8FC-AC1667EBCBE1}">
+            <a:ext uri="{AF507438-7753-43E0-B8FC-AC1667EBCBE1}">
               <a14:hiddenEffects xmlns:a14="http://schemas.microsoft.com/office/drawing/2010/main">
                 <a:effectLst>
                   <a:outerShdw dist="35921" dir="2700000" algn="ctr" rotWithShape="0">
@@ -1556,7 +1556,7 @@
             <a:tailEnd/>
           </a:ln>
           <a:extLst>
-            <a:ext uri="{AF507438-7753-43e0-B8FC-AC1667EBCBE1}">
+            <a:ext uri="{AF507438-7753-43E0-B8FC-AC1667EBCBE1}">
               <a14:hiddenEffects xmlns:a14="http://schemas.microsoft.com/office/drawing/2010/main">
                 <a:effectLst>
                   <a:outerShdw dist="35921" dir="2700000" algn="ctr" rotWithShape="0">
@@ -1589,14 +1589,14 @@
           <a:noFill/>
           <a:ln/>
           <a:extLst>
-            <a:ext uri="{909E8E84-426E-40dd-AFC4-6F175D3DCCD1}">
+            <a:ext uri="{909E8E84-426E-40DD-AFC4-6F175D3DCCD1}">
               <a14:hiddenFill xmlns:a14="http://schemas.microsoft.com/office/drawing/2010/main">
                 <a:solidFill>
                   <a:srgbClr val="FFFFFF"/>
                 </a:solidFill>
               </a14:hiddenFill>
             </a:ext>
-            <a:ext uri="{91240B29-F687-4f45-9708-019B960494DF}">
+            <a:ext uri="{91240B29-F687-4F45-9708-019B960494DF}">
               <a14:hiddenLine xmlns:a14="http://schemas.microsoft.com/office/drawing/2010/main" w="9525" cap="flat">
                 <a:solidFill>
                   <a:srgbClr val="808080"/>
@@ -1606,7 +1606,7 @@
                 <a:tailEnd/>
               </a14:hiddenLine>
             </a:ext>
-            <a:ext uri="{AF507438-7753-43e0-B8FC-AC1667EBCBE1}">
+            <a:ext uri="{AF507438-7753-43E0-B8FC-AC1667EBCBE1}">
               <a14:hiddenEffects xmlns:a14="http://schemas.microsoft.com/office/drawing/2010/main">
                 <a:effectLst>
                   <a:outerShdw dist="35921" dir="2700000" algn="ctr" rotWithShape="0">
@@ -1714,7 +1714,7 @@
             <a:tailEnd/>
           </a:ln>
           <a:extLst>
-            <a:ext uri="{AF507438-7753-43e0-B8FC-AC1667EBCBE1}">
+            <a:ext uri="{AF507438-7753-43E0-B8FC-AC1667EBCBE1}">
               <a14:hiddenEffects xmlns:a14="http://schemas.microsoft.com/office/drawing/2010/main">
                 <a:effectLst>
                   <a:outerShdw dist="35921" dir="2700000" algn="ctr" rotWithShape="0">
@@ -1747,14 +1747,14 @@
           <a:noFill/>
           <a:ln/>
           <a:extLst>
-            <a:ext uri="{909E8E84-426E-40dd-AFC4-6F175D3DCCD1}">
+            <a:ext uri="{909E8E84-426E-40DD-AFC4-6F175D3DCCD1}">
               <a14:hiddenFill xmlns:a14="http://schemas.microsoft.com/office/drawing/2010/main">
                 <a:solidFill>
                   <a:srgbClr val="FFFFFF"/>
                 </a:solidFill>
               </a14:hiddenFill>
             </a:ext>
-            <a:ext uri="{91240B29-F687-4f45-9708-019B960494DF}">
+            <a:ext uri="{91240B29-F687-4F45-9708-019B960494DF}">
               <a14:hiddenLine xmlns:a14="http://schemas.microsoft.com/office/drawing/2010/main" w="9525" cap="flat">
                 <a:solidFill>
                   <a:srgbClr val="808080"/>
@@ -1764,7 +1764,7 @@
                 <a:tailEnd/>
               </a14:hiddenLine>
             </a:ext>
-            <a:ext uri="{AF507438-7753-43e0-B8FC-AC1667EBCBE1}">
+            <a:ext uri="{AF507438-7753-43E0-B8FC-AC1667EBCBE1}">
               <a14:hiddenEffects xmlns:a14="http://schemas.microsoft.com/office/drawing/2010/main">
                 <a:effectLst>
                   <a:outerShdw dist="35921" dir="2700000" algn="ctr" rotWithShape="0">
@@ -1872,7 +1872,7 @@
             <a:tailEnd/>
           </a:ln>
           <a:extLst>
-            <a:ext uri="{AF507438-7753-43e0-B8FC-AC1667EBCBE1}">
+            <a:ext uri="{AF507438-7753-43E0-B8FC-AC1667EBCBE1}">
               <a14:hiddenEffects xmlns:a14="http://schemas.microsoft.com/office/drawing/2010/main">
                 <a:effectLst>
                   <a:outerShdw dist="35921" dir="2700000" algn="ctr" rotWithShape="0">
@@ -1905,14 +1905,14 @@
           <a:noFill/>
           <a:ln/>
           <a:extLst>
-            <a:ext uri="{909E8E84-426E-40dd-AFC4-6F175D3DCCD1}">
+            <a:ext uri="{909E8E84-426E-40DD-AFC4-6F175D3DCCD1}">
               <a14:hiddenFill xmlns:a14="http://schemas.microsoft.com/office/drawing/2010/main">
                 <a:solidFill>
                   <a:srgbClr val="FFFFFF"/>
                 </a:solidFill>
               </a14:hiddenFill>
             </a:ext>
-            <a:ext uri="{91240B29-F687-4f45-9708-019B960494DF}">
+            <a:ext uri="{91240B29-F687-4F45-9708-019B960494DF}">
               <a14:hiddenLine xmlns:a14="http://schemas.microsoft.com/office/drawing/2010/main" w="9525" cap="flat">
                 <a:solidFill>
                   <a:srgbClr val="808080"/>
@@ -1922,7 +1922,7 @@
                 <a:tailEnd/>
               </a14:hiddenLine>
             </a:ext>
-            <a:ext uri="{AF507438-7753-43e0-B8FC-AC1667EBCBE1}">
+            <a:ext uri="{AF507438-7753-43E0-B8FC-AC1667EBCBE1}">
               <a14:hiddenEffects xmlns:a14="http://schemas.microsoft.com/office/drawing/2010/main">
                 <a:effectLst>
                   <a:outerShdw dist="35921" dir="2700000" algn="ctr" rotWithShape="0">
@@ -2030,7 +2030,7 @@
             <a:tailEnd/>
           </a:ln>
           <a:extLst>
-            <a:ext uri="{AF507438-7753-43e0-B8FC-AC1667EBCBE1}">
+            <a:ext uri="{AF507438-7753-43E0-B8FC-AC1667EBCBE1}">
               <a14:hiddenEffects xmlns:a14="http://schemas.microsoft.com/office/drawing/2010/main">
                 <a:effectLst>
                   <a:outerShdw dist="35921" dir="2700000" algn="ctr" rotWithShape="0">
@@ -2063,14 +2063,14 @@
           <a:noFill/>
           <a:ln/>
           <a:extLst>
-            <a:ext uri="{909E8E84-426E-40dd-AFC4-6F175D3DCCD1}">
+            <a:ext uri="{909E8E84-426E-40DD-AFC4-6F175D3DCCD1}">
               <a14:hiddenFill xmlns:a14="http://schemas.microsoft.com/office/drawing/2010/main">
                 <a:solidFill>
                   <a:srgbClr val="FFFFFF"/>
                 </a:solidFill>
               </a14:hiddenFill>
             </a:ext>
-            <a:ext uri="{91240B29-F687-4f45-9708-019B960494DF}">
+            <a:ext uri="{91240B29-F687-4F45-9708-019B960494DF}">
               <a14:hiddenLine xmlns:a14="http://schemas.microsoft.com/office/drawing/2010/main" w="9525" cap="flat">
                 <a:solidFill>
                   <a:srgbClr val="808080"/>
@@ -2080,7 +2080,7 @@
                 <a:tailEnd/>
               </a14:hiddenLine>
             </a:ext>
-            <a:ext uri="{AF507438-7753-43e0-B8FC-AC1667EBCBE1}">
+            <a:ext uri="{AF507438-7753-43E0-B8FC-AC1667EBCBE1}">
               <a14:hiddenEffects xmlns:a14="http://schemas.microsoft.com/office/drawing/2010/main">
                 <a:effectLst>
                   <a:outerShdw dist="35921" dir="2700000" algn="ctr" rotWithShape="0">
@@ -2188,7 +2188,7 @@
             <a:tailEnd/>
           </a:ln>
           <a:extLst>
-            <a:ext uri="{AF507438-7753-43e0-B8FC-AC1667EBCBE1}">
+            <a:ext uri="{AF507438-7753-43E0-B8FC-AC1667EBCBE1}">
               <a14:hiddenEffects xmlns:a14="http://schemas.microsoft.com/office/drawing/2010/main">
                 <a:effectLst>
                   <a:outerShdw dist="35921" dir="2700000" algn="ctr" rotWithShape="0">
@@ -2221,14 +2221,14 @@
           <a:noFill/>
           <a:ln/>
           <a:extLst>
-            <a:ext uri="{909E8E84-426E-40dd-AFC4-6F175D3DCCD1}">
+            <a:ext uri="{909E8E84-426E-40DD-AFC4-6F175D3DCCD1}">
               <a14:hiddenFill xmlns:a14="http://schemas.microsoft.com/office/drawing/2010/main">
                 <a:solidFill>
                   <a:srgbClr val="FFFFFF"/>
                 </a:solidFill>
               </a14:hiddenFill>
             </a:ext>
-            <a:ext uri="{91240B29-F687-4f45-9708-019B960494DF}">
+            <a:ext uri="{91240B29-F687-4F45-9708-019B960494DF}">
               <a14:hiddenLine xmlns:a14="http://schemas.microsoft.com/office/drawing/2010/main" w="9525" cap="flat">
                 <a:solidFill>
                   <a:srgbClr val="808080"/>
@@ -2238,7 +2238,7 @@
                 <a:tailEnd/>
               </a14:hiddenLine>
             </a:ext>
-            <a:ext uri="{AF507438-7753-43e0-B8FC-AC1667EBCBE1}">
+            <a:ext uri="{AF507438-7753-43E0-B8FC-AC1667EBCBE1}">
               <a14:hiddenEffects xmlns:a14="http://schemas.microsoft.com/office/drawing/2010/main">
                 <a:effectLst>
                   <a:outerShdw dist="35921" dir="2700000" algn="ctr" rotWithShape="0">
@@ -2346,7 +2346,7 @@
             <a:tailEnd/>
           </a:ln>
           <a:extLst>
-            <a:ext uri="{AF507438-7753-43e0-B8FC-AC1667EBCBE1}">
+            <a:ext uri="{AF507438-7753-43E0-B8FC-AC1667EBCBE1}">
               <a14:hiddenEffects xmlns:a14="http://schemas.microsoft.com/office/drawing/2010/main">
                 <a:effectLst>
                   <a:outerShdw dist="35921" dir="2700000" algn="ctr" rotWithShape="0">
@@ -2379,14 +2379,14 @@
           <a:noFill/>
           <a:ln/>
           <a:extLst>
-            <a:ext uri="{909E8E84-426E-40dd-AFC4-6F175D3DCCD1}">
+            <a:ext uri="{909E8E84-426E-40DD-AFC4-6F175D3DCCD1}">
               <a14:hiddenFill xmlns:a14="http://schemas.microsoft.com/office/drawing/2010/main">
                 <a:solidFill>
                   <a:srgbClr val="FFFFFF"/>
                 </a:solidFill>
               </a14:hiddenFill>
             </a:ext>
-            <a:ext uri="{91240B29-F687-4f45-9708-019B960494DF}">
+            <a:ext uri="{91240B29-F687-4F45-9708-019B960494DF}">
               <a14:hiddenLine xmlns:a14="http://schemas.microsoft.com/office/drawing/2010/main" w="9525" cap="flat">
                 <a:solidFill>
                   <a:srgbClr val="808080"/>
@@ -2396,7 +2396,7 @@
                 <a:tailEnd/>
               </a14:hiddenLine>
             </a:ext>
-            <a:ext uri="{AF507438-7753-43e0-B8FC-AC1667EBCBE1}">
+            <a:ext uri="{AF507438-7753-43E0-B8FC-AC1667EBCBE1}">
               <a14:hiddenEffects xmlns:a14="http://schemas.microsoft.com/office/drawing/2010/main">
                 <a:effectLst>
                   <a:outerShdw dist="35921" dir="2700000" algn="ctr" rotWithShape="0">
@@ -2504,7 +2504,7 @@
             <a:tailEnd/>
           </a:ln>
           <a:extLst>
-            <a:ext uri="{AF507438-7753-43e0-B8FC-AC1667EBCBE1}">
+            <a:ext uri="{AF507438-7753-43E0-B8FC-AC1667EBCBE1}">
               <a14:hiddenEffects xmlns:a14="http://schemas.microsoft.com/office/drawing/2010/main">
                 <a:effectLst>
                   <a:outerShdw dist="35921" dir="2700000" algn="ctr" rotWithShape="0">
@@ -2537,14 +2537,14 @@
           <a:noFill/>
           <a:ln/>
           <a:extLst>
-            <a:ext uri="{909E8E84-426E-40dd-AFC4-6F175D3DCCD1}">
+            <a:ext uri="{909E8E84-426E-40DD-AFC4-6F175D3DCCD1}">
               <a14:hiddenFill xmlns:a14="http://schemas.microsoft.com/office/drawing/2010/main">
                 <a:solidFill>
                   <a:srgbClr val="FFFFFF"/>
                 </a:solidFill>
               </a14:hiddenFill>
             </a:ext>
-            <a:ext uri="{91240B29-F687-4f45-9708-019B960494DF}">
+            <a:ext uri="{91240B29-F687-4F45-9708-019B960494DF}">
               <a14:hiddenLine xmlns:a14="http://schemas.microsoft.com/office/drawing/2010/main" w="9525" cap="flat">
                 <a:solidFill>
                   <a:srgbClr val="808080"/>
@@ -2554,7 +2554,7 @@
                 <a:tailEnd/>
               </a14:hiddenLine>
             </a:ext>
-            <a:ext uri="{AF507438-7753-43e0-B8FC-AC1667EBCBE1}">
+            <a:ext uri="{AF507438-7753-43E0-B8FC-AC1667EBCBE1}">
               <a14:hiddenEffects xmlns:a14="http://schemas.microsoft.com/office/drawing/2010/main">
                 <a:effectLst>
                   <a:outerShdw dist="35921" dir="2700000" algn="ctr" rotWithShape="0">
@@ -2662,7 +2662,7 @@
             <a:tailEnd/>
           </a:ln>
           <a:extLst>
-            <a:ext uri="{AF507438-7753-43e0-B8FC-AC1667EBCBE1}">
+            <a:ext uri="{AF507438-7753-43E0-B8FC-AC1667EBCBE1}">
               <a14:hiddenEffects xmlns:a14="http://schemas.microsoft.com/office/drawing/2010/main">
                 <a:effectLst>
                   <a:outerShdw dist="35921" dir="2700000" algn="ctr" rotWithShape="0">
@@ -2695,14 +2695,14 @@
           <a:noFill/>
           <a:ln/>
           <a:extLst>
-            <a:ext uri="{909E8E84-426E-40dd-AFC4-6F175D3DCCD1}">
+            <a:ext uri="{909E8E84-426E-40DD-AFC4-6F175D3DCCD1}">
               <a14:hiddenFill xmlns:a14="http://schemas.microsoft.com/office/drawing/2010/main">
                 <a:solidFill>
                   <a:srgbClr val="FFFFFF"/>
                 </a:solidFill>
               </a14:hiddenFill>
             </a:ext>
-            <a:ext uri="{91240B29-F687-4f45-9708-019B960494DF}">
+            <a:ext uri="{91240B29-F687-4F45-9708-019B960494DF}">
               <a14:hiddenLine xmlns:a14="http://schemas.microsoft.com/office/drawing/2010/main" w="9525" cap="flat">
                 <a:solidFill>
                   <a:srgbClr val="808080"/>
@@ -2712,7 +2712,7 @@
                 <a:tailEnd/>
               </a14:hiddenLine>
             </a:ext>
-            <a:ext uri="{AF507438-7753-43e0-B8FC-AC1667EBCBE1}">
+            <a:ext uri="{AF507438-7753-43E0-B8FC-AC1667EBCBE1}">
               <a14:hiddenEffects xmlns:a14="http://schemas.microsoft.com/office/drawing/2010/main">
                 <a:effectLst>
                   <a:outerShdw dist="35921" dir="2700000" algn="ctr" rotWithShape="0">
@@ -2820,7 +2820,7 @@
             <a:tailEnd/>
           </a:ln>
           <a:extLst>
-            <a:ext uri="{AF507438-7753-43e0-B8FC-AC1667EBCBE1}">
+            <a:ext uri="{AF507438-7753-43E0-B8FC-AC1667EBCBE1}">
               <a14:hiddenEffects xmlns:a14="http://schemas.microsoft.com/office/drawing/2010/main">
                 <a:effectLst>
                   <a:outerShdw dist="35921" dir="2700000" algn="ctr" rotWithShape="0">
@@ -2853,14 +2853,14 @@
           <a:noFill/>
           <a:ln/>
           <a:extLst>
-            <a:ext uri="{909E8E84-426E-40dd-AFC4-6F175D3DCCD1}">
+            <a:ext uri="{909E8E84-426E-40DD-AFC4-6F175D3DCCD1}">
               <a14:hiddenFill xmlns:a14="http://schemas.microsoft.com/office/drawing/2010/main">
                 <a:solidFill>
                   <a:srgbClr val="FFFFFF"/>
                 </a:solidFill>
               </a14:hiddenFill>
             </a:ext>
-            <a:ext uri="{91240B29-F687-4f45-9708-019B960494DF}">
+            <a:ext uri="{91240B29-F687-4F45-9708-019B960494DF}">
               <a14:hiddenLine xmlns:a14="http://schemas.microsoft.com/office/drawing/2010/main" w="9525" cap="flat">
                 <a:solidFill>
                   <a:srgbClr val="808080"/>
@@ -2870,7 +2870,7 @@
                 <a:tailEnd/>
               </a14:hiddenLine>
             </a:ext>
-            <a:ext uri="{AF507438-7753-43e0-B8FC-AC1667EBCBE1}">
+            <a:ext uri="{AF507438-7753-43E0-B8FC-AC1667EBCBE1}">
               <a14:hiddenEffects xmlns:a14="http://schemas.microsoft.com/office/drawing/2010/main">
                 <a:effectLst>
                   <a:outerShdw dist="35921" dir="2700000" algn="ctr" rotWithShape="0">
@@ -2978,7 +2978,7 @@
             <a:tailEnd/>
           </a:ln>
           <a:extLst>
-            <a:ext uri="{AF507438-7753-43e0-B8FC-AC1667EBCBE1}">
+            <a:ext uri="{AF507438-7753-43E0-B8FC-AC1667EBCBE1}">
               <a14:hiddenEffects xmlns:a14="http://schemas.microsoft.com/office/drawing/2010/main">
                 <a:effectLst>
                   <a:outerShdw dist="35921" dir="2700000" algn="ctr" rotWithShape="0">
@@ -3011,14 +3011,14 @@
           <a:noFill/>
           <a:ln/>
           <a:extLst>
-            <a:ext uri="{909E8E84-426E-40dd-AFC4-6F175D3DCCD1}">
+            <a:ext uri="{909E8E84-426E-40DD-AFC4-6F175D3DCCD1}">
               <a14:hiddenFill xmlns:a14="http://schemas.microsoft.com/office/drawing/2010/main">
                 <a:solidFill>
                   <a:srgbClr val="FFFFFF"/>
                 </a:solidFill>
               </a14:hiddenFill>
             </a:ext>
-            <a:ext uri="{91240B29-F687-4f45-9708-019B960494DF}">
+            <a:ext uri="{91240B29-F687-4F45-9708-019B960494DF}">
               <a14:hiddenLine xmlns:a14="http://schemas.microsoft.com/office/drawing/2010/main" w="9525" cap="flat">
                 <a:solidFill>
                   <a:srgbClr val="808080"/>
@@ -3028,7 +3028,7 @@
                 <a:tailEnd/>
               </a14:hiddenLine>
             </a:ext>
-            <a:ext uri="{AF507438-7753-43e0-B8FC-AC1667EBCBE1}">
+            <a:ext uri="{AF507438-7753-43E0-B8FC-AC1667EBCBE1}">
               <a14:hiddenEffects xmlns:a14="http://schemas.microsoft.com/office/drawing/2010/main">
                 <a:effectLst>
                   <a:outerShdw dist="35921" dir="2700000" algn="ctr" rotWithShape="0">
@@ -3136,7 +3136,7 @@
             <a:tailEnd/>
           </a:ln>
           <a:extLst>
-            <a:ext uri="{AF507438-7753-43e0-B8FC-AC1667EBCBE1}">
+            <a:ext uri="{AF507438-7753-43E0-B8FC-AC1667EBCBE1}">
               <a14:hiddenEffects xmlns:a14="http://schemas.microsoft.com/office/drawing/2010/main">
                 <a:effectLst>
                   <a:outerShdw dist="35921" dir="2700000" algn="ctr" rotWithShape="0">
@@ -3169,14 +3169,14 @@
           <a:noFill/>
           <a:ln/>
           <a:extLst>
-            <a:ext uri="{909E8E84-426E-40dd-AFC4-6F175D3DCCD1}">
+            <a:ext uri="{909E8E84-426E-40DD-AFC4-6F175D3DCCD1}">
               <a14:hiddenFill xmlns:a14="http://schemas.microsoft.com/office/drawing/2010/main">
                 <a:solidFill>
                   <a:srgbClr val="FFFFFF"/>
                 </a:solidFill>
               </a14:hiddenFill>
             </a:ext>
-            <a:ext uri="{91240B29-F687-4f45-9708-019B960494DF}">
+            <a:ext uri="{91240B29-F687-4F45-9708-019B960494DF}">
               <a14:hiddenLine xmlns:a14="http://schemas.microsoft.com/office/drawing/2010/main" w="9525" cap="flat">
                 <a:solidFill>
                   <a:srgbClr val="808080"/>
@@ -3186,7 +3186,7 @@
                 <a:tailEnd/>
               </a14:hiddenLine>
             </a:ext>
-            <a:ext uri="{AF507438-7753-43e0-B8FC-AC1667EBCBE1}">
+            <a:ext uri="{AF507438-7753-43E0-B8FC-AC1667EBCBE1}">
               <a14:hiddenEffects xmlns:a14="http://schemas.microsoft.com/office/drawing/2010/main">
                 <a:effectLst>
                   <a:outerShdw dist="35921" dir="2700000" algn="ctr" rotWithShape="0">
@@ -3235,14 +3235,14 @@
           </a:ln>
           <a:effectLst/>
           <a:extLst>
-            <a:ext uri="{909E8E84-426E-40dd-AFC4-6F175D3DCCD1}">
+            <a:ext uri="{909E8E84-426E-40DD-AFC4-6F175D3DCCD1}">
               <a14:hiddenFill xmlns:a14="http://schemas.microsoft.com/office/drawing/2010/main">
                 <a:solidFill>
                   <a:srgbClr val="FFFFFF"/>
                 </a:solidFill>
               </a14:hiddenFill>
             </a:ext>
-            <a:ext uri="{91240B29-F687-4f45-9708-019B960494DF}">
+            <a:ext uri="{91240B29-F687-4F45-9708-019B960494DF}">
               <a14:hiddenLine xmlns:a14="http://schemas.microsoft.com/office/drawing/2010/main" w="9525" cap="flat">
                 <a:solidFill>
                   <a:srgbClr val="808080"/>
@@ -3252,7 +3252,7 @@
                 <a:tailEnd/>
               </a14:hiddenLine>
             </a:ext>
-            <a:ext uri="{AF507438-7753-43e0-B8FC-AC1667EBCBE1}">
+            <a:ext uri="{AF507438-7753-43E0-B8FC-AC1667EBCBE1}">
               <a14:hiddenEffects xmlns:a14="http://schemas.microsoft.com/office/drawing/2010/main">
                 <a:effectLst>
                   <a:outerShdw dist="35921" dir="2700000" algn="ctr" rotWithShape="0">
@@ -3384,7 +3384,7 @@
             <a:tailEnd/>
           </a:ln>
           <a:extLst>
-            <a:ext uri="{AF507438-7753-43e0-B8FC-AC1667EBCBE1}">
+            <a:ext uri="{AF507438-7753-43E0-B8FC-AC1667EBCBE1}">
               <a14:hiddenEffects xmlns:a14="http://schemas.microsoft.com/office/drawing/2010/main">
                 <a:effectLst>
                   <a:outerShdw dist="35921" dir="2700000" algn="ctr" rotWithShape="0">
@@ -3417,14 +3417,14 @@
           <a:noFill/>
           <a:ln/>
           <a:extLst>
-            <a:ext uri="{909E8E84-426E-40dd-AFC4-6F175D3DCCD1}">
+            <a:ext uri="{909E8E84-426E-40DD-AFC4-6F175D3DCCD1}">
               <a14:hiddenFill xmlns:a14="http://schemas.microsoft.com/office/drawing/2010/main">
                 <a:solidFill>
                   <a:srgbClr val="FFFFFF"/>
                 </a:solidFill>
               </a14:hiddenFill>
             </a:ext>
-            <a:ext uri="{91240B29-F687-4f45-9708-019B960494DF}">
+            <a:ext uri="{91240B29-F687-4F45-9708-019B960494DF}">
               <a14:hiddenLine xmlns:a14="http://schemas.microsoft.com/office/drawing/2010/main" w="9525" cap="flat">
                 <a:solidFill>
                   <a:srgbClr val="808080"/>
@@ -3434,7 +3434,7 @@
                 <a:tailEnd/>
               </a14:hiddenLine>
             </a:ext>
-            <a:ext uri="{AF507438-7753-43e0-B8FC-AC1667EBCBE1}">
+            <a:ext uri="{AF507438-7753-43E0-B8FC-AC1667EBCBE1}">
               <a14:hiddenEffects xmlns:a14="http://schemas.microsoft.com/office/drawing/2010/main">
                 <a:effectLst>
                   <a:outerShdw dist="35921" dir="2700000" algn="ctr" rotWithShape="0">
@@ -3542,7 +3542,7 @@
             <a:tailEnd/>
           </a:ln>
           <a:extLst>
-            <a:ext uri="{AF507438-7753-43e0-B8FC-AC1667EBCBE1}">
+            <a:ext uri="{AF507438-7753-43E0-B8FC-AC1667EBCBE1}">
               <a14:hiddenEffects xmlns:a14="http://schemas.microsoft.com/office/drawing/2010/main">
                 <a:effectLst>
                   <a:outerShdw dist="35921" dir="2700000" algn="ctr" rotWithShape="0">
@@ -3575,14 +3575,14 @@
           <a:noFill/>
           <a:ln/>
           <a:extLst>
-            <a:ext uri="{909E8E84-426E-40dd-AFC4-6F175D3DCCD1}">
+            <a:ext uri="{909E8E84-426E-40DD-AFC4-6F175D3DCCD1}">
               <a14:hiddenFill xmlns:a14="http://schemas.microsoft.com/office/drawing/2010/main">
                 <a:solidFill>
                   <a:srgbClr val="FFFFFF"/>
                 </a:solidFill>
               </a14:hiddenFill>
             </a:ext>
-            <a:ext uri="{91240B29-F687-4f45-9708-019B960494DF}">
+            <a:ext uri="{91240B29-F687-4F45-9708-019B960494DF}">
               <a14:hiddenLine xmlns:a14="http://schemas.microsoft.com/office/drawing/2010/main" w="9525" cap="flat">
                 <a:solidFill>
                   <a:srgbClr val="808080"/>
@@ -3592,7 +3592,7 @@
                 <a:tailEnd/>
               </a14:hiddenLine>
             </a:ext>
-            <a:ext uri="{AF507438-7753-43e0-B8FC-AC1667EBCBE1}">
+            <a:ext uri="{AF507438-7753-43E0-B8FC-AC1667EBCBE1}">
               <a14:hiddenEffects xmlns:a14="http://schemas.microsoft.com/office/drawing/2010/main">
                 <a:effectLst>
                   <a:outerShdw dist="35921" dir="2700000" algn="ctr" rotWithShape="0">
@@ -3700,7 +3700,7 @@
             <a:tailEnd/>
           </a:ln>
           <a:extLst>
-            <a:ext uri="{AF507438-7753-43e0-B8FC-AC1667EBCBE1}">
+            <a:ext uri="{AF507438-7753-43E0-B8FC-AC1667EBCBE1}">
               <a14:hiddenEffects xmlns:a14="http://schemas.microsoft.com/office/drawing/2010/main">
                 <a:effectLst>
                   <a:outerShdw dist="35921" dir="2700000" algn="ctr" rotWithShape="0">
@@ -3733,14 +3733,14 @@
           <a:noFill/>
           <a:ln/>
           <a:extLst>
-            <a:ext uri="{909E8E84-426E-40dd-AFC4-6F175D3DCCD1}">
+            <a:ext uri="{909E8E84-426E-40DD-AFC4-6F175D3DCCD1}">
               <a14:hiddenFill xmlns:a14="http://schemas.microsoft.com/office/drawing/2010/main">
                 <a:solidFill>
                   <a:srgbClr val="FFFFFF"/>
                 </a:solidFill>
               </a14:hiddenFill>
             </a:ext>
-            <a:ext uri="{91240B29-F687-4f45-9708-019B960494DF}">
+            <a:ext uri="{91240B29-F687-4F45-9708-019B960494DF}">
               <a14:hiddenLine xmlns:a14="http://schemas.microsoft.com/office/drawing/2010/main" w="9525" cap="flat">
                 <a:solidFill>
                   <a:srgbClr val="808080"/>
@@ -3750,7 +3750,7 @@
                 <a:tailEnd/>
               </a14:hiddenLine>
             </a:ext>
-            <a:ext uri="{AF507438-7753-43e0-B8FC-AC1667EBCBE1}">
+            <a:ext uri="{AF507438-7753-43E0-B8FC-AC1667EBCBE1}">
               <a14:hiddenEffects xmlns:a14="http://schemas.microsoft.com/office/drawing/2010/main">
                 <a:effectLst>
                   <a:outerShdw dist="35921" dir="2700000" algn="ctr" rotWithShape="0">
@@ -3858,7 +3858,7 @@
             <a:tailEnd/>
           </a:ln>
           <a:extLst>
-            <a:ext uri="{AF507438-7753-43e0-B8FC-AC1667EBCBE1}">
+            <a:ext uri="{AF507438-7753-43E0-B8FC-AC1667EBCBE1}">
               <a14:hiddenEffects xmlns:a14="http://schemas.microsoft.com/office/drawing/2010/main">
                 <a:effectLst>
                   <a:outerShdw dist="35921" dir="2700000" algn="ctr" rotWithShape="0">
@@ -3891,14 +3891,14 @@
           <a:noFill/>
           <a:ln/>
           <a:extLst>
-            <a:ext uri="{909E8E84-426E-40dd-AFC4-6F175D3DCCD1}">
+            <a:ext uri="{909E8E84-426E-40DD-AFC4-6F175D3DCCD1}">
               <a14:hiddenFill xmlns:a14="http://schemas.microsoft.com/office/drawing/2010/main">
                 <a:solidFill>
                   <a:srgbClr val="FFFFFF"/>
                 </a:solidFill>
               </a14:hiddenFill>
             </a:ext>
-            <a:ext uri="{91240B29-F687-4f45-9708-019B960494DF}">
+            <a:ext uri="{91240B29-F687-4F45-9708-019B960494DF}">
               <a14:hiddenLine xmlns:a14="http://schemas.microsoft.com/office/drawing/2010/main" w="9525" cap="flat">
                 <a:solidFill>
                   <a:srgbClr val="808080"/>
@@ -3908,7 +3908,7 @@
                 <a:tailEnd/>
               </a14:hiddenLine>
             </a:ext>
-            <a:ext uri="{AF507438-7753-43e0-B8FC-AC1667EBCBE1}">
+            <a:ext uri="{AF507438-7753-43E0-B8FC-AC1667EBCBE1}">
               <a14:hiddenEffects xmlns:a14="http://schemas.microsoft.com/office/drawing/2010/main">
                 <a:effectLst>
                   <a:outerShdw dist="35921" dir="2700000" algn="ctr" rotWithShape="0">
@@ -4016,7 +4016,7 @@
             <a:tailEnd/>
           </a:ln>
           <a:extLst>
-            <a:ext uri="{AF507438-7753-43e0-B8FC-AC1667EBCBE1}">
+            <a:ext uri="{AF507438-7753-43E0-B8FC-AC1667EBCBE1}">
               <a14:hiddenEffects xmlns:a14="http://schemas.microsoft.com/office/drawing/2010/main">
                 <a:effectLst>
                   <a:outerShdw dist="35921" dir="2700000" algn="ctr" rotWithShape="0">
@@ -4049,14 +4049,14 @@
           <a:noFill/>
           <a:ln/>
           <a:extLst>
-            <a:ext uri="{909E8E84-426E-40dd-AFC4-6F175D3DCCD1}">
+            <a:ext uri="{909E8E84-426E-40DD-AFC4-6F175D3DCCD1}">
               <a14:hiddenFill xmlns:a14="http://schemas.microsoft.com/office/drawing/2010/main">
                 <a:solidFill>
                   <a:srgbClr val="FFFFFF"/>
                 </a:solidFill>
               </a14:hiddenFill>
             </a:ext>
-            <a:ext uri="{91240B29-F687-4f45-9708-019B960494DF}">
+            <a:ext uri="{91240B29-F687-4F45-9708-019B960494DF}">
               <a14:hiddenLine xmlns:a14="http://schemas.microsoft.com/office/drawing/2010/main" w="9525" cap="flat">
                 <a:solidFill>
                   <a:srgbClr val="808080"/>
@@ -4066,7 +4066,7 @@
                 <a:tailEnd/>
               </a14:hiddenLine>
             </a:ext>
-            <a:ext uri="{AF507438-7753-43e0-B8FC-AC1667EBCBE1}">
+            <a:ext uri="{AF507438-7753-43E0-B8FC-AC1667EBCBE1}">
               <a14:hiddenEffects xmlns:a14="http://schemas.microsoft.com/office/drawing/2010/main">
                 <a:effectLst>
                   <a:outerShdw dist="35921" dir="2700000" algn="ctr" rotWithShape="0">
@@ -4174,7 +4174,7 @@
             <a:tailEnd/>
           </a:ln>
           <a:extLst>
-            <a:ext uri="{AF507438-7753-43e0-B8FC-AC1667EBCBE1}">
+            <a:ext uri="{AF507438-7753-43E0-B8FC-AC1667EBCBE1}">
               <a14:hiddenEffects xmlns:a14="http://schemas.microsoft.com/office/drawing/2010/main">
                 <a:effectLst>
                   <a:outerShdw dist="35921" dir="2700000" algn="ctr" rotWithShape="0">
@@ -4207,14 +4207,14 @@
           <a:noFill/>
           <a:ln/>
           <a:extLst>
-            <a:ext uri="{909E8E84-426E-40dd-AFC4-6F175D3DCCD1}">
+            <a:ext uri="{909E8E84-426E-40DD-AFC4-6F175D3DCCD1}">
               <a14:hiddenFill xmlns:a14="http://schemas.microsoft.com/office/drawing/2010/main">
                 <a:solidFill>
                   <a:srgbClr val="FFFFFF"/>
                 </a:solidFill>
               </a14:hiddenFill>
             </a:ext>
-            <a:ext uri="{91240B29-F687-4f45-9708-019B960494DF}">
+            <a:ext uri="{91240B29-F687-4F45-9708-019B960494DF}">
               <a14:hiddenLine xmlns:a14="http://schemas.microsoft.com/office/drawing/2010/main" w="9525" cap="flat">
                 <a:solidFill>
                   <a:srgbClr val="808080"/>
@@ -4224,7 +4224,7 @@
                 <a:tailEnd/>
               </a14:hiddenLine>
             </a:ext>
-            <a:ext uri="{AF507438-7753-43e0-B8FC-AC1667EBCBE1}">
+            <a:ext uri="{AF507438-7753-43E0-B8FC-AC1667EBCBE1}">
               <a14:hiddenEffects xmlns:a14="http://schemas.microsoft.com/office/drawing/2010/main">
                 <a:effectLst>
                   <a:outerShdw dist="35921" dir="2700000" algn="ctr" rotWithShape="0">
@@ -4332,7 +4332,7 @@
             <a:tailEnd/>
           </a:ln>
           <a:extLst>
-            <a:ext uri="{AF507438-7753-43e0-B8FC-AC1667EBCBE1}">
+            <a:ext uri="{AF507438-7753-43E0-B8FC-AC1667EBCBE1}">
               <a14:hiddenEffects xmlns:a14="http://schemas.microsoft.com/office/drawing/2010/main">
                 <a:effectLst>
                   <a:outerShdw dist="35921" dir="2700000" algn="ctr" rotWithShape="0">
@@ -4365,14 +4365,14 @@
           <a:noFill/>
           <a:ln/>
           <a:extLst>
-            <a:ext uri="{909E8E84-426E-40dd-AFC4-6F175D3DCCD1}">
+            <a:ext uri="{909E8E84-426E-40DD-AFC4-6F175D3DCCD1}">
               <a14:hiddenFill xmlns:a14="http://schemas.microsoft.com/office/drawing/2010/main">
                 <a:solidFill>
                   <a:srgbClr val="FFFFFF"/>
                 </a:solidFill>
               </a14:hiddenFill>
             </a:ext>
-            <a:ext uri="{91240B29-F687-4f45-9708-019B960494DF}">
+            <a:ext uri="{91240B29-F687-4F45-9708-019B960494DF}">
               <a14:hiddenLine xmlns:a14="http://schemas.microsoft.com/office/drawing/2010/main" w="9525" cap="flat">
                 <a:solidFill>
                   <a:srgbClr val="808080"/>
@@ -4382,7 +4382,7 @@
                 <a:tailEnd/>
               </a14:hiddenLine>
             </a:ext>
-            <a:ext uri="{AF507438-7753-43e0-B8FC-AC1667EBCBE1}">
+            <a:ext uri="{AF507438-7753-43E0-B8FC-AC1667EBCBE1}">
               <a14:hiddenEffects xmlns:a14="http://schemas.microsoft.com/office/drawing/2010/main">
                 <a:effectLst>
                   <a:outerShdw dist="35921" dir="2700000" algn="ctr" rotWithShape="0">
@@ -4490,7 +4490,7 @@
             <a:tailEnd/>
           </a:ln>
           <a:extLst>
-            <a:ext uri="{AF507438-7753-43e0-B8FC-AC1667EBCBE1}">
+            <a:ext uri="{AF507438-7753-43E0-B8FC-AC1667EBCBE1}">
               <a14:hiddenEffects xmlns:a14="http://schemas.microsoft.com/office/drawing/2010/main">
                 <a:effectLst>
                   <a:outerShdw dist="35921" dir="2700000" algn="ctr" rotWithShape="0">
@@ -4523,14 +4523,14 @@
           <a:noFill/>
           <a:ln/>
           <a:extLst>
-            <a:ext uri="{909E8E84-426E-40dd-AFC4-6F175D3DCCD1}">
+            <a:ext uri="{909E8E84-426E-40DD-AFC4-6F175D3DCCD1}">
               <a14:hiddenFill xmlns:a14="http://schemas.microsoft.com/office/drawing/2010/main">
                 <a:solidFill>
                   <a:srgbClr val="FFFFFF"/>
                 </a:solidFill>
               </a14:hiddenFill>
             </a:ext>
-            <a:ext uri="{91240B29-F687-4f45-9708-019B960494DF}">
+            <a:ext uri="{91240B29-F687-4F45-9708-019B960494DF}">
               <a14:hiddenLine xmlns:a14="http://schemas.microsoft.com/office/drawing/2010/main" w="9525" cap="flat">
                 <a:solidFill>
                   <a:srgbClr val="808080"/>
@@ -4540,7 +4540,7 @@
                 <a:tailEnd/>
               </a14:hiddenLine>
             </a:ext>
-            <a:ext uri="{AF507438-7753-43e0-B8FC-AC1667EBCBE1}">
+            <a:ext uri="{AF507438-7753-43E0-B8FC-AC1667EBCBE1}">
               <a14:hiddenEffects xmlns:a14="http://schemas.microsoft.com/office/drawing/2010/main">
                 <a:effectLst>
                   <a:outerShdw dist="35921" dir="2700000" algn="ctr" rotWithShape="0">
@@ -4648,7 +4648,7 @@
             <a:tailEnd/>
           </a:ln>
           <a:extLst>
-            <a:ext uri="{AF507438-7753-43e0-B8FC-AC1667EBCBE1}">
+            <a:ext uri="{AF507438-7753-43E0-B8FC-AC1667EBCBE1}">
               <a14:hiddenEffects xmlns:a14="http://schemas.microsoft.com/office/drawing/2010/main">
                 <a:effectLst>
                   <a:outerShdw dist="35921" dir="2700000" algn="ctr" rotWithShape="0">
@@ -4681,14 +4681,14 @@
           <a:noFill/>
           <a:ln/>
           <a:extLst>
-            <a:ext uri="{909E8E84-426E-40dd-AFC4-6F175D3DCCD1}">
+            <a:ext uri="{909E8E84-426E-40DD-AFC4-6F175D3DCCD1}">
               <a14:hiddenFill xmlns:a14="http://schemas.microsoft.com/office/drawing/2010/main">
                 <a:solidFill>
                   <a:srgbClr val="FFFFFF"/>
                 </a:solidFill>
               </a14:hiddenFill>
             </a:ext>
-            <a:ext uri="{91240B29-F687-4f45-9708-019B960494DF}">
+            <a:ext uri="{91240B29-F687-4F45-9708-019B960494DF}">
               <a14:hiddenLine xmlns:a14="http://schemas.microsoft.com/office/drawing/2010/main" w="9525" cap="flat">
                 <a:solidFill>
                   <a:srgbClr val="808080"/>
@@ -4698,7 +4698,7 @@
                 <a:tailEnd/>
               </a14:hiddenLine>
             </a:ext>
-            <a:ext uri="{AF507438-7753-43e0-B8FC-AC1667EBCBE1}">
+            <a:ext uri="{AF507438-7753-43E0-B8FC-AC1667EBCBE1}">
               <a14:hiddenEffects xmlns:a14="http://schemas.microsoft.com/office/drawing/2010/main">
                 <a:effectLst>
                   <a:outerShdw dist="35921" dir="2700000" algn="ctr" rotWithShape="0">
@@ -4806,7 +4806,7 @@
             <a:tailEnd/>
           </a:ln>
           <a:extLst>
-            <a:ext uri="{AF507438-7753-43e0-B8FC-AC1667EBCBE1}">
+            <a:ext uri="{AF507438-7753-43E0-B8FC-AC1667EBCBE1}">
               <a14:hiddenEffects xmlns:a14="http://schemas.microsoft.com/office/drawing/2010/main">
                 <a:effectLst>
                   <a:outerShdw dist="35921" dir="2700000" algn="ctr" rotWithShape="0">
@@ -4839,14 +4839,14 @@
           <a:noFill/>
           <a:ln/>
           <a:extLst>
-            <a:ext uri="{909E8E84-426E-40dd-AFC4-6F175D3DCCD1}">
+            <a:ext uri="{909E8E84-426E-40DD-AFC4-6F175D3DCCD1}">
               <a14:hiddenFill xmlns:a14="http://schemas.microsoft.com/office/drawing/2010/main">
                 <a:solidFill>
                   <a:srgbClr val="FFFFFF"/>
                 </a:solidFill>
               </a14:hiddenFill>
             </a:ext>
-            <a:ext uri="{91240B29-F687-4f45-9708-019B960494DF}">
+            <a:ext uri="{91240B29-F687-4F45-9708-019B960494DF}">
               <a14:hiddenLine xmlns:a14="http://schemas.microsoft.com/office/drawing/2010/main" w="9525" cap="flat">
                 <a:solidFill>
                   <a:srgbClr val="808080"/>
@@ -4856,7 +4856,7 @@
                 <a:tailEnd/>
               </a14:hiddenLine>
             </a:ext>
-            <a:ext uri="{AF507438-7753-43e0-B8FC-AC1667EBCBE1}">
+            <a:ext uri="{AF507438-7753-43E0-B8FC-AC1667EBCBE1}">
               <a14:hiddenEffects xmlns:a14="http://schemas.microsoft.com/office/drawing/2010/main">
                 <a:effectLst>
                   <a:outerShdw dist="35921" dir="2700000" algn="ctr" rotWithShape="0">
@@ -4964,7 +4964,7 @@
             <a:tailEnd/>
           </a:ln>
           <a:extLst>
-            <a:ext uri="{AF507438-7753-43e0-B8FC-AC1667EBCBE1}">
+            <a:ext uri="{AF507438-7753-43E0-B8FC-AC1667EBCBE1}">
               <a14:hiddenEffects xmlns:a14="http://schemas.microsoft.com/office/drawing/2010/main">
                 <a:effectLst>
                   <a:outerShdw dist="35921" dir="2700000" algn="ctr" rotWithShape="0">
@@ -4997,14 +4997,14 @@
           <a:noFill/>
           <a:ln/>
           <a:extLst>
-            <a:ext uri="{909E8E84-426E-40dd-AFC4-6F175D3DCCD1}">
+            <a:ext uri="{909E8E84-426E-40DD-AFC4-6F175D3DCCD1}">
               <a14:hiddenFill xmlns:a14="http://schemas.microsoft.com/office/drawing/2010/main">
                 <a:solidFill>
                   <a:srgbClr val="FFFFFF"/>
                 </a:solidFill>
               </a14:hiddenFill>
             </a:ext>
-            <a:ext uri="{91240B29-F687-4f45-9708-019B960494DF}">
+            <a:ext uri="{91240B29-F687-4F45-9708-019B960494DF}">
               <a14:hiddenLine xmlns:a14="http://schemas.microsoft.com/office/drawing/2010/main" w="9525" cap="flat">
                 <a:solidFill>
                   <a:srgbClr val="808080"/>
@@ -5014,7 +5014,7 @@
                 <a:tailEnd/>
               </a14:hiddenLine>
             </a:ext>
-            <a:ext uri="{AF507438-7753-43e0-B8FC-AC1667EBCBE1}">
+            <a:ext uri="{AF507438-7753-43E0-B8FC-AC1667EBCBE1}">
               <a14:hiddenEffects xmlns:a14="http://schemas.microsoft.com/office/drawing/2010/main">
                 <a:effectLst>
                   <a:outerShdw dist="35921" dir="2700000" algn="ctr" rotWithShape="0">
@@ -5122,7 +5122,7 @@
             <a:tailEnd/>
           </a:ln>
           <a:extLst>
-            <a:ext uri="{AF507438-7753-43e0-B8FC-AC1667EBCBE1}">
+            <a:ext uri="{AF507438-7753-43E0-B8FC-AC1667EBCBE1}">
               <a14:hiddenEffects xmlns:a14="http://schemas.microsoft.com/office/drawing/2010/main">
                 <a:effectLst>
                   <a:outerShdw dist="35921" dir="2700000" algn="ctr" rotWithShape="0">
@@ -5155,14 +5155,14 @@
           <a:noFill/>
           <a:ln/>
           <a:extLst>
-            <a:ext uri="{909E8E84-426E-40dd-AFC4-6F175D3DCCD1}">
+            <a:ext uri="{909E8E84-426E-40DD-AFC4-6F175D3DCCD1}">
               <a14:hiddenFill xmlns:a14="http://schemas.microsoft.com/office/drawing/2010/main">
                 <a:solidFill>
                   <a:srgbClr val="FFFFFF"/>
                 </a:solidFill>
               </a14:hiddenFill>
             </a:ext>
-            <a:ext uri="{91240B29-F687-4f45-9708-019B960494DF}">
+            <a:ext uri="{91240B29-F687-4F45-9708-019B960494DF}">
               <a14:hiddenLine xmlns:a14="http://schemas.microsoft.com/office/drawing/2010/main" w="9525" cap="flat">
                 <a:solidFill>
                   <a:srgbClr val="808080"/>
@@ -5172,7 +5172,7 @@
                 <a:tailEnd/>
               </a14:hiddenLine>
             </a:ext>
-            <a:ext uri="{AF507438-7753-43e0-B8FC-AC1667EBCBE1}">
+            <a:ext uri="{AF507438-7753-43E0-B8FC-AC1667EBCBE1}">
               <a14:hiddenEffects xmlns:a14="http://schemas.microsoft.com/office/drawing/2010/main">
                 <a:effectLst>
                   <a:outerShdw dist="35921" dir="2700000" algn="ctr" rotWithShape="0">
@@ -5280,7 +5280,7 @@
             <a:tailEnd/>
           </a:ln>
           <a:extLst>
-            <a:ext uri="{AF507438-7753-43e0-B8FC-AC1667EBCBE1}">
+            <a:ext uri="{AF507438-7753-43E0-B8FC-AC1667EBCBE1}">
               <a14:hiddenEffects xmlns:a14="http://schemas.microsoft.com/office/drawing/2010/main">
                 <a:effectLst>
                   <a:outerShdw dist="35921" dir="2700000" algn="ctr" rotWithShape="0">
@@ -5313,14 +5313,14 @@
           <a:noFill/>
           <a:ln/>
           <a:extLst>
-            <a:ext uri="{909E8E84-426E-40dd-AFC4-6F175D3DCCD1}">
+            <a:ext uri="{909E8E84-426E-40DD-AFC4-6F175D3DCCD1}">
               <a14:hiddenFill xmlns:a14="http://schemas.microsoft.com/office/drawing/2010/main">
                 <a:solidFill>
                   <a:srgbClr val="FFFFFF"/>
                 </a:solidFill>
               </a14:hiddenFill>
             </a:ext>
-            <a:ext uri="{91240B29-F687-4f45-9708-019B960494DF}">
+            <a:ext uri="{91240B29-F687-4F45-9708-019B960494DF}">
               <a14:hiddenLine xmlns:a14="http://schemas.microsoft.com/office/drawing/2010/main" w="9525" cap="flat">
                 <a:solidFill>
                   <a:srgbClr val="808080"/>
@@ -5330,7 +5330,7 @@
                 <a:tailEnd/>
               </a14:hiddenLine>
             </a:ext>
-            <a:ext uri="{AF507438-7753-43e0-B8FC-AC1667EBCBE1}">
+            <a:ext uri="{AF507438-7753-43E0-B8FC-AC1667EBCBE1}">
               <a14:hiddenEffects xmlns:a14="http://schemas.microsoft.com/office/drawing/2010/main">
                 <a:effectLst>
                   <a:outerShdw dist="35921" dir="2700000" algn="ctr" rotWithShape="0">
@@ -5438,7 +5438,7 @@
             <a:tailEnd/>
           </a:ln>
           <a:extLst>
-            <a:ext uri="{AF507438-7753-43e0-B8FC-AC1667EBCBE1}">
+            <a:ext uri="{AF507438-7753-43E0-B8FC-AC1667EBCBE1}">
               <a14:hiddenEffects xmlns:a14="http://schemas.microsoft.com/office/drawing/2010/main">
                 <a:effectLst>
                   <a:outerShdw dist="35921" dir="2700000" algn="ctr" rotWithShape="0">
@@ -5471,14 +5471,14 @@
           <a:noFill/>
           <a:ln/>
           <a:extLst>
-            <a:ext uri="{909E8E84-426E-40dd-AFC4-6F175D3DCCD1}">
+            <a:ext uri="{909E8E84-426E-40DD-AFC4-6F175D3DCCD1}">
               <a14:hiddenFill xmlns:a14="http://schemas.microsoft.com/office/drawing/2010/main">
                 <a:solidFill>
                   <a:srgbClr val="FFFFFF"/>
                 </a:solidFill>
               </a14:hiddenFill>
             </a:ext>
-            <a:ext uri="{91240B29-F687-4f45-9708-019B960494DF}">
+            <a:ext uri="{91240B29-F687-4F45-9708-019B960494DF}">
               <a14:hiddenLine xmlns:a14="http://schemas.microsoft.com/office/drawing/2010/main" w="9525" cap="flat">
                 <a:solidFill>
                   <a:srgbClr val="808080"/>
@@ -5488,7 +5488,7 @@
                 <a:tailEnd/>
               </a14:hiddenLine>
             </a:ext>
-            <a:ext uri="{AF507438-7753-43e0-B8FC-AC1667EBCBE1}">
+            <a:ext uri="{AF507438-7753-43E0-B8FC-AC1667EBCBE1}">
               <a14:hiddenEffects xmlns:a14="http://schemas.microsoft.com/office/drawing/2010/main">
                 <a:effectLst>
                   <a:outerShdw dist="35921" dir="2700000" algn="ctr" rotWithShape="0">
@@ -5596,7 +5596,7 @@
             <a:tailEnd/>
           </a:ln>
           <a:extLst>
-            <a:ext uri="{AF507438-7753-43e0-B8FC-AC1667EBCBE1}">
+            <a:ext uri="{AF507438-7753-43E0-B8FC-AC1667EBCBE1}">
               <a14:hiddenEffects xmlns:a14="http://schemas.microsoft.com/office/drawing/2010/main">
                 <a:effectLst>
                   <a:outerShdw dist="35921" dir="2700000" algn="ctr" rotWithShape="0">
@@ -5629,14 +5629,14 @@
           <a:noFill/>
           <a:ln/>
           <a:extLst>
-            <a:ext uri="{909E8E84-426E-40dd-AFC4-6F175D3DCCD1}">
+            <a:ext uri="{909E8E84-426E-40DD-AFC4-6F175D3DCCD1}">
               <a14:hiddenFill xmlns:a14="http://schemas.microsoft.com/office/drawing/2010/main">
                 <a:solidFill>
                   <a:srgbClr val="FFFFFF"/>
                 </a:solidFill>
               </a14:hiddenFill>
             </a:ext>
-            <a:ext uri="{91240B29-F687-4f45-9708-019B960494DF}">
+            <a:ext uri="{91240B29-F687-4F45-9708-019B960494DF}">
               <a14:hiddenLine xmlns:a14="http://schemas.microsoft.com/office/drawing/2010/main" w="9525" cap="flat">
                 <a:solidFill>
                   <a:srgbClr val="808080"/>
@@ -5646,7 +5646,7 @@
                 <a:tailEnd/>
               </a14:hiddenLine>
             </a:ext>
-            <a:ext uri="{AF507438-7753-43e0-B8FC-AC1667EBCBE1}">
+            <a:ext uri="{AF507438-7753-43E0-B8FC-AC1667EBCBE1}">
               <a14:hiddenEffects xmlns:a14="http://schemas.microsoft.com/office/drawing/2010/main">
                 <a:effectLst>
                   <a:outerShdw dist="35921" dir="2700000" algn="ctr" rotWithShape="0">
@@ -5754,7 +5754,7 @@
             <a:tailEnd/>
           </a:ln>
           <a:extLst>
-            <a:ext uri="{AF507438-7753-43e0-B8FC-AC1667EBCBE1}">
+            <a:ext uri="{AF507438-7753-43E0-B8FC-AC1667EBCBE1}">
               <a14:hiddenEffects xmlns:a14="http://schemas.microsoft.com/office/drawing/2010/main">
                 <a:effectLst>
                   <a:outerShdw dist="35921" dir="2700000" algn="ctr" rotWithShape="0">
@@ -5787,14 +5787,14 @@
           <a:noFill/>
           <a:ln/>
           <a:extLst>
-            <a:ext uri="{909E8E84-426E-40dd-AFC4-6F175D3DCCD1}">
+            <a:ext uri="{909E8E84-426E-40DD-AFC4-6F175D3DCCD1}">
               <a14:hiddenFill xmlns:a14="http://schemas.microsoft.com/office/drawing/2010/main">
                 <a:solidFill>
                   <a:srgbClr val="FFFFFF"/>
                 </a:solidFill>
               </a14:hiddenFill>
             </a:ext>
-            <a:ext uri="{91240B29-F687-4f45-9708-019B960494DF}">
+            <a:ext uri="{91240B29-F687-4F45-9708-019B960494DF}">
               <a14:hiddenLine xmlns:a14="http://schemas.microsoft.com/office/drawing/2010/main" w="9525" cap="flat">
                 <a:solidFill>
                   <a:srgbClr val="808080"/>
@@ -5804,7 +5804,7 @@
                 <a:tailEnd/>
               </a14:hiddenLine>
             </a:ext>
-            <a:ext uri="{AF507438-7753-43e0-B8FC-AC1667EBCBE1}">
+            <a:ext uri="{AF507438-7753-43E0-B8FC-AC1667EBCBE1}">
               <a14:hiddenEffects xmlns:a14="http://schemas.microsoft.com/office/drawing/2010/main">
                 <a:effectLst>
                   <a:outerShdw dist="35921" dir="2700000" algn="ctr" rotWithShape="0">
@@ -5912,7 +5912,7 @@
             <a:tailEnd/>
           </a:ln>
           <a:extLst>
-            <a:ext uri="{AF507438-7753-43e0-B8FC-AC1667EBCBE1}">
+            <a:ext uri="{AF507438-7753-43E0-B8FC-AC1667EBCBE1}">
               <a14:hiddenEffects xmlns:a14="http://schemas.microsoft.com/office/drawing/2010/main">
                 <a:effectLst>
                   <a:outerShdw dist="35921" dir="2700000" algn="ctr" rotWithShape="0">
@@ -5945,14 +5945,14 @@
           <a:noFill/>
           <a:ln/>
           <a:extLst>
-            <a:ext uri="{909E8E84-426E-40dd-AFC4-6F175D3DCCD1}">
+            <a:ext uri="{909E8E84-426E-40DD-AFC4-6F175D3DCCD1}">
               <a14:hiddenFill xmlns:a14="http://schemas.microsoft.com/office/drawing/2010/main">
                 <a:solidFill>
                   <a:srgbClr val="FFFFFF"/>
                 </a:solidFill>
               </a14:hiddenFill>
             </a:ext>
-            <a:ext uri="{91240B29-F687-4f45-9708-019B960494DF}">
+            <a:ext uri="{91240B29-F687-4F45-9708-019B960494DF}">
               <a14:hiddenLine xmlns:a14="http://schemas.microsoft.com/office/drawing/2010/main" w="9525" cap="flat">
                 <a:solidFill>
                   <a:srgbClr val="808080"/>
@@ -5962,7 +5962,7 @@
                 <a:tailEnd/>
               </a14:hiddenLine>
             </a:ext>
-            <a:ext uri="{AF507438-7753-43e0-B8FC-AC1667EBCBE1}">
+            <a:ext uri="{AF507438-7753-43E0-B8FC-AC1667EBCBE1}">
               <a14:hiddenEffects xmlns:a14="http://schemas.microsoft.com/office/drawing/2010/main">
                 <a:effectLst>
                   <a:outerShdw dist="35921" dir="2700000" algn="ctr" rotWithShape="0">
@@ -6070,7 +6070,7 @@
             <a:tailEnd/>
           </a:ln>
           <a:extLst>
-            <a:ext uri="{AF507438-7753-43e0-B8FC-AC1667EBCBE1}">
+            <a:ext uri="{AF507438-7753-43E0-B8FC-AC1667EBCBE1}">
               <a14:hiddenEffects xmlns:a14="http://schemas.microsoft.com/office/drawing/2010/main">
                 <a:effectLst>
                   <a:outerShdw dist="35921" dir="2700000" algn="ctr" rotWithShape="0">
@@ -6103,14 +6103,14 @@
           <a:noFill/>
           <a:ln/>
           <a:extLst>
-            <a:ext uri="{909E8E84-426E-40dd-AFC4-6F175D3DCCD1}">
+            <a:ext uri="{909E8E84-426E-40DD-AFC4-6F175D3DCCD1}">
               <a14:hiddenFill xmlns:a14="http://schemas.microsoft.com/office/drawing/2010/main">
                 <a:solidFill>
                   <a:srgbClr val="FFFFFF"/>
                 </a:solidFill>
               </a14:hiddenFill>
             </a:ext>
-            <a:ext uri="{91240B29-F687-4f45-9708-019B960494DF}">
+            <a:ext uri="{91240B29-F687-4F45-9708-019B960494DF}">
               <a14:hiddenLine xmlns:a14="http://schemas.microsoft.com/office/drawing/2010/main" w="9525" cap="flat">
                 <a:solidFill>
                   <a:srgbClr val="808080"/>
@@ -6120,7 +6120,7 @@
                 <a:tailEnd/>
               </a14:hiddenLine>
             </a:ext>
-            <a:ext uri="{AF507438-7753-43e0-B8FC-AC1667EBCBE1}">
+            <a:ext uri="{AF507438-7753-43E0-B8FC-AC1667EBCBE1}">
               <a14:hiddenEffects xmlns:a14="http://schemas.microsoft.com/office/drawing/2010/main">
                 <a:effectLst>
                   <a:outerShdw dist="35921" dir="2700000" algn="ctr" rotWithShape="0">
@@ -6228,7 +6228,7 @@
             <a:tailEnd/>
           </a:ln>
           <a:extLst>
-            <a:ext uri="{AF507438-7753-43e0-B8FC-AC1667EBCBE1}">
+            <a:ext uri="{AF507438-7753-43E0-B8FC-AC1667EBCBE1}">
               <a14:hiddenEffects xmlns:a14="http://schemas.microsoft.com/office/drawing/2010/main">
                 <a:effectLst>
                   <a:outerShdw dist="35921" dir="2700000" algn="ctr" rotWithShape="0">
@@ -6261,14 +6261,14 @@
           <a:noFill/>
           <a:ln/>
           <a:extLst>
-            <a:ext uri="{909E8E84-426E-40dd-AFC4-6F175D3DCCD1}">
+            <a:ext uri="{909E8E84-426E-40DD-AFC4-6F175D3DCCD1}">
               <a14:hiddenFill xmlns:a14="http://schemas.microsoft.com/office/drawing/2010/main">
                 <a:solidFill>
                   <a:srgbClr val="FFFFFF"/>
                 </a:solidFill>
               </a14:hiddenFill>
             </a:ext>
-            <a:ext uri="{91240B29-F687-4f45-9708-019B960494DF}">
+            <a:ext uri="{91240B29-F687-4F45-9708-019B960494DF}">
               <a14:hiddenLine xmlns:a14="http://schemas.microsoft.com/office/drawing/2010/main" w="9525" cap="flat">
                 <a:solidFill>
                   <a:srgbClr val="808080"/>
@@ -6278,7 +6278,7 @@
                 <a:tailEnd/>
               </a14:hiddenLine>
             </a:ext>
-            <a:ext uri="{AF507438-7753-43e0-B8FC-AC1667EBCBE1}">
+            <a:ext uri="{AF507438-7753-43E0-B8FC-AC1667EBCBE1}">
               <a14:hiddenEffects xmlns:a14="http://schemas.microsoft.com/office/drawing/2010/main">
                 <a:effectLst>
                   <a:outerShdw dist="35921" dir="2700000" algn="ctr" rotWithShape="0">
@@ -6386,7 +6386,7 @@
             <a:tailEnd/>
           </a:ln>
           <a:extLst>
-            <a:ext uri="{AF507438-7753-43e0-B8FC-AC1667EBCBE1}">
+            <a:ext uri="{AF507438-7753-43E0-B8FC-AC1667EBCBE1}">
               <a14:hiddenEffects xmlns:a14="http://schemas.microsoft.com/office/drawing/2010/main">
                 <a:effectLst>
                   <a:outerShdw dist="35921" dir="2700000" algn="ctr" rotWithShape="0">
@@ -6419,14 +6419,14 @@
           <a:noFill/>
           <a:ln/>
           <a:extLst>
-            <a:ext uri="{909E8E84-426E-40dd-AFC4-6F175D3DCCD1}">
+            <a:ext uri="{909E8E84-426E-40DD-AFC4-6F175D3DCCD1}">
               <a14:hiddenFill xmlns:a14="http://schemas.microsoft.com/office/drawing/2010/main">
                 <a:solidFill>
                   <a:srgbClr val="FFFFFF"/>
                 </a:solidFill>
               </a14:hiddenFill>
             </a:ext>
-            <a:ext uri="{91240B29-F687-4f45-9708-019B960494DF}">
+            <a:ext uri="{91240B29-F687-4F45-9708-019B960494DF}">
               <a14:hiddenLine xmlns:a14="http://schemas.microsoft.com/office/drawing/2010/main" w="9525" cap="flat">
                 <a:solidFill>
                   <a:srgbClr val="808080"/>
@@ -6436,7 +6436,7 @@
                 <a:tailEnd/>
               </a14:hiddenLine>
             </a:ext>
-            <a:ext uri="{AF507438-7753-43e0-B8FC-AC1667EBCBE1}">
+            <a:ext uri="{AF507438-7753-43E0-B8FC-AC1667EBCBE1}">
               <a14:hiddenEffects xmlns:a14="http://schemas.microsoft.com/office/drawing/2010/main">
                 <a:effectLst>
                   <a:outerShdw dist="35921" dir="2700000" algn="ctr" rotWithShape="0">
@@ -6544,7 +6544,7 @@
             <a:tailEnd/>
           </a:ln>
           <a:extLst>
-            <a:ext uri="{AF507438-7753-43e0-B8FC-AC1667EBCBE1}">
+            <a:ext uri="{AF507438-7753-43E0-B8FC-AC1667EBCBE1}">
               <a14:hiddenEffects xmlns:a14="http://schemas.microsoft.com/office/drawing/2010/main">
                 <a:effectLst>
                   <a:outerShdw dist="35921" dir="2700000" algn="ctr" rotWithShape="0">
@@ -6577,14 +6577,14 @@
           <a:noFill/>
           <a:ln/>
           <a:extLst>
-            <a:ext uri="{909E8E84-426E-40dd-AFC4-6F175D3DCCD1}">
+            <a:ext uri="{909E8E84-426E-40DD-AFC4-6F175D3DCCD1}">
               <a14:hiddenFill xmlns:a14="http://schemas.microsoft.com/office/drawing/2010/main">
                 <a:solidFill>
                   <a:srgbClr val="FFFFFF"/>
                 </a:solidFill>
               </a14:hiddenFill>
             </a:ext>
-            <a:ext uri="{91240B29-F687-4f45-9708-019B960494DF}">
+            <a:ext uri="{91240B29-F687-4F45-9708-019B960494DF}">
               <a14:hiddenLine xmlns:a14="http://schemas.microsoft.com/office/drawing/2010/main" w="9525" cap="flat">
                 <a:solidFill>
                   <a:srgbClr val="808080"/>
@@ -6594,7 +6594,7 @@
                 <a:tailEnd/>
               </a14:hiddenLine>
             </a:ext>
-            <a:ext uri="{AF507438-7753-43e0-B8FC-AC1667EBCBE1}">
+            <a:ext uri="{AF507438-7753-43E0-B8FC-AC1667EBCBE1}">
               <a14:hiddenEffects xmlns:a14="http://schemas.microsoft.com/office/drawing/2010/main">
                 <a:effectLst>
                   <a:outerShdw dist="35921" dir="2700000" algn="ctr" rotWithShape="0">
@@ -6702,7 +6702,7 @@
             <a:tailEnd/>
           </a:ln>
           <a:extLst>
-            <a:ext uri="{AF507438-7753-43e0-B8FC-AC1667EBCBE1}">
+            <a:ext uri="{AF507438-7753-43E0-B8FC-AC1667EBCBE1}">
               <a14:hiddenEffects xmlns:a14="http://schemas.microsoft.com/office/drawing/2010/main">
                 <a:effectLst>
                   <a:outerShdw dist="35921" dir="2700000" algn="ctr" rotWithShape="0">
@@ -6735,14 +6735,14 @@
           <a:noFill/>
           <a:ln/>
           <a:extLst>
-            <a:ext uri="{909E8E84-426E-40dd-AFC4-6F175D3DCCD1}">
+            <a:ext uri="{909E8E84-426E-40DD-AFC4-6F175D3DCCD1}">
               <a14:hiddenFill xmlns:a14="http://schemas.microsoft.com/office/drawing/2010/main">
                 <a:solidFill>
                   <a:srgbClr val="FFFFFF"/>
                 </a:solidFill>
               </a14:hiddenFill>
             </a:ext>
-            <a:ext uri="{91240B29-F687-4f45-9708-019B960494DF}">
+            <a:ext uri="{91240B29-F687-4F45-9708-019B960494DF}">
               <a14:hiddenLine xmlns:a14="http://schemas.microsoft.com/office/drawing/2010/main" w="9525" cap="flat">
                 <a:solidFill>
                   <a:srgbClr val="808080"/>
@@ -6752,7 +6752,7 @@
                 <a:tailEnd/>
               </a14:hiddenLine>
             </a:ext>
-            <a:ext uri="{AF507438-7753-43e0-B8FC-AC1667EBCBE1}">
+            <a:ext uri="{AF507438-7753-43E0-B8FC-AC1667EBCBE1}">
               <a14:hiddenEffects xmlns:a14="http://schemas.microsoft.com/office/drawing/2010/main">
                 <a:effectLst>
                   <a:outerShdw dist="35921" dir="2700000" algn="ctr" rotWithShape="0">
@@ -6860,7 +6860,7 @@
             <a:tailEnd/>
           </a:ln>
           <a:extLst>
-            <a:ext uri="{AF507438-7753-43e0-B8FC-AC1667EBCBE1}">
+            <a:ext uri="{AF507438-7753-43E0-B8FC-AC1667EBCBE1}">
               <a14:hiddenEffects xmlns:a14="http://schemas.microsoft.com/office/drawing/2010/main">
                 <a:effectLst>
                   <a:outerShdw dist="35921" dir="2700000" algn="ctr" rotWithShape="0">
@@ -6893,14 +6893,14 @@
           <a:noFill/>
           <a:ln/>
           <a:extLst>
-            <a:ext uri="{909E8E84-426E-40dd-AFC4-6F175D3DCCD1}">
+            <a:ext uri="{909E8E84-426E-40DD-AFC4-6F175D3DCCD1}">
               <a14:hiddenFill xmlns:a14="http://schemas.microsoft.com/office/drawing/2010/main">
                 <a:solidFill>
                   <a:srgbClr val="FFFFFF"/>
                 </a:solidFill>
               </a14:hiddenFill>
             </a:ext>
-            <a:ext uri="{91240B29-F687-4f45-9708-019B960494DF}">
+            <a:ext uri="{91240B29-F687-4F45-9708-019B960494DF}">
               <a14:hiddenLine xmlns:a14="http://schemas.microsoft.com/office/drawing/2010/main" w="9525" cap="flat">
                 <a:solidFill>
                   <a:srgbClr val="808080"/>
@@ -6910,7 +6910,7 @@
                 <a:tailEnd/>
               </a14:hiddenLine>
             </a:ext>
-            <a:ext uri="{AF507438-7753-43e0-B8FC-AC1667EBCBE1}">
+            <a:ext uri="{AF507438-7753-43E0-B8FC-AC1667EBCBE1}">
               <a14:hiddenEffects xmlns:a14="http://schemas.microsoft.com/office/drawing/2010/main">
                 <a:effectLst>
                   <a:outerShdw dist="35921" dir="2700000" algn="ctr" rotWithShape="0">
@@ -7018,7 +7018,7 @@
             <a:tailEnd/>
           </a:ln>
           <a:extLst>
-            <a:ext uri="{AF507438-7753-43e0-B8FC-AC1667EBCBE1}">
+            <a:ext uri="{AF507438-7753-43E0-B8FC-AC1667EBCBE1}">
               <a14:hiddenEffects xmlns:a14="http://schemas.microsoft.com/office/drawing/2010/main">
                 <a:effectLst>
                   <a:outerShdw dist="35921" dir="2700000" algn="ctr" rotWithShape="0">
@@ -7051,14 +7051,14 @@
           <a:noFill/>
           <a:ln/>
           <a:extLst>
-            <a:ext uri="{909E8E84-426E-40dd-AFC4-6F175D3DCCD1}">
+            <a:ext uri="{909E8E84-426E-40DD-AFC4-6F175D3DCCD1}">
               <a14:hiddenFill xmlns:a14="http://schemas.microsoft.com/office/drawing/2010/main">
                 <a:solidFill>
                   <a:srgbClr val="FFFFFF"/>
                 </a:solidFill>
               </a14:hiddenFill>
             </a:ext>
-            <a:ext uri="{91240B29-F687-4f45-9708-019B960494DF}">
+            <a:ext uri="{91240B29-F687-4F45-9708-019B960494DF}">
               <a14:hiddenLine xmlns:a14="http://schemas.microsoft.com/office/drawing/2010/main" w="9525" cap="flat">
                 <a:solidFill>
                   <a:srgbClr val="808080"/>
@@ -7068,7 +7068,7 @@
                 <a:tailEnd/>
               </a14:hiddenLine>
             </a:ext>
-            <a:ext uri="{AF507438-7753-43e0-B8FC-AC1667EBCBE1}">
+            <a:ext uri="{AF507438-7753-43E0-B8FC-AC1667EBCBE1}">
               <a14:hiddenEffects xmlns:a14="http://schemas.microsoft.com/office/drawing/2010/main">
                 <a:effectLst>
                   <a:outerShdw dist="35921" dir="2700000" algn="ctr" rotWithShape="0">
@@ -7176,7 +7176,7 @@
             <a:tailEnd/>
           </a:ln>
           <a:extLst>
-            <a:ext uri="{AF507438-7753-43e0-B8FC-AC1667EBCBE1}">
+            <a:ext uri="{AF507438-7753-43E0-B8FC-AC1667EBCBE1}">
               <a14:hiddenEffects xmlns:a14="http://schemas.microsoft.com/office/drawing/2010/main">
                 <a:effectLst>
                   <a:outerShdw dist="35921" dir="2700000" algn="ctr" rotWithShape="0">
@@ -7209,14 +7209,14 @@
           <a:noFill/>
           <a:ln/>
           <a:extLst>
-            <a:ext uri="{909E8E84-426E-40dd-AFC4-6F175D3DCCD1}">
+            <a:ext uri="{909E8E84-426E-40DD-AFC4-6F175D3DCCD1}">
               <a14:hiddenFill xmlns:a14="http://schemas.microsoft.com/office/drawing/2010/main">
                 <a:solidFill>
                   <a:srgbClr val="FFFFFF"/>
                 </a:solidFill>
               </a14:hiddenFill>
             </a:ext>
-            <a:ext uri="{91240B29-F687-4f45-9708-019B960494DF}">
+            <a:ext uri="{91240B29-F687-4F45-9708-019B960494DF}">
               <a14:hiddenLine xmlns:a14="http://schemas.microsoft.com/office/drawing/2010/main" w="9525" cap="flat">
                 <a:solidFill>
                   <a:srgbClr val="808080"/>
@@ -7226,7 +7226,7 @@
                 <a:tailEnd/>
               </a14:hiddenLine>
             </a:ext>
-            <a:ext uri="{AF507438-7753-43e0-B8FC-AC1667EBCBE1}">
+            <a:ext uri="{AF507438-7753-43E0-B8FC-AC1667EBCBE1}">
               <a14:hiddenEffects xmlns:a14="http://schemas.microsoft.com/office/drawing/2010/main">
                 <a:effectLst>
                   <a:outerShdw dist="35921" dir="2700000" algn="ctr" rotWithShape="0">
@@ -7334,7 +7334,7 @@
             <a:tailEnd/>
           </a:ln>
           <a:extLst>
-            <a:ext uri="{AF507438-7753-43e0-B8FC-AC1667EBCBE1}">
+            <a:ext uri="{AF507438-7753-43E0-B8FC-AC1667EBCBE1}">
               <a14:hiddenEffects xmlns:a14="http://schemas.microsoft.com/office/drawing/2010/main">
                 <a:effectLst>
                   <a:outerShdw dist="35921" dir="2700000" algn="ctr" rotWithShape="0">
@@ -7367,14 +7367,14 @@
           <a:noFill/>
           <a:ln/>
           <a:extLst>
-            <a:ext uri="{909E8E84-426E-40dd-AFC4-6F175D3DCCD1}">
+            <a:ext uri="{909E8E84-426E-40DD-AFC4-6F175D3DCCD1}">
               <a14:hiddenFill xmlns:a14="http://schemas.microsoft.com/office/drawing/2010/main">
                 <a:solidFill>
                   <a:srgbClr val="FFFFFF"/>
                 </a:solidFill>
               </a14:hiddenFill>
             </a:ext>
-            <a:ext uri="{91240B29-F687-4f45-9708-019B960494DF}">
+            <a:ext uri="{91240B29-F687-4F45-9708-019B960494DF}">
               <a14:hiddenLine xmlns:a14="http://schemas.microsoft.com/office/drawing/2010/main" w="9525" cap="flat">
                 <a:solidFill>
                   <a:srgbClr val="808080"/>
@@ -7384,7 +7384,7 @@
                 <a:tailEnd/>
               </a14:hiddenLine>
             </a:ext>
-            <a:ext uri="{AF507438-7753-43e0-B8FC-AC1667EBCBE1}">
+            <a:ext uri="{AF507438-7753-43E0-B8FC-AC1667EBCBE1}">
               <a14:hiddenEffects xmlns:a14="http://schemas.microsoft.com/office/drawing/2010/main">
                 <a:effectLst>
                   <a:outerShdw dist="35921" dir="2700000" algn="ctr" rotWithShape="0">
@@ -12056,14 +12056,14 @@
           </a:ln>
           <a:effectLst/>
           <a:extLst>
-            <a:ext uri="{909E8E84-426E-40dd-AFC4-6F175D3DCCD1}">
+            <a:ext uri="{909E8E84-426E-40DD-AFC4-6F175D3DCCD1}">
               <a14:hiddenFill xmlns:a14="http://schemas.microsoft.com/office/drawing/2010/main">
                 <a:solidFill>
                   <a:srgbClr val="FFFFFF"/>
                 </a:solidFill>
               </a14:hiddenFill>
             </a:ext>
-            <a:ext uri="{91240B29-F687-4f45-9708-019B960494DF}">
+            <a:ext uri="{91240B29-F687-4F45-9708-019B960494DF}">
               <a14:hiddenLine xmlns:a14="http://schemas.microsoft.com/office/drawing/2010/main" w="9525" cap="flat">
                 <a:solidFill>
                   <a:srgbClr val="808080"/>
@@ -12073,7 +12073,7 @@
                 <a:tailEnd/>
               </a14:hiddenLine>
             </a:ext>
-            <a:ext uri="{AF507438-7753-43e0-B8FC-AC1667EBCBE1}">
+            <a:ext uri="{AF507438-7753-43E0-B8FC-AC1667EBCBE1}">
               <a14:hiddenEffects xmlns:a14="http://schemas.microsoft.com/office/drawing/2010/main">
                 <a:effectLst>
                   <a:outerShdw dist="35921" dir="2700000" algn="ctr" rotWithShape="0">
@@ -12124,14 +12124,14 @@
           </a:ln>
           <a:effectLst/>
           <a:extLst>
-            <a:ext uri="{909E8E84-426E-40dd-AFC4-6F175D3DCCD1}">
+            <a:ext uri="{909E8E84-426E-40DD-AFC4-6F175D3DCCD1}">
               <a14:hiddenFill xmlns:a14="http://schemas.microsoft.com/office/drawing/2010/main">
                 <a:solidFill>
                   <a:srgbClr val="FFFFFF"/>
                 </a:solidFill>
               </a14:hiddenFill>
             </a:ext>
-            <a:ext uri="{91240B29-F687-4f45-9708-019B960494DF}">
+            <a:ext uri="{91240B29-F687-4F45-9708-019B960494DF}">
               <a14:hiddenLine xmlns:a14="http://schemas.microsoft.com/office/drawing/2010/main" w="9525" cap="flat">
                 <a:solidFill>
                   <a:srgbClr val="808080"/>
@@ -12141,7 +12141,7 @@
                 <a:tailEnd/>
               </a14:hiddenLine>
             </a:ext>
-            <a:ext uri="{AF507438-7753-43e0-B8FC-AC1667EBCBE1}">
+            <a:ext uri="{AF507438-7753-43E0-B8FC-AC1667EBCBE1}">
               <a14:hiddenEffects xmlns:a14="http://schemas.microsoft.com/office/drawing/2010/main">
                 <a:effectLst>
                   <a:outerShdw dist="35921" dir="2700000" algn="ctr" rotWithShape="0">
@@ -12205,14 +12205,14 @@
           </a:ln>
           <a:effectLst/>
           <a:extLst>
-            <a:ext uri="{909E8E84-426E-40dd-AFC4-6F175D3DCCD1}">
+            <a:ext uri="{909E8E84-426E-40DD-AFC4-6F175D3DCCD1}">
               <a14:hiddenFill xmlns:a14="http://schemas.microsoft.com/office/drawing/2010/main">
                 <a:solidFill>
                   <a:srgbClr val="FFFFFF"/>
                 </a:solidFill>
               </a14:hiddenFill>
             </a:ext>
-            <a:ext uri="{91240B29-F687-4f45-9708-019B960494DF}">
+            <a:ext uri="{91240B29-F687-4F45-9708-019B960494DF}">
               <a14:hiddenLine xmlns:a14="http://schemas.microsoft.com/office/drawing/2010/main" w="9525" cap="flat">
                 <a:solidFill>
                   <a:srgbClr val="808080"/>
@@ -12222,7 +12222,7 @@
                 <a:tailEnd/>
               </a14:hiddenLine>
             </a:ext>
-            <a:ext uri="{AF507438-7753-43e0-B8FC-AC1667EBCBE1}">
+            <a:ext uri="{AF507438-7753-43E0-B8FC-AC1667EBCBE1}">
               <a14:hiddenEffects xmlns:a14="http://schemas.microsoft.com/office/drawing/2010/main">
                 <a:effectLst>
                   <a:outerShdw dist="35921" dir="2700000" algn="ctr" rotWithShape="0">
@@ -12265,14 +12265,14 @@
           </a:ln>
           <a:effectLst/>
           <a:extLst>
-            <a:ext uri="{909E8E84-426E-40dd-AFC4-6F175D3DCCD1}">
+            <a:ext uri="{909E8E84-426E-40DD-AFC4-6F175D3DCCD1}">
               <a14:hiddenFill xmlns:a14="http://schemas.microsoft.com/office/drawing/2010/main">
                 <a:solidFill>
                   <a:srgbClr val="FFFFFF"/>
                 </a:solidFill>
               </a14:hiddenFill>
             </a:ext>
-            <a:ext uri="{91240B29-F687-4f45-9708-019B960494DF}">
+            <a:ext uri="{91240B29-F687-4F45-9708-019B960494DF}">
               <a14:hiddenLine xmlns:a14="http://schemas.microsoft.com/office/drawing/2010/main" w="9525" cap="flat">
                 <a:solidFill>
                   <a:srgbClr val="808080"/>
@@ -12282,7 +12282,7 @@
                 <a:tailEnd/>
               </a14:hiddenLine>
             </a:ext>
-            <a:ext uri="{AF507438-7753-43e0-B8FC-AC1667EBCBE1}">
+            <a:ext uri="{AF507438-7753-43E0-B8FC-AC1667EBCBE1}">
               <a14:hiddenEffects xmlns:a14="http://schemas.microsoft.com/office/drawing/2010/main">
                 <a:effectLst>
                   <a:outerShdw dist="35921" dir="2700000" algn="ctr" rotWithShape="0">
@@ -12350,14 +12350,14 @@
           </a:ln>
           <a:effectLst/>
           <a:extLst>
-            <a:ext uri="{909E8E84-426E-40dd-AFC4-6F175D3DCCD1}">
+            <a:ext uri="{909E8E84-426E-40DD-AFC4-6F175D3DCCD1}">
               <a14:hiddenFill xmlns:a14="http://schemas.microsoft.com/office/drawing/2010/main">
                 <a:solidFill>
                   <a:srgbClr val="FFFFFF"/>
                 </a:solidFill>
               </a14:hiddenFill>
             </a:ext>
-            <a:ext uri="{91240B29-F687-4f45-9708-019B960494DF}">
+            <a:ext uri="{91240B29-F687-4F45-9708-019B960494DF}">
               <a14:hiddenLine xmlns:a14="http://schemas.microsoft.com/office/drawing/2010/main" w="9525" cap="flat">
                 <a:solidFill>
                   <a:srgbClr val="808080"/>
@@ -12367,7 +12367,7 @@
                 <a:tailEnd/>
               </a14:hiddenLine>
             </a:ext>
-            <a:ext uri="{AF507438-7753-43e0-B8FC-AC1667EBCBE1}">
+            <a:ext uri="{AF507438-7753-43E0-B8FC-AC1667EBCBE1}">
               <a14:hiddenEffects xmlns:a14="http://schemas.microsoft.com/office/drawing/2010/main">
                 <a:effectLst>
                   <a:outerShdw dist="35921" dir="2700000" algn="ctr" rotWithShape="0">
@@ -13037,14 +13037,14 @@
           </a:ln>
           <a:effectLst/>
           <a:extLst>
-            <a:ext uri="{909E8E84-426E-40dd-AFC4-6F175D3DCCD1}">
+            <a:ext uri="{909E8E84-426E-40DD-AFC4-6F175D3DCCD1}">
               <a14:hiddenFill xmlns:a14="http://schemas.microsoft.com/office/drawing/2010/main">
                 <a:solidFill>
                   <a:srgbClr val="FFFFFF"/>
                 </a:solidFill>
               </a14:hiddenFill>
             </a:ext>
-            <a:ext uri="{91240B29-F687-4f45-9708-019B960494DF}">
+            <a:ext uri="{91240B29-F687-4F45-9708-019B960494DF}">
               <a14:hiddenLine xmlns:a14="http://schemas.microsoft.com/office/drawing/2010/main" w="9525" cap="flat">
                 <a:solidFill>
                   <a:srgbClr val="808080"/>
@@ -13054,7 +13054,7 @@
                 <a:tailEnd/>
               </a14:hiddenLine>
             </a:ext>
-            <a:ext uri="{AF507438-7753-43e0-B8FC-AC1667EBCBE1}">
+            <a:ext uri="{AF507438-7753-43E0-B8FC-AC1667EBCBE1}">
               <a14:hiddenEffects xmlns:a14="http://schemas.microsoft.com/office/drawing/2010/main">
                 <a:effectLst>
                   <a:outerShdw dist="35921" dir="2700000" algn="ctr" rotWithShape="0">
@@ -13105,14 +13105,14 @@
           </a:ln>
           <a:effectLst/>
           <a:extLst>
-            <a:ext uri="{909E8E84-426E-40dd-AFC4-6F175D3DCCD1}">
+            <a:ext uri="{909E8E84-426E-40DD-AFC4-6F175D3DCCD1}">
               <a14:hiddenFill xmlns:a14="http://schemas.microsoft.com/office/drawing/2010/main">
                 <a:solidFill>
                   <a:srgbClr val="FFFFFF"/>
                 </a:solidFill>
               </a14:hiddenFill>
             </a:ext>
-            <a:ext uri="{91240B29-F687-4f45-9708-019B960494DF}">
+            <a:ext uri="{91240B29-F687-4F45-9708-019B960494DF}">
               <a14:hiddenLine xmlns:a14="http://schemas.microsoft.com/office/drawing/2010/main" w="9525" cap="flat">
                 <a:solidFill>
                   <a:srgbClr val="808080"/>
@@ -13122,7 +13122,7 @@
                 <a:tailEnd/>
               </a14:hiddenLine>
             </a:ext>
-            <a:ext uri="{AF507438-7753-43e0-B8FC-AC1667EBCBE1}">
+            <a:ext uri="{AF507438-7753-43E0-B8FC-AC1667EBCBE1}">
               <a14:hiddenEffects xmlns:a14="http://schemas.microsoft.com/office/drawing/2010/main">
                 <a:effectLst>
                   <a:outerShdw dist="35921" dir="2700000" algn="ctr" rotWithShape="0">
@@ -13257,14 +13257,14 @@
           </a:ln>
           <a:effectLst/>
           <a:extLst>
-            <a:ext uri="{909E8E84-426E-40dd-AFC4-6F175D3DCCD1}">
+            <a:ext uri="{909E8E84-426E-40DD-AFC4-6F175D3DCCD1}">
               <a14:hiddenFill xmlns:a14="http://schemas.microsoft.com/office/drawing/2010/main">
                 <a:solidFill>
                   <a:srgbClr val="FFFFFF"/>
                 </a:solidFill>
               </a14:hiddenFill>
             </a:ext>
-            <a:ext uri="{91240B29-F687-4f45-9708-019B960494DF}">
+            <a:ext uri="{91240B29-F687-4F45-9708-019B960494DF}">
               <a14:hiddenLine xmlns:a14="http://schemas.microsoft.com/office/drawing/2010/main" w="9525" cap="flat">
                 <a:solidFill>
                   <a:srgbClr val="808080"/>
@@ -13274,7 +13274,7 @@
                 <a:tailEnd/>
               </a14:hiddenLine>
             </a:ext>
-            <a:ext uri="{AF507438-7753-43e0-B8FC-AC1667EBCBE1}">
+            <a:ext uri="{AF507438-7753-43E0-B8FC-AC1667EBCBE1}">
               <a14:hiddenEffects xmlns:a14="http://schemas.microsoft.com/office/drawing/2010/main">
                 <a:effectLst>
                   <a:outerShdw dist="35921" dir="2700000" algn="ctr" rotWithShape="0">
@@ -13338,14 +13338,14 @@
           </a:ln>
           <a:effectLst/>
           <a:extLst>
-            <a:ext uri="{909E8E84-426E-40dd-AFC4-6F175D3DCCD1}">
+            <a:ext uri="{909E8E84-426E-40DD-AFC4-6F175D3DCCD1}">
               <a14:hiddenFill xmlns:a14="http://schemas.microsoft.com/office/drawing/2010/main">
                 <a:solidFill>
                   <a:srgbClr val="FFFFFF"/>
                 </a:solidFill>
               </a14:hiddenFill>
             </a:ext>
-            <a:ext uri="{91240B29-F687-4f45-9708-019B960494DF}">
+            <a:ext uri="{91240B29-F687-4F45-9708-019B960494DF}">
               <a14:hiddenLine xmlns:a14="http://schemas.microsoft.com/office/drawing/2010/main" w="9525" cap="flat">
                 <a:solidFill>
                   <a:srgbClr val="808080"/>
@@ -13355,7 +13355,7 @@
                 <a:tailEnd/>
               </a14:hiddenLine>
             </a:ext>
-            <a:ext uri="{AF507438-7753-43e0-B8FC-AC1667EBCBE1}">
+            <a:ext uri="{AF507438-7753-43E0-B8FC-AC1667EBCBE1}">
               <a14:hiddenEffects xmlns:a14="http://schemas.microsoft.com/office/drawing/2010/main">
                 <a:effectLst>
                   <a:outerShdw dist="35921" dir="2700000" algn="ctr" rotWithShape="0">
@@ -13398,14 +13398,14 @@
           </a:ln>
           <a:effectLst/>
           <a:extLst>
-            <a:ext uri="{909E8E84-426E-40dd-AFC4-6F175D3DCCD1}">
+            <a:ext uri="{909E8E84-426E-40DD-AFC4-6F175D3DCCD1}">
               <a14:hiddenFill xmlns:a14="http://schemas.microsoft.com/office/drawing/2010/main">
                 <a:solidFill>
                   <a:srgbClr val="FFFFFF"/>
                 </a:solidFill>
               </a14:hiddenFill>
             </a:ext>
-            <a:ext uri="{91240B29-F687-4f45-9708-019B960494DF}">
+            <a:ext uri="{91240B29-F687-4F45-9708-019B960494DF}">
               <a14:hiddenLine xmlns:a14="http://schemas.microsoft.com/office/drawing/2010/main" w="9525" cap="flat">
                 <a:solidFill>
                   <a:srgbClr val="808080"/>
@@ -13415,7 +13415,7 @@
                 <a:tailEnd/>
               </a14:hiddenLine>
             </a:ext>
-            <a:ext uri="{AF507438-7753-43e0-B8FC-AC1667EBCBE1}">
+            <a:ext uri="{AF507438-7753-43E0-B8FC-AC1667EBCBE1}">
               <a14:hiddenEffects xmlns:a14="http://schemas.microsoft.com/office/drawing/2010/main">
                 <a:effectLst>
                   <a:outerShdw dist="35921" dir="2700000" algn="ctr" rotWithShape="0">
@@ -14080,14 +14080,14 @@
           </a:ln>
           <a:effectLst/>
           <a:extLst>
-            <a:ext uri="{909E8E84-426E-40dd-AFC4-6F175D3DCCD1}">
+            <a:ext uri="{909E8E84-426E-40DD-AFC4-6F175D3DCCD1}">
               <a14:hiddenFill xmlns:a14="http://schemas.microsoft.com/office/drawing/2010/main">
                 <a:solidFill>
                   <a:srgbClr val="FFFFFF"/>
                 </a:solidFill>
               </a14:hiddenFill>
             </a:ext>
-            <a:ext uri="{91240B29-F687-4f45-9708-019B960494DF}">
+            <a:ext uri="{91240B29-F687-4F45-9708-019B960494DF}">
               <a14:hiddenLine xmlns:a14="http://schemas.microsoft.com/office/drawing/2010/main" w="9525" cap="flat">
                 <a:solidFill>
                   <a:srgbClr val="808080"/>
@@ -14097,7 +14097,7 @@
                 <a:tailEnd/>
               </a14:hiddenLine>
             </a:ext>
-            <a:ext uri="{AF507438-7753-43e0-B8FC-AC1667EBCBE1}">
+            <a:ext uri="{AF507438-7753-43E0-B8FC-AC1667EBCBE1}">
               <a14:hiddenEffects xmlns:a14="http://schemas.microsoft.com/office/drawing/2010/main">
                 <a:effectLst>
                   <a:outerShdw dist="35921" dir="2700000" algn="ctr" rotWithShape="0">
@@ -14313,11 +14313,11 @@
   <p:clrMapOvr>
     <a:masterClrMapping/>
   </p:clrMapOvr>
-  <p:transition xmlns:p14="http://schemas.microsoft.com/office/powerpoint/2010/main" spd="med"/>
+  <p:transition spd="med"/>
   <p:timing>
     <p:tnLst>
       <p:par>
-        <p:cTn xmlns:p14="http://schemas.microsoft.com/office/powerpoint/2010/main" id="1" dur="indefinite" restart="never" nodeType="tmRoot">
+        <p:cTn id="1" dur="indefinite" restart="never" nodeType="tmRoot">
           <p:childTnLst>
             <p:seq concurrent="1" nextAc="seek">
               <p:cTn id="2" dur="0" nodeType="mainSeq"/>
@@ -14436,14 +14436,14 @@
           </a:ln>
           <a:effectLst/>
           <a:extLst>
-            <a:ext uri="{909E8E84-426E-40dd-AFC4-6F175D3DCCD1}">
+            <a:ext uri="{909E8E84-426E-40DD-AFC4-6F175D3DCCD1}">
               <a14:hiddenFill xmlns:a14="http://schemas.microsoft.com/office/drawing/2010/main">
                 <a:solidFill>
                   <a:srgbClr val="FFFFFF"/>
                 </a:solidFill>
               </a14:hiddenFill>
             </a:ext>
-            <a:ext uri="{91240B29-F687-4f45-9708-019B960494DF}">
+            <a:ext uri="{91240B29-F687-4F45-9708-019B960494DF}">
               <a14:hiddenLine xmlns:a14="http://schemas.microsoft.com/office/drawing/2010/main" w="9525" cap="flat">
                 <a:solidFill>
                   <a:srgbClr val="808080"/>
@@ -14453,7 +14453,7 @@
                 <a:tailEnd/>
               </a14:hiddenLine>
             </a:ext>
-            <a:ext uri="{AF507438-7753-43e0-B8FC-AC1667EBCBE1}">
+            <a:ext uri="{AF507438-7753-43E0-B8FC-AC1667EBCBE1}">
               <a14:hiddenEffects xmlns:a14="http://schemas.microsoft.com/office/drawing/2010/main">
                 <a:effectLst>
                   <a:outerShdw dist="35921" dir="2700000" algn="ctr" rotWithShape="0">
@@ -14938,14 +14938,14 @@
           </a:ln>
           <a:effectLst/>
           <a:extLst>
-            <a:ext uri="{909E8E84-426E-40dd-AFC4-6F175D3DCCD1}">
+            <a:ext uri="{909E8E84-426E-40DD-AFC4-6F175D3DCCD1}">
               <a14:hiddenFill xmlns:a14="http://schemas.microsoft.com/office/drawing/2010/main">
                 <a:solidFill>
                   <a:srgbClr val="FFFFFF"/>
                 </a:solidFill>
               </a14:hiddenFill>
             </a:ext>
-            <a:ext uri="{91240B29-F687-4f45-9708-019B960494DF}">
+            <a:ext uri="{91240B29-F687-4F45-9708-019B960494DF}">
               <a14:hiddenLine xmlns:a14="http://schemas.microsoft.com/office/drawing/2010/main" w="9525" cap="flat">
                 <a:solidFill>
                   <a:srgbClr val="808080"/>
@@ -14955,7 +14955,7 @@
                 <a:tailEnd/>
               </a14:hiddenLine>
             </a:ext>
-            <a:ext uri="{AF507438-7753-43e0-B8FC-AC1667EBCBE1}">
+            <a:ext uri="{AF507438-7753-43E0-B8FC-AC1667EBCBE1}">
               <a14:hiddenEffects xmlns:a14="http://schemas.microsoft.com/office/drawing/2010/main">
                 <a:effectLst>
                   <a:outerShdw dist="35921" dir="2700000" algn="ctr" rotWithShape="0">
@@ -15171,11 +15171,11 @@
   <p:clrMapOvr>
     <a:masterClrMapping/>
   </p:clrMapOvr>
-  <p:transition xmlns:p14="http://schemas.microsoft.com/office/powerpoint/2010/main" spd="med"/>
+  <p:transition spd="med"/>
   <p:timing>
     <p:tnLst>
       <p:par>
-        <p:cTn xmlns:p14="http://schemas.microsoft.com/office/powerpoint/2010/main" id="1" dur="indefinite" restart="never" nodeType="tmRoot">
+        <p:cTn id="1" dur="indefinite" restart="never" nodeType="tmRoot">
           <p:childTnLst>
             <p:seq concurrent="1" nextAc="seek">
               <p:cTn id="2" dur="0" nodeType="mainSeq"/>
@@ -15294,14 +15294,14 @@
           </a:ln>
           <a:effectLst/>
           <a:extLst>
-            <a:ext uri="{909E8E84-426E-40dd-AFC4-6F175D3DCCD1}">
+            <a:ext uri="{909E8E84-426E-40DD-AFC4-6F175D3DCCD1}">
               <a14:hiddenFill xmlns:a14="http://schemas.microsoft.com/office/drawing/2010/main">
                 <a:solidFill>
                   <a:srgbClr val="FFFFFF"/>
                 </a:solidFill>
               </a14:hiddenFill>
             </a:ext>
-            <a:ext uri="{91240B29-F687-4f45-9708-019B960494DF}">
+            <a:ext uri="{91240B29-F687-4F45-9708-019B960494DF}">
               <a14:hiddenLine xmlns:a14="http://schemas.microsoft.com/office/drawing/2010/main" w="9525" cap="flat">
                 <a:solidFill>
                   <a:srgbClr val="808080"/>
@@ -15311,7 +15311,7 @@
                 <a:tailEnd/>
               </a14:hiddenLine>
             </a:ext>
-            <a:ext uri="{AF507438-7753-43e0-B8FC-AC1667EBCBE1}">
+            <a:ext uri="{AF507438-7753-43E0-B8FC-AC1667EBCBE1}">
               <a14:hiddenEffects xmlns:a14="http://schemas.microsoft.com/office/drawing/2010/main">
                 <a:effectLst>
                   <a:outerShdw dist="35921" dir="2700000" algn="ctr" rotWithShape="0">
@@ -15758,14 +15758,14 @@
           </a:ln>
           <a:effectLst/>
           <a:extLst>
-            <a:ext uri="{909E8E84-426E-40dd-AFC4-6F175D3DCCD1}">
+            <a:ext uri="{909E8E84-426E-40DD-AFC4-6F175D3DCCD1}">
               <a14:hiddenFill xmlns:a14="http://schemas.microsoft.com/office/drawing/2010/main">
                 <a:solidFill>
                   <a:srgbClr val="FFFFFF"/>
                 </a:solidFill>
               </a14:hiddenFill>
             </a:ext>
-            <a:ext uri="{91240B29-F687-4f45-9708-019B960494DF}">
+            <a:ext uri="{91240B29-F687-4F45-9708-019B960494DF}">
               <a14:hiddenLine xmlns:a14="http://schemas.microsoft.com/office/drawing/2010/main" w="9525" cap="flat">
                 <a:solidFill>
                   <a:srgbClr val="808080"/>
@@ -15775,7 +15775,7 @@
                 <a:tailEnd/>
               </a14:hiddenLine>
             </a:ext>
-            <a:ext uri="{AF507438-7753-43e0-B8FC-AC1667EBCBE1}">
+            <a:ext uri="{AF507438-7753-43E0-B8FC-AC1667EBCBE1}">
               <a14:hiddenEffects xmlns:a14="http://schemas.microsoft.com/office/drawing/2010/main">
                 <a:effectLst>
                   <a:outerShdw dist="35921" dir="2700000" algn="ctr" rotWithShape="0">
@@ -15991,11 +15991,11 @@
   <p:clrMapOvr>
     <a:masterClrMapping/>
   </p:clrMapOvr>
-  <p:transition xmlns:p14="http://schemas.microsoft.com/office/powerpoint/2010/main" spd="med"/>
+  <p:transition spd="med"/>
   <p:timing>
     <p:tnLst>
       <p:par>
-        <p:cTn xmlns:p14="http://schemas.microsoft.com/office/powerpoint/2010/main" id="1" dur="indefinite" restart="never" nodeType="tmRoot">
+        <p:cTn id="1" dur="indefinite" restart="never" nodeType="tmRoot">
           <p:childTnLst>
             <p:seq concurrent="1" nextAc="seek">
               <p:cTn id="2" dur="0" nodeType="mainSeq"/>
@@ -16107,14 +16107,14 @@
           </a:ln>
           <a:effectLst/>
           <a:extLst>
-            <a:ext uri="{909E8E84-426E-40dd-AFC4-6F175D3DCCD1}">
+            <a:ext uri="{909E8E84-426E-40DD-AFC4-6F175D3DCCD1}">
               <a14:hiddenFill xmlns:a14="http://schemas.microsoft.com/office/drawing/2010/main">
                 <a:solidFill>
                   <a:srgbClr val="FFFFFF"/>
                 </a:solidFill>
               </a14:hiddenFill>
             </a:ext>
-            <a:ext uri="{91240B29-F687-4f45-9708-019B960494DF}">
+            <a:ext uri="{91240B29-F687-4F45-9708-019B960494DF}">
               <a14:hiddenLine xmlns:a14="http://schemas.microsoft.com/office/drawing/2010/main" w="9525" cap="flat">
                 <a:solidFill>
                   <a:srgbClr val="808080"/>
@@ -16124,7 +16124,7 @@
                 <a:tailEnd/>
               </a14:hiddenLine>
             </a:ext>
-            <a:ext uri="{AF507438-7753-43e0-B8FC-AC1667EBCBE1}">
+            <a:ext uri="{AF507438-7753-43E0-B8FC-AC1667EBCBE1}">
               <a14:hiddenEffects xmlns:a14="http://schemas.microsoft.com/office/drawing/2010/main">
                 <a:effectLst>
                   <a:outerShdw dist="35921" dir="2700000" algn="ctr" rotWithShape="0">
@@ -16593,14 +16593,14 @@
           </a:ln>
           <a:effectLst/>
           <a:extLst>
-            <a:ext uri="{909E8E84-426E-40dd-AFC4-6F175D3DCCD1}">
+            <a:ext uri="{909E8E84-426E-40DD-AFC4-6F175D3DCCD1}">
               <a14:hiddenFill xmlns:a14="http://schemas.microsoft.com/office/drawing/2010/main">
                 <a:solidFill>
                   <a:srgbClr val="FFFFFF"/>
                 </a:solidFill>
               </a14:hiddenFill>
             </a:ext>
-            <a:ext uri="{91240B29-F687-4f45-9708-019B960494DF}">
+            <a:ext uri="{91240B29-F687-4F45-9708-019B960494DF}">
               <a14:hiddenLine xmlns:a14="http://schemas.microsoft.com/office/drawing/2010/main" w="9525" cap="flat">
                 <a:solidFill>
                   <a:srgbClr val="808080"/>
@@ -16610,7 +16610,7 @@
                 <a:tailEnd/>
               </a14:hiddenLine>
             </a:ext>
-            <a:ext uri="{AF507438-7753-43e0-B8FC-AC1667EBCBE1}">
+            <a:ext uri="{AF507438-7753-43E0-B8FC-AC1667EBCBE1}">
               <a14:hiddenEffects xmlns:a14="http://schemas.microsoft.com/office/drawing/2010/main">
                 <a:effectLst>
                   <a:outerShdw dist="35921" dir="2700000" algn="ctr" rotWithShape="0">
@@ -16826,11 +16826,11 @@
   <p:clrMapOvr>
     <a:masterClrMapping/>
   </p:clrMapOvr>
-  <p:transition xmlns:p14="http://schemas.microsoft.com/office/powerpoint/2010/main" spd="med"/>
+  <p:transition spd="med"/>
   <p:timing>
     <p:tnLst>
       <p:par>
-        <p:cTn xmlns:p14="http://schemas.microsoft.com/office/powerpoint/2010/main" id="1" dur="indefinite" restart="never" nodeType="tmRoot">
+        <p:cTn id="1" dur="indefinite" restart="never" nodeType="tmRoot">
           <p:childTnLst>
             <p:seq concurrent="1" nextAc="seek">
               <p:cTn id="2" dur="0" nodeType="mainSeq"/>
@@ -16942,14 +16942,14 @@
           </a:ln>
           <a:effectLst/>
           <a:extLst>
-            <a:ext uri="{909E8E84-426E-40dd-AFC4-6F175D3DCCD1}">
+            <a:ext uri="{909E8E84-426E-40DD-AFC4-6F175D3DCCD1}">
               <a14:hiddenFill xmlns:a14="http://schemas.microsoft.com/office/drawing/2010/main">
                 <a:solidFill>
                   <a:srgbClr val="FFFFFF"/>
                 </a:solidFill>
               </a14:hiddenFill>
             </a:ext>
-            <a:ext uri="{91240B29-F687-4f45-9708-019B960494DF}">
+            <a:ext uri="{91240B29-F687-4F45-9708-019B960494DF}">
               <a14:hiddenLine xmlns:a14="http://schemas.microsoft.com/office/drawing/2010/main" w="9525" cap="flat">
                 <a:solidFill>
                   <a:srgbClr val="808080"/>
@@ -16959,7 +16959,7 @@
                 <a:tailEnd/>
               </a14:hiddenLine>
             </a:ext>
-            <a:ext uri="{AF507438-7753-43e0-B8FC-AC1667EBCBE1}">
+            <a:ext uri="{AF507438-7753-43E0-B8FC-AC1667EBCBE1}">
               <a14:hiddenEffects xmlns:a14="http://schemas.microsoft.com/office/drawing/2010/main">
                 <a:effectLst>
                   <a:outerShdw dist="35921" dir="2700000" algn="ctr" rotWithShape="0">
@@ -17362,14 +17362,14 @@
           </a:ln>
           <a:effectLst/>
           <a:extLst>
-            <a:ext uri="{909E8E84-426E-40dd-AFC4-6F175D3DCCD1}">
+            <a:ext uri="{909E8E84-426E-40DD-AFC4-6F175D3DCCD1}">
               <a14:hiddenFill xmlns:a14="http://schemas.microsoft.com/office/drawing/2010/main">
                 <a:solidFill>
                   <a:srgbClr val="FFFFFF"/>
                 </a:solidFill>
               </a14:hiddenFill>
             </a:ext>
-            <a:ext uri="{91240B29-F687-4f45-9708-019B960494DF}">
+            <a:ext uri="{91240B29-F687-4F45-9708-019B960494DF}">
               <a14:hiddenLine xmlns:a14="http://schemas.microsoft.com/office/drawing/2010/main" w="9525" cap="flat">
                 <a:solidFill>
                   <a:srgbClr val="808080"/>
@@ -17379,7 +17379,7 @@
                 <a:tailEnd/>
               </a14:hiddenLine>
             </a:ext>
-            <a:ext uri="{AF507438-7753-43e0-B8FC-AC1667EBCBE1}">
+            <a:ext uri="{AF507438-7753-43E0-B8FC-AC1667EBCBE1}">
               <a14:hiddenEffects xmlns:a14="http://schemas.microsoft.com/office/drawing/2010/main">
                 <a:effectLst>
                   <a:outerShdw dist="35921" dir="2700000" algn="ctr" rotWithShape="0">
@@ -17595,11 +17595,11 @@
   <p:clrMapOvr>
     <a:masterClrMapping/>
   </p:clrMapOvr>
-  <p:transition xmlns:p14="http://schemas.microsoft.com/office/powerpoint/2010/main" spd="med"/>
+  <p:transition spd="med"/>
   <p:timing>
     <p:tnLst>
       <p:par>
-        <p:cTn xmlns:p14="http://schemas.microsoft.com/office/powerpoint/2010/main" id="1" dur="indefinite" restart="never" nodeType="tmRoot">
+        <p:cTn id="1" dur="indefinite" restart="never" nodeType="tmRoot">
           <p:childTnLst>
             <p:seq concurrent="1" nextAc="seek">
               <p:cTn id="2" dur="0" nodeType="mainSeq"/>
@@ -17711,14 +17711,14 @@
           </a:ln>
           <a:effectLst/>
           <a:extLst>
-            <a:ext uri="{909E8E84-426E-40dd-AFC4-6F175D3DCCD1}">
+            <a:ext uri="{909E8E84-426E-40DD-AFC4-6F175D3DCCD1}">
               <a14:hiddenFill xmlns:a14="http://schemas.microsoft.com/office/drawing/2010/main">
                 <a:solidFill>
                   <a:srgbClr val="FFFFFF"/>
                 </a:solidFill>
               </a14:hiddenFill>
             </a:ext>
-            <a:ext uri="{91240B29-F687-4f45-9708-019B960494DF}">
+            <a:ext uri="{91240B29-F687-4F45-9708-019B960494DF}">
               <a14:hiddenLine xmlns:a14="http://schemas.microsoft.com/office/drawing/2010/main" w="9525" cap="flat">
                 <a:solidFill>
                   <a:srgbClr val="808080"/>
@@ -17728,7 +17728,7 @@
                 <a:tailEnd/>
               </a14:hiddenLine>
             </a:ext>
-            <a:ext uri="{AF507438-7753-43e0-B8FC-AC1667EBCBE1}">
+            <a:ext uri="{AF507438-7753-43E0-B8FC-AC1667EBCBE1}">
               <a14:hiddenEffects xmlns:a14="http://schemas.microsoft.com/office/drawing/2010/main">
                 <a:effectLst>
                   <a:outerShdw dist="35921" dir="2700000" algn="ctr" rotWithShape="0">
@@ -18153,14 +18153,14 @@
           </a:ln>
           <a:effectLst/>
           <a:extLst>
-            <a:ext uri="{909E8E84-426E-40dd-AFC4-6F175D3DCCD1}">
+            <a:ext uri="{909E8E84-426E-40DD-AFC4-6F175D3DCCD1}">
               <a14:hiddenFill xmlns:a14="http://schemas.microsoft.com/office/drawing/2010/main">
                 <a:solidFill>
                   <a:srgbClr val="FFFFFF"/>
                 </a:solidFill>
               </a14:hiddenFill>
             </a:ext>
-            <a:ext uri="{91240B29-F687-4f45-9708-019B960494DF}">
+            <a:ext uri="{91240B29-F687-4F45-9708-019B960494DF}">
               <a14:hiddenLine xmlns:a14="http://schemas.microsoft.com/office/drawing/2010/main" w="9525" cap="flat">
                 <a:solidFill>
                   <a:srgbClr val="808080"/>
@@ -18170,7 +18170,7 @@
                 <a:tailEnd/>
               </a14:hiddenLine>
             </a:ext>
-            <a:ext uri="{AF507438-7753-43e0-B8FC-AC1667EBCBE1}">
+            <a:ext uri="{AF507438-7753-43E0-B8FC-AC1667EBCBE1}">
               <a14:hiddenEffects xmlns:a14="http://schemas.microsoft.com/office/drawing/2010/main">
                 <a:effectLst>
                   <a:outerShdw dist="35921" dir="2700000" algn="ctr" rotWithShape="0">
@@ -18275,14 +18275,14 @@
           </a:ln>
           <a:effectLst/>
           <a:extLst>
-            <a:ext uri="{909E8E84-426E-40dd-AFC4-6F175D3DCCD1}">
+            <a:ext uri="{909E8E84-426E-40DD-AFC4-6F175D3DCCD1}">
               <a14:hiddenFill xmlns:a14="http://schemas.microsoft.com/office/drawing/2010/main">
                 <a:solidFill>
                   <a:srgbClr val="FFFFFF"/>
                 </a:solidFill>
               </a14:hiddenFill>
             </a:ext>
-            <a:ext uri="{91240B29-F687-4f45-9708-019B960494DF}">
+            <a:ext uri="{91240B29-F687-4F45-9708-019B960494DF}">
               <a14:hiddenLine xmlns:a14="http://schemas.microsoft.com/office/drawing/2010/main" w="9525" cap="flat">
                 <a:solidFill>
                   <a:srgbClr val="808080"/>
@@ -18292,7 +18292,7 @@
                 <a:tailEnd/>
               </a14:hiddenLine>
             </a:ext>
-            <a:ext uri="{AF507438-7753-43e0-B8FC-AC1667EBCBE1}">
+            <a:ext uri="{AF507438-7753-43E0-B8FC-AC1667EBCBE1}">
               <a14:hiddenEffects xmlns:a14="http://schemas.microsoft.com/office/drawing/2010/main">
                 <a:effectLst>
                   <a:outerShdw dist="35921" dir="2700000" algn="ctr" rotWithShape="0">
@@ -18508,11 +18508,11 @@
   <p:clrMapOvr>
     <a:masterClrMapping/>
   </p:clrMapOvr>
-  <p:transition xmlns:p14="http://schemas.microsoft.com/office/powerpoint/2010/main" spd="med"/>
+  <p:transition spd="med"/>
   <p:timing>
     <p:tnLst>
       <p:par>
-        <p:cTn xmlns:p14="http://schemas.microsoft.com/office/powerpoint/2010/main" id="1" dur="indefinite" restart="never" nodeType="tmRoot">
+        <p:cTn id="1" dur="indefinite" restart="never" nodeType="tmRoot">
           <p:childTnLst>
             <p:seq concurrent="1" nextAc="seek">
               <p:cTn id="2" dur="0" nodeType="mainSeq"/>
@@ -18624,14 +18624,14 @@
           </a:ln>
           <a:effectLst/>
           <a:extLst>
-            <a:ext uri="{909E8E84-426E-40dd-AFC4-6F175D3DCCD1}">
+            <a:ext uri="{909E8E84-426E-40DD-AFC4-6F175D3DCCD1}">
               <a14:hiddenFill xmlns:a14="http://schemas.microsoft.com/office/drawing/2010/main">
                 <a:solidFill>
                   <a:srgbClr val="FFFFFF"/>
                 </a:solidFill>
               </a14:hiddenFill>
             </a:ext>
-            <a:ext uri="{91240B29-F687-4f45-9708-019B960494DF}">
+            <a:ext uri="{91240B29-F687-4F45-9708-019B960494DF}">
               <a14:hiddenLine xmlns:a14="http://schemas.microsoft.com/office/drawing/2010/main" w="9525" cap="flat">
                 <a:solidFill>
                   <a:srgbClr val="808080"/>
@@ -18641,7 +18641,7 @@
                 <a:tailEnd/>
               </a14:hiddenLine>
             </a:ext>
-            <a:ext uri="{AF507438-7753-43e0-B8FC-AC1667EBCBE1}">
+            <a:ext uri="{AF507438-7753-43E0-B8FC-AC1667EBCBE1}">
               <a14:hiddenEffects xmlns:a14="http://schemas.microsoft.com/office/drawing/2010/main">
                 <a:effectLst>
                   <a:outerShdw dist="35921" dir="2700000" algn="ctr" rotWithShape="0">
@@ -19044,14 +19044,14 @@
           </a:ln>
           <a:effectLst/>
           <a:extLst>
-            <a:ext uri="{909E8E84-426E-40dd-AFC4-6F175D3DCCD1}">
+            <a:ext uri="{909E8E84-426E-40DD-AFC4-6F175D3DCCD1}">
               <a14:hiddenFill xmlns:a14="http://schemas.microsoft.com/office/drawing/2010/main">
                 <a:solidFill>
                   <a:srgbClr val="FFFFFF"/>
                 </a:solidFill>
               </a14:hiddenFill>
             </a:ext>
-            <a:ext uri="{91240B29-F687-4f45-9708-019B960494DF}">
+            <a:ext uri="{91240B29-F687-4F45-9708-019B960494DF}">
               <a14:hiddenLine xmlns:a14="http://schemas.microsoft.com/office/drawing/2010/main" w="9525" cap="flat">
                 <a:solidFill>
                   <a:srgbClr val="808080"/>
@@ -19061,7 +19061,7 @@
                 <a:tailEnd/>
               </a14:hiddenLine>
             </a:ext>
-            <a:ext uri="{AF507438-7753-43e0-B8FC-AC1667EBCBE1}">
+            <a:ext uri="{AF507438-7753-43E0-B8FC-AC1667EBCBE1}">
               <a14:hiddenEffects xmlns:a14="http://schemas.microsoft.com/office/drawing/2010/main">
                 <a:effectLst>
                   <a:outerShdw dist="35921" dir="2700000" algn="ctr" rotWithShape="0">
@@ -19277,11 +19277,11 @@
   <p:clrMapOvr>
     <a:masterClrMapping/>
   </p:clrMapOvr>
-  <p:transition xmlns:p14="http://schemas.microsoft.com/office/powerpoint/2010/main" spd="med"/>
+  <p:transition spd="med"/>
   <p:timing>
     <p:tnLst>
       <p:par>
-        <p:cTn xmlns:p14="http://schemas.microsoft.com/office/powerpoint/2010/main" id="1" dur="indefinite" restart="never" nodeType="tmRoot">
+        <p:cTn id="1" dur="indefinite" restart="never" nodeType="tmRoot">
           <p:childTnLst>
             <p:seq concurrent="1" nextAc="seek">
               <p:cTn id="2" dur="0" nodeType="mainSeq"/>
@@ -19393,14 +19393,14 @@
           </a:ln>
           <a:effectLst/>
           <a:extLst>
-            <a:ext uri="{909E8E84-426E-40dd-AFC4-6F175D3DCCD1}">
+            <a:ext uri="{909E8E84-426E-40DD-AFC4-6F175D3DCCD1}">
               <a14:hiddenFill xmlns:a14="http://schemas.microsoft.com/office/drawing/2010/main">
                 <a:solidFill>
                   <a:srgbClr val="FFFFFF"/>
                 </a:solidFill>
               </a14:hiddenFill>
             </a:ext>
-            <a:ext uri="{91240B29-F687-4f45-9708-019B960494DF}">
+            <a:ext uri="{91240B29-F687-4F45-9708-019B960494DF}">
               <a14:hiddenLine xmlns:a14="http://schemas.microsoft.com/office/drawing/2010/main" w="9525" cap="flat">
                 <a:solidFill>
                   <a:srgbClr val="808080"/>
@@ -19410,7 +19410,7 @@
                 <a:tailEnd/>
               </a14:hiddenLine>
             </a:ext>
-            <a:ext uri="{AF507438-7753-43e0-B8FC-AC1667EBCBE1}">
+            <a:ext uri="{AF507438-7753-43E0-B8FC-AC1667EBCBE1}">
               <a14:hiddenEffects xmlns:a14="http://schemas.microsoft.com/office/drawing/2010/main">
                 <a:effectLst>
                   <a:outerShdw dist="35921" dir="2700000" algn="ctr" rotWithShape="0">
@@ -19835,14 +19835,14 @@
           </a:ln>
           <a:effectLst/>
           <a:extLst>
-            <a:ext uri="{909E8E84-426E-40dd-AFC4-6F175D3DCCD1}">
+            <a:ext uri="{909E8E84-426E-40DD-AFC4-6F175D3DCCD1}">
               <a14:hiddenFill xmlns:a14="http://schemas.microsoft.com/office/drawing/2010/main">
                 <a:solidFill>
                   <a:srgbClr val="FFFFFF"/>
                 </a:solidFill>
               </a14:hiddenFill>
             </a:ext>
-            <a:ext uri="{91240B29-F687-4f45-9708-019B960494DF}">
+            <a:ext uri="{91240B29-F687-4F45-9708-019B960494DF}">
               <a14:hiddenLine xmlns:a14="http://schemas.microsoft.com/office/drawing/2010/main" w="9525" cap="flat">
                 <a:solidFill>
                   <a:srgbClr val="808080"/>
@@ -19852,7 +19852,7 @@
                 <a:tailEnd/>
               </a14:hiddenLine>
             </a:ext>
-            <a:ext uri="{AF507438-7753-43e0-B8FC-AC1667EBCBE1}">
+            <a:ext uri="{AF507438-7753-43E0-B8FC-AC1667EBCBE1}">
               <a14:hiddenEffects xmlns:a14="http://schemas.microsoft.com/office/drawing/2010/main">
                 <a:effectLst>
                   <a:outerShdw dist="35921" dir="2700000" algn="ctr" rotWithShape="0">
@@ -19957,14 +19957,14 @@
           </a:ln>
           <a:effectLst/>
           <a:extLst>
-            <a:ext uri="{909E8E84-426E-40dd-AFC4-6F175D3DCCD1}">
+            <a:ext uri="{909E8E84-426E-40DD-AFC4-6F175D3DCCD1}">
               <a14:hiddenFill xmlns:a14="http://schemas.microsoft.com/office/drawing/2010/main">
                 <a:solidFill>
                   <a:srgbClr val="FFFFFF"/>
                 </a:solidFill>
               </a14:hiddenFill>
             </a:ext>
-            <a:ext uri="{91240B29-F687-4f45-9708-019B960494DF}">
+            <a:ext uri="{91240B29-F687-4F45-9708-019B960494DF}">
               <a14:hiddenLine xmlns:a14="http://schemas.microsoft.com/office/drawing/2010/main" w="9525" cap="flat">
                 <a:solidFill>
                   <a:srgbClr val="808080"/>
@@ -19974,7 +19974,7 @@
                 <a:tailEnd/>
               </a14:hiddenLine>
             </a:ext>
-            <a:ext uri="{AF507438-7753-43e0-B8FC-AC1667EBCBE1}">
+            <a:ext uri="{AF507438-7753-43E0-B8FC-AC1667EBCBE1}">
               <a14:hiddenEffects xmlns:a14="http://schemas.microsoft.com/office/drawing/2010/main">
                 <a:effectLst>
                   <a:outerShdw dist="35921" dir="2700000" algn="ctr" rotWithShape="0">
@@ -20190,11 +20190,11 @@
   <p:clrMapOvr>
     <a:masterClrMapping/>
   </p:clrMapOvr>
-  <p:transition xmlns:p14="http://schemas.microsoft.com/office/powerpoint/2010/main" spd="med"/>
+  <p:transition spd="med"/>
   <p:timing>
     <p:tnLst>
       <p:par>
-        <p:cTn xmlns:p14="http://schemas.microsoft.com/office/powerpoint/2010/main" id="1" dur="indefinite" restart="never" nodeType="tmRoot">
+        <p:cTn id="1" dur="indefinite" restart="never" nodeType="tmRoot">
           <p:childTnLst>
             <p:seq concurrent="1" nextAc="seek">
               <p:cTn id="2" dur="0" nodeType="mainSeq"/>
@@ -20306,14 +20306,14 @@
           </a:ln>
           <a:effectLst/>
           <a:extLst>
-            <a:ext uri="{909E8E84-426E-40dd-AFC4-6F175D3DCCD1}">
+            <a:ext uri="{909E8E84-426E-40DD-AFC4-6F175D3DCCD1}">
               <a14:hiddenFill xmlns:a14="http://schemas.microsoft.com/office/drawing/2010/main">
                 <a:solidFill>
                   <a:srgbClr val="FFFFFF"/>
                 </a:solidFill>
               </a14:hiddenFill>
             </a:ext>
-            <a:ext uri="{91240B29-F687-4f45-9708-019B960494DF}">
+            <a:ext uri="{91240B29-F687-4F45-9708-019B960494DF}">
               <a14:hiddenLine xmlns:a14="http://schemas.microsoft.com/office/drawing/2010/main" w="9525" cap="flat">
                 <a:solidFill>
                   <a:srgbClr val="808080"/>
@@ -20323,7 +20323,7 @@
                 <a:tailEnd/>
               </a14:hiddenLine>
             </a:ext>
-            <a:ext uri="{AF507438-7753-43e0-B8FC-AC1667EBCBE1}">
+            <a:ext uri="{AF507438-7753-43E0-B8FC-AC1667EBCBE1}">
               <a14:hiddenEffects xmlns:a14="http://schemas.microsoft.com/office/drawing/2010/main">
                 <a:effectLst>
                   <a:outerShdw dist="35921" dir="2700000" algn="ctr" rotWithShape="0">
@@ -20726,14 +20726,14 @@
           </a:ln>
           <a:effectLst/>
           <a:extLst>
-            <a:ext uri="{909E8E84-426E-40dd-AFC4-6F175D3DCCD1}">
+            <a:ext uri="{909E8E84-426E-40DD-AFC4-6F175D3DCCD1}">
               <a14:hiddenFill xmlns:a14="http://schemas.microsoft.com/office/drawing/2010/main">
                 <a:solidFill>
                   <a:srgbClr val="FFFFFF"/>
                 </a:solidFill>
               </a14:hiddenFill>
             </a:ext>
-            <a:ext uri="{91240B29-F687-4f45-9708-019B960494DF}">
+            <a:ext uri="{91240B29-F687-4F45-9708-019B960494DF}">
               <a14:hiddenLine xmlns:a14="http://schemas.microsoft.com/office/drawing/2010/main" w="9525" cap="flat">
                 <a:solidFill>
                   <a:srgbClr val="808080"/>
@@ -20743,7 +20743,7 @@
                 <a:tailEnd/>
               </a14:hiddenLine>
             </a:ext>
-            <a:ext uri="{AF507438-7753-43e0-B8FC-AC1667EBCBE1}">
+            <a:ext uri="{AF507438-7753-43E0-B8FC-AC1667EBCBE1}">
               <a14:hiddenEffects xmlns:a14="http://schemas.microsoft.com/office/drawing/2010/main">
                 <a:effectLst>
                   <a:outerShdw dist="35921" dir="2700000" algn="ctr" rotWithShape="0">
@@ -20959,11 +20959,11 @@
   <p:clrMapOvr>
     <a:masterClrMapping/>
   </p:clrMapOvr>
-  <p:transition xmlns:p14="http://schemas.microsoft.com/office/powerpoint/2010/main" spd="med"/>
+  <p:transition spd="med"/>
   <p:timing>
     <p:tnLst>
       <p:par>
-        <p:cTn xmlns:p14="http://schemas.microsoft.com/office/powerpoint/2010/main" id="1" dur="indefinite" restart="never" nodeType="tmRoot">
+        <p:cTn id="1" dur="indefinite" restart="never" nodeType="tmRoot">
           <p:childTnLst>
             <p:seq concurrent="1" nextAc="seek">
               <p:cTn id="2" dur="0" nodeType="mainSeq"/>
@@ -21075,14 +21075,14 @@
           </a:ln>
           <a:effectLst/>
           <a:extLst>
-            <a:ext uri="{909E8E84-426E-40dd-AFC4-6F175D3DCCD1}">
+            <a:ext uri="{909E8E84-426E-40DD-AFC4-6F175D3DCCD1}">
               <a14:hiddenFill xmlns:a14="http://schemas.microsoft.com/office/drawing/2010/main">
                 <a:solidFill>
                   <a:srgbClr val="FFFFFF"/>
                 </a:solidFill>
               </a14:hiddenFill>
             </a:ext>
-            <a:ext uri="{91240B29-F687-4f45-9708-019B960494DF}">
+            <a:ext uri="{91240B29-F687-4F45-9708-019B960494DF}">
               <a14:hiddenLine xmlns:a14="http://schemas.microsoft.com/office/drawing/2010/main" w="9525" cap="flat">
                 <a:solidFill>
                   <a:srgbClr val="808080"/>
@@ -21092,7 +21092,7 @@
                 <a:tailEnd/>
               </a14:hiddenLine>
             </a:ext>
-            <a:ext uri="{AF507438-7753-43e0-B8FC-AC1667EBCBE1}">
+            <a:ext uri="{AF507438-7753-43E0-B8FC-AC1667EBCBE1}">
               <a14:hiddenEffects xmlns:a14="http://schemas.microsoft.com/office/drawing/2010/main">
                 <a:effectLst>
                   <a:outerShdw dist="35921" dir="2700000" algn="ctr" rotWithShape="0">
@@ -21517,14 +21517,14 @@
           </a:ln>
           <a:effectLst/>
           <a:extLst>
-            <a:ext uri="{909E8E84-426E-40dd-AFC4-6F175D3DCCD1}">
+            <a:ext uri="{909E8E84-426E-40DD-AFC4-6F175D3DCCD1}">
               <a14:hiddenFill xmlns:a14="http://schemas.microsoft.com/office/drawing/2010/main">
                 <a:solidFill>
                   <a:srgbClr val="FFFFFF"/>
                 </a:solidFill>
               </a14:hiddenFill>
             </a:ext>
-            <a:ext uri="{91240B29-F687-4f45-9708-019B960494DF}">
+            <a:ext uri="{91240B29-F687-4F45-9708-019B960494DF}">
               <a14:hiddenLine xmlns:a14="http://schemas.microsoft.com/office/drawing/2010/main" w="9525" cap="flat">
                 <a:solidFill>
                   <a:srgbClr val="808080"/>
@@ -21534,7 +21534,7 @@
                 <a:tailEnd/>
               </a14:hiddenLine>
             </a:ext>
-            <a:ext uri="{AF507438-7753-43e0-B8FC-AC1667EBCBE1}">
+            <a:ext uri="{AF507438-7753-43E0-B8FC-AC1667EBCBE1}">
               <a14:hiddenEffects xmlns:a14="http://schemas.microsoft.com/office/drawing/2010/main">
                 <a:effectLst>
                   <a:outerShdw dist="35921" dir="2700000" algn="ctr" rotWithShape="0">
@@ -21750,11 +21750,11 @@
   <p:clrMapOvr>
     <a:masterClrMapping/>
   </p:clrMapOvr>
-  <p:transition xmlns:p14="http://schemas.microsoft.com/office/powerpoint/2010/main" spd="med"/>
+  <p:transition spd="med"/>
   <p:timing>
     <p:tnLst>
       <p:par>
-        <p:cTn xmlns:p14="http://schemas.microsoft.com/office/powerpoint/2010/main" id="1" dur="indefinite" restart="never" nodeType="tmRoot">
+        <p:cTn id="1" dur="indefinite" restart="never" nodeType="tmRoot">
           <p:childTnLst>
             <p:seq concurrent="1" nextAc="seek">
               <p:cTn id="2" dur="0" nodeType="mainSeq"/>
@@ -21866,14 +21866,14 @@
           </a:ln>
           <a:effectLst/>
           <a:extLst>
-            <a:ext uri="{909E8E84-426E-40dd-AFC4-6F175D3DCCD1}">
+            <a:ext uri="{909E8E84-426E-40DD-AFC4-6F175D3DCCD1}">
               <a14:hiddenFill xmlns:a14="http://schemas.microsoft.com/office/drawing/2010/main">
                 <a:solidFill>
                   <a:srgbClr val="FFFFFF"/>
                 </a:solidFill>
               </a14:hiddenFill>
             </a:ext>
-            <a:ext uri="{91240B29-F687-4f45-9708-019B960494DF}">
+            <a:ext uri="{91240B29-F687-4F45-9708-019B960494DF}">
               <a14:hiddenLine xmlns:a14="http://schemas.microsoft.com/office/drawing/2010/main" w="9525" cap="flat">
                 <a:solidFill>
                   <a:srgbClr val="808080"/>
@@ -21883,7 +21883,7 @@
                 <a:tailEnd/>
               </a14:hiddenLine>
             </a:ext>
-            <a:ext uri="{AF507438-7753-43e0-B8FC-AC1667EBCBE1}">
+            <a:ext uri="{AF507438-7753-43E0-B8FC-AC1667EBCBE1}">
               <a14:hiddenEffects xmlns:a14="http://schemas.microsoft.com/office/drawing/2010/main">
                 <a:effectLst>
                   <a:outerShdw dist="35921" dir="2700000" algn="ctr" rotWithShape="0">
@@ -22286,14 +22286,14 @@
           </a:ln>
           <a:effectLst/>
           <a:extLst>
-            <a:ext uri="{909E8E84-426E-40dd-AFC4-6F175D3DCCD1}">
+            <a:ext uri="{909E8E84-426E-40DD-AFC4-6F175D3DCCD1}">
               <a14:hiddenFill xmlns:a14="http://schemas.microsoft.com/office/drawing/2010/main">
                 <a:solidFill>
                   <a:srgbClr val="FFFFFF"/>
                 </a:solidFill>
               </a14:hiddenFill>
             </a:ext>
-            <a:ext uri="{91240B29-F687-4f45-9708-019B960494DF}">
+            <a:ext uri="{91240B29-F687-4F45-9708-019B960494DF}">
               <a14:hiddenLine xmlns:a14="http://schemas.microsoft.com/office/drawing/2010/main" w="9525" cap="flat">
                 <a:solidFill>
                   <a:srgbClr val="808080"/>
@@ -22303,7 +22303,7 @@
                 <a:tailEnd/>
               </a14:hiddenLine>
             </a:ext>
-            <a:ext uri="{AF507438-7753-43e0-B8FC-AC1667EBCBE1}">
+            <a:ext uri="{AF507438-7753-43E0-B8FC-AC1667EBCBE1}">
               <a14:hiddenEffects xmlns:a14="http://schemas.microsoft.com/office/drawing/2010/main">
                 <a:effectLst>
                   <a:outerShdw dist="35921" dir="2700000" algn="ctr" rotWithShape="0">
@@ -22519,11 +22519,11 @@
   <p:clrMapOvr>
     <a:masterClrMapping/>
   </p:clrMapOvr>
-  <p:transition xmlns:p14="http://schemas.microsoft.com/office/powerpoint/2010/main" spd="med"/>
+  <p:transition spd="med"/>
   <p:timing>
     <p:tnLst>
       <p:par>
-        <p:cTn xmlns:p14="http://schemas.microsoft.com/office/powerpoint/2010/main" id="1" dur="indefinite" restart="never" nodeType="tmRoot">
+        <p:cTn id="1" dur="indefinite" restart="never" nodeType="tmRoot">
           <p:childTnLst>
             <p:seq concurrent="1" nextAc="seek">
               <p:cTn id="2" dur="0" nodeType="mainSeq"/>
@@ -22638,14 +22638,14 @@
           </a:ln>
           <a:effectLst/>
           <a:extLst>
-            <a:ext uri="{909E8E84-426E-40dd-AFC4-6F175D3DCCD1}">
+            <a:ext uri="{909E8E84-426E-40DD-AFC4-6F175D3DCCD1}">
               <a14:hiddenFill xmlns:a14="http://schemas.microsoft.com/office/drawing/2010/main">
                 <a:solidFill>
                   <a:srgbClr val="FFFFFF"/>
                 </a:solidFill>
               </a14:hiddenFill>
             </a:ext>
-            <a:ext uri="{91240B29-F687-4f45-9708-019B960494DF}">
+            <a:ext uri="{91240B29-F687-4F45-9708-019B960494DF}">
               <a14:hiddenLine xmlns:a14="http://schemas.microsoft.com/office/drawing/2010/main" w="9525" cap="flat">
                 <a:solidFill>
                   <a:srgbClr val="808080"/>
@@ -22655,7 +22655,7 @@
                 <a:tailEnd/>
               </a14:hiddenLine>
             </a:ext>
-            <a:ext uri="{AF507438-7753-43e0-B8FC-AC1667EBCBE1}">
+            <a:ext uri="{AF507438-7753-43E0-B8FC-AC1667EBCBE1}">
               <a14:hiddenEffects xmlns:a14="http://schemas.microsoft.com/office/drawing/2010/main">
                 <a:effectLst>
                   <a:outerShdw dist="35921" dir="2700000" algn="ctr" rotWithShape="0">
@@ -23055,14 +23055,14 @@
           </a:ln>
           <a:effectLst/>
           <a:extLst>
-            <a:ext uri="{909E8E84-426E-40dd-AFC4-6F175D3DCCD1}">
+            <a:ext uri="{909E8E84-426E-40DD-AFC4-6F175D3DCCD1}">
               <a14:hiddenFill xmlns:a14="http://schemas.microsoft.com/office/drawing/2010/main">
                 <a:solidFill>
                   <a:srgbClr val="FFFFFF"/>
                 </a:solidFill>
               </a14:hiddenFill>
             </a:ext>
-            <a:ext uri="{91240B29-F687-4f45-9708-019B960494DF}">
+            <a:ext uri="{91240B29-F687-4F45-9708-019B960494DF}">
               <a14:hiddenLine xmlns:a14="http://schemas.microsoft.com/office/drawing/2010/main" w="9525" cap="flat">
                 <a:solidFill>
                   <a:srgbClr val="808080"/>
@@ -23072,7 +23072,7 @@
                 <a:tailEnd/>
               </a14:hiddenLine>
             </a:ext>
-            <a:ext uri="{AF507438-7753-43e0-B8FC-AC1667EBCBE1}">
+            <a:ext uri="{AF507438-7753-43E0-B8FC-AC1667EBCBE1}">
               <a14:hiddenEffects xmlns:a14="http://schemas.microsoft.com/office/drawing/2010/main">
                 <a:effectLst>
                   <a:outerShdw dist="35921" dir="2700000" algn="ctr" rotWithShape="0">
@@ -23288,11 +23288,11 @@
   <p:clrMapOvr>
     <a:masterClrMapping/>
   </p:clrMapOvr>
-  <p:transition xmlns:p14="http://schemas.microsoft.com/office/powerpoint/2010/main" spd="med"/>
+  <p:transition spd="med"/>
   <p:timing>
     <p:tnLst>
       <p:par>
-        <p:cTn xmlns:p14="http://schemas.microsoft.com/office/powerpoint/2010/main" id="1" dur="indefinite" restart="never" nodeType="tmRoot">
+        <p:cTn id="1" dur="indefinite" restart="never" nodeType="tmRoot">
           <p:childTnLst>
             <p:seq concurrent="1" nextAc="seek">
               <p:cTn id="2" dur="0" nodeType="mainSeq"/>
@@ -23404,14 +23404,14 @@
           </a:ln>
           <a:effectLst/>
           <a:extLst>
-            <a:ext uri="{909E8E84-426E-40dd-AFC4-6F175D3DCCD1}">
+            <a:ext uri="{909E8E84-426E-40DD-AFC4-6F175D3DCCD1}">
               <a14:hiddenFill xmlns:a14="http://schemas.microsoft.com/office/drawing/2010/main">
                 <a:solidFill>
                   <a:srgbClr val="FFFFFF"/>
                 </a:solidFill>
               </a14:hiddenFill>
             </a:ext>
-            <a:ext uri="{91240B29-F687-4f45-9708-019B960494DF}">
+            <a:ext uri="{91240B29-F687-4F45-9708-019B960494DF}">
               <a14:hiddenLine xmlns:a14="http://schemas.microsoft.com/office/drawing/2010/main" w="9525" cap="flat">
                 <a:solidFill>
                   <a:srgbClr val="808080"/>
@@ -23421,7 +23421,7 @@
                 <a:tailEnd/>
               </a14:hiddenLine>
             </a:ext>
-            <a:ext uri="{AF507438-7753-43e0-B8FC-AC1667EBCBE1}">
+            <a:ext uri="{AF507438-7753-43E0-B8FC-AC1667EBCBE1}">
               <a14:hiddenEffects xmlns:a14="http://schemas.microsoft.com/office/drawing/2010/main">
                 <a:effectLst>
                   <a:outerShdw dist="35921" dir="2700000" algn="ctr" rotWithShape="0">
@@ -23846,14 +23846,14 @@
           </a:ln>
           <a:effectLst/>
           <a:extLst>
-            <a:ext uri="{909E8E84-426E-40dd-AFC4-6F175D3DCCD1}">
+            <a:ext uri="{909E8E84-426E-40DD-AFC4-6F175D3DCCD1}">
               <a14:hiddenFill xmlns:a14="http://schemas.microsoft.com/office/drawing/2010/main">
                 <a:solidFill>
                   <a:srgbClr val="FFFFFF"/>
                 </a:solidFill>
               </a14:hiddenFill>
             </a:ext>
-            <a:ext uri="{91240B29-F687-4f45-9708-019B960494DF}">
+            <a:ext uri="{91240B29-F687-4F45-9708-019B960494DF}">
               <a14:hiddenLine xmlns:a14="http://schemas.microsoft.com/office/drawing/2010/main" w="9525" cap="flat">
                 <a:solidFill>
                   <a:srgbClr val="808080"/>
@@ -23863,7 +23863,7 @@
                 <a:tailEnd/>
               </a14:hiddenLine>
             </a:ext>
-            <a:ext uri="{AF507438-7753-43e0-B8FC-AC1667EBCBE1}">
+            <a:ext uri="{AF507438-7753-43E0-B8FC-AC1667EBCBE1}">
               <a14:hiddenEffects xmlns:a14="http://schemas.microsoft.com/office/drawing/2010/main">
                 <a:effectLst>
                   <a:outerShdw dist="35921" dir="2700000" algn="ctr" rotWithShape="0">
@@ -24079,11 +24079,11 @@
   <p:clrMapOvr>
     <a:masterClrMapping/>
   </p:clrMapOvr>
-  <p:transition xmlns:p14="http://schemas.microsoft.com/office/powerpoint/2010/main" spd="med"/>
+  <p:transition spd="med"/>
   <p:timing>
     <p:tnLst>
       <p:par>
-        <p:cTn xmlns:p14="http://schemas.microsoft.com/office/powerpoint/2010/main" id="1" dur="indefinite" restart="never" nodeType="tmRoot">
+        <p:cTn id="1" dur="indefinite" restart="never" nodeType="tmRoot">
           <p:childTnLst>
             <p:seq concurrent="1" nextAc="seek">
               <p:cTn id="2" dur="0" nodeType="mainSeq"/>
@@ -24206,14 +24206,14 @@
           </a:ln>
           <a:effectLst/>
           <a:extLst>
-            <a:ext uri="{909E8E84-426E-40dd-AFC4-6F175D3DCCD1}">
+            <a:ext uri="{909E8E84-426E-40DD-AFC4-6F175D3DCCD1}">
               <a14:hiddenFill xmlns:a14="http://schemas.microsoft.com/office/drawing/2010/main">
                 <a:solidFill>
                   <a:srgbClr val="FFFFFF"/>
                 </a:solidFill>
               </a14:hiddenFill>
             </a:ext>
-            <a:ext uri="{91240B29-F687-4f45-9708-019B960494DF}">
+            <a:ext uri="{91240B29-F687-4F45-9708-019B960494DF}">
               <a14:hiddenLine xmlns:a14="http://schemas.microsoft.com/office/drawing/2010/main" w="9525" cap="flat">
                 <a:solidFill>
                   <a:srgbClr val="808080"/>
@@ -24223,7 +24223,7 @@
                 <a:tailEnd/>
               </a14:hiddenLine>
             </a:ext>
-            <a:ext uri="{AF507438-7753-43e0-B8FC-AC1667EBCBE1}">
+            <a:ext uri="{AF507438-7753-43E0-B8FC-AC1667EBCBE1}">
               <a14:hiddenEffects xmlns:a14="http://schemas.microsoft.com/office/drawing/2010/main">
                 <a:effectLst>
                   <a:outerShdw dist="35921" dir="2700000" algn="ctr" rotWithShape="0">
@@ -24626,14 +24626,14 @@
           </a:ln>
           <a:effectLst/>
           <a:extLst>
-            <a:ext uri="{909E8E84-426E-40dd-AFC4-6F175D3DCCD1}">
+            <a:ext uri="{909E8E84-426E-40DD-AFC4-6F175D3DCCD1}">
               <a14:hiddenFill xmlns:a14="http://schemas.microsoft.com/office/drawing/2010/main">
                 <a:solidFill>
                   <a:srgbClr val="FFFFFF"/>
                 </a:solidFill>
               </a14:hiddenFill>
             </a:ext>
-            <a:ext uri="{91240B29-F687-4f45-9708-019B960494DF}">
+            <a:ext uri="{91240B29-F687-4F45-9708-019B960494DF}">
               <a14:hiddenLine xmlns:a14="http://schemas.microsoft.com/office/drawing/2010/main" w="9525" cap="flat">
                 <a:solidFill>
                   <a:srgbClr val="808080"/>
@@ -24643,7 +24643,7 @@
                 <a:tailEnd/>
               </a14:hiddenLine>
             </a:ext>
-            <a:ext uri="{AF507438-7753-43e0-B8FC-AC1667EBCBE1}">
+            <a:ext uri="{AF507438-7753-43E0-B8FC-AC1667EBCBE1}">
               <a14:hiddenEffects xmlns:a14="http://schemas.microsoft.com/office/drawing/2010/main">
                 <a:effectLst>
                   <a:outerShdw dist="35921" dir="2700000" algn="ctr" rotWithShape="0">
@@ -24859,11 +24859,11 @@
   <p:clrMapOvr>
     <a:masterClrMapping/>
   </p:clrMapOvr>
-  <p:transition xmlns:p14="http://schemas.microsoft.com/office/powerpoint/2010/main" spd="med"/>
+  <p:transition spd="med"/>
   <p:timing>
     <p:tnLst>
       <p:par>
-        <p:cTn xmlns:p14="http://schemas.microsoft.com/office/powerpoint/2010/main" id="1" dur="indefinite" restart="never" nodeType="tmRoot">
+        <p:cTn id="1" dur="indefinite" restart="never" nodeType="tmRoot">
           <p:childTnLst>
             <p:seq concurrent="1" nextAc="seek">
               <p:cTn id="2" dur="0" nodeType="mainSeq"/>
@@ -24986,14 +24986,14 @@
           </a:ln>
           <a:effectLst/>
           <a:extLst>
-            <a:ext uri="{909E8E84-426E-40dd-AFC4-6F175D3DCCD1}">
+            <a:ext uri="{909E8E84-426E-40DD-AFC4-6F175D3DCCD1}">
               <a14:hiddenFill xmlns:a14="http://schemas.microsoft.com/office/drawing/2010/main">
                 <a:solidFill>
                   <a:srgbClr val="FFFFFF"/>
                 </a:solidFill>
               </a14:hiddenFill>
             </a:ext>
-            <a:ext uri="{91240B29-F687-4f45-9708-019B960494DF}">
+            <a:ext uri="{91240B29-F687-4F45-9708-019B960494DF}">
               <a14:hiddenLine xmlns:a14="http://schemas.microsoft.com/office/drawing/2010/main" w="9525" cap="flat">
                 <a:solidFill>
                   <a:srgbClr val="808080"/>
@@ -25003,7 +25003,7 @@
                 <a:tailEnd/>
               </a14:hiddenLine>
             </a:ext>
-            <a:ext uri="{AF507438-7753-43e0-B8FC-AC1667EBCBE1}">
+            <a:ext uri="{AF507438-7753-43E0-B8FC-AC1667EBCBE1}">
               <a14:hiddenEffects xmlns:a14="http://schemas.microsoft.com/office/drawing/2010/main">
                 <a:effectLst>
                   <a:outerShdw dist="35921" dir="2700000" algn="ctr" rotWithShape="0">
@@ -25428,14 +25428,14 @@
           </a:ln>
           <a:effectLst/>
           <a:extLst>
-            <a:ext uri="{909E8E84-426E-40dd-AFC4-6F175D3DCCD1}">
+            <a:ext uri="{909E8E84-426E-40DD-AFC4-6F175D3DCCD1}">
               <a14:hiddenFill xmlns:a14="http://schemas.microsoft.com/office/drawing/2010/main">
                 <a:solidFill>
                   <a:srgbClr val="FFFFFF"/>
                 </a:solidFill>
               </a14:hiddenFill>
             </a:ext>
-            <a:ext uri="{91240B29-F687-4f45-9708-019B960494DF}">
+            <a:ext uri="{91240B29-F687-4F45-9708-019B960494DF}">
               <a14:hiddenLine xmlns:a14="http://schemas.microsoft.com/office/drawing/2010/main" w="9525" cap="flat">
                 <a:solidFill>
                   <a:srgbClr val="808080"/>
@@ -25445,7 +25445,7 @@
                 <a:tailEnd/>
               </a14:hiddenLine>
             </a:ext>
-            <a:ext uri="{AF507438-7753-43e0-B8FC-AC1667EBCBE1}">
+            <a:ext uri="{AF507438-7753-43E0-B8FC-AC1667EBCBE1}">
               <a14:hiddenEffects xmlns:a14="http://schemas.microsoft.com/office/drawing/2010/main">
                 <a:effectLst>
                   <a:outerShdw dist="35921" dir="2700000" algn="ctr" rotWithShape="0">
@@ -25561,14 +25561,14 @@
           </a:ln>
           <a:effectLst/>
           <a:extLst>
-            <a:ext uri="{909E8E84-426E-40dd-AFC4-6F175D3DCCD1}">
+            <a:ext uri="{909E8E84-426E-40DD-AFC4-6F175D3DCCD1}">
               <a14:hiddenFill xmlns:a14="http://schemas.microsoft.com/office/drawing/2010/main">
                 <a:solidFill>
                   <a:srgbClr val="FFFFFF"/>
                 </a:solidFill>
               </a14:hiddenFill>
             </a:ext>
-            <a:ext uri="{91240B29-F687-4f45-9708-019B960494DF}">
+            <a:ext uri="{91240B29-F687-4F45-9708-019B960494DF}">
               <a14:hiddenLine xmlns:a14="http://schemas.microsoft.com/office/drawing/2010/main" w="9525" cap="flat">
                 <a:solidFill>
                   <a:srgbClr val="808080"/>
@@ -25578,7 +25578,7 @@
                 <a:tailEnd/>
               </a14:hiddenLine>
             </a:ext>
-            <a:ext uri="{AF507438-7753-43e0-B8FC-AC1667EBCBE1}">
+            <a:ext uri="{AF507438-7753-43E0-B8FC-AC1667EBCBE1}">
               <a14:hiddenEffects xmlns:a14="http://schemas.microsoft.com/office/drawing/2010/main">
                 <a:effectLst>
                   <a:outerShdw dist="35921" dir="2700000" algn="ctr" rotWithShape="0">
@@ -25794,11 +25794,11 @@
   <p:clrMapOvr>
     <a:masterClrMapping/>
   </p:clrMapOvr>
-  <p:transition xmlns:p14="http://schemas.microsoft.com/office/powerpoint/2010/main" spd="med"/>
+  <p:transition spd="med"/>
   <p:timing>
     <p:tnLst>
       <p:par>
-        <p:cTn xmlns:p14="http://schemas.microsoft.com/office/powerpoint/2010/main" id="1" dur="indefinite" restart="never" nodeType="tmRoot">
+        <p:cTn id="1" dur="indefinite" restart="never" nodeType="tmRoot">
           <p:childTnLst>
             <p:seq concurrent="1" nextAc="seek">
               <p:cTn id="2" dur="0" nodeType="mainSeq"/>
@@ -25910,14 +25910,14 @@
           </a:ln>
           <a:effectLst/>
           <a:extLst>
-            <a:ext uri="{909E8E84-426E-40dd-AFC4-6F175D3DCCD1}">
+            <a:ext uri="{909E8E84-426E-40DD-AFC4-6F175D3DCCD1}">
               <a14:hiddenFill xmlns:a14="http://schemas.microsoft.com/office/drawing/2010/main">
                 <a:solidFill>
                   <a:srgbClr val="FFFFFF"/>
                 </a:solidFill>
               </a14:hiddenFill>
             </a:ext>
-            <a:ext uri="{91240B29-F687-4f45-9708-019B960494DF}">
+            <a:ext uri="{91240B29-F687-4F45-9708-019B960494DF}">
               <a14:hiddenLine xmlns:a14="http://schemas.microsoft.com/office/drawing/2010/main" w="9525" cap="flat">
                 <a:solidFill>
                   <a:srgbClr val="808080"/>
@@ -25927,7 +25927,7 @@
                 <a:tailEnd/>
               </a14:hiddenLine>
             </a:ext>
-            <a:ext uri="{AF507438-7753-43e0-B8FC-AC1667EBCBE1}">
+            <a:ext uri="{AF507438-7753-43E0-B8FC-AC1667EBCBE1}">
               <a14:hiddenEffects xmlns:a14="http://schemas.microsoft.com/office/drawing/2010/main">
                 <a:effectLst>
                   <a:outerShdw dist="35921" dir="2700000" algn="ctr" rotWithShape="0">
@@ -26409,14 +26409,14 @@
           </a:ln>
           <a:effectLst/>
           <a:extLst>
-            <a:ext uri="{909E8E84-426E-40dd-AFC4-6F175D3DCCD1}">
+            <a:ext uri="{909E8E84-426E-40DD-AFC4-6F175D3DCCD1}">
               <a14:hiddenFill xmlns:a14="http://schemas.microsoft.com/office/drawing/2010/main">
                 <a:solidFill>
                   <a:srgbClr val="FFFFFF"/>
                 </a:solidFill>
               </a14:hiddenFill>
             </a:ext>
-            <a:ext uri="{91240B29-F687-4f45-9708-019B960494DF}">
+            <a:ext uri="{91240B29-F687-4F45-9708-019B960494DF}">
               <a14:hiddenLine xmlns:a14="http://schemas.microsoft.com/office/drawing/2010/main" w="9525" cap="flat">
                 <a:solidFill>
                   <a:srgbClr val="808080"/>
@@ -26426,7 +26426,7 @@
                 <a:tailEnd/>
               </a14:hiddenLine>
             </a:ext>
-            <a:ext uri="{AF507438-7753-43e0-B8FC-AC1667EBCBE1}">
+            <a:ext uri="{AF507438-7753-43E0-B8FC-AC1667EBCBE1}">
               <a14:hiddenEffects xmlns:a14="http://schemas.microsoft.com/office/drawing/2010/main">
                 <a:effectLst>
                   <a:outerShdw dist="35921" dir="2700000" algn="ctr" rotWithShape="0">
@@ -26642,11 +26642,11 @@
   <p:clrMapOvr>
     <a:masterClrMapping/>
   </p:clrMapOvr>
-  <p:transition xmlns:p14="http://schemas.microsoft.com/office/powerpoint/2010/main" spd="med"/>
+  <p:transition spd="med"/>
   <p:timing>
     <p:tnLst>
       <p:par>
-        <p:cTn xmlns:p14="http://schemas.microsoft.com/office/powerpoint/2010/main" id="1" dur="indefinite" restart="never" nodeType="tmRoot">
+        <p:cTn id="1" dur="indefinite" restart="never" nodeType="tmRoot">
           <p:childTnLst>
             <p:seq concurrent="1" nextAc="seek">
               <p:cTn id="2" dur="0" nodeType="mainSeq"/>
@@ -26769,14 +26769,14 @@
           </a:ln>
           <a:effectLst/>
           <a:extLst>
-            <a:ext uri="{909E8E84-426E-40dd-AFC4-6F175D3DCCD1}">
+            <a:ext uri="{909E8E84-426E-40DD-AFC4-6F175D3DCCD1}">
               <a14:hiddenFill xmlns:a14="http://schemas.microsoft.com/office/drawing/2010/main">
                 <a:solidFill>
                   <a:srgbClr val="FFFFFF"/>
                 </a:solidFill>
               </a14:hiddenFill>
             </a:ext>
-            <a:ext uri="{91240B29-F687-4f45-9708-019B960494DF}">
+            <a:ext uri="{91240B29-F687-4F45-9708-019B960494DF}">
               <a14:hiddenLine xmlns:a14="http://schemas.microsoft.com/office/drawing/2010/main" w="9525" cap="flat">
                 <a:solidFill>
                   <a:srgbClr val="808080"/>
@@ -26786,7 +26786,7 @@
                 <a:tailEnd/>
               </a14:hiddenLine>
             </a:ext>
-            <a:ext uri="{AF507438-7753-43e0-B8FC-AC1667EBCBE1}">
+            <a:ext uri="{AF507438-7753-43E0-B8FC-AC1667EBCBE1}">
               <a14:hiddenEffects xmlns:a14="http://schemas.microsoft.com/office/drawing/2010/main">
                 <a:effectLst>
                   <a:outerShdw dist="35921" dir="2700000" algn="ctr" rotWithShape="0">
@@ -27189,14 +27189,14 @@
           </a:ln>
           <a:effectLst/>
           <a:extLst>
-            <a:ext uri="{909E8E84-426E-40dd-AFC4-6F175D3DCCD1}">
+            <a:ext uri="{909E8E84-426E-40DD-AFC4-6F175D3DCCD1}">
               <a14:hiddenFill xmlns:a14="http://schemas.microsoft.com/office/drawing/2010/main">
                 <a:solidFill>
                   <a:srgbClr val="FFFFFF"/>
                 </a:solidFill>
               </a14:hiddenFill>
             </a:ext>
-            <a:ext uri="{91240B29-F687-4f45-9708-019B960494DF}">
+            <a:ext uri="{91240B29-F687-4F45-9708-019B960494DF}">
               <a14:hiddenLine xmlns:a14="http://schemas.microsoft.com/office/drawing/2010/main" w="9525" cap="flat">
                 <a:solidFill>
                   <a:srgbClr val="808080"/>
@@ -27206,7 +27206,7 @@
                 <a:tailEnd/>
               </a14:hiddenLine>
             </a:ext>
-            <a:ext uri="{AF507438-7753-43e0-B8FC-AC1667EBCBE1}">
+            <a:ext uri="{AF507438-7753-43E0-B8FC-AC1667EBCBE1}">
               <a14:hiddenEffects xmlns:a14="http://schemas.microsoft.com/office/drawing/2010/main">
                 <a:effectLst>
                   <a:outerShdw dist="35921" dir="2700000" algn="ctr" rotWithShape="0">
@@ -27391,14 +27391,14 @@
           </a:ln>
           <a:effectLst/>
           <a:extLst>
-            <a:ext uri="{909E8E84-426E-40dd-AFC4-6F175D3DCCD1}">
+            <a:ext uri="{909E8E84-426E-40DD-AFC4-6F175D3DCCD1}">
               <a14:hiddenFill xmlns:a14="http://schemas.microsoft.com/office/drawing/2010/main">
                 <a:solidFill>
                   <a:srgbClr val="FFFFFF"/>
                 </a:solidFill>
               </a14:hiddenFill>
             </a:ext>
-            <a:ext uri="{91240B29-F687-4f45-9708-019B960494DF}">
+            <a:ext uri="{91240B29-F687-4F45-9708-019B960494DF}">
               <a14:hiddenLine xmlns:a14="http://schemas.microsoft.com/office/drawing/2010/main" w="9525" cap="flat">
                 <a:solidFill>
                   <a:srgbClr val="808080"/>
@@ -27408,7 +27408,7 @@
                 <a:tailEnd/>
               </a14:hiddenLine>
             </a:ext>
-            <a:ext uri="{AF507438-7753-43e0-B8FC-AC1667EBCBE1}">
+            <a:ext uri="{AF507438-7753-43E0-B8FC-AC1667EBCBE1}">
               <a14:hiddenEffects xmlns:a14="http://schemas.microsoft.com/office/drawing/2010/main">
                 <a:effectLst>
                   <a:outerShdw dist="35921" dir="2700000" algn="ctr" rotWithShape="0">
@@ -27624,11 +27624,11 @@
   <p:clrMapOvr>
     <a:masterClrMapping/>
   </p:clrMapOvr>
-  <p:transition xmlns:p14="http://schemas.microsoft.com/office/powerpoint/2010/main" spd="med"/>
+  <p:transition spd="med"/>
   <p:timing>
     <p:tnLst>
       <p:par>
-        <p:cTn xmlns:p14="http://schemas.microsoft.com/office/powerpoint/2010/main" id="1" dur="indefinite" restart="never" nodeType="tmRoot">
+        <p:cTn id="1" dur="indefinite" restart="never" nodeType="tmRoot">
           <p:childTnLst>
             <p:seq concurrent="1" nextAc="seek">
               <p:cTn id="2" dur="0" nodeType="mainSeq"/>
@@ -27740,14 +27740,14 @@
           </a:ln>
           <a:effectLst/>
           <a:extLst>
-            <a:ext uri="{909E8E84-426E-40dd-AFC4-6F175D3DCCD1}">
+            <a:ext uri="{909E8E84-426E-40DD-AFC4-6F175D3DCCD1}">
               <a14:hiddenFill xmlns:a14="http://schemas.microsoft.com/office/drawing/2010/main">
                 <a:solidFill>
                   <a:srgbClr val="FFFFFF"/>
                 </a:solidFill>
               </a14:hiddenFill>
             </a:ext>
-            <a:ext uri="{91240B29-F687-4f45-9708-019B960494DF}">
+            <a:ext uri="{91240B29-F687-4F45-9708-019B960494DF}">
               <a14:hiddenLine xmlns:a14="http://schemas.microsoft.com/office/drawing/2010/main" w="9525" cap="flat">
                 <a:solidFill>
                   <a:srgbClr val="808080"/>
@@ -27757,7 +27757,7 @@
                 <a:tailEnd/>
               </a14:hiddenLine>
             </a:ext>
-            <a:ext uri="{AF507438-7753-43e0-B8FC-AC1667EBCBE1}">
+            <a:ext uri="{AF507438-7753-43E0-B8FC-AC1667EBCBE1}">
               <a14:hiddenEffects xmlns:a14="http://schemas.microsoft.com/office/drawing/2010/main">
                 <a:effectLst>
                   <a:outerShdw dist="35921" dir="2700000" algn="ctr" rotWithShape="0">
@@ -28239,14 +28239,14 @@
           </a:ln>
           <a:effectLst/>
           <a:extLst>
-            <a:ext uri="{909E8E84-426E-40dd-AFC4-6F175D3DCCD1}">
+            <a:ext uri="{909E8E84-426E-40DD-AFC4-6F175D3DCCD1}">
               <a14:hiddenFill xmlns:a14="http://schemas.microsoft.com/office/drawing/2010/main">
                 <a:solidFill>
                   <a:srgbClr val="FFFFFF"/>
                 </a:solidFill>
               </a14:hiddenFill>
             </a:ext>
-            <a:ext uri="{91240B29-F687-4f45-9708-019B960494DF}">
+            <a:ext uri="{91240B29-F687-4F45-9708-019B960494DF}">
               <a14:hiddenLine xmlns:a14="http://schemas.microsoft.com/office/drawing/2010/main" w="9525" cap="flat">
                 <a:solidFill>
                   <a:srgbClr val="808080"/>
@@ -28256,7 +28256,7 @@
                 <a:tailEnd/>
               </a14:hiddenLine>
             </a:ext>
-            <a:ext uri="{AF507438-7753-43e0-B8FC-AC1667EBCBE1}">
+            <a:ext uri="{AF507438-7753-43E0-B8FC-AC1667EBCBE1}">
               <a14:hiddenEffects xmlns:a14="http://schemas.microsoft.com/office/drawing/2010/main">
                 <a:effectLst>
                   <a:outerShdw dist="35921" dir="2700000" algn="ctr" rotWithShape="0">
@@ -28472,11 +28472,11 @@
   <p:clrMapOvr>
     <a:masterClrMapping/>
   </p:clrMapOvr>
-  <p:transition xmlns:p14="http://schemas.microsoft.com/office/powerpoint/2010/main" spd="med"/>
+  <p:transition spd="med"/>
   <p:timing>
     <p:tnLst>
       <p:par>
-        <p:cTn xmlns:p14="http://schemas.microsoft.com/office/powerpoint/2010/main" id="1" dur="indefinite" restart="never" nodeType="tmRoot">
+        <p:cTn id="1" dur="indefinite" restart="never" nodeType="tmRoot">
           <p:childTnLst>
             <p:seq concurrent="1" nextAc="seek">
               <p:cTn id="2" dur="0" nodeType="mainSeq"/>
@@ -28599,14 +28599,14 @@
           </a:ln>
           <a:effectLst/>
           <a:extLst>
-            <a:ext uri="{909E8E84-426E-40dd-AFC4-6F175D3DCCD1}">
+            <a:ext uri="{909E8E84-426E-40DD-AFC4-6F175D3DCCD1}">
               <a14:hiddenFill xmlns:a14="http://schemas.microsoft.com/office/drawing/2010/main">
                 <a:solidFill>
                   <a:srgbClr val="FFFFFF"/>
                 </a:solidFill>
               </a14:hiddenFill>
             </a:ext>
-            <a:ext uri="{91240B29-F687-4f45-9708-019B960494DF}">
+            <a:ext uri="{91240B29-F687-4F45-9708-019B960494DF}">
               <a14:hiddenLine xmlns:a14="http://schemas.microsoft.com/office/drawing/2010/main" w="9525" cap="flat">
                 <a:solidFill>
                   <a:srgbClr val="808080"/>
@@ -28616,7 +28616,7 @@
                 <a:tailEnd/>
               </a14:hiddenLine>
             </a:ext>
-            <a:ext uri="{AF507438-7753-43e0-B8FC-AC1667EBCBE1}">
+            <a:ext uri="{AF507438-7753-43E0-B8FC-AC1667EBCBE1}">
               <a14:hiddenEffects xmlns:a14="http://schemas.microsoft.com/office/drawing/2010/main">
                 <a:effectLst>
                   <a:outerShdw dist="35921" dir="2700000" algn="ctr" rotWithShape="0">
@@ -29041,14 +29041,14 @@
           </a:ln>
           <a:effectLst/>
           <a:extLst>
-            <a:ext uri="{909E8E84-426E-40dd-AFC4-6F175D3DCCD1}">
+            <a:ext uri="{909E8E84-426E-40DD-AFC4-6F175D3DCCD1}">
               <a14:hiddenFill xmlns:a14="http://schemas.microsoft.com/office/drawing/2010/main">
                 <a:solidFill>
                   <a:srgbClr val="FFFFFF"/>
                 </a:solidFill>
               </a14:hiddenFill>
             </a:ext>
-            <a:ext uri="{91240B29-F687-4f45-9708-019B960494DF}">
+            <a:ext uri="{91240B29-F687-4F45-9708-019B960494DF}">
               <a14:hiddenLine xmlns:a14="http://schemas.microsoft.com/office/drawing/2010/main" w="9525" cap="flat">
                 <a:solidFill>
                   <a:srgbClr val="808080"/>
@@ -29058,7 +29058,7 @@
                 <a:tailEnd/>
               </a14:hiddenLine>
             </a:ext>
-            <a:ext uri="{AF507438-7753-43e0-B8FC-AC1667EBCBE1}">
+            <a:ext uri="{AF507438-7753-43E0-B8FC-AC1667EBCBE1}">
               <a14:hiddenEffects xmlns:a14="http://schemas.microsoft.com/office/drawing/2010/main">
                 <a:effectLst>
                   <a:outerShdw dist="35921" dir="2700000" algn="ctr" rotWithShape="0">
@@ -29243,14 +29243,14 @@
           </a:ln>
           <a:effectLst/>
           <a:extLst>
-            <a:ext uri="{909E8E84-426E-40dd-AFC4-6F175D3DCCD1}">
+            <a:ext uri="{909E8E84-426E-40DD-AFC4-6F175D3DCCD1}">
               <a14:hiddenFill xmlns:a14="http://schemas.microsoft.com/office/drawing/2010/main">
                 <a:solidFill>
                   <a:srgbClr val="FFFFFF"/>
                 </a:solidFill>
               </a14:hiddenFill>
             </a:ext>
-            <a:ext uri="{91240B29-F687-4f45-9708-019B960494DF}">
+            <a:ext uri="{91240B29-F687-4F45-9708-019B960494DF}">
               <a14:hiddenLine xmlns:a14="http://schemas.microsoft.com/office/drawing/2010/main" w="9525" cap="flat">
                 <a:solidFill>
                   <a:srgbClr val="808080"/>
@@ -29260,7 +29260,7 @@
                 <a:tailEnd/>
               </a14:hiddenLine>
             </a:ext>
-            <a:ext uri="{AF507438-7753-43e0-B8FC-AC1667EBCBE1}">
+            <a:ext uri="{AF507438-7753-43E0-B8FC-AC1667EBCBE1}">
               <a14:hiddenEffects xmlns:a14="http://schemas.microsoft.com/office/drawing/2010/main">
                 <a:effectLst>
                   <a:outerShdw dist="35921" dir="2700000" algn="ctr" rotWithShape="0">
@@ -29476,11 +29476,11 @@
   <p:clrMapOvr>
     <a:masterClrMapping/>
   </p:clrMapOvr>
-  <p:transition xmlns:p14="http://schemas.microsoft.com/office/powerpoint/2010/main" spd="med"/>
+  <p:transition spd="med"/>
   <p:timing>
     <p:tnLst>
       <p:par>
-        <p:cTn xmlns:p14="http://schemas.microsoft.com/office/powerpoint/2010/main" id="1" dur="indefinite" restart="never" nodeType="tmRoot">
+        <p:cTn id="1" dur="indefinite" restart="never" nodeType="tmRoot">
           <p:childTnLst>
             <p:seq concurrent="1" nextAc="seek">
               <p:cTn id="2" dur="0" nodeType="mainSeq"/>
@@ -29592,14 +29592,14 @@
           </a:ln>
           <a:effectLst/>
           <a:extLst>
-            <a:ext uri="{909E8E84-426E-40dd-AFC4-6F175D3DCCD1}">
+            <a:ext uri="{909E8E84-426E-40DD-AFC4-6F175D3DCCD1}">
               <a14:hiddenFill xmlns:a14="http://schemas.microsoft.com/office/drawing/2010/main">
                 <a:solidFill>
                   <a:srgbClr val="FFFFFF"/>
                 </a:solidFill>
               </a14:hiddenFill>
             </a:ext>
-            <a:ext uri="{91240B29-F687-4f45-9708-019B960494DF}">
+            <a:ext uri="{91240B29-F687-4F45-9708-019B960494DF}">
               <a14:hiddenLine xmlns:a14="http://schemas.microsoft.com/office/drawing/2010/main" w="9525" cap="flat">
                 <a:solidFill>
                   <a:srgbClr val="808080"/>
@@ -29609,7 +29609,7 @@
                 <a:tailEnd/>
               </a14:hiddenLine>
             </a:ext>
-            <a:ext uri="{AF507438-7753-43e0-B8FC-AC1667EBCBE1}">
+            <a:ext uri="{AF507438-7753-43E0-B8FC-AC1667EBCBE1}">
               <a14:hiddenEffects xmlns:a14="http://schemas.microsoft.com/office/drawing/2010/main">
                 <a:effectLst>
                   <a:outerShdw dist="35921" dir="2700000" algn="ctr" rotWithShape="0">
@@ -30072,14 +30072,14 @@
           </a:ln>
           <a:effectLst/>
           <a:extLst>
-            <a:ext uri="{909E8E84-426E-40dd-AFC4-6F175D3DCCD1}">
+            <a:ext uri="{909E8E84-426E-40DD-AFC4-6F175D3DCCD1}">
               <a14:hiddenFill xmlns:a14="http://schemas.microsoft.com/office/drawing/2010/main">
                 <a:solidFill>
                   <a:srgbClr val="FFFFFF"/>
                 </a:solidFill>
               </a14:hiddenFill>
             </a:ext>
-            <a:ext uri="{91240B29-F687-4f45-9708-019B960494DF}">
+            <a:ext uri="{91240B29-F687-4F45-9708-019B960494DF}">
               <a14:hiddenLine xmlns:a14="http://schemas.microsoft.com/office/drawing/2010/main" w="9525" cap="flat">
                 <a:solidFill>
                   <a:srgbClr val="808080"/>
@@ -30089,7 +30089,7 @@
                 <a:tailEnd/>
               </a14:hiddenLine>
             </a:ext>
-            <a:ext uri="{AF507438-7753-43e0-B8FC-AC1667EBCBE1}">
+            <a:ext uri="{AF507438-7753-43E0-B8FC-AC1667EBCBE1}">
               <a14:hiddenEffects xmlns:a14="http://schemas.microsoft.com/office/drawing/2010/main">
                 <a:effectLst>
                   <a:outerShdw dist="35921" dir="2700000" algn="ctr" rotWithShape="0">
@@ -30305,11 +30305,11 @@
   <p:clrMapOvr>
     <a:masterClrMapping/>
   </p:clrMapOvr>
-  <p:transition xmlns:p14="http://schemas.microsoft.com/office/powerpoint/2010/main" spd="med"/>
+  <p:transition spd="med"/>
   <p:timing>
     <p:tnLst>
       <p:par>
-        <p:cTn xmlns:p14="http://schemas.microsoft.com/office/powerpoint/2010/main" id="1" dur="indefinite" restart="never" nodeType="tmRoot">
+        <p:cTn id="1" dur="indefinite" restart="never" nodeType="tmRoot">
           <p:childTnLst>
             <p:seq concurrent="1" nextAc="seek">
               <p:cTn id="2" dur="0" nodeType="mainSeq"/>
@@ -30421,14 +30421,14 @@
           </a:ln>
           <a:effectLst/>
           <a:extLst>
-            <a:ext uri="{909E8E84-426E-40dd-AFC4-6F175D3DCCD1}">
+            <a:ext uri="{909E8E84-426E-40DD-AFC4-6F175D3DCCD1}">
               <a14:hiddenFill xmlns:a14="http://schemas.microsoft.com/office/drawing/2010/main">
                 <a:solidFill>
                   <a:srgbClr val="FFFFFF"/>
                 </a:solidFill>
               </a14:hiddenFill>
             </a:ext>
-            <a:ext uri="{91240B29-F687-4f45-9708-019B960494DF}">
+            <a:ext uri="{91240B29-F687-4F45-9708-019B960494DF}">
               <a14:hiddenLine xmlns:a14="http://schemas.microsoft.com/office/drawing/2010/main" w="9525" cap="flat">
                 <a:solidFill>
                   <a:srgbClr val="808080"/>
@@ -30438,7 +30438,7 @@
                 <a:tailEnd/>
               </a14:hiddenLine>
             </a:ext>
-            <a:ext uri="{AF507438-7753-43e0-B8FC-AC1667EBCBE1}">
+            <a:ext uri="{AF507438-7753-43E0-B8FC-AC1667EBCBE1}">
               <a14:hiddenEffects xmlns:a14="http://schemas.microsoft.com/office/drawing/2010/main">
                 <a:effectLst>
                   <a:outerShdw dist="35921" dir="2700000" algn="ctr" rotWithShape="0">
@@ -30929,14 +30929,14 @@
           </a:ln>
           <a:effectLst/>
           <a:extLst>
-            <a:ext uri="{909E8E84-426E-40dd-AFC4-6F175D3DCCD1}">
+            <a:ext uri="{909E8E84-426E-40DD-AFC4-6F175D3DCCD1}">
               <a14:hiddenFill xmlns:a14="http://schemas.microsoft.com/office/drawing/2010/main">
                 <a:solidFill>
                   <a:srgbClr val="FFFFFF"/>
                 </a:solidFill>
               </a14:hiddenFill>
             </a:ext>
-            <a:ext uri="{91240B29-F687-4f45-9708-019B960494DF}">
+            <a:ext uri="{91240B29-F687-4F45-9708-019B960494DF}">
               <a14:hiddenLine xmlns:a14="http://schemas.microsoft.com/office/drawing/2010/main" w="9525" cap="flat">
                 <a:solidFill>
                   <a:srgbClr val="808080"/>
@@ -30946,7 +30946,7 @@
                 <a:tailEnd/>
               </a14:hiddenLine>
             </a:ext>
-            <a:ext uri="{AF507438-7753-43e0-B8FC-AC1667EBCBE1}">
+            <a:ext uri="{AF507438-7753-43E0-B8FC-AC1667EBCBE1}">
               <a14:hiddenEffects xmlns:a14="http://schemas.microsoft.com/office/drawing/2010/main">
                 <a:effectLst>
                   <a:outerShdw dist="35921" dir="2700000" algn="ctr" rotWithShape="0">
@@ -31162,11 +31162,11 @@
   <p:clrMapOvr>
     <a:masterClrMapping/>
   </p:clrMapOvr>
-  <p:transition xmlns:p14="http://schemas.microsoft.com/office/powerpoint/2010/main" spd="med"/>
+  <p:transition spd="med"/>
   <p:timing>
     <p:tnLst>
       <p:par>
-        <p:cTn xmlns:p14="http://schemas.microsoft.com/office/powerpoint/2010/main" id="1" dur="indefinite" restart="never" nodeType="tmRoot">
+        <p:cTn id="1" dur="indefinite" restart="never" nodeType="tmRoot">
           <p:childTnLst>
             <p:seq concurrent="1" nextAc="seek">
               <p:cTn id="2" dur="0" nodeType="mainSeq"/>
@@ -31278,14 +31278,14 @@
           </a:ln>
           <a:effectLst/>
           <a:extLst>
-            <a:ext uri="{909E8E84-426E-40dd-AFC4-6F175D3DCCD1}">
+            <a:ext uri="{909E8E84-426E-40DD-AFC4-6F175D3DCCD1}">
               <a14:hiddenFill xmlns:a14="http://schemas.microsoft.com/office/drawing/2010/main">
                 <a:solidFill>
                   <a:srgbClr val="FFFFFF"/>
                 </a:solidFill>
               </a14:hiddenFill>
             </a:ext>
-            <a:ext uri="{91240B29-F687-4f45-9708-019B960494DF}">
+            <a:ext uri="{91240B29-F687-4F45-9708-019B960494DF}">
               <a14:hiddenLine xmlns:a14="http://schemas.microsoft.com/office/drawing/2010/main" w="9525" cap="flat">
                 <a:solidFill>
                   <a:srgbClr val="808080"/>
@@ -31295,7 +31295,7 @@
                 <a:tailEnd/>
               </a14:hiddenLine>
             </a:ext>
-            <a:ext uri="{AF507438-7753-43e0-B8FC-AC1667EBCBE1}">
+            <a:ext uri="{AF507438-7753-43E0-B8FC-AC1667EBCBE1}">
               <a14:hiddenEffects xmlns:a14="http://schemas.microsoft.com/office/drawing/2010/main">
                 <a:effectLst>
                   <a:outerShdw dist="35921" dir="2700000" algn="ctr" rotWithShape="0">
@@ -31758,14 +31758,14 @@
           </a:ln>
           <a:effectLst/>
           <a:extLst>
-            <a:ext uri="{909E8E84-426E-40dd-AFC4-6F175D3DCCD1}">
+            <a:ext uri="{909E8E84-426E-40DD-AFC4-6F175D3DCCD1}">
               <a14:hiddenFill xmlns:a14="http://schemas.microsoft.com/office/drawing/2010/main">
                 <a:solidFill>
                   <a:srgbClr val="FFFFFF"/>
                 </a:solidFill>
               </a14:hiddenFill>
             </a:ext>
-            <a:ext uri="{91240B29-F687-4f45-9708-019B960494DF}">
+            <a:ext uri="{91240B29-F687-4F45-9708-019B960494DF}">
               <a14:hiddenLine xmlns:a14="http://schemas.microsoft.com/office/drawing/2010/main" w="9525" cap="flat">
                 <a:solidFill>
                   <a:srgbClr val="808080"/>
@@ -31775,7 +31775,7 @@
                 <a:tailEnd/>
               </a14:hiddenLine>
             </a:ext>
-            <a:ext uri="{AF507438-7753-43e0-B8FC-AC1667EBCBE1}">
+            <a:ext uri="{AF507438-7753-43E0-B8FC-AC1667EBCBE1}">
               <a14:hiddenEffects xmlns:a14="http://schemas.microsoft.com/office/drawing/2010/main">
                 <a:effectLst>
                   <a:outerShdw dist="35921" dir="2700000" algn="ctr" rotWithShape="0">
@@ -31991,11 +31991,11 @@
   <p:clrMapOvr>
     <a:masterClrMapping/>
   </p:clrMapOvr>
-  <p:transition xmlns:p14="http://schemas.microsoft.com/office/powerpoint/2010/main" spd="med"/>
+  <p:transition spd="med"/>
   <p:timing>
     <p:tnLst>
       <p:par>
-        <p:cTn xmlns:p14="http://schemas.microsoft.com/office/powerpoint/2010/main" id="1" dur="indefinite" restart="never" nodeType="tmRoot">
+        <p:cTn id="1" dur="indefinite" restart="never" nodeType="tmRoot">
           <p:childTnLst>
             <p:seq concurrent="1" nextAc="seek">
               <p:cTn id="2" dur="0" nodeType="mainSeq"/>
@@ -32110,14 +32110,14 @@
           </a:ln>
           <a:effectLst/>
           <a:extLst>
-            <a:ext uri="{909E8E84-426E-40dd-AFC4-6F175D3DCCD1}">
+            <a:ext uri="{909E8E84-426E-40DD-AFC4-6F175D3DCCD1}">
               <a14:hiddenFill xmlns:a14="http://schemas.microsoft.com/office/drawing/2010/main">
                 <a:solidFill>
                   <a:srgbClr val="FFFFFF"/>
                 </a:solidFill>
               </a14:hiddenFill>
             </a:ext>
-            <a:ext uri="{91240B29-F687-4f45-9708-019B960494DF}">
+            <a:ext uri="{91240B29-F687-4F45-9708-019B960494DF}">
               <a14:hiddenLine xmlns:a14="http://schemas.microsoft.com/office/drawing/2010/main" w="9525" cap="flat">
                 <a:solidFill>
                   <a:srgbClr val="808080"/>
@@ -32127,7 +32127,7 @@
                 <a:tailEnd/>
               </a14:hiddenLine>
             </a:ext>
-            <a:ext uri="{AF507438-7753-43e0-B8FC-AC1667EBCBE1}">
+            <a:ext uri="{AF507438-7753-43E0-B8FC-AC1667EBCBE1}">
               <a14:hiddenEffects xmlns:a14="http://schemas.microsoft.com/office/drawing/2010/main">
                 <a:effectLst>
                   <a:outerShdw dist="35921" dir="2700000" algn="ctr" rotWithShape="0">
@@ -32452,14 +32452,14 @@
           </a:ln>
           <a:effectLst/>
           <a:extLst>
-            <a:ext uri="{909E8E84-426E-40dd-AFC4-6F175D3DCCD1}">
+            <a:ext uri="{909E8E84-426E-40DD-AFC4-6F175D3DCCD1}">
               <a14:hiddenFill xmlns:a14="http://schemas.microsoft.com/office/drawing/2010/main">
                 <a:solidFill>
                   <a:srgbClr val="FFFFFF"/>
                 </a:solidFill>
               </a14:hiddenFill>
             </a:ext>
-            <a:ext uri="{91240B29-F687-4f45-9708-019B960494DF}">
+            <a:ext uri="{91240B29-F687-4F45-9708-019B960494DF}">
               <a14:hiddenLine xmlns:a14="http://schemas.microsoft.com/office/drawing/2010/main" w="9525" cap="flat">
                 <a:solidFill>
                   <a:srgbClr val="808080"/>
@@ -32469,7 +32469,7 @@
                 <a:tailEnd/>
               </a14:hiddenLine>
             </a:ext>
-            <a:ext uri="{AF507438-7753-43e0-B8FC-AC1667EBCBE1}">
+            <a:ext uri="{AF507438-7753-43E0-B8FC-AC1667EBCBE1}">
               <a14:hiddenEffects xmlns:a14="http://schemas.microsoft.com/office/drawing/2010/main">
                 <a:effectLst>
                   <a:outerShdw dist="35921" dir="2700000" algn="ctr" rotWithShape="0">
@@ -32685,11 +32685,11 @@
   <p:clrMapOvr>
     <a:masterClrMapping/>
   </p:clrMapOvr>
-  <p:transition xmlns:p14="http://schemas.microsoft.com/office/powerpoint/2010/main" spd="med"/>
+  <p:transition spd="med"/>
   <p:timing>
     <p:tnLst>
       <p:par>
-        <p:cTn xmlns:p14="http://schemas.microsoft.com/office/powerpoint/2010/main" id="1" dur="indefinite" restart="never" nodeType="tmRoot">
+        <p:cTn id="1" dur="indefinite" restart="never" nodeType="tmRoot">
           <p:childTnLst>
             <p:seq concurrent="1" nextAc="seek">
               <p:cTn id="2" dur="0" nodeType="mainSeq"/>
@@ -32801,14 +32801,14 @@
           </a:ln>
           <a:effectLst/>
           <a:extLst>
-            <a:ext uri="{909E8E84-426E-40dd-AFC4-6F175D3DCCD1}">
+            <a:ext uri="{909E8E84-426E-40DD-AFC4-6F175D3DCCD1}">
               <a14:hiddenFill xmlns:a14="http://schemas.microsoft.com/office/drawing/2010/main">
                 <a:solidFill>
                   <a:srgbClr val="FFFFFF"/>
                 </a:solidFill>
               </a14:hiddenFill>
             </a:ext>
-            <a:ext uri="{91240B29-F687-4f45-9708-019B960494DF}">
+            <a:ext uri="{91240B29-F687-4F45-9708-019B960494DF}">
               <a14:hiddenLine xmlns:a14="http://schemas.microsoft.com/office/drawing/2010/main" w="9525" cap="flat">
                 <a:solidFill>
                   <a:srgbClr val="808080"/>
@@ -32818,7 +32818,7 @@
                 <a:tailEnd/>
               </a14:hiddenLine>
             </a:ext>
-            <a:ext uri="{AF507438-7753-43e0-B8FC-AC1667EBCBE1}">
+            <a:ext uri="{AF507438-7753-43E0-B8FC-AC1667EBCBE1}">
               <a14:hiddenEffects xmlns:a14="http://schemas.microsoft.com/office/drawing/2010/main">
                 <a:effectLst>
                   <a:outerShdw dist="35921" dir="2700000" algn="ctr" rotWithShape="0">
@@ -33265,14 +33265,14 @@
           </a:ln>
           <a:effectLst/>
           <a:extLst>
-            <a:ext uri="{909E8E84-426E-40dd-AFC4-6F175D3DCCD1}">
+            <a:ext uri="{909E8E84-426E-40DD-AFC4-6F175D3DCCD1}">
               <a14:hiddenFill xmlns:a14="http://schemas.microsoft.com/office/drawing/2010/main">
                 <a:solidFill>
                   <a:srgbClr val="FFFFFF"/>
                 </a:solidFill>
               </a14:hiddenFill>
             </a:ext>
-            <a:ext uri="{91240B29-F687-4f45-9708-019B960494DF}">
+            <a:ext uri="{91240B29-F687-4F45-9708-019B960494DF}">
               <a14:hiddenLine xmlns:a14="http://schemas.microsoft.com/office/drawing/2010/main" w="9525" cap="flat">
                 <a:solidFill>
                   <a:srgbClr val="808080"/>
@@ -33282,7 +33282,7 @@
                 <a:tailEnd/>
               </a14:hiddenLine>
             </a:ext>
-            <a:ext uri="{AF507438-7753-43e0-B8FC-AC1667EBCBE1}">
+            <a:ext uri="{AF507438-7753-43E0-B8FC-AC1667EBCBE1}">
               <a14:hiddenEffects xmlns:a14="http://schemas.microsoft.com/office/drawing/2010/main">
                 <a:effectLst>
                   <a:outerShdw dist="35921" dir="2700000" algn="ctr" rotWithShape="0">
@@ -33498,11 +33498,11 @@
   <p:clrMapOvr>
     <a:masterClrMapping/>
   </p:clrMapOvr>
-  <p:transition xmlns:p14="http://schemas.microsoft.com/office/powerpoint/2010/main" spd="med"/>
+  <p:transition spd="med"/>
   <p:timing>
     <p:tnLst>
       <p:par>
-        <p:cTn xmlns:p14="http://schemas.microsoft.com/office/powerpoint/2010/main" id="1" dur="indefinite" restart="never" nodeType="tmRoot">
+        <p:cTn id="1" dur="indefinite" restart="never" nodeType="tmRoot">
           <p:childTnLst>
             <p:seq concurrent="1" nextAc="seek">
               <p:cTn id="2" dur="0" nodeType="mainSeq"/>
@@ -33614,14 +33614,14 @@
           </a:ln>
           <a:effectLst/>
           <a:extLst>
-            <a:ext uri="{909E8E84-426E-40dd-AFC4-6F175D3DCCD1}">
+            <a:ext uri="{909E8E84-426E-40DD-AFC4-6F175D3DCCD1}">
               <a14:hiddenFill xmlns:a14="http://schemas.microsoft.com/office/drawing/2010/main">
                 <a:solidFill>
                   <a:srgbClr val="FFFFFF"/>
                 </a:solidFill>
               </a14:hiddenFill>
             </a:ext>
-            <a:ext uri="{91240B29-F687-4f45-9708-019B960494DF}">
+            <a:ext uri="{91240B29-F687-4F45-9708-019B960494DF}">
               <a14:hiddenLine xmlns:a14="http://schemas.microsoft.com/office/drawing/2010/main" w="9525" cap="flat">
                 <a:solidFill>
                   <a:srgbClr val="808080"/>
@@ -33631,7 +33631,7 @@
                 <a:tailEnd/>
               </a14:hiddenLine>
             </a:ext>
-            <a:ext uri="{AF507438-7753-43e0-B8FC-AC1667EBCBE1}">
+            <a:ext uri="{AF507438-7753-43E0-B8FC-AC1667EBCBE1}">
               <a14:hiddenEffects xmlns:a14="http://schemas.microsoft.com/office/drawing/2010/main">
                 <a:effectLst>
                   <a:outerShdw dist="35921" dir="2700000" algn="ctr" rotWithShape="0">
@@ -34100,14 +34100,14 @@
           </a:ln>
           <a:effectLst/>
           <a:extLst>
-            <a:ext uri="{909E8E84-426E-40dd-AFC4-6F175D3DCCD1}">
+            <a:ext uri="{909E8E84-426E-40DD-AFC4-6F175D3DCCD1}">
               <a14:hiddenFill xmlns:a14="http://schemas.microsoft.com/office/drawing/2010/main">
                 <a:solidFill>
                   <a:srgbClr val="FFFFFF"/>
                 </a:solidFill>
               </a14:hiddenFill>
             </a:ext>
-            <a:ext uri="{91240B29-F687-4f45-9708-019B960494DF}">
+            <a:ext uri="{91240B29-F687-4F45-9708-019B960494DF}">
               <a14:hiddenLine xmlns:a14="http://schemas.microsoft.com/office/drawing/2010/main" w="9525" cap="flat">
                 <a:solidFill>
                   <a:srgbClr val="808080"/>
@@ -34117,7 +34117,7 @@
                 <a:tailEnd/>
               </a14:hiddenLine>
             </a:ext>
-            <a:ext uri="{AF507438-7753-43e0-B8FC-AC1667EBCBE1}">
+            <a:ext uri="{AF507438-7753-43E0-B8FC-AC1667EBCBE1}">
               <a14:hiddenEffects xmlns:a14="http://schemas.microsoft.com/office/drawing/2010/main">
                 <a:effectLst>
                   <a:outerShdw dist="35921" dir="2700000" algn="ctr" rotWithShape="0">
@@ -34333,11 +34333,11 @@
   <p:clrMapOvr>
     <a:masterClrMapping/>
   </p:clrMapOvr>
-  <p:transition xmlns:p14="http://schemas.microsoft.com/office/powerpoint/2010/main" spd="med"/>
+  <p:transition spd="med"/>
   <p:timing>
     <p:tnLst>
       <p:par>
-        <p:cTn xmlns:p14="http://schemas.microsoft.com/office/powerpoint/2010/main" id="1" dur="indefinite" restart="never" nodeType="tmRoot">
+        <p:cTn id="1" dur="indefinite" restart="never" nodeType="tmRoot">
           <p:childTnLst>
             <p:seq concurrent="1" nextAc="seek">
               <p:cTn id="2" dur="0" nodeType="mainSeq"/>
@@ -34571,11 +34571,11 @@
   <p:clrMapOvr>
     <a:masterClrMapping/>
   </p:clrMapOvr>
-  <p:transition xmlns:p14="http://schemas.microsoft.com/office/powerpoint/2010/main" spd="med"/>
+  <p:transition spd="med"/>
   <p:timing>
     <p:tnLst>
       <p:par>
-        <p:cTn xmlns:p14="http://schemas.microsoft.com/office/powerpoint/2010/main" id="1" dur="indefinite" restart="never" nodeType="tmRoot">
+        <p:cTn id="1" dur="indefinite" restart="never" nodeType="tmRoot">
           <p:childTnLst>
             <p:seq concurrent="1" nextAc="seek">
               <p:cTn id="2" dur="0" nodeType="mainSeq"/>
@@ -34687,14 +34687,14 @@
           </a:ln>
           <a:effectLst/>
           <a:extLst>
-            <a:ext uri="{909E8E84-426E-40dd-AFC4-6F175D3DCCD1}">
+            <a:ext uri="{909E8E84-426E-40DD-AFC4-6F175D3DCCD1}">
               <a14:hiddenFill xmlns:a14="http://schemas.microsoft.com/office/drawing/2010/main">
                 <a:solidFill>
                   <a:srgbClr val="FFFFFF"/>
                 </a:solidFill>
               </a14:hiddenFill>
             </a:ext>
-            <a:ext uri="{91240B29-F687-4f45-9708-019B960494DF}">
+            <a:ext uri="{91240B29-F687-4F45-9708-019B960494DF}">
               <a14:hiddenLine xmlns:a14="http://schemas.microsoft.com/office/drawing/2010/main" w="9525" cap="flat">
                 <a:solidFill>
                   <a:srgbClr val="808080"/>
@@ -34704,7 +34704,7 @@
                 <a:tailEnd/>
               </a14:hiddenLine>
             </a:ext>
-            <a:ext uri="{AF507438-7753-43e0-B8FC-AC1667EBCBE1}">
+            <a:ext uri="{AF507438-7753-43E0-B8FC-AC1667EBCBE1}">
               <a14:hiddenEffects xmlns:a14="http://schemas.microsoft.com/office/drawing/2010/main">
                 <a:effectLst>
                   <a:outerShdw dist="35921" dir="2700000" algn="ctr" rotWithShape="0">
@@ -35329,14 +35329,14 @@
           </a:ln>
           <a:effectLst/>
           <a:extLst>
-            <a:ext uri="{909E8E84-426E-40dd-AFC4-6F175D3DCCD1}">
+            <a:ext uri="{909E8E84-426E-40DD-AFC4-6F175D3DCCD1}">
               <a14:hiddenFill xmlns:a14="http://schemas.microsoft.com/office/drawing/2010/main">
                 <a:solidFill>
                   <a:srgbClr val="FFFFFF"/>
                 </a:solidFill>
               </a14:hiddenFill>
             </a:ext>
-            <a:ext uri="{91240B29-F687-4f45-9708-019B960494DF}">
+            <a:ext uri="{91240B29-F687-4F45-9708-019B960494DF}">
               <a14:hiddenLine xmlns:a14="http://schemas.microsoft.com/office/drawing/2010/main" w="9525" cap="flat">
                 <a:solidFill>
                   <a:srgbClr val="808080"/>
@@ -35346,7 +35346,7 @@
                 <a:tailEnd/>
               </a14:hiddenLine>
             </a:ext>
-            <a:ext uri="{AF507438-7753-43e0-B8FC-AC1667EBCBE1}">
+            <a:ext uri="{AF507438-7753-43E0-B8FC-AC1667EBCBE1}">
               <a14:hiddenEffects xmlns:a14="http://schemas.microsoft.com/office/drawing/2010/main">
                 <a:effectLst>
                   <a:outerShdw dist="35921" dir="2700000" algn="ctr" rotWithShape="0">
@@ -35562,11 +35562,11 @@
   <p:clrMapOvr>
     <a:masterClrMapping/>
   </p:clrMapOvr>
-  <p:transition xmlns:p14="http://schemas.microsoft.com/office/powerpoint/2010/main" spd="med"/>
+  <p:transition spd="med"/>
   <p:timing>
     <p:tnLst>
       <p:par>
-        <p:cTn xmlns:p14="http://schemas.microsoft.com/office/powerpoint/2010/main" id="1" dur="indefinite" restart="never" nodeType="tmRoot">
+        <p:cTn id="1" dur="indefinite" restart="never" nodeType="tmRoot">
           <p:childTnLst>
             <p:seq concurrent="1" nextAc="seek">
               <p:cTn id="2" dur="0" nodeType="mainSeq"/>
@@ -35650,9 +35650,25 @@
               </a:tabLst>
             </a:pPr>
             <a:r>
-              <a:rPr lang="en-US" sz="4400"/>
+              <a:rPr lang="en-US" sz="4400" smtClean="0"/>
               <a:t>showSignupDetail</a:t>
             </a:r>
+            <a:br>
+              <a:rPr lang="en-US" sz="4400" smtClean="0"/>
+            </a:br>
+            <a:r>
+              <a:rPr lang="en-US" sz="2800" smtClean="0">
+                <a:solidFill>
+                  <a:srgbClr val="FF0000"/>
+                </a:solidFill>
+              </a:rPr>
+              <a:t>(remove)</a:t>
+            </a:r>
+            <a:endParaRPr lang="en-US" sz="4400">
+              <a:solidFill>
+                <a:srgbClr val="FF0000"/>
+              </a:solidFill>
+            </a:endParaRPr>
           </a:p>
         </p:txBody>
       </p:sp>
@@ -35678,14 +35694,14 @@
           </a:ln>
           <a:effectLst/>
           <a:extLst>
-            <a:ext uri="{909E8E84-426E-40dd-AFC4-6F175D3DCCD1}">
+            <a:ext uri="{909E8E84-426E-40DD-AFC4-6F175D3DCCD1}">
               <a14:hiddenFill xmlns:a14="http://schemas.microsoft.com/office/drawing/2010/main">
                 <a:solidFill>
                   <a:srgbClr val="FFFFFF"/>
                 </a:solidFill>
               </a14:hiddenFill>
             </a:ext>
-            <a:ext uri="{91240B29-F687-4f45-9708-019B960494DF}">
+            <a:ext uri="{91240B29-F687-4F45-9708-019B960494DF}">
               <a14:hiddenLine xmlns:a14="http://schemas.microsoft.com/office/drawing/2010/main" w="9525" cap="flat">
                 <a:solidFill>
                   <a:srgbClr val="808080"/>
@@ -35695,7 +35711,7 @@
                 <a:tailEnd/>
               </a14:hiddenLine>
             </a:ext>
-            <a:ext uri="{AF507438-7753-43e0-B8FC-AC1667EBCBE1}">
+            <a:ext uri="{AF507438-7753-43E0-B8FC-AC1667EBCBE1}">
               <a14:hiddenEffects xmlns:a14="http://schemas.microsoft.com/office/drawing/2010/main">
                 <a:effectLst>
                   <a:outerShdw dist="35921" dir="2700000" algn="ctr" rotWithShape="0">
@@ -36098,14 +36114,14 @@
           </a:ln>
           <a:effectLst/>
           <a:extLst>
-            <a:ext uri="{909E8E84-426E-40dd-AFC4-6F175D3DCCD1}">
+            <a:ext uri="{909E8E84-426E-40DD-AFC4-6F175D3DCCD1}">
               <a14:hiddenFill xmlns:a14="http://schemas.microsoft.com/office/drawing/2010/main">
                 <a:solidFill>
                   <a:srgbClr val="FFFFFF"/>
                 </a:solidFill>
               </a14:hiddenFill>
             </a:ext>
-            <a:ext uri="{91240B29-F687-4f45-9708-019B960494DF}">
+            <a:ext uri="{91240B29-F687-4F45-9708-019B960494DF}">
               <a14:hiddenLine xmlns:a14="http://schemas.microsoft.com/office/drawing/2010/main" w="9525" cap="flat">
                 <a:solidFill>
                   <a:srgbClr val="808080"/>
@@ -36115,7 +36131,7 @@
                 <a:tailEnd/>
               </a14:hiddenLine>
             </a:ext>
-            <a:ext uri="{AF507438-7753-43e0-B8FC-AC1667EBCBE1}">
+            <a:ext uri="{AF507438-7753-43E0-B8FC-AC1667EBCBE1}">
               <a14:hiddenEffects xmlns:a14="http://schemas.microsoft.com/office/drawing/2010/main">
                 <a:effectLst>
                   <a:outerShdw dist="35921" dir="2700000" algn="ctr" rotWithShape="0">
@@ -36331,11 +36347,11 @@
   <p:clrMapOvr>
     <a:masterClrMapping/>
   </p:clrMapOvr>
-  <p:transition xmlns:p14="http://schemas.microsoft.com/office/powerpoint/2010/main" spd="med"/>
+  <p:transition spd="med"/>
   <p:timing>
     <p:tnLst>
       <p:par>
-        <p:cTn xmlns:p14="http://schemas.microsoft.com/office/powerpoint/2010/main" id="1" dur="indefinite" restart="never" nodeType="tmRoot">
+        <p:cTn id="1" dur="indefinite" restart="never" nodeType="tmRoot">
           <p:childTnLst>
             <p:seq concurrent="1" nextAc="seek">
               <p:cTn id="2" dur="0" nodeType="mainSeq"/>
@@ -36447,14 +36463,14 @@
           </a:ln>
           <a:effectLst/>
           <a:extLst>
-            <a:ext uri="{909E8E84-426E-40dd-AFC4-6F175D3DCCD1}">
+            <a:ext uri="{909E8E84-426E-40DD-AFC4-6F175D3DCCD1}">
               <a14:hiddenFill xmlns:a14="http://schemas.microsoft.com/office/drawing/2010/main">
                 <a:solidFill>
                   <a:srgbClr val="FFFFFF"/>
                 </a:solidFill>
               </a14:hiddenFill>
             </a:ext>
-            <a:ext uri="{91240B29-F687-4f45-9708-019B960494DF}">
+            <a:ext uri="{91240B29-F687-4F45-9708-019B960494DF}">
               <a14:hiddenLine xmlns:a14="http://schemas.microsoft.com/office/drawing/2010/main" w="9525" cap="flat">
                 <a:solidFill>
                   <a:srgbClr val="808080"/>
@@ -36464,7 +36480,7 @@
                 <a:tailEnd/>
               </a14:hiddenLine>
             </a:ext>
-            <a:ext uri="{AF507438-7753-43e0-B8FC-AC1667EBCBE1}">
+            <a:ext uri="{AF507438-7753-43E0-B8FC-AC1667EBCBE1}">
               <a14:hiddenEffects xmlns:a14="http://schemas.microsoft.com/office/drawing/2010/main">
                 <a:effectLst>
                   <a:outerShdw dist="35921" dir="2700000" algn="ctr" rotWithShape="0">
@@ -37200,14 +37216,14 @@
           </a:ln>
           <a:effectLst/>
           <a:extLst>
-            <a:ext uri="{909E8E84-426E-40dd-AFC4-6F175D3DCCD1}">
+            <a:ext uri="{909E8E84-426E-40DD-AFC4-6F175D3DCCD1}">
               <a14:hiddenFill xmlns:a14="http://schemas.microsoft.com/office/drawing/2010/main">
                 <a:solidFill>
                   <a:srgbClr val="FFFFFF"/>
                 </a:solidFill>
               </a14:hiddenFill>
             </a:ext>
-            <a:ext uri="{91240B29-F687-4f45-9708-019B960494DF}">
+            <a:ext uri="{91240B29-F687-4F45-9708-019B960494DF}">
               <a14:hiddenLine xmlns:a14="http://schemas.microsoft.com/office/drawing/2010/main" w="9525" cap="flat">
                 <a:solidFill>
                   <a:srgbClr val="808080"/>
@@ -37217,7 +37233,7 @@
                 <a:tailEnd/>
               </a14:hiddenLine>
             </a:ext>
-            <a:ext uri="{AF507438-7753-43e0-B8FC-AC1667EBCBE1}">
+            <a:ext uri="{AF507438-7753-43E0-B8FC-AC1667EBCBE1}">
               <a14:hiddenEffects xmlns:a14="http://schemas.microsoft.com/office/drawing/2010/main">
                 <a:effectLst>
                   <a:outerShdw dist="35921" dir="2700000" algn="ctr" rotWithShape="0">
@@ -37433,11 +37449,11 @@
   <p:clrMapOvr>
     <a:masterClrMapping/>
   </p:clrMapOvr>
-  <p:transition xmlns:p14="http://schemas.microsoft.com/office/powerpoint/2010/main" spd="med"/>
+  <p:transition spd="med"/>
   <p:timing>
     <p:tnLst>
       <p:par>
-        <p:cTn xmlns:p14="http://schemas.microsoft.com/office/powerpoint/2010/main" id="1" dur="indefinite" restart="never" nodeType="tmRoot">
+        <p:cTn id="1" dur="indefinite" restart="never" nodeType="tmRoot">
           <p:childTnLst>
             <p:seq concurrent="1" nextAc="seek">
               <p:cTn id="2" dur="0" nodeType="mainSeq"/>
@@ -37549,14 +37565,14 @@
           </a:ln>
           <a:effectLst/>
           <a:extLst>
-            <a:ext uri="{909E8E84-426E-40dd-AFC4-6F175D3DCCD1}">
+            <a:ext uri="{909E8E84-426E-40DD-AFC4-6F175D3DCCD1}">
               <a14:hiddenFill xmlns:a14="http://schemas.microsoft.com/office/drawing/2010/main">
                 <a:solidFill>
                   <a:srgbClr val="FFFFFF"/>
                 </a:solidFill>
               </a14:hiddenFill>
             </a:ext>
-            <a:ext uri="{91240B29-F687-4f45-9708-019B960494DF}">
+            <a:ext uri="{91240B29-F687-4F45-9708-019B960494DF}">
               <a14:hiddenLine xmlns:a14="http://schemas.microsoft.com/office/drawing/2010/main" w="9525" cap="flat">
                 <a:solidFill>
                   <a:srgbClr val="808080"/>
@@ -37566,7 +37582,7 @@
                 <a:tailEnd/>
               </a14:hiddenLine>
             </a:ext>
-            <a:ext uri="{AF507438-7753-43e0-B8FC-AC1667EBCBE1}">
+            <a:ext uri="{AF507438-7753-43E0-B8FC-AC1667EBCBE1}">
               <a14:hiddenEffects xmlns:a14="http://schemas.microsoft.com/office/drawing/2010/main">
                 <a:effectLst>
                   <a:outerShdw dist="35921" dir="2700000" algn="ctr" rotWithShape="0">
@@ -37969,14 +37985,14 @@
           </a:ln>
           <a:effectLst/>
           <a:extLst>
-            <a:ext uri="{909E8E84-426E-40dd-AFC4-6F175D3DCCD1}">
+            <a:ext uri="{909E8E84-426E-40DD-AFC4-6F175D3DCCD1}">
               <a14:hiddenFill xmlns:a14="http://schemas.microsoft.com/office/drawing/2010/main">
                 <a:solidFill>
                   <a:srgbClr val="FFFFFF"/>
                 </a:solidFill>
               </a14:hiddenFill>
             </a:ext>
-            <a:ext uri="{91240B29-F687-4f45-9708-019B960494DF}">
+            <a:ext uri="{91240B29-F687-4F45-9708-019B960494DF}">
               <a14:hiddenLine xmlns:a14="http://schemas.microsoft.com/office/drawing/2010/main" w="9525" cap="flat">
                 <a:solidFill>
                   <a:srgbClr val="808080"/>
@@ -37986,7 +38002,7 @@
                 <a:tailEnd/>
               </a14:hiddenLine>
             </a:ext>
-            <a:ext uri="{AF507438-7753-43e0-B8FC-AC1667EBCBE1}">
+            <a:ext uri="{AF507438-7753-43E0-B8FC-AC1667EBCBE1}">
               <a14:hiddenEffects xmlns:a14="http://schemas.microsoft.com/office/drawing/2010/main">
                 <a:effectLst>
                   <a:outerShdw dist="35921" dir="2700000" algn="ctr" rotWithShape="0">
@@ -38202,11 +38218,11 @@
   <p:clrMapOvr>
     <a:masterClrMapping/>
   </p:clrMapOvr>
-  <p:transition xmlns:p14="http://schemas.microsoft.com/office/powerpoint/2010/main" spd="med"/>
+  <p:transition spd="med"/>
   <p:timing>
     <p:tnLst>
       <p:par>
-        <p:cTn xmlns:p14="http://schemas.microsoft.com/office/powerpoint/2010/main" id="1" dur="indefinite" restart="never" nodeType="tmRoot">
+        <p:cTn id="1" dur="indefinite" restart="never" nodeType="tmRoot">
           <p:childTnLst>
             <p:seq concurrent="1" nextAc="seek">
               <p:cTn id="2" dur="0" nodeType="mainSeq"/>
@@ -38318,14 +38334,14 @@
           </a:ln>
           <a:effectLst/>
           <a:extLst>
-            <a:ext uri="{909E8E84-426E-40dd-AFC4-6F175D3DCCD1}">
+            <a:ext uri="{909E8E84-426E-40DD-AFC4-6F175D3DCCD1}">
               <a14:hiddenFill xmlns:a14="http://schemas.microsoft.com/office/drawing/2010/main">
                 <a:solidFill>
                   <a:srgbClr val="FFFFFF"/>
                 </a:solidFill>
               </a14:hiddenFill>
             </a:ext>
-            <a:ext uri="{91240B29-F687-4f45-9708-019B960494DF}">
+            <a:ext uri="{91240B29-F687-4F45-9708-019B960494DF}">
               <a14:hiddenLine xmlns:a14="http://schemas.microsoft.com/office/drawing/2010/main" w="9525" cap="flat">
                 <a:solidFill>
                   <a:srgbClr val="808080"/>
@@ -38335,7 +38351,7 @@
                 <a:tailEnd/>
               </a14:hiddenLine>
             </a:ext>
-            <a:ext uri="{AF507438-7753-43e0-B8FC-AC1667EBCBE1}">
+            <a:ext uri="{AF507438-7753-43E0-B8FC-AC1667EBCBE1}">
               <a14:hiddenEffects xmlns:a14="http://schemas.microsoft.com/office/drawing/2010/main">
                 <a:effectLst>
                   <a:outerShdw dist="35921" dir="2700000" algn="ctr" rotWithShape="0">
@@ -38824,14 +38840,14 @@
           </a:ln>
           <a:effectLst/>
           <a:extLst>
-            <a:ext uri="{909E8E84-426E-40dd-AFC4-6F175D3DCCD1}">
+            <a:ext uri="{909E8E84-426E-40DD-AFC4-6F175D3DCCD1}">
               <a14:hiddenFill xmlns:a14="http://schemas.microsoft.com/office/drawing/2010/main">
                 <a:solidFill>
                   <a:srgbClr val="FFFFFF"/>
                 </a:solidFill>
               </a14:hiddenFill>
             </a:ext>
-            <a:ext uri="{91240B29-F687-4f45-9708-019B960494DF}">
+            <a:ext uri="{91240B29-F687-4F45-9708-019B960494DF}">
               <a14:hiddenLine xmlns:a14="http://schemas.microsoft.com/office/drawing/2010/main" w="9525" cap="flat">
                 <a:solidFill>
                   <a:srgbClr val="808080"/>
@@ -38841,7 +38857,7 @@
                 <a:tailEnd/>
               </a14:hiddenLine>
             </a:ext>
-            <a:ext uri="{AF507438-7753-43e0-B8FC-AC1667EBCBE1}">
+            <a:ext uri="{AF507438-7753-43E0-B8FC-AC1667EBCBE1}">
               <a14:hiddenEffects xmlns:a14="http://schemas.microsoft.com/office/drawing/2010/main">
                 <a:effectLst>
                   <a:outerShdw dist="35921" dir="2700000" algn="ctr" rotWithShape="0">
@@ -39057,11 +39073,11 @@
   <p:clrMapOvr>
     <a:masterClrMapping/>
   </p:clrMapOvr>
-  <p:transition xmlns:p14="http://schemas.microsoft.com/office/powerpoint/2010/main" spd="med"/>
+  <p:transition spd="med"/>
   <p:timing>
     <p:tnLst>
       <p:par>
-        <p:cTn xmlns:p14="http://schemas.microsoft.com/office/powerpoint/2010/main" id="1" dur="indefinite" restart="never" nodeType="tmRoot">
+        <p:cTn id="1" dur="indefinite" restart="never" nodeType="tmRoot">
           <p:childTnLst>
             <p:seq concurrent="1" nextAc="seek">
               <p:cTn id="2" dur="0" nodeType="mainSeq"/>
@@ -39173,14 +39189,14 @@
           </a:ln>
           <a:effectLst/>
           <a:extLst>
-            <a:ext uri="{909E8E84-426E-40dd-AFC4-6F175D3DCCD1}">
+            <a:ext uri="{909E8E84-426E-40DD-AFC4-6F175D3DCCD1}">
               <a14:hiddenFill xmlns:a14="http://schemas.microsoft.com/office/drawing/2010/main">
                 <a:solidFill>
                   <a:srgbClr val="FFFFFF"/>
                 </a:solidFill>
               </a14:hiddenFill>
             </a:ext>
-            <a:ext uri="{91240B29-F687-4f45-9708-019B960494DF}">
+            <a:ext uri="{91240B29-F687-4F45-9708-019B960494DF}">
               <a14:hiddenLine xmlns:a14="http://schemas.microsoft.com/office/drawing/2010/main" w="9525" cap="flat">
                 <a:solidFill>
                   <a:srgbClr val="808080"/>
@@ -39190,7 +39206,7 @@
                 <a:tailEnd/>
               </a14:hiddenLine>
             </a:ext>
-            <a:ext uri="{AF507438-7753-43e0-B8FC-AC1667EBCBE1}">
+            <a:ext uri="{AF507438-7753-43E0-B8FC-AC1667EBCBE1}">
               <a14:hiddenEffects xmlns:a14="http://schemas.microsoft.com/office/drawing/2010/main">
                 <a:effectLst>
                   <a:outerShdw dist="35921" dir="2700000" algn="ctr" rotWithShape="0">
@@ -39635,14 +39651,14 @@
           </a:ln>
           <a:effectLst/>
           <a:extLst>
-            <a:ext uri="{909E8E84-426E-40dd-AFC4-6F175D3DCCD1}">
+            <a:ext uri="{909E8E84-426E-40DD-AFC4-6F175D3DCCD1}">
               <a14:hiddenFill xmlns:a14="http://schemas.microsoft.com/office/drawing/2010/main">
                 <a:solidFill>
                   <a:srgbClr val="FFFFFF"/>
                 </a:solidFill>
               </a14:hiddenFill>
             </a:ext>
-            <a:ext uri="{91240B29-F687-4f45-9708-019B960494DF}">
+            <a:ext uri="{91240B29-F687-4F45-9708-019B960494DF}">
               <a14:hiddenLine xmlns:a14="http://schemas.microsoft.com/office/drawing/2010/main" w="9525" cap="flat">
                 <a:solidFill>
                   <a:srgbClr val="808080"/>
@@ -39652,7 +39668,7 @@
                 <a:tailEnd/>
               </a14:hiddenLine>
             </a:ext>
-            <a:ext uri="{AF507438-7753-43e0-B8FC-AC1667EBCBE1}">
+            <a:ext uri="{AF507438-7753-43E0-B8FC-AC1667EBCBE1}">
               <a14:hiddenEffects xmlns:a14="http://schemas.microsoft.com/office/drawing/2010/main">
                 <a:effectLst>
                   <a:outerShdw dist="35921" dir="2700000" algn="ctr" rotWithShape="0">
@@ -39868,11 +39884,11 @@
   <p:clrMapOvr>
     <a:masterClrMapping/>
   </p:clrMapOvr>
-  <p:transition xmlns:p14="http://schemas.microsoft.com/office/powerpoint/2010/main" spd="med"/>
+  <p:transition spd="med"/>
   <p:timing>
     <p:tnLst>
       <p:par>
-        <p:cTn xmlns:p14="http://schemas.microsoft.com/office/powerpoint/2010/main" id="1" dur="indefinite" restart="never" nodeType="tmRoot">
+        <p:cTn id="1" dur="indefinite" restart="never" nodeType="tmRoot">
           <p:childTnLst>
             <p:seq concurrent="1" nextAc="seek">
               <p:cTn id="2" dur="0" nodeType="mainSeq"/>
@@ -39984,14 +40000,14 @@
           </a:ln>
           <a:effectLst/>
           <a:extLst>
-            <a:ext uri="{909E8E84-426E-40dd-AFC4-6F175D3DCCD1}">
+            <a:ext uri="{909E8E84-426E-40DD-AFC4-6F175D3DCCD1}">
               <a14:hiddenFill xmlns:a14="http://schemas.microsoft.com/office/drawing/2010/main">
                 <a:solidFill>
                   <a:srgbClr val="FFFFFF"/>
                 </a:solidFill>
               </a14:hiddenFill>
             </a:ext>
-            <a:ext uri="{91240B29-F687-4f45-9708-019B960494DF}">
+            <a:ext uri="{91240B29-F687-4F45-9708-019B960494DF}">
               <a14:hiddenLine xmlns:a14="http://schemas.microsoft.com/office/drawing/2010/main" w="9525" cap="flat">
                 <a:solidFill>
                   <a:srgbClr val="808080"/>
@@ -40001,7 +40017,7 @@
                 <a:tailEnd/>
               </a14:hiddenLine>
             </a:ext>
-            <a:ext uri="{AF507438-7753-43e0-B8FC-AC1667EBCBE1}">
+            <a:ext uri="{AF507438-7753-43E0-B8FC-AC1667EBCBE1}">
               <a14:hiddenEffects xmlns:a14="http://schemas.microsoft.com/office/drawing/2010/main">
                 <a:effectLst>
                   <a:outerShdw dist="35921" dir="2700000" algn="ctr" rotWithShape="0">
@@ -40426,14 +40442,14 @@
           </a:ln>
           <a:effectLst/>
           <a:extLst>
-            <a:ext uri="{909E8E84-426E-40dd-AFC4-6F175D3DCCD1}">
+            <a:ext uri="{909E8E84-426E-40DD-AFC4-6F175D3DCCD1}">
               <a14:hiddenFill xmlns:a14="http://schemas.microsoft.com/office/drawing/2010/main">
                 <a:solidFill>
                   <a:srgbClr val="FFFFFF"/>
                 </a:solidFill>
               </a14:hiddenFill>
             </a:ext>
-            <a:ext uri="{91240B29-F687-4f45-9708-019B960494DF}">
+            <a:ext uri="{91240B29-F687-4F45-9708-019B960494DF}">
               <a14:hiddenLine xmlns:a14="http://schemas.microsoft.com/office/drawing/2010/main" w="9525" cap="flat">
                 <a:solidFill>
                   <a:srgbClr val="808080"/>
@@ -40443,7 +40459,7 @@
                 <a:tailEnd/>
               </a14:hiddenLine>
             </a:ext>
-            <a:ext uri="{AF507438-7753-43e0-B8FC-AC1667EBCBE1}">
+            <a:ext uri="{AF507438-7753-43E0-B8FC-AC1667EBCBE1}">
               <a14:hiddenEffects xmlns:a14="http://schemas.microsoft.com/office/drawing/2010/main">
                 <a:effectLst>
                   <a:outerShdw dist="35921" dir="2700000" algn="ctr" rotWithShape="0">
@@ -40659,11 +40675,11 @@
   <p:clrMapOvr>
     <a:masterClrMapping/>
   </p:clrMapOvr>
-  <p:transition xmlns:p14="http://schemas.microsoft.com/office/powerpoint/2010/main" spd="med"/>
+  <p:transition spd="med"/>
   <p:timing>
     <p:tnLst>
       <p:par>
-        <p:cTn xmlns:p14="http://schemas.microsoft.com/office/powerpoint/2010/main" id="1" dur="indefinite" restart="never" nodeType="tmRoot">
+        <p:cTn id="1" dur="indefinite" restart="never" nodeType="tmRoot">
           <p:childTnLst>
             <p:seq concurrent="1" nextAc="seek">
               <p:cTn id="2" dur="0" nodeType="mainSeq"/>
@@ -40775,14 +40791,14 @@
           </a:ln>
           <a:effectLst/>
           <a:extLst>
-            <a:ext uri="{909E8E84-426E-40dd-AFC4-6F175D3DCCD1}">
+            <a:ext uri="{909E8E84-426E-40DD-AFC4-6F175D3DCCD1}">
               <a14:hiddenFill xmlns:a14="http://schemas.microsoft.com/office/drawing/2010/main">
                 <a:solidFill>
                   <a:srgbClr val="FFFFFF"/>
                 </a:solidFill>
               </a14:hiddenFill>
             </a:ext>
-            <a:ext uri="{91240B29-F687-4f45-9708-019B960494DF}">
+            <a:ext uri="{91240B29-F687-4F45-9708-019B960494DF}">
               <a14:hiddenLine xmlns:a14="http://schemas.microsoft.com/office/drawing/2010/main" w="9525" cap="flat">
                 <a:solidFill>
                   <a:srgbClr val="808080"/>
@@ -40792,7 +40808,7 @@
                 <a:tailEnd/>
               </a14:hiddenLine>
             </a:ext>
-            <a:ext uri="{AF507438-7753-43e0-B8FC-AC1667EBCBE1}">
+            <a:ext uri="{AF507438-7753-43E0-B8FC-AC1667EBCBE1}">
               <a14:hiddenEffects xmlns:a14="http://schemas.microsoft.com/office/drawing/2010/main">
                 <a:effectLst>
                   <a:outerShdw dist="35921" dir="2700000" algn="ctr" rotWithShape="0">
@@ -41008,11 +41024,11 @@
   <p:clrMapOvr>
     <a:masterClrMapping/>
   </p:clrMapOvr>
-  <p:transition xmlns:p14="http://schemas.microsoft.com/office/powerpoint/2010/main" spd="med"/>
+  <p:transition spd="med"/>
   <p:timing>
     <p:tnLst>
       <p:par>
-        <p:cTn xmlns:p14="http://schemas.microsoft.com/office/powerpoint/2010/main" id="1" dur="indefinite" restart="never" nodeType="tmRoot">
+        <p:cTn id="1" dur="indefinite" restart="never" nodeType="tmRoot">
           <p:childTnLst>
             <p:seq concurrent="1" nextAc="seek">
               <p:cTn id="2" dur="0" nodeType="mainSeq"/>
@@ -41124,14 +41140,14 @@
           </a:ln>
           <a:effectLst/>
           <a:extLst>
-            <a:ext uri="{909E8E84-426E-40dd-AFC4-6F175D3DCCD1}">
+            <a:ext uri="{909E8E84-426E-40DD-AFC4-6F175D3DCCD1}">
               <a14:hiddenFill xmlns:a14="http://schemas.microsoft.com/office/drawing/2010/main">
                 <a:solidFill>
                   <a:srgbClr val="FFFFFF"/>
                 </a:solidFill>
               </a14:hiddenFill>
             </a:ext>
-            <a:ext uri="{91240B29-F687-4f45-9708-019B960494DF}">
+            <a:ext uri="{91240B29-F687-4F45-9708-019B960494DF}">
               <a14:hiddenLine xmlns:a14="http://schemas.microsoft.com/office/drawing/2010/main" w="9525" cap="flat">
                 <a:solidFill>
                   <a:srgbClr val="808080"/>
@@ -41141,7 +41157,7 @@
                 <a:tailEnd/>
               </a14:hiddenLine>
             </a:ext>
-            <a:ext uri="{AF507438-7753-43e0-B8FC-AC1667EBCBE1}">
+            <a:ext uri="{AF507438-7753-43E0-B8FC-AC1667EBCBE1}">
               <a14:hiddenEffects xmlns:a14="http://schemas.microsoft.com/office/drawing/2010/main">
                 <a:effectLst>
                   <a:outerShdw dist="35921" dir="2700000" algn="ctr" rotWithShape="0">
@@ -41610,14 +41626,14 @@
           </a:ln>
           <a:effectLst/>
           <a:extLst>
-            <a:ext uri="{909E8E84-426E-40dd-AFC4-6F175D3DCCD1}">
+            <a:ext uri="{909E8E84-426E-40DD-AFC4-6F175D3DCCD1}">
               <a14:hiddenFill xmlns:a14="http://schemas.microsoft.com/office/drawing/2010/main">
                 <a:solidFill>
                   <a:srgbClr val="FFFFFF"/>
                 </a:solidFill>
               </a14:hiddenFill>
             </a:ext>
-            <a:ext uri="{91240B29-F687-4f45-9708-019B960494DF}">
+            <a:ext uri="{91240B29-F687-4F45-9708-019B960494DF}">
               <a14:hiddenLine xmlns:a14="http://schemas.microsoft.com/office/drawing/2010/main" w="9525" cap="flat">
                 <a:solidFill>
                   <a:srgbClr val="808080"/>
@@ -41627,7 +41643,7 @@
                 <a:tailEnd/>
               </a14:hiddenLine>
             </a:ext>
-            <a:ext uri="{AF507438-7753-43e0-B8FC-AC1667EBCBE1}">
+            <a:ext uri="{AF507438-7753-43E0-B8FC-AC1667EBCBE1}">
               <a14:hiddenEffects xmlns:a14="http://schemas.microsoft.com/office/drawing/2010/main">
                 <a:effectLst>
                   <a:outerShdw dist="35921" dir="2700000" algn="ctr" rotWithShape="0">
@@ -41843,11 +41859,11 @@
   <p:clrMapOvr>
     <a:masterClrMapping/>
   </p:clrMapOvr>
-  <p:transition xmlns:p14="http://schemas.microsoft.com/office/powerpoint/2010/main" spd="med"/>
+  <p:transition spd="med"/>
   <p:timing>
     <p:tnLst>
       <p:par>
-        <p:cTn xmlns:p14="http://schemas.microsoft.com/office/powerpoint/2010/main" id="1" dur="indefinite" restart="never" nodeType="tmRoot">
+        <p:cTn id="1" dur="indefinite" restart="never" nodeType="tmRoot">
           <p:childTnLst>
             <p:seq concurrent="1" nextAc="seek">
               <p:cTn id="2" dur="0" nodeType="mainSeq"/>
@@ -42057,11 +42073,11 @@
   <p:clrMapOvr>
     <a:masterClrMapping/>
   </p:clrMapOvr>
-  <p:transition xmlns:p14="http://schemas.microsoft.com/office/powerpoint/2010/main" spd="med"/>
+  <p:transition spd="med"/>
   <p:timing>
     <p:tnLst>
       <p:par>
-        <p:cTn xmlns:p14="http://schemas.microsoft.com/office/powerpoint/2010/main" id="1" dur="indefinite" restart="never" nodeType="tmRoot">
+        <p:cTn id="1" dur="indefinite" restart="never" nodeType="tmRoot">
           <p:childTnLst>
             <p:seq concurrent="1" nextAc="seek">
               <p:cTn id="2" dur="0" nodeType="mainSeq"/>
@@ -42173,14 +42189,14 @@
           </a:ln>
           <a:effectLst/>
           <a:extLst>
-            <a:ext uri="{909E8E84-426E-40dd-AFC4-6F175D3DCCD1}">
+            <a:ext uri="{909E8E84-426E-40DD-AFC4-6F175D3DCCD1}">
               <a14:hiddenFill xmlns:a14="http://schemas.microsoft.com/office/drawing/2010/main">
                 <a:solidFill>
                   <a:srgbClr val="FFFFFF"/>
                 </a:solidFill>
               </a14:hiddenFill>
             </a:ext>
-            <a:ext uri="{91240B29-F687-4f45-9708-019B960494DF}">
+            <a:ext uri="{91240B29-F687-4F45-9708-019B960494DF}">
               <a14:hiddenLine xmlns:a14="http://schemas.microsoft.com/office/drawing/2010/main" w="9525" cap="flat">
                 <a:solidFill>
                   <a:srgbClr val="808080"/>
@@ -42190,7 +42206,7 @@
                 <a:tailEnd/>
               </a14:hiddenLine>
             </a:ext>
-            <a:ext uri="{AF507438-7753-43e0-B8FC-AC1667EBCBE1}">
+            <a:ext uri="{AF507438-7753-43E0-B8FC-AC1667EBCBE1}">
               <a14:hiddenEffects xmlns:a14="http://schemas.microsoft.com/office/drawing/2010/main">
                 <a:effectLst>
                   <a:outerShdw dist="35921" dir="2700000" algn="ctr" rotWithShape="0">
@@ -42646,14 +42662,14 @@
           </a:ln>
           <a:effectLst/>
           <a:extLst>
-            <a:ext uri="{909E8E84-426E-40dd-AFC4-6F175D3DCCD1}">
+            <a:ext uri="{909E8E84-426E-40DD-AFC4-6F175D3DCCD1}">
               <a14:hiddenFill xmlns:a14="http://schemas.microsoft.com/office/drawing/2010/main">
                 <a:solidFill>
                   <a:srgbClr val="FFFFFF"/>
                 </a:solidFill>
               </a14:hiddenFill>
             </a:ext>
-            <a:ext uri="{91240B29-F687-4f45-9708-019B960494DF}">
+            <a:ext uri="{91240B29-F687-4F45-9708-019B960494DF}">
               <a14:hiddenLine xmlns:a14="http://schemas.microsoft.com/office/drawing/2010/main" w="9525" cap="flat">
                 <a:solidFill>
                   <a:srgbClr val="808080"/>
@@ -42663,7 +42679,7 @@
                 <a:tailEnd/>
               </a14:hiddenLine>
             </a:ext>
-            <a:ext uri="{AF507438-7753-43e0-B8FC-AC1667EBCBE1}">
+            <a:ext uri="{AF507438-7753-43E0-B8FC-AC1667EBCBE1}">
               <a14:hiddenEffects xmlns:a14="http://schemas.microsoft.com/office/drawing/2010/main">
                 <a:effectLst>
                   <a:outerShdw dist="35921" dir="2700000" algn="ctr" rotWithShape="0">
@@ -42879,11 +42895,11 @@
   <p:clrMapOvr>
     <a:masterClrMapping/>
   </p:clrMapOvr>
-  <p:transition xmlns:p14="http://schemas.microsoft.com/office/powerpoint/2010/main" spd="med"/>
+  <p:transition spd="med"/>
   <p:timing>
     <p:tnLst>
       <p:par>
-        <p:cTn xmlns:p14="http://schemas.microsoft.com/office/powerpoint/2010/main" id="1" dur="indefinite" restart="never" nodeType="tmRoot">
+        <p:cTn id="1" dur="indefinite" restart="never" nodeType="tmRoot">
           <p:childTnLst>
             <p:seq concurrent="1" nextAc="seek">
               <p:cTn id="2" dur="0" nodeType="mainSeq"/>
@@ -42995,14 +43011,14 @@
           </a:ln>
           <a:effectLst/>
           <a:extLst>
-            <a:ext uri="{909E8E84-426E-40dd-AFC4-6F175D3DCCD1}">
+            <a:ext uri="{909E8E84-426E-40DD-AFC4-6F175D3DCCD1}">
               <a14:hiddenFill xmlns:a14="http://schemas.microsoft.com/office/drawing/2010/main">
                 <a:solidFill>
                   <a:srgbClr val="FFFFFF"/>
                 </a:solidFill>
               </a14:hiddenFill>
             </a:ext>
-            <a:ext uri="{91240B29-F687-4f45-9708-019B960494DF}">
+            <a:ext uri="{91240B29-F687-4F45-9708-019B960494DF}">
               <a14:hiddenLine xmlns:a14="http://schemas.microsoft.com/office/drawing/2010/main" w="9525" cap="flat">
                 <a:solidFill>
                   <a:srgbClr val="808080"/>
@@ -43012,7 +43028,7 @@
                 <a:tailEnd/>
               </a14:hiddenLine>
             </a:ext>
-            <a:ext uri="{AF507438-7753-43e0-B8FC-AC1667EBCBE1}">
+            <a:ext uri="{AF507438-7753-43E0-B8FC-AC1667EBCBE1}">
               <a14:hiddenEffects xmlns:a14="http://schemas.microsoft.com/office/drawing/2010/main">
                 <a:effectLst>
                   <a:outerShdw dist="35921" dir="2700000" algn="ctr" rotWithShape="0">
@@ -43452,14 +43468,14 @@
           </a:ln>
           <a:effectLst/>
           <a:extLst>
-            <a:ext uri="{909E8E84-426E-40dd-AFC4-6F175D3DCCD1}">
+            <a:ext uri="{909E8E84-426E-40DD-AFC4-6F175D3DCCD1}">
               <a14:hiddenFill xmlns:a14="http://schemas.microsoft.com/office/drawing/2010/main">
                 <a:solidFill>
                   <a:srgbClr val="FFFFFF"/>
                 </a:solidFill>
               </a14:hiddenFill>
             </a:ext>
-            <a:ext uri="{91240B29-F687-4f45-9708-019B960494DF}">
+            <a:ext uri="{91240B29-F687-4F45-9708-019B960494DF}">
               <a14:hiddenLine xmlns:a14="http://schemas.microsoft.com/office/drawing/2010/main" w="9525" cap="flat">
                 <a:solidFill>
                   <a:srgbClr val="808080"/>
@@ -43469,7 +43485,7 @@
                 <a:tailEnd/>
               </a14:hiddenLine>
             </a:ext>
-            <a:ext uri="{AF507438-7753-43e0-B8FC-AC1667EBCBE1}">
+            <a:ext uri="{AF507438-7753-43E0-B8FC-AC1667EBCBE1}">
               <a14:hiddenEffects xmlns:a14="http://schemas.microsoft.com/office/drawing/2010/main">
                 <a:effectLst>
                   <a:outerShdw dist="35921" dir="2700000" algn="ctr" rotWithShape="0">
@@ -43685,11 +43701,11 @@
   <p:clrMapOvr>
     <a:masterClrMapping/>
   </p:clrMapOvr>
-  <p:transition xmlns:p14="http://schemas.microsoft.com/office/powerpoint/2010/main" spd="med"/>
+  <p:transition spd="med"/>
   <p:timing>
     <p:tnLst>
       <p:par>
-        <p:cTn xmlns:p14="http://schemas.microsoft.com/office/powerpoint/2010/main" id="1" dur="indefinite" restart="never" nodeType="tmRoot">
+        <p:cTn id="1" dur="indefinite" restart="never" nodeType="tmRoot">
           <p:childTnLst>
             <p:seq concurrent="1" nextAc="seek">
               <p:cTn id="2" dur="0" nodeType="mainSeq"/>
@@ -43808,14 +43824,14 @@
           </a:ln>
           <a:effectLst/>
           <a:extLst>
-            <a:ext uri="{909E8E84-426E-40dd-AFC4-6F175D3DCCD1}">
+            <a:ext uri="{909E8E84-426E-40DD-AFC4-6F175D3DCCD1}">
               <a14:hiddenFill xmlns:a14="http://schemas.microsoft.com/office/drawing/2010/main">
                 <a:solidFill>
                   <a:srgbClr val="FFFFFF"/>
                 </a:solidFill>
               </a14:hiddenFill>
             </a:ext>
-            <a:ext uri="{91240B29-F687-4f45-9708-019B960494DF}">
+            <a:ext uri="{91240B29-F687-4F45-9708-019B960494DF}">
               <a14:hiddenLine xmlns:a14="http://schemas.microsoft.com/office/drawing/2010/main" w="9525" cap="flat">
                 <a:solidFill>
                   <a:srgbClr val="808080"/>
@@ -43825,7 +43841,7 @@
                 <a:tailEnd/>
               </a14:hiddenLine>
             </a:ext>
-            <a:ext uri="{AF507438-7753-43e0-B8FC-AC1667EBCBE1}">
+            <a:ext uri="{AF507438-7753-43E0-B8FC-AC1667EBCBE1}">
               <a14:hiddenEffects xmlns:a14="http://schemas.microsoft.com/office/drawing/2010/main">
                 <a:effectLst>
                   <a:outerShdw dist="35921" dir="2700000" algn="ctr" rotWithShape="0">
@@ -44410,14 +44426,14 @@
           </a:ln>
           <a:effectLst/>
           <a:extLst>
-            <a:ext uri="{909E8E84-426E-40dd-AFC4-6F175D3DCCD1}">
+            <a:ext uri="{909E8E84-426E-40DD-AFC4-6F175D3DCCD1}">
               <a14:hiddenFill xmlns:a14="http://schemas.microsoft.com/office/drawing/2010/main">
                 <a:solidFill>
                   <a:srgbClr val="FFFFFF"/>
                 </a:solidFill>
               </a14:hiddenFill>
             </a:ext>
-            <a:ext uri="{91240B29-F687-4f45-9708-019B960494DF}">
+            <a:ext uri="{91240B29-F687-4F45-9708-019B960494DF}">
               <a14:hiddenLine xmlns:a14="http://schemas.microsoft.com/office/drawing/2010/main" w="9525" cap="flat">
                 <a:solidFill>
                   <a:srgbClr val="808080"/>
@@ -44427,7 +44443,7 @@
                 <a:tailEnd/>
               </a14:hiddenLine>
             </a:ext>
-            <a:ext uri="{AF507438-7753-43e0-B8FC-AC1667EBCBE1}">
+            <a:ext uri="{AF507438-7753-43E0-B8FC-AC1667EBCBE1}">
               <a14:hiddenEffects xmlns:a14="http://schemas.microsoft.com/office/drawing/2010/main">
                 <a:effectLst>
                   <a:outerShdw dist="35921" dir="2700000" algn="ctr" rotWithShape="0">
@@ -44532,14 +44548,14 @@
           </a:ln>
           <a:effectLst/>
           <a:extLst>
-            <a:ext uri="{909E8E84-426E-40dd-AFC4-6F175D3DCCD1}">
+            <a:ext uri="{909E8E84-426E-40DD-AFC4-6F175D3DCCD1}">
               <a14:hiddenFill xmlns:a14="http://schemas.microsoft.com/office/drawing/2010/main">
                 <a:solidFill>
                   <a:srgbClr val="FFFFFF"/>
                 </a:solidFill>
               </a14:hiddenFill>
             </a:ext>
-            <a:ext uri="{91240B29-F687-4f45-9708-019B960494DF}">
+            <a:ext uri="{91240B29-F687-4F45-9708-019B960494DF}">
               <a14:hiddenLine xmlns:a14="http://schemas.microsoft.com/office/drawing/2010/main" w="9525" cap="flat">
                 <a:solidFill>
                   <a:srgbClr val="808080"/>
@@ -44549,7 +44565,7 @@
                 <a:tailEnd/>
               </a14:hiddenLine>
             </a:ext>
-            <a:ext uri="{AF507438-7753-43e0-B8FC-AC1667EBCBE1}">
+            <a:ext uri="{AF507438-7753-43E0-B8FC-AC1667EBCBE1}">
               <a14:hiddenEffects xmlns:a14="http://schemas.microsoft.com/office/drawing/2010/main">
                 <a:effectLst>
                   <a:outerShdw dist="35921" dir="2700000" algn="ctr" rotWithShape="0">
@@ -44765,11 +44781,11 @@
   <p:clrMapOvr>
     <a:masterClrMapping/>
   </p:clrMapOvr>
-  <p:transition xmlns:p14="http://schemas.microsoft.com/office/powerpoint/2010/main" spd="med"/>
+  <p:transition spd="med"/>
   <p:timing>
     <p:tnLst>
       <p:par>
-        <p:cTn xmlns:p14="http://schemas.microsoft.com/office/powerpoint/2010/main" id="1" dur="indefinite" restart="never" nodeType="tmRoot">
+        <p:cTn id="1" dur="indefinite" restart="never" nodeType="tmRoot">
           <p:childTnLst>
             <p:seq concurrent="1" nextAc="seek">
               <p:cTn id="2" dur="0" nodeType="mainSeq"/>
@@ -44881,14 +44897,14 @@
           </a:ln>
           <a:effectLst/>
           <a:extLst>
-            <a:ext uri="{909E8E84-426E-40dd-AFC4-6F175D3DCCD1}">
+            <a:ext uri="{909E8E84-426E-40DD-AFC4-6F175D3DCCD1}">
               <a14:hiddenFill xmlns:a14="http://schemas.microsoft.com/office/drawing/2010/main">
                 <a:solidFill>
                   <a:srgbClr val="FFFFFF"/>
                 </a:solidFill>
               </a14:hiddenFill>
             </a:ext>
-            <a:ext uri="{91240B29-F687-4f45-9708-019B960494DF}">
+            <a:ext uri="{91240B29-F687-4F45-9708-019B960494DF}">
               <a14:hiddenLine xmlns:a14="http://schemas.microsoft.com/office/drawing/2010/main" w="9525" cap="flat">
                 <a:solidFill>
                   <a:srgbClr val="808080"/>
@@ -44898,7 +44914,7 @@
                 <a:tailEnd/>
               </a14:hiddenLine>
             </a:ext>
-            <a:ext uri="{AF507438-7753-43e0-B8FC-AC1667EBCBE1}">
+            <a:ext uri="{AF507438-7753-43E0-B8FC-AC1667EBCBE1}">
               <a14:hiddenEffects xmlns:a14="http://schemas.microsoft.com/office/drawing/2010/main">
                 <a:effectLst>
                   <a:outerShdw dist="35921" dir="2700000" algn="ctr" rotWithShape="0">
@@ -45402,14 +45418,14 @@
           </a:ln>
           <a:effectLst/>
           <a:extLst>
-            <a:ext uri="{909E8E84-426E-40dd-AFC4-6F175D3DCCD1}">
+            <a:ext uri="{909E8E84-426E-40DD-AFC4-6F175D3DCCD1}">
               <a14:hiddenFill xmlns:a14="http://schemas.microsoft.com/office/drawing/2010/main">
                 <a:solidFill>
                   <a:srgbClr val="FFFFFF"/>
                 </a:solidFill>
               </a14:hiddenFill>
             </a:ext>
-            <a:ext uri="{91240B29-F687-4f45-9708-019B960494DF}">
+            <a:ext uri="{91240B29-F687-4F45-9708-019B960494DF}">
               <a14:hiddenLine xmlns:a14="http://schemas.microsoft.com/office/drawing/2010/main" w="9525" cap="flat">
                 <a:solidFill>
                   <a:srgbClr val="808080"/>
@@ -45419,7 +45435,7 @@
                 <a:tailEnd/>
               </a14:hiddenLine>
             </a:ext>
-            <a:ext uri="{AF507438-7753-43e0-B8FC-AC1667EBCBE1}">
+            <a:ext uri="{AF507438-7753-43E0-B8FC-AC1667EBCBE1}">
               <a14:hiddenEffects xmlns:a14="http://schemas.microsoft.com/office/drawing/2010/main">
                 <a:effectLst>
                   <a:outerShdw dist="35921" dir="2700000" algn="ctr" rotWithShape="0">
@@ -45635,11 +45651,11 @@
   <p:clrMapOvr>
     <a:masterClrMapping/>
   </p:clrMapOvr>
-  <p:transition xmlns:p14="http://schemas.microsoft.com/office/powerpoint/2010/main" spd="med"/>
+  <p:transition spd="med"/>
   <p:timing>
     <p:tnLst>
       <p:par>
-        <p:cTn xmlns:p14="http://schemas.microsoft.com/office/powerpoint/2010/main" id="1" dur="indefinite" restart="never" nodeType="tmRoot">
+        <p:cTn id="1" dur="indefinite" restart="never" nodeType="tmRoot">
           <p:childTnLst>
             <p:seq concurrent="1" nextAc="seek">
               <p:cTn id="2" dur="0" nodeType="mainSeq"/>
@@ -45758,14 +45774,14 @@
           </a:ln>
           <a:effectLst/>
           <a:extLst>
-            <a:ext uri="{909E8E84-426E-40dd-AFC4-6F175D3DCCD1}">
+            <a:ext uri="{909E8E84-426E-40DD-AFC4-6F175D3DCCD1}">
               <a14:hiddenFill xmlns:a14="http://schemas.microsoft.com/office/drawing/2010/main">
                 <a:solidFill>
                   <a:srgbClr val="FFFFFF"/>
                 </a:solidFill>
               </a14:hiddenFill>
             </a:ext>
-            <a:ext uri="{91240B29-F687-4f45-9708-019B960494DF}">
+            <a:ext uri="{91240B29-F687-4F45-9708-019B960494DF}">
               <a14:hiddenLine xmlns:a14="http://schemas.microsoft.com/office/drawing/2010/main" w="9525" cap="flat">
                 <a:solidFill>
                   <a:srgbClr val="808080"/>
@@ -45775,7 +45791,7 @@
                 <a:tailEnd/>
               </a14:hiddenLine>
             </a:ext>
-            <a:ext uri="{AF507438-7753-43e0-B8FC-AC1667EBCBE1}">
+            <a:ext uri="{AF507438-7753-43E0-B8FC-AC1667EBCBE1}">
               <a14:hiddenEffects xmlns:a14="http://schemas.microsoft.com/office/drawing/2010/main">
                 <a:effectLst>
                   <a:outerShdw dist="35921" dir="2700000" algn="ctr" rotWithShape="0">
@@ -46294,14 +46310,14 @@
           </a:ln>
           <a:effectLst/>
           <a:extLst>
-            <a:ext uri="{909E8E84-426E-40dd-AFC4-6F175D3DCCD1}">
+            <a:ext uri="{909E8E84-426E-40DD-AFC4-6F175D3DCCD1}">
               <a14:hiddenFill xmlns:a14="http://schemas.microsoft.com/office/drawing/2010/main">
                 <a:solidFill>
                   <a:srgbClr val="FFFFFF"/>
                 </a:solidFill>
               </a14:hiddenFill>
             </a:ext>
-            <a:ext uri="{91240B29-F687-4f45-9708-019B960494DF}">
+            <a:ext uri="{91240B29-F687-4F45-9708-019B960494DF}">
               <a14:hiddenLine xmlns:a14="http://schemas.microsoft.com/office/drawing/2010/main" w="9525" cap="flat">
                 <a:solidFill>
                   <a:srgbClr val="808080"/>
@@ -46311,7 +46327,7 @@
                 <a:tailEnd/>
               </a14:hiddenLine>
             </a:ext>
-            <a:ext uri="{AF507438-7753-43e0-B8FC-AC1667EBCBE1}">
+            <a:ext uri="{AF507438-7753-43E0-B8FC-AC1667EBCBE1}">
               <a14:hiddenEffects xmlns:a14="http://schemas.microsoft.com/office/drawing/2010/main">
                 <a:effectLst>
                   <a:outerShdw dist="35921" dir="2700000" algn="ctr" rotWithShape="0">
@@ -46527,11 +46543,11 @@
   <p:clrMapOvr>
     <a:masterClrMapping/>
   </p:clrMapOvr>
-  <p:transition xmlns:p14="http://schemas.microsoft.com/office/powerpoint/2010/main" spd="med"/>
+  <p:transition spd="med"/>
   <p:timing>
     <p:tnLst>
       <p:par>
-        <p:cTn xmlns:p14="http://schemas.microsoft.com/office/powerpoint/2010/main" id="1" dur="indefinite" restart="never" nodeType="tmRoot">
+        <p:cTn id="1" dur="indefinite" restart="never" nodeType="tmRoot">
           <p:childTnLst>
             <p:seq concurrent="1" nextAc="seek">
               <p:cTn id="2" dur="0" nodeType="mainSeq"/>
@@ -46807,7 +46823,7 @@
         </a:ln>
         <a:effectLst/>
         <a:extLst>
-          <a:ext uri="{AF507438-7753-43e0-B8FC-AC1667EBCBE1}">
+          <a:ext uri="{AF507438-7753-43E0-B8FC-AC1667EBCBE1}">
             <a14:hiddenEffects xmlns:a14="http://schemas.microsoft.com/office/drawing/2010/main">
               <a:effectLst>
                 <a:outerShdw dist="35921" dir="2700000" algn="ctr" rotWithShape="0">
@@ -46880,7 +46896,7 @@
         </a:ln>
         <a:effectLst/>
         <a:extLst>
-          <a:ext uri="{AF507438-7753-43e0-B8FC-AC1667EBCBE1}">
+          <a:ext uri="{AF507438-7753-43E0-B8FC-AC1667EBCBE1}">
             <a14:hiddenEffects xmlns:a14="http://schemas.microsoft.com/office/drawing/2010/main">
               <a:effectLst>
                 <a:outerShdw dist="35921" dir="2700000" algn="ctr" rotWithShape="0">
@@ -47467,7 +47483,7 @@
         </a:ln>
         <a:effectLst/>
         <a:extLst>
-          <a:ext uri="{AF507438-7753-43e0-B8FC-AC1667EBCBE1}">
+          <a:ext uri="{AF507438-7753-43E0-B8FC-AC1667EBCBE1}">
             <a14:hiddenEffects xmlns:a14="http://schemas.microsoft.com/office/drawing/2010/main">
               <a:effectLst>
                 <a:outerShdw dist="35921" dir="2700000" algn="ctr" rotWithShape="0">
@@ -47540,7 +47556,7 @@
         </a:ln>
         <a:effectLst/>
         <a:extLst>
-          <a:ext uri="{AF507438-7753-43e0-B8FC-AC1667EBCBE1}">
+          <a:ext uri="{AF507438-7753-43E0-B8FC-AC1667EBCBE1}">
             <a14:hiddenEffects xmlns:a14="http://schemas.microsoft.com/office/drawing/2010/main">
               <a:effectLst>
                 <a:outerShdw dist="35921" dir="2700000" algn="ctr" rotWithShape="0">

</xml_diff>